<commit_message>
Updates to ArticleSummary files and added another figure
</commit_message>
<xml_diff>
--- a/Assignments/ArticleSummary/ArticleSummarySlides-MJS.pptx
+++ b/Assignments/ArticleSummary/ArticleSummarySlides-MJS.pptx
@@ -6,10 +6,14 @@
   </p:sldMasterIdLst>
   <p:sldIdLst>
     <p:sldId id="258" r:id="rId2"/>
-    <p:sldId id="257" r:id="rId3"/>
-    <p:sldId id="259" r:id="rId4"/>
-    <p:sldId id="261" r:id="rId5"/>
-    <p:sldId id="262" r:id="rId6"/>
+    <p:sldId id="270" r:id="rId3"/>
+    <p:sldId id="269" r:id="rId4"/>
+    <p:sldId id="257" r:id="rId5"/>
+    <p:sldId id="265" r:id="rId6"/>
+    <p:sldId id="266" r:id="rId7"/>
+    <p:sldId id="267" r:id="rId8"/>
+    <p:sldId id="268" r:id="rId9"/>
+    <p:sldId id="262" r:id="rId10"/>
   </p:sldIdLst>
   <p:sldSz cx="12192000" cy="6858000"/>
   <p:notesSz cx="6858000" cy="9144000"/>
@@ -244,7 +248,7 @@
           <a:p>
             <a:fld id="{48A87A34-81AB-432B-8DAE-1953F412C126}" type="datetimeFigureOut">
               <a:rPr lang="en-US" dirty="0"/>
-              <a:t>22-Feb-16</a:t>
+              <a:t>23-Feb-2016</a:t>
             </a:fld>
             <a:endParaRPr lang="en-US" dirty="0"/>
           </a:p>
@@ -526,7 +530,7 @@
           <a:p>
             <a:fld id="{48A87A34-81AB-432B-8DAE-1953F412C126}" type="datetimeFigureOut">
               <a:rPr lang="en-US" dirty="0"/>
-              <a:t>22-Feb-16</a:t>
+              <a:t>23-Feb-2016</a:t>
             </a:fld>
             <a:endParaRPr lang="en-US" dirty="0"/>
           </a:p>
@@ -713,7 +717,7 @@
           <a:p>
             <a:fld id="{48A87A34-81AB-432B-8DAE-1953F412C126}" type="datetimeFigureOut">
               <a:rPr lang="en-US" dirty="0"/>
-              <a:t>22-Feb-16</a:t>
+              <a:t>23-Feb-2016</a:t>
             </a:fld>
             <a:endParaRPr lang="en-US" dirty="0"/>
           </a:p>
@@ -969,7 +973,7 @@
           <a:p>
             <a:fld id="{48A87A34-81AB-432B-8DAE-1953F412C126}" type="datetimeFigureOut">
               <a:rPr lang="en-US" dirty="0"/>
-              <a:t>22-Feb-16</a:t>
+              <a:t>23-Feb-2016</a:t>
             </a:fld>
             <a:endParaRPr lang="en-US" dirty="0"/>
           </a:p>
@@ -1388,7 +1392,7 @@
           <a:p>
             <a:fld id="{48A87A34-81AB-432B-8DAE-1953F412C126}" type="datetimeFigureOut">
               <a:rPr lang="en-US" dirty="0"/>
-              <a:t>22-Feb-16</a:t>
+              <a:t>23-Feb-2016</a:t>
             </a:fld>
             <a:endParaRPr lang="en-US" dirty="0"/>
           </a:p>
@@ -1929,7 +1933,7 @@
           <a:p>
             <a:fld id="{48A87A34-81AB-432B-8DAE-1953F412C126}" type="datetimeFigureOut">
               <a:rPr lang="en-US" dirty="0"/>
-              <a:t>22-Feb-16</a:t>
+              <a:t>23-Feb-2016</a:t>
             </a:fld>
             <a:endParaRPr lang="en-US" dirty="0"/>
           </a:p>
@@ -2764,7 +2768,7 @@
           <a:p>
             <a:fld id="{48A87A34-81AB-432B-8DAE-1953F412C126}" type="datetimeFigureOut">
               <a:rPr lang="en-US" dirty="0"/>
-              <a:t>22-Feb-16</a:t>
+              <a:t>23-Feb-2016</a:t>
             </a:fld>
             <a:endParaRPr lang="en-US" dirty="0"/>
           </a:p>
@@ -2929,7 +2933,7 @@
           <a:p>
             <a:fld id="{48A87A34-81AB-432B-8DAE-1953F412C126}" type="datetimeFigureOut">
               <a:rPr lang="en-US" dirty="0"/>
-              <a:t>22-Feb-16</a:t>
+              <a:t>23-Feb-2016</a:t>
             </a:fld>
             <a:endParaRPr lang="en-US" dirty="0"/>
           </a:p>
@@ -3108,7 +3112,7 @@
           <a:p>
             <a:fld id="{48A87A34-81AB-432B-8DAE-1953F412C126}" type="datetimeFigureOut">
               <a:rPr lang="en-US" dirty="0"/>
-              <a:t>22-Feb-16</a:t>
+              <a:t>23-Feb-2016</a:t>
             </a:fld>
             <a:endParaRPr lang="en-US" dirty="0"/>
           </a:p>
@@ -3273,7 +3277,7 @@
           <a:p>
             <a:fld id="{48A87A34-81AB-432B-8DAE-1953F412C126}" type="datetimeFigureOut">
               <a:rPr lang="en-US" dirty="0"/>
-              <a:t>22-Feb-16</a:t>
+              <a:t>23-Feb-2016</a:t>
             </a:fld>
             <a:endParaRPr lang="en-US" dirty="0"/>
           </a:p>
@@ -3516,7 +3520,7 @@
           <a:p>
             <a:fld id="{48A87A34-81AB-432B-8DAE-1953F412C126}" type="datetimeFigureOut">
               <a:rPr lang="en-US" dirty="0"/>
-              <a:t>22-Feb-16</a:t>
+              <a:t>23-Feb-2016</a:t>
             </a:fld>
             <a:endParaRPr lang="en-US" dirty="0"/>
           </a:p>
@@ -3748,7 +3752,7 @@
           <a:p>
             <a:fld id="{48A87A34-81AB-432B-8DAE-1953F412C126}" type="datetimeFigureOut">
               <a:rPr lang="en-US" dirty="0"/>
-              <a:t>22-Feb-16</a:t>
+              <a:t>23-Feb-2016</a:t>
             </a:fld>
             <a:endParaRPr lang="en-US" dirty="0"/>
           </a:p>
@@ -4116,7 +4120,7 @@
           <a:p>
             <a:fld id="{48A87A34-81AB-432B-8DAE-1953F412C126}" type="datetimeFigureOut">
               <a:rPr lang="en-US" dirty="0"/>
-              <a:t>22-Feb-16</a:t>
+              <a:t>23-Feb-2016</a:t>
             </a:fld>
             <a:endParaRPr lang="en-US" dirty="0"/>
           </a:p>
@@ -4229,7 +4233,7 @@
           <a:p>
             <a:fld id="{48A87A34-81AB-432B-8DAE-1953F412C126}" type="datetimeFigureOut">
               <a:rPr lang="en-US" dirty="0"/>
-              <a:t>22-Feb-16</a:t>
+              <a:t>23-Feb-2016</a:t>
             </a:fld>
             <a:endParaRPr lang="en-US" dirty="0"/>
           </a:p>
@@ -4319,7 +4323,7 @@
           <a:p>
             <a:fld id="{48A87A34-81AB-432B-8DAE-1953F412C126}" type="datetimeFigureOut">
               <a:rPr lang="en-US" dirty="0"/>
-              <a:t>22-Feb-16</a:t>
+              <a:t>23-Feb-2016</a:t>
             </a:fld>
             <a:endParaRPr lang="en-US" dirty="0"/>
           </a:p>
@@ -4565,7 +4569,7 @@
           <a:p>
             <a:fld id="{48A87A34-81AB-432B-8DAE-1953F412C126}" type="datetimeFigureOut">
               <a:rPr lang="en-US" dirty="0"/>
-              <a:t>22-Feb-16</a:t>
+              <a:t>23-Feb-2016</a:t>
             </a:fld>
             <a:endParaRPr lang="en-US" dirty="0"/>
           </a:p>
@@ -4847,7 +4851,7 @@
           <a:p>
             <a:fld id="{48A87A34-81AB-432B-8DAE-1953F412C126}" type="datetimeFigureOut">
               <a:rPr lang="en-US" dirty="0"/>
-              <a:t>22-Feb-16</a:t>
+              <a:t>23-Feb-2016</a:t>
             </a:fld>
             <a:endParaRPr lang="en-US" dirty="0"/>
           </a:p>
@@ -5056,7 +5060,7 @@
             <a:fld id="{48A87A34-81AB-432B-8DAE-1953F412C126}" type="datetimeFigureOut">
               <a:rPr lang="en-US" dirty="0"/>
               <a:pPr/>
-              <a:t>22-Feb-16</a:t>
+              <a:t>23-Feb-2016</a:t>
             </a:fld>
             <a:endParaRPr lang="en-US" dirty="0"/>
           </a:p>
@@ -5670,12 +5674,17 @@
             <p:ph type="title"/>
           </p:nvPr>
         </p:nvSpPr>
-        <p:spPr/>
-        <p:txBody>
-          <a:bodyPr/>
-          <a:lstStyle/>
-          <a:p>
-            <a:endParaRPr lang="en-US"/>
+        <p:spPr>
+          <a:xfrm>
+            <a:off x="913795" y="457200"/>
+            <a:ext cx="10353761" cy="914400"/>
+          </a:xfrm>
+        </p:spPr>
+        <p:txBody>
+          <a:bodyPr/>
+          <a:lstStyle/>
+          <a:p>
+            <a:endParaRPr lang="en-US" dirty="0"/>
           </a:p>
         </p:txBody>
       </p:sp>
@@ -5689,19 +5698,28 @@
             <p:ph idx="1"/>
           </p:nvPr>
         </p:nvSpPr>
-        <p:spPr/>
-        <p:txBody>
-          <a:bodyPr/>
-          <a:lstStyle/>
-          <a:p>
-            <a:endParaRPr lang="en-US"/>
+        <p:spPr>
+          <a:xfrm>
+            <a:off x="913795" y="1600200"/>
+            <a:ext cx="10353762" cy="4572000"/>
+          </a:xfrm>
+        </p:spPr>
+        <p:txBody>
+          <a:bodyPr/>
+          <a:lstStyle/>
+          <a:p>
+            <a:r>
+              <a:rPr lang="en-US" dirty="0" smtClean="0"/>
+              <a:t>Automatic speech recognition (ASR) system pronunciation dictionary (or lexicon) </a:t>
+            </a:r>
+            <a:endParaRPr lang="en-US" dirty="0"/>
           </a:p>
         </p:txBody>
       </p:sp>
     </p:spTree>
     <p:extLst>
       <p:ext uri="{BB962C8B-B14F-4D97-AF65-F5344CB8AC3E}">
-        <p14:creationId xmlns:p14="http://schemas.microsoft.com/office/powerpoint/2010/main" val="582041634"/>
+        <p14:creationId xmlns:p14="http://schemas.microsoft.com/office/powerpoint/2010/main" val="1643602549"/>
       </p:ext>
     </p:extLst>
   </p:cSld>
@@ -5728,70 +5746,176 @@
           <a:chExt cx="0" cy="0"/>
         </a:xfrm>
       </p:grpSpPr>
-      <p:pic>
-        <p:nvPicPr>
-          <p:cNvPr id="2" name="Picture 1"/>
-          <p:cNvPicPr>
-            <a:picLocks noChangeAspect="1"/>
-          </p:cNvPicPr>
-          <p:nvPr/>
-        </p:nvPicPr>
-        <p:blipFill>
-          <a:blip r:embed="rId2">
-            <a:extLst>
-              <a:ext uri="{28A0092B-C50C-407E-A947-70E740481C1C}">
-                <a14:useLocalDpi xmlns:a14="http://schemas.microsoft.com/office/drawing/2010/main" val="0"/>
-              </a:ext>
-            </a:extLst>
-          </a:blip>
-          <a:stretch>
-            <a:fillRect/>
-          </a:stretch>
-        </p:blipFill>
-        <p:spPr>
-          <a:xfrm>
-            <a:off x="1025621" y="1663303"/>
-            <a:ext cx="3295819" cy="1371670"/>
-          </a:xfrm>
-          <a:prstGeom prst="rect">
-            <a:avLst/>
-          </a:prstGeom>
-        </p:spPr>
-      </p:pic>
-      <p:pic>
-        <p:nvPicPr>
-          <p:cNvPr id="3" name="Picture 2"/>
-          <p:cNvPicPr>
-            <a:picLocks noChangeAspect="1"/>
-          </p:cNvPicPr>
-          <p:nvPr/>
-        </p:nvPicPr>
-        <p:blipFill>
-          <a:blip r:embed="rId3">
-            <a:extLst>
-              <a:ext uri="{28A0092B-C50C-407E-A947-70E740481C1C}">
-                <a14:useLocalDpi xmlns:a14="http://schemas.microsoft.com/office/drawing/2010/main" val="0"/>
-              </a:ext>
-            </a:extLst>
-          </a:blip>
-          <a:stretch>
-            <a:fillRect/>
-          </a:stretch>
-        </p:blipFill>
-        <p:spPr>
-          <a:xfrm>
-            <a:off x="6180187" y="1624150"/>
-            <a:ext cx="3384724" cy="2787793"/>
-          </a:xfrm>
-          <a:prstGeom prst="rect">
-            <a:avLst/>
-          </a:prstGeom>
-        </p:spPr>
-      </p:pic>
+      <p:sp>
+        <p:nvSpPr>
+          <p:cNvPr id="2" name="Title 1"/>
+          <p:cNvSpPr>
+            <a:spLocks noGrp="1"/>
+          </p:cNvSpPr>
+          <p:nvPr>
+            <p:ph type="title"/>
+          </p:nvPr>
+        </p:nvSpPr>
+        <p:spPr>
+          <a:xfrm>
+            <a:off x="913795" y="457200"/>
+            <a:ext cx="10353761" cy="914400"/>
+          </a:xfrm>
+        </p:spPr>
+        <p:txBody>
+          <a:bodyPr/>
+          <a:lstStyle/>
+          <a:p>
+            <a:r>
+              <a:rPr lang="en-US" dirty="0" smtClean="0"/>
+              <a:t>Existing/related work</a:t>
+            </a:r>
+            <a:endParaRPr lang="en-US" dirty="0"/>
+          </a:p>
+        </p:txBody>
+      </p:sp>
+      <p:sp>
+        <p:nvSpPr>
+          <p:cNvPr id="3" name="Content Placeholder 2"/>
+          <p:cNvSpPr>
+            <a:spLocks noGrp="1"/>
+          </p:cNvSpPr>
+          <p:nvPr>
+            <p:ph idx="1"/>
+          </p:nvPr>
+        </p:nvSpPr>
+        <p:spPr>
+          <a:xfrm>
+            <a:off x="913795" y="1600200"/>
+            <a:ext cx="10353762" cy="4572000"/>
+          </a:xfrm>
+        </p:spPr>
+        <p:txBody>
+          <a:bodyPr>
+            <a:normAutofit fontScale="92500" lnSpcReduction="10000"/>
+          </a:bodyPr>
+          <a:lstStyle/>
+          <a:p>
+            <a:r>
+              <a:rPr lang="en-US" dirty="0" smtClean="0"/>
+              <a:t>Research on machine learning for grapheme to phoneme conversion (</a:t>
+            </a:r>
+            <a:r>
+              <a:rPr lang="en-US" dirty="0" err="1" smtClean="0"/>
+              <a:t>G2P</a:t>
+            </a:r>
+            <a:r>
+              <a:rPr lang="en-US" dirty="0" smtClean="0"/>
+              <a:t>):</a:t>
+            </a:r>
+          </a:p>
+          <a:p>
+            <a:pPr lvl="1"/>
+            <a:r>
+              <a:rPr lang="en-US" dirty="0" smtClean="0"/>
+              <a:t>Decision tree classifier to learn pronunciation rules</a:t>
+            </a:r>
+          </a:p>
+          <a:p>
+            <a:pPr lvl="1"/>
+            <a:r>
+              <a:rPr lang="en-US" dirty="0" smtClean="0"/>
+              <a:t>Joint </a:t>
+            </a:r>
+            <a:r>
+              <a:rPr lang="en-US" dirty="0" err="1" smtClean="0"/>
+              <a:t>ngram</a:t>
+            </a:r>
+            <a:r>
+              <a:rPr lang="en-US" dirty="0" smtClean="0"/>
+              <a:t> model</a:t>
+            </a:r>
+          </a:p>
+          <a:p>
+            <a:pPr lvl="1"/>
+            <a:r>
+              <a:rPr lang="en-US" dirty="0" smtClean="0"/>
+              <a:t>Maximum </a:t>
+            </a:r>
+            <a:r>
+              <a:rPr lang="en-US" dirty="0" err="1" smtClean="0"/>
+              <a:t>entroy</a:t>
+            </a:r>
+            <a:r>
+              <a:rPr lang="en-US" dirty="0" smtClean="0"/>
+              <a:t> model</a:t>
+            </a:r>
+          </a:p>
+          <a:p>
+            <a:pPr lvl="1"/>
+            <a:r>
+              <a:rPr lang="en-US" dirty="0" smtClean="0"/>
+              <a:t>Active learning</a:t>
+            </a:r>
+          </a:p>
+          <a:p>
+            <a:pPr lvl="1"/>
+            <a:r>
+              <a:rPr lang="en-US" dirty="0" smtClean="0"/>
+              <a:t>Recurrent neural network</a:t>
+            </a:r>
+          </a:p>
+          <a:p>
+            <a:r>
+              <a:rPr lang="en-US" dirty="0" smtClean="0"/>
+              <a:t>Studies on detection speech recognition errors:</a:t>
+            </a:r>
+          </a:p>
+          <a:p>
+            <a:pPr lvl="1"/>
+            <a:r>
+              <a:rPr lang="en-US" dirty="0" smtClean="0"/>
+              <a:t>Using acoustic and prosodic features to identify corrections</a:t>
+            </a:r>
+          </a:p>
+          <a:p>
+            <a:pPr lvl="1"/>
+            <a:r>
+              <a:rPr lang="en-US" dirty="0" smtClean="0"/>
+              <a:t>Prosodic features to detect recognition errors</a:t>
+            </a:r>
+          </a:p>
+          <a:p>
+            <a:pPr lvl="1"/>
+            <a:r>
+              <a:rPr lang="en-US" dirty="0" smtClean="0"/>
+              <a:t>Examining features related to the user’s speaking style to detect speech errors</a:t>
+            </a:r>
+          </a:p>
+          <a:p>
+            <a:pPr lvl="1"/>
+            <a:r>
+              <a:rPr lang="en-US" dirty="0" smtClean="0"/>
+              <a:t>Decision-tree based method to detect voice query retires</a:t>
+            </a:r>
+          </a:p>
+          <a:p>
+            <a:pPr lvl="1"/>
+            <a:r>
+              <a:rPr lang="en-US" dirty="0" smtClean="0"/>
+              <a:t>Co-</a:t>
+            </a:r>
+            <a:r>
+              <a:rPr lang="en-US" dirty="0" err="1" smtClean="0"/>
+              <a:t>occurence</a:t>
+            </a:r>
+            <a:r>
+              <a:rPr lang="en-US" dirty="0" smtClean="0"/>
+              <a:t> method for detecting and correcting misrecognition</a:t>
+            </a:r>
+            <a:endParaRPr lang="en-US" dirty="0"/>
+          </a:p>
+        </p:txBody>
+      </p:sp>
     </p:spTree>
     <p:extLst>
       <p:ext uri="{BB962C8B-B14F-4D97-AF65-F5344CB8AC3E}">
-        <p14:creationId xmlns:p14="http://schemas.microsoft.com/office/powerpoint/2010/main" val="561919222"/>
+        <p14:creationId xmlns:p14="http://schemas.microsoft.com/office/powerpoint/2010/main" val="3723262291"/>
       </p:ext>
     </p:extLst>
   </p:cSld>
@@ -5818,130 +5942,95 @@
           <a:chExt cx="0" cy="0"/>
         </a:xfrm>
       </p:grpSpPr>
-      <p:pic>
-        <p:nvPicPr>
-          <p:cNvPr id="2" name="Picture 1"/>
-          <p:cNvPicPr>
-            <a:picLocks noChangeAspect="1"/>
-          </p:cNvPicPr>
-          <p:nvPr/>
-        </p:nvPicPr>
-        <p:blipFill>
-          <a:blip r:embed="rId2">
-            <a:extLst>
-              <a:ext uri="{28A0092B-C50C-407E-A947-70E740481C1C}">
-                <a14:useLocalDpi xmlns:a14="http://schemas.microsoft.com/office/drawing/2010/main" val="0"/>
-              </a:ext>
-            </a:extLst>
-          </a:blip>
-          <a:stretch>
-            <a:fillRect/>
-          </a:stretch>
-        </p:blipFill>
-        <p:spPr>
-          <a:xfrm>
-            <a:off x="1161968" y="703094"/>
-            <a:ext cx="3162463" cy="1289116"/>
-          </a:xfrm>
-          <a:prstGeom prst="rect">
-            <a:avLst/>
-          </a:prstGeom>
-        </p:spPr>
-      </p:pic>
-      <p:pic>
-        <p:nvPicPr>
-          <p:cNvPr id="3" name="Picture 2"/>
-          <p:cNvPicPr>
-            <a:picLocks noChangeAspect="1"/>
-          </p:cNvPicPr>
-          <p:nvPr/>
-        </p:nvPicPr>
-        <p:blipFill>
-          <a:blip r:embed="rId3">
-            <a:extLst>
-              <a:ext uri="{28A0092B-C50C-407E-A947-70E740481C1C}">
-                <a14:useLocalDpi xmlns:a14="http://schemas.microsoft.com/office/drawing/2010/main" val="0"/>
-              </a:ext>
-            </a:extLst>
-          </a:blip>
-          <a:stretch>
-            <a:fillRect/>
-          </a:stretch>
-        </p:blipFill>
-        <p:spPr>
-          <a:xfrm>
-            <a:off x="6320526" y="805145"/>
-            <a:ext cx="3225966" cy="1346269"/>
-          </a:xfrm>
-          <a:prstGeom prst="rect">
-            <a:avLst/>
-          </a:prstGeom>
-        </p:spPr>
-      </p:pic>
-      <p:pic>
-        <p:nvPicPr>
-          <p:cNvPr id="4" name="Picture 3"/>
-          <p:cNvPicPr>
-            <a:picLocks noChangeAspect="1"/>
-          </p:cNvPicPr>
-          <p:nvPr/>
-        </p:nvPicPr>
-        <p:blipFill>
-          <a:blip r:embed="rId4">
-            <a:extLst>
-              <a:ext uri="{28A0092B-C50C-407E-A947-70E740481C1C}">
-                <a14:useLocalDpi xmlns:a14="http://schemas.microsoft.com/office/drawing/2010/main" val="0"/>
-              </a:ext>
-            </a:extLst>
-          </a:blip>
-          <a:stretch>
-            <a:fillRect/>
-          </a:stretch>
-        </p:blipFill>
-        <p:spPr>
-          <a:xfrm>
-            <a:off x="1269461" y="3826572"/>
-            <a:ext cx="3295819" cy="1085906"/>
-          </a:xfrm>
-          <a:prstGeom prst="rect">
-            <a:avLst/>
-          </a:prstGeom>
-        </p:spPr>
-      </p:pic>
-      <p:pic>
-        <p:nvPicPr>
-          <p:cNvPr id="5" name="Picture 4"/>
-          <p:cNvPicPr>
-            <a:picLocks noChangeAspect="1"/>
-          </p:cNvPicPr>
-          <p:nvPr/>
-        </p:nvPicPr>
-        <p:blipFill>
-          <a:blip r:embed="rId5">
-            <a:extLst>
-              <a:ext uri="{28A0092B-C50C-407E-A947-70E740481C1C}">
-                <a14:useLocalDpi xmlns:a14="http://schemas.microsoft.com/office/drawing/2010/main" val="0"/>
-              </a:ext>
-            </a:extLst>
-          </a:blip>
-          <a:stretch>
-            <a:fillRect/>
-          </a:stretch>
-        </p:blipFill>
-        <p:spPr>
-          <a:xfrm>
-            <a:off x="6797231" y="3680254"/>
-            <a:ext cx="3143412" cy="977950"/>
-          </a:xfrm>
-          <a:prstGeom prst="rect">
-            <a:avLst/>
-          </a:prstGeom>
-        </p:spPr>
-      </p:pic>
+      <p:sp>
+        <p:nvSpPr>
+          <p:cNvPr id="2" name="Title 1"/>
+          <p:cNvSpPr>
+            <a:spLocks noGrp="1"/>
+          </p:cNvSpPr>
+          <p:nvPr>
+            <p:ph type="title"/>
+          </p:nvPr>
+        </p:nvSpPr>
+        <p:spPr>
+          <a:xfrm>
+            <a:off x="913795" y="457200"/>
+            <a:ext cx="10353761" cy="914400"/>
+          </a:xfrm>
+        </p:spPr>
+        <p:txBody>
+          <a:bodyPr/>
+          <a:lstStyle/>
+          <a:p>
+            <a:endParaRPr lang="en-US" dirty="0"/>
+          </a:p>
+        </p:txBody>
+      </p:sp>
+      <p:sp>
+        <p:nvSpPr>
+          <p:cNvPr id="3" name="Content Placeholder 2"/>
+          <p:cNvSpPr>
+            <a:spLocks noGrp="1"/>
+          </p:cNvSpPr>
+          <p:nvPr>
+            <p:ph idx="1"/>
+          </p:nvPr>
+        </p:nvSpPr>
+        <p:spPr>
+          <a:xfrm>
+            <a:off x="913795" y="1600200"/>
+            <a:ext cx="10353762" cy="4572000"/>
+          </a:xfrm>
+        </p:spPr>
+        <p:txBody>
+          <a:bodyPr/>
+          <a:lstStyle/>
+          <a:p>
+            <a:r>
+              <a:rPr lang="en-US" dirty="0" smtClean="0"/>
+              <a:t>Correction data focuses specifically on the areas of weaknesses of the system</a:t>
+            </a:r>
+          </a:p>
+          <a:p>
+            <a:pPr lvl="1"/>
+            <a:r>
+              <a:rPr lang="en-US" dirty="0" smtClean="0"/>
+              <a:t>Do not need to identify bad pronunciations ahead of time</a:t>
+            </a:r>
+          </a:p>
+          <a:p>
+            <a:r>
+              <a:rPr lang="en-US" dirty="0" smtClean="0"/>
+              <a:t>Corrections are provided by the users who spoke them, who know how they want to pronounce the words</a:t>
+            </a:r>
+          </a:p>
+          <a:p>
+            <a:r>
+              <a:rPr lang="en-US" dirty="0" smtClean="0"/>
+              <a:t>Using two different types of correction data:</a:t>
+            </a:r>
+          </a:p>
+          <a:p>
+            <a:pPr lvl="1"/>
+            <a:r>
+              <a:rPr lang="en-US" dirty="0" smtClean="0"/>
+              <a:t>Keyboard Correction</a:t>
+            </a:r>
+          </a:p>
+          <a:p>
+            <a:pPr lvl="1"/>
+            <a:r>
+              <a:rPr lang="en-US" dirty="0" smtClean="0"/>
+              <a:t>Selected Alternate</a:t>
+            </a:r>
+            <a:endParaRPr lang="en-US" dirty="0"/>
+          </a:p>
+        </p:txBody>
+      </p:sp>
     </p:spTree>
     <p:extLst>
       <p:ext uri="{BB962C8B-B14F-4D97-AF65-F5344CB8AC3E}">
-        <p14:creationId xmlns:p14="http://schemas.microsoft.com/office/powerpoint/2010/main" val="504783391"/>
+        <p14:creationId xmlns:p14="http://schemas.microsoft.com/office/powerpoint/2010/main" val="582041634"/>
       </p:ext>
     </p:extLst>
   </p:cSld>
@@ -5978,16 +6067,752 @@
             <p:ph type="title"/>
           </p:nvPr>
         </p:nvSpPr>
-        <p:spPr/>
-        <p:txBody>
-          <a:bodyPr/>
-          <a:lstStyle/>
-          <a:p>
-            <a:r>
-              <a:rPr lang="en-US" smtClean="0"/>
+        <p:spPr>
+          <a:xfrm>
+            <a:off x="913795" y="457200"/>
+            <a:ext cx="10353761" cy="914400"/>
+          </a:xfrm>
+        </p:spPr>
+        <p:txBody>
+          <a:bodyPr/>
+          <a:lstStyle/>
+          <a:p>
+            <a:r>
+              <a:rPr lang="en-US" dirty="0"/>
+              <a:t>Keyboard correction data</a:t>
+            </a:r>
+          </a:p>
+        </p:txBody>
+      </p:sp>
+      <p:sp>
+        <p:nvSpPr>
+          <p:cNvPr id="3" name="Content Placeholder 2"/>
+          <p:cNvSpPr>
+            <a:spLocks noGrp="1"/>
+          </p:cNvSpPr>
+          <p:nvPr>
+            <p:ph sz="half" idx="1"/>
+          </p:nvPr>
+        </p:nvSpPr>
+        <p:spPr>
+          <a:xfrm>
+            <a:off x="913795" y="1600200"/>
+            <a:ext cx="6858000" cy="4800600"/>
+          </a:xfrm>
+        </p:spPr>
+        <p:txBody>
+          <a:bodyPr>
+            <a:normAutofit fontScale="85000" lnSpcReduction="20000"/>
+          </a:bodyPr>
+          <a:lstStyle/>
+          <a:p>
+            <a:r>
+              <a:rPr lang="en-US" dirty="0" smtClean="0"/>
+              <a:t>User makes a voice query, then issues a typed query shortly after</a:t>
+            </a:r>
+          </a:p>
+          <a:p>
+            <a:pPr lvl="1"/>
+            <a:r>
+              <a:rPr lang="en-US" dirty="0" smtClean="0"/>
+              <a:t>Within 30 seconds</a:t>
+            </a:r>
+          </a:p>
+          <a:p>
+            <a:r>
+              <a:rPr lang="en-US" dirty="0" smtClean="0"/>
+              <a:t>Analysis showed only 30-40% of these pairs are true corrections</a:t>
+            </a:r>
+          </a:p>
+          <a:p>
+            <a:r>
+              <a:rPr lang="en-US" dirty="0"/>
+              <a:t>Correction data classifier features</a:t>
+            </a:r>
+          </a:p>
+          <a:p>
+            <a:pPr lvl="1"/>
+            <a:r>
+              <a:rPr lang="en-US" dirty="0"/>
+              <a:t>Word-based:</a:t>
+            </a:r>
+          </a:p>
+          <a:p>
+            <a:pPr lvl="2"/>
+            <a:r>
+              <a:rPr lang="en-US" dirty="0"/>
+              <a:t>Unigram </a:t>
+            </a:r>
+            <a:r>
+              <a:rPr lang="en-US" dirty="0" smtClean="0"/>
+              <a:t>counts, number </a:t>
+            </a:r>
+            <a:r>
+              <a:rPr lang="en-US" dirty="0"/>
+              <a:t>of word </a:t>
+            </a:r>
+            <a:r>
+              <a:rPr lang="en-US" dirty="0" smtClean="0"/>
+              <a:t>overlaps, and language </a:t>
+            </a:r>
+            <a:r>
+              <a:rPr lang="en-US" dirty="0"/>
+              <a:t>model costs</a:t>
+            </a:r>
+          </a:p>
+          <a:p>
+            <a:pPr lvl="1"/>
+            <a:r>
+              <a:rPr lang="en-US" dirty="0"/>
+              <a:t>Character-based:</a:t>
+            </a:r>
+          </a:p>
+          <a:p>
+            <a:pPr lvl="2"/>
+            <a:r>
+              <a:rPr lang="en-US" dirty="0"/>
+              <a:t>Character </a:t>
+            </a:r>
+            <a:r>
+              <a:rPr lang="en-US" dirty="0" smtClean="0"/>
+              <a:t>counts, and edit </a:t>
+            </a:r>
+            <a:r>
+              <a:rPr lang="en-US" dirty="0"/>
+              <a:t>distance between the recognized and typed queries</a:t>
+            </a:r>
+          </a:p>
+          <a:p>
+            <a:pPr lvl="1"/>
+            <a:r>
+              <a:rPr lang="en-US" dirty="0"/>
+              <a:t>Phoneme:</a:t>
+            </a:r>
+          </a:p>
+          <a:p>
+            <a:pPr lvl="2"/>
+            <a:r>
+              <a:rPr lang="en-US" dirty="0" smtClean="0"/>
+              <a:t>Counts and edit distance between the phoneme sequences corresponding to the recognition results and typed query</a:t>
+            </a:r>
+          </a:p>
+          <a:p>
+            <a:pPr lvl="1"/>
+            <a:r>
+              <a:rPr lang="en-US" dirty="0" smtClean="0"/>
+              <a:t>Acoustic</a:t>
+            </a:r>
+            <a:r>
+              <a:rPr lang="en-US" dirty="0"/>
+              <a:t>:</a:t>
+            </a:r>
+          </a:p>
+          <a:p>
+            <a:pPr lvl="2"/>
+            <a:r>
+              <a:rPr lang="en-US" dirty="0"/>
+              <a:t>Forced phone alignment costs</a:t>
+            </a:r>
+          </a:p>
+          <a:p>
+            <a:pPr lvl="2"/>
+            <a:r>
+              <a:rPr lang="en-US" dirty="0"/>
+              <a:t>Waveform-to-transcript length </a:t>
+            </a:r>
+            <a:r>
+              <a:rPr lang="en-US" dirty="0" smtClean="0"/>
+              <a:t>ratio</a:t>
+            </a:r>
+            <a:endParaRPr lang="en-US" dirty="0"/>
+          </a:p>
+        </p:txBody>
+      </p:sp>
+      <p:pic>
+        <p:nvPicPr>
+          <p:cNvPr id="9" name="Content Placeholder 4"/>
+          <p:cNvPicPr>
+            <a:picLocks noGrp="1" noChangeAspect="1"/>
+          </p:cNvPicPr>
+          <p:nvPr>
+            <p:ph sz="half" idx="2"/>
+          </p:nvPr>
+        </p:nvPicPr>
+        <p:blipFill rotWithShape="1">
+          <a:blip r:embed="rId2">
+            <a:extLst>
+              <a:ext uri="{28A0092B-C50C-407E-A947-70E740481C1C}">
+                <a14:useLocalDpi xmlns:a14="http://schemas.microsoft.com/office/drawing/2010/main" val="0"/>
+              </a:ext>
+            </a:extLst>
+          </a:blip>
+          <a:srcRect b="25545"/>
+          <a:stretch/>
+        </p:blipFill>
+        <p:spPr>
+          <a:xfrm>
+            <a:off x="8149501" y="2152551"/>
+            <a:ext cx="3295819" cy="1021277"/>
+          </a:xfrm>
+          <a:prstGeom prst="rect">
+            <a:avLst/>
+          </a:prstGeom>
+        </p:spPr>
+      </p:pic>
+      <p:pic>
+        <p:nvPicPr>
+          <p:cNvPr id="10" name="Picture 9"/>
+          <p:cNvPicPr>
+            <a:picLocks noChangeAspect="1"/>
+          </p:cNvPicPr>
+          <p:nvPr/>
+        </p:nvPicPr>
+        <p:blipFill rotWithShape="1">
+          <a:blip r:embed="rId3">
+            <a:extLst>
+              <a:ext uri="{28A0092B-C50C-407E-A947-70E740481C1C}">
+                <a14:useLocalDpi xmlns:a14="http://schemas.microsoft.com/office/drawing/2010/main" val="0"/>
+              </a:ext>
+            </a:extLst>
+          </a:blip>
+          <a:srcRect t="7525"/>
+          <a:stretch/>
+        </p:blipFill>
+        <p:spPr>
+          <a:xfrm>
+            <a:off x="8282856" y="4114800"/>
+            <a:ext cx="3162463" cy="1192110"/>
+          </a:xfrm>
+          <a:prstGeom prst="rect">
+            <a:avLst/>
+          </a:prstGeom>
+        </p:spPr>
+      </p:pic>
+    </p:spTree>
+    <p:extLst>
+      <p:ext uri="{BB962C8B-B14F-4D97-AF65-F5344CB8AC3E}">
+        <p14:creationId xmlns:p14="http://schemas.microsoft.com/office/powerpoint/2010/main" val="2949745998"/>
+      </p:ext>
+    </p:extLst>
+  </p:cSld>
+  <p:clrMapOvr>
+    <a:masterClrMapping/>
+  </p:clrMapOvr>
+</p:sld>
+</file>
+
+<file path=ppt/slides/slide6.xml><?xml version="1.0" encoding="utf-8"?>
+<p:sld xmlns:a="http://schemas.openxmlformats.org/drawingml/2006/main" xmlns:r="http://schemas.openxmlformats.org/officeDocument/2006/relationships" xmlns:p="http://schemas.openxmlformats.org/presentationml/2006/main">
+  <p:cSld>
+    <p:spTree>
+      <p:nvGrpSpPr>
+        <p:cNvPr id="1" name=""/>
+        <p:cNvGrpSpPr/>
+        <p:nvPr/>
+      </p:nvGrpSpPr>
+      <p:grpSpPr>
+        <a:xfrm>
+          <a:off x="0" y="0"/>
+          <a:ext cx="0" cy="0"/>
+          <a:chOff x="0" y="0"/>
+          <a:chExt cx="0" cy="0"/>
+        </a:xfrm>
+      </p:grpSpPr>
+      <p:sp>
+        <p:nvSpPr>
+          <p:cNvPr id="2" name="Title 1"/>
+          <p:cNvSpPr>
+            <a:spLocks noGrp="1"/>
+          </p:cNvSpPr>
+          <p:nvPr>
+            <p:ph type="title"/>
+          </p:nvPr>
+        </p:nvSpPr>
+        <p:spPr>
+          <a:xfrm>
+            <a:off x="913795" y="457200"/>
+            <a:ext cx="10353761" cy="914400"/>
+          </a:xfrm>
+        </p:spPr>
+        <p:txBody>
+          <a:bodyPr/>
+          <a:lstStyle/>
+          <a:p>
+            <a:r>
+              <a:rPr lang="en-US" dirty="0"/>
+              <a:t>Selected alternate data</a:t>
+            </a:r>
+          </a:p>
+        </p:txBody>
+      </p:sp>
+      <p:sp>
+        <p:nvSpPr>
+          <p:cNvPr id="3" name="Content Placeholder 2"/>
+          <p:cNvSpPr>
+            <a:spLocks noGrp="1"/>
+          </p:cNvSpPr>
+          <p:nvPr>
+            <p:ph sz="half" idx="1"/>
+          </p:nvPr>
+        </p:nvSpPr>
+        <p:spPr>
+          <a:xfrm>
+            <a:off x="913795" y="1600200"/>
+            <a:ext cx="5106004" cy="4572000"/>
+          </a:xfrm>
+        </p:spPr>
+        <p:txBody>
+          <a:bodyPr/>
+          <a:lstStyle/>
+          <a:p>
+            <a:r>
+              <a:rPr lang="en-US" dirty="0" smtClean="0"/>
+              <a:t>Google voice search user interface allows users to manually select from a list of alternative recognition results</a:t>
+            </a:r>
+          </a:p>
+          <a:p>
+            <a:r>
+              <a:rPr lang="en-US" dirty="0" smtClean="0"/>
+              <a:t>User selection provides a high quality correction, so no extra classifier is needed</a:t>
+            </a:r>
+          </a:p>
+          <a:p>
+            <a:endParaRPr lang="en-US" dirty="0"/>
+          </a:p>
+        </p:txBody>
+      </p:sp>
+      <p:pic>
+        <p:nvPicPr>
+          <p:cNvPr id="6" name="Content Placeholder 5"/>
+          <p:cNvPicPr>
+            <a:picLocks noGrp="1" noChangeAspect="1"/>
+          </p:cNvPicPr>
+          <p:nvPr>
+            <p:ph sz="half" idx="2"/>
+          </p:nvPr>
+        </p:nvPicPr>
+        <p:blipFill rotWithShape="1">
+          <a:blip r:embed="rId2">
+            <a:extLst>
+              <a:ext uri="{28A0092B-C50C-407E-A947-70E740481C1C}">
+                <a14:useLocalDpi xmlns:a14="http://schemas.microsoft.com/office/drawing/2010/main" val="0"/>
+              </a:ext>
+            </a:extLst>
+          </a:blip>
+          <a:srcRect t="3607" b="11068"/>
+          <a:stretch/>
+        </p:blipFill>
+        <p:spPr>
+          <a:xfrm>
+            <a:off x="7097149" y="2274569"/>
+            <a:ext cx="3384724" cy="2378651"/>
+          </a:xfrm>
+          <a:prstGeom prst="rect">
+            <a:avLst/>
+          </a:prstGeom>
+        </p:spPr>
+      </p:pic>
+      <p:pic>
+        <p:nvPicPr>
+          <p:cNvPr id="7" name="Picture 6"/>
+          <p:cNvPicPr>
+            <a:picLocks noChangeAspect="1"/>
+          </p:cNvPicPr>
+          <p:nvPr/>
+        </p:nvPicPr>
+        <p:blipFill rotWithShape="1">
+          <a:blip r:embed="rId3">
+            <a:extLst>
+              <a:ext uri="{28A0092B-C50C-407E-A947-70E740481C1C}">
+                <a14:useLocalDpi xmlns:a14="http://schemas.microsoft.com/office/drawing/2010/main" val="0"/>
+              </a:ext>
+            </a:extLst>
+          </a:blip>
+          <a:srcRect t="6417"/>
+          <a:stretch/>
+        </p:blipFill>
+        <p:spPr>
+          <a:xfrm>
+            <a:off x="7212066" y="4983480"/>
+            <a:ext cx="3225966" cy="1259874"/>
+          </a:xfrm>
+          <a:prstGeom prst="rect">
+            <a:avLst/>
+          </a:prstGeom>
+        </p:spPr>
+      </p:pic>
+    </p:spTree>
+    <p:extLst>
+      <p:ext uri="{BB962C8B-B14F-4D97-AF65-F5344CB8AC3E}">
+        <p14:creationId xmlns:p14="http://schemas.microsoft.com/office/powerpoint/2010/main" val="261239048"/>
+      </p:ext>
+    </p:extLst>
+  </p:cSld>
+  <p:clrMapOvr>
+    <a:masterClrMapping/>
+  </p:clrMapOvr>
+</p:sld>
+</file>
+
+<file path=ppt/slides/slide7.xml><?xml version="1.0" encoding="utf-8"?>
+<p:sld xmlns:a="http://schemas.openxmlformats.org/drawingml/2006/main" xmlns:r="http://schemas.openxmlformats.org/officeDocument/2006/relationships" xmlns:p="http://schemas.openxmlformats.org/presentationml/2006/main">
+  <p:cSld>
+    <p:spTree>
+      <p:nvGrpSpPr>
+        <p:cNvPr id="1" name=""/>
+        <p:cNvGrpSpPr/>
+        <p:nvPr/>
+      </p:nvGrpSpPr>
+      <p:grpSpPr>
+        <a:xfrm>
+          <a:off x="0" y="0"/>
+          <a:ext cx="0" cy="0"/>
+          <a:chOff x="0" y="0"/>
+          <a:chExt cx="0" cy="0"/>
+        </a:xfrm>
+      </p:grpSpPr>
+      <p:sp>
+        <p:nvSpPr>
+          <p:cNvPr id="2" name="Title 1"/>
+          <p:cNvSpPr>
+            <a:spLocks noGrp="1"/>
+          </p:cNvSpPr>
+          <p:nvPr>
+            <p:ph type="title"/>
+          </p:nvPr>
+        </p:nvSpPr>
+        <p:spPr>
+          <a:xfrm>
+            <a:off x="913795" y="457200"/>
+            <a:ext cx="10353761" cy="914400"/>
+          </a:xfrm>
+        </p:spPr>
+        <p:txBody>
+          <a:bodyPr/>
+          <a:lstStyle/>
+          <a:p>
+            <a:r>
+              <a:rPr lang="en-US" dirty="0" smtClean="0"/>
+              <a:t>Results</a:t>
+            </a:r>
+            <a:endParaRPr lang="en-US" dirty="0"/>
+          </a:p>
+        </p:txBody>
+      </p:sp>
+      <p:sp>
+        <p:nvSpPr>
+          <p:cNvPr id="3" name="Text Placeholder 2"/>
+          <p:cNvSpPr>
+            <a:spLocks noGrp="1"/>
+          </p:cNvSpPr>
+          <p:nvPr>
+            <p:ph type="body" idx="1"/>
+          </p:nvPr>
+        </p:nvSpPr>
+        <p:spPr>
+          <a:xfrm>
+            <a:off x="1141804" y="1600200"/>
+            <a:ext cx="4879199" cy="823912"/>
+          </a:xfrm>
+        </p:spPr>
+        <p:txBody>
+          <a:bodyPr anchor="ctr"/>
+          <a:lstStyle/>
+          <a:p>
+            <a:pPr algn="ctr"/>
+            <a:r>
+              <a:rPr lang="en-US" dirty="0" smtClean="0"/>
+              <a:t>Keyboard Correction Data</a:t>
+            </a:r>
+          </a:p>
+        </p:txBody>
+      </p:sp>
+      <p:sp>
+        <p:nvSpPr>
+          <p:cNvPr id="5" name="Text Placeholder 4"/>
+          <p:cNvSpPr>
+            <a:spLocks noGrp="1"/>
+          </p:cNvSpPr>
+          <p:nvPr>
+            <p:ph type="body" sz="quarter" idx="3"/>
+          </p:nvPr>
+        </p:nvSpPr>
+        <p:spPr>
+          <a:xfrm>
+            <a:off x="6402003" y="1600200"/>
+            <a:ext cx="4865554" cy="823912"/>
+          </a:xfrm>
+        </p:spPr>
+        <p:txBody>
+          <a:bodyPr anchor="ctr"/>
+          <a:lstStyle/>
+          <a:p>
+            <a:pPr algn="ctr"/>
+            <a:r>
+              <a:rPr lang="en-US" dirty="0" smtClean="0"/>
+              <a:t>Alternate Selection Data</a:t>
+            </a:r>
+            <a:endParaRPr lang="en-US" dirty="0"/>
+          </a:p>
+        </p:txBody>
+      </p:sp>
+      <p:pic>
+        <p:nvPicPr>
+          <p:cNvPr id="7" name="Content Placeholder 6"/>
+          <p:cNvPicPr>
+            <a:picLocks noGrp="1" noChangeAspect="1"/>
+          </p:cNvPicPr>
+          <p:nvPr>
+            <p:ph sz="half" idx="2"/>
+          </p:nvPr>
+        </p:nvPicPr>
+        <p:blipFill rotWithShape="1">
+          <a:blip r:embed="rId2">
+            <a:extLst>
+              <a:ext uri="{28A0092B-C50C-407E-A947-70E740481C1C}">
+                <a14:useLocalDpi xmlns:a14="http://schemas.microsoft.com/office/drawing/2010/main" val="0"/>
+              </a:ext>
+            </a:extLst>
+          </a:blip>
+          <a:srcRect l="573" t="5061"/>
+          <a:stretch/>
+        </p:blipFill>
+        <p:spPr>
+          <a:xfrm>
+            <a:off x="1819547" y="2903220"/>
+            <a:ext cx="3276953" cy="1030950"/>
+          </a:xfrm>
+          <a:prstGeom prst="rect">
+            <a:avLst/>
+          </a:prstGeom>
+        </p:spPr>
+      </p:pic>
+      <p:pic>
+        <p:nvPicPr>
+          <p:cNvPr id="8" name="Picture 7"/>
+          <p:cNvPicPr>
+            <a:picLocks noChangeAspect="1"/>
+          </p:cNvPicPr>
+          <p:nvPr/>
+        </p:nvPicPr>
+        <p:blipFill rotWithShape="1">
+          <a:blip r:embed="rId3">
+            <a:extLst>
+              <a:ext uri="{28A0092B-C50C-407E-A947-70E740481C1C}">
+                <a14:useLocalDpi xmlns:a14="http://schemas.microsoft.com/office/drawing/2010/main" val="0"/>
+              </a:ext>
+            </a:extLst>
+          </a:blip>
+          <a:srcRect t="8203"/>
+          <a:stretch/>
+        </p:blipFill>
+        <p:spPr>
+          <a:xfrm>
+            <a:off x="1953088" y="4609387"/>
+            <a:ext cx="3143412" cy="897734"/>
+          </a:xfrm>
+          <a:prstGeom prst="rect">
+            <a:avLst/>
+          </a:prstGeom>
+        </p:spPr>
+      </p:pic>
+      <p:pic>
+        <p:nvPicPr>
+          <p:cNvPr id="10" name="Picture 3" descr="U:\git\COSC757\Assignments\ArticleSummary\Figure 5.PNG"/>
+          <p:cNvPicPr>
+            <a:picLocks noGrp="1" noChangeAspect="1" noChangeArrowheads="1"/>
+          </p:cNvPicPr>
+          <p:nvPr>
+            <p:ph sz="quarter" idx="4"/>
+          </p:nvPr>
+        </p:nvPicPr>
+        <p:blipFill rotWithShape="1">
+          <a:blip r:embed="rId4">
+            <a:extLst>
+              <a:ext uri="{28A0092B-C50C-407E-A947-70E740481C1C}">
+                <a14:useLocalDpi xmlns:a14="http://schemas.microsoft.com/office/drawing/2010/main" val="0"/>
+              </a:ext>
+            </a:extLst>
+          </a:blip>
+          <a:srcRect t="10391"/>
+          <a:stretch/>
+        </p:blipFill>
+        <p:spPr bwMode="auto">
+          <a:xfrm>
+            <a:off x="7077769" y="2929138"/>
+            <a:ext cx="3696216" cy="2577983"/>
+          </a:xfrm>
+          <a:prstGeom prst="rect">
+            <a:avLst/>
+          </a:prstGeom>
+          <a:noFill/>
+          <a:extLst>
+            <a:ext uri="{909E8E84-426E-40DD-AFC4-6F175D3DCCD1}">
+              <a14:hiddenFill xmlns:a14="http://schemas.microsoft.com/office/drawing/2010/main">
+                <a:solidFill>
+                  <a:srgbClr val="FFFFFF"/>
+                </a:solidFill>
+              </a14:hiddenFill>
+            </a:ext>
+          </a:extLst>
+        </p:spPr>
+      </p:pic>
+    </p:spTree>
+    <p:extLst>
+      <p:ext uri="{BB962C8B-B14F-4D97-AF65-F5344CB8AC3E}">
+        <p14:creationId xmlns:p14="http://schemas.microsoft.com/office/powerpoint/2010/main" val="1548367371"/>
+      </p:ext>
+    </p:extLst>
+  </p:cSld>
+  <p:clrMapOvr>
+    <a:masterClrMapping/>
+  </p:clrMapOvr>
+</p:sld>
+</file>
+
+<file path=ppt/slides/slide8.xml><?xml version="1.0" encoding="utf-8"?>
+<p:sld xmlns:a="http://schemas.openxmlformats.org/drawingml/2006/main" xmlns:r="http://schemas.openxmlformats.org/officeDocument/2006/relationships" xmlns:p="http://schemas.openxmlformats.org/presentationml/2006/main">
+  <p:cSld>
+    <p:spTree>
+      <p:nvGrpSpPr>
+        <p:cNvPr id="1" name=""/>
+        <p:cNvGrpSpPr/>
+        <p:nvPr/>
+      </p:nvGrpSpPr>
+      <p:grpSpPr>
+        <a:xfrm>
+          <a:off x="0" y="0"/>
+          <a:ext cx="0" cy="0"/>
+          <a:chOff x="0" y="0"/>
+          <a:chExt cx="0" cy="0"/>
+        </a:xfrm>
+      </p:grpSpPr>
+      <p:sp>
+        <p:nvSpPr>
+          <p:cNvPr id="2" name="Title 1"/>
+          <p:cNvSpPr>
+            <a:spLocks noGrp="1"/>
+          </p:cNvSpPr>
+          <p:nvPr>
+            <p:ph type="title"/>
+          </p:nvPr>
+        </p:nvSpPr>
+        <p:spPr>
+          <a:xfrm>
+            <a:off x="913795" y="457200"/>
+            <a:ext cx="10353761" cy="914400"/>
+          </a:xfrm>
+        </p:spPr>
+        <p:txBody>
+          <a:bodyPr/>
+          <a:lstStyle/>
+          <a:p>
+            <a:r>
+              <a:rPr lang="en-US" dirty="0" smtClean="0"/>
+              <a:t>Results (cont.)</a:t>
+            </a:r>
+            <a:endParaRPr lang="en-US" dirty="0"/>
+          </a:p>
+        </p:txBody>
+      </p:sp>
+      <p:pic>
+        <p:nvPicPr>
+          <p:cNvPr id="4" name="Picture 2" descr="U:\git\COSC757\Assignments\ArticleSummary\Table 5.PNG"/>
+          <p:cNvPicPr>
+            <a:picLocks noGrp="1" noChangeAspect="1" noChangeArrowheads="1"/>
+          </p:cNvPicPr>
+          <p:nvPr>
+            <p:ph idx="1"/>
+          </p:nvPr>
+        </p:nvPicPr>
+        <p:blipFill>
+          <a:blip r:embed="rId2">
+            <a:extLst>
+              <a:ext uri="{28A0092B-C50C-407E-A947-70E740481C1C}">
+                <a14:useLocalDpi xmlns:a14="http://schemas.microsoft.com/office/drawing/2010/main" val="0"/>
+              </a:ext>
+            </a:extLst>
+          </a:blip>
+          <a:srcRect/>
+          <a:stretch>
+            <a:fillRect/>
+          </a:stretch>
+        </p:blipFill>
+        <p:spPr bwMode="auto">
+          <a:xfrm>
+            <a:off x="4468729" y="3273390"/>
+            <a:ext cx="3245017" cy="1339919"/>
+          </a:xfrm>
+          <a:prstGeom prst="rect">
+            <a:avLst/>
+          </a:prstGeom>
+          <a:noFill/>
+          <a:extLst>
+            <a:ext uri="{909E8E84-426E-40DD-AFC4-6F175D3DCCD1}">
+              <a14:hiddenFill xmlns:a14="http://schemas.microsoft.com/office/drawing/2010/main">
+                <a:solidFill>
+                  <a:srgbClr val="FFFFFF"/>
+                </a:solidFill>
+              </a14:hiddenFill>
+            </a:ext>
+          </a:extLst>
+        </p:spPr>
+      </p:pic>
+    </p:spTree>
+    <p:extLst>
+      <p:ext uri="{BB962C8B-B14F-4D97-AF65-F5344CB8AC3E}">
+        <p14:creationId xmlns:p14="http://schemas.microsoft.com/office/powerpoint/2010/main" val="3294197162"/>
+      </p:ext>
+    </p:extLst>
+  </p:cSld>
+  <p:clrMapOvr>
+    <a:masterClrMapping/>
+  </p:clrMapOvr>
+</p:sld>
+</file>
+
+<file path=ppt/slides/slide9.xml><?xml version="1.0" encoding="utf-8"?>
+<p:sld xmlns:a="http://schemas.openxmlformats.org/drawingml/2006/main" xmlns:r="http://schemas.openxmlformats.org/officeDocument/2006/relationships" xmlns:p="http://schemas.openxmlformats.org/presentationml/2006/main">
+  <p:cSld>
+    <p:spTree>
+      <p:nvGrpSpPr>
+        <p:cNvPr id="1" name=""/>
+        <p:cNvGrpSpPr/>
+        <p:nvPr/>
+      </p:nvGrpSpPr>
+      <p:grpSpPr>
+        <a:xfrm>
+          <a:off x="0" y="0"/>
+          <a:ext cx="0" cy="0"/>
+          <a:chOff x="0" y="0"/>
+          <a:chExt cx="0" cy="0"/>
+        </a:xfrm>
+      </p:grpSpPr>
+      <p:sp>
+        <p:nvSpPr>
+          <p:cNvPr id="2" name="Title 1"/>
+          <p:cNvSpPr>
+            <a:spLocks noGrp="1"/>
+          </p:cNvSpPr>
+          <p:nvPr>
+            <p:ph type="title"/>
+          </p:nvPr>
+        </p:nvSpPr>
+        <p:spPr>
+          <a:xfrm>
+            <a:off x="913795" y="457200"/>
+            <a:ext cx="10353761" cy="914400"/>
+          </a:xfrm>
+        </p:spPr>
+        <p:txBody>
+          <a:bodyPr/>
+          <a:lstStyle/>
+          <a:p>
+            <a:r>
+              <a:rPr lang="en-US" dirty="0" smtClean="0"/>
               <a:t>Thoughtful Questions</a:t>
             </a:r>
-            <a:endParaRPr lang="en-US"/>
+            <a:endParaRPr lang="en-US" dirty="0"/>
           </a:p>
         </p:txBody>
       </p:sp>
@@ -6001,12 +6826,17 @@
             <p:ph idx="1"/>
           </p:nvPr>
         </p:nvSpPr>
-        <p:spPr/>
-        <p:txBody>
-          <a:bodyPr/>
-          <a:lstStyle/>
-          <a:p>
-            <a:endParaRPr lang="en-US"/>
+        <p:spPr>
+          <a:xfrm>
+            <a:off x="913795" y="1600200"/>
+            <a:ext cx="10353762" cy="4572000"/>
+          </a:xfrm>
+        </p:spPr>
+        <p:txBody>
+          <a:bodyPr/>
+          <a:lstStyle/>
+          <a:p>
+            <a:endParaRPr lang="en-US" dirty="0"/>
           </a:p>
         </p:txBody>
       </p:sp>
@@ -6273,7 +7103,7 @@
   <a:extraClrSchemeLst/>
   <a:extLst>
     <a:ext uri="{05A4C25C-085E-4340-85A3-A5531E510DB2}">
-      <thm15:themeFamily xmlns:thm15="http://schemas.microsoft.com/office/thememl/2012/main" name="Damask" id="{F9A299A0-33D0-4E0F-9F3F-7163E3744208}" vid="{746EEEEA-FB6A-406B-B510-531588D54811}"/>
+      <thm15:themeFamily xmlns:thm15="http://schemas.microsoft.com/office/thememl/2012/main" xmlns="" name="Damask" id="{F9A299A0-33D0-4E0F-9F3F-7163E3744208}" vid="{746EEEEA-FB6A-406B-B510-531588D54811}"/>
     </a:ext>
   </a:extLst>
 </a:theme>

</xml_diff>

<commit_message>
Update to presentation slides and pdf
</commit_message>
<xml_diff>
--- a/Assignments/ArticleSummary/ArticleSummarySlides-MJS.pptx
+++ b/Assignments/ArticleSummary/ArticleSummarySlides-MJS.pptx
@@ -4,6 +4,9 @@
   <p:sldMasterIdLst>
     <p:sldMasterId id="2147483648" r:id="rId1"/>
   </p:sldMasterIdLst>
+  <p:notesMasterIdLst>
+    <p:notesMasterId r:id="rId11"/>
+  </p:notesMasterIdLst>
   <p:sldIdLst>
     <p:sldId id="258" r:id="rId2"/>
     <p:sldId id="270" r:id="rId3"/>
@@ -11,8 +14,8 @@
     <p:sldId id="257" r:id="rId5"/>
     <p:sldId id="265" r:id="rId6"/>
     <p:sldId id="266" r:id="rId7"/>
-    <p:sldId id="267" r:id="rId8"/>
-    <p:sldId id="268" r:id="rId9"/>
+    <p:sldId id="268" r:id="rId8"/>
+    <p:sldId id="267" r:id="rId9"/>
     <p:sldId id="262" r:id="rId10"/>
   </p:sldIdLst>
   <p:sldSz cx="12192000" cy="6858000"/>
@@ -115,6 +118,1482 @@
 </p:presentation>
 </file>
 
+<file path=ppt/notesMasters/notesMaster1.xml><?xml version="1.0" encoding="utf-8"?>
+<p:notesMaster xmlns:a="http://schemas.openxmlformats.org/drawingml/2006/main" xmlns:r="http://schemas.openxmlformats.org/officeDocument/2006/relationships" xmlns:p="http://schemas.openxmlformats.org/presentationml/2006/main">
+  <p:cSld>
+    <p:bg>
+      <p:bgRef idx="1001">
+        <a:schemeClr val="bg1"/>
+      </p:bgRef>
+    </p:bg>
+    <p:spTree>
+      <p:nvGrpSpPr>
+        <p:cNvPr id="1" name=""/>
+        <p:cNvGrpSpPr/>
+        <p:nvPr/>
+      </p:nvGrpSpPr>
+      <p:grpSpPr>
+        <a:xfrm>
+          <a:off x="0" y="0"/>
+          <a:ext cx="0" cy="0"/>
+          <a:chOff x="0" y="0"/>
+          <a:chExt cx="0" cy="0"/>
+        </a:xfrm>
+      </p:grpSpPr>
+      <p:sp>
+        <p:nvSpPr>
+          <p:cNvPr id="2" name="Header Placeholder 1"/>
+          <p:cNvSpPr>
+            <a:spLocks noGrp="1"/>
+          </p:cNvSpPr>
+          <p:nvPr>
+            <p:ph type="hdr" sz="quarter"/>
+          </p:nvPr>
+        </p:nvSpPr>
+        <p:spPr>
+          <a:xfrm>
+            <a:off x="0" y="0"/>
+            <a:ext cx="2971800" cy="457200"/>
+          </a:xfrm>
+          <a:prstGeom prst="rect">
+            <a:avLst/>
+          </a:prstGeom>
+        </p:spPr>
+        <p:txBody>
+          <a:bodyPr vert="horz" lIns="91440" tIns="45720" rIns="91440" bIns="45720" rtlCol="0"/>
+          <a:lstStyle>
+            <a:lvl1pPr algn="l">
+              <a:defRPr sz="1200"/>
+            </a:lvl1pPr>
+          </a:lstStyle>
+          <a:p>
+            <a:endParaRPr lang="en-US"/>
+          </a:p>
+        </p:txBody>
+      </p:sp>
+      <p:sp>
+        <p:nvSpPr>
+          <p:cNvPr id="3" name="Date Placeholder 2"/>
+          <p:cNvSpPr>
+            <a:spLocks noGrp="1"/>
+          </p:cNvSpPr>
+          <p:nvPr>
+            <p:ph type="dt" idx="1"/>
+          </p:nvPr>
+        </p:nvSpPr>
+        <p:spPr>
+          <a:xfrm>
+            <a:off x="3884613" y="0"/>
+            <a:ext cx="2971800" cy="457200"/>
+          </a:xfrm>
+          <a:prstGeom prst="rect">
+            <a:avLst/>
+          </a:prstGeom>
+        </p:spPr>
+        <p:txBody>
+          <a:bodyPr vert="horz" lIns="91440" tIns="45720" rIns="91440" bIns="45720" rtlCol="0"/>
+          <a:lstStyle>
+            <a:lvl1pPr algn="r">
+              <a:defRPr sz="1200"/>
+            </a:lvl1pPr>
+          </a:lstStyle>
+          <a:p>
+            <a:fld id="{5BA0C6F3-6BF8-4DC2-B398-E4ECE6AE51D5}" type="datetimeFigureOut">
+              <a:rPr lang="en-US" smtClean="0"/>
+              <a:t>24-Feb-2016</a:t>
+            </a:fld>
+            <a:endParaRPr lang="en-US"/>
+          </a:p>
+        </p:txBody>
+      </p:sp>
+      <p:sp>
+        <p:nvSpPr>
+          <p:cNvPr id="4" name="Slide Image Placeholder 3"/>
+          <p:cNvSpPr>
+            <a:spLocks noGrp="1" noRot="1" noChangeAspect="1"/>
+          </p:cNvSpPr>
+          <p:nvPr>
+            <p:ph type="sldImg" idx="2"/>
+          </p:nvPr>
+        </p:nvSpPr>
+        <p:spPr>
+          <a:xfrm>
+            <a:off x="381000" y="685800"/>
+            <a:ext cx="6096000" cy="3429000"/>
+          </a:xfrm>
+          <a:prstGeom prst="rect">
+            <a:avLst/>
+          </a:prstGeom>
+          <a:noFill/>
+          <a:ln w="12700">
+            <a:solidFill>
+              <a:prstClr val="black"/>
+            </a:solidFill>
+          </a:ln>
+        </p:spPr>
+        <p:txBody>
+          <a:bodyPr vert="horz" lIns="91440" tIns="45720" rIns="91440" bIns="45720" rtlCol="0" anchor="ctr"/>
+          <a:lstStyle/>
+          <a:p>
+            <a:endParaRPr lang="en-US"/>
+          </a:p>
+        </p:txBody>
+      </p:sp>
+      <p:sp>
+        <p:nvSpPr>
+          <p:cNvPr id="5" name="Notes Placeholder 4"/>
+          <p:cNvSpPr>
+            <a:spLocks noGrp="1"/>
+          </p:cNvSpPr>
+          <p:nvPr>
+            <p:ph type="body" sz="quarter" idx="3"/>
+          </p:nvPr>
+        </p:nvSpPr>
+        <p:spPr>
+          <a:xfrm>
+            <a:off x="685800" y="4343400"/>
+            <a:ext cx="5486400" cy="4114800"/>
+          </a:xfrm>
+          <a:prstGeom prst="rect">
+            <a:avLst/>
+          </a:prstGeom>
+        </p:spPr>
+        <p:txBody>
+          <a:bodyPr vert="horz" lIns="91440" tIns="45720" rIns="91440" bIns="45720" rtlCol="0"/>
+          <a:lstStyle/>
+          <a:p>
+            <a:pPr lvl="0"/>
+            <a:r>
+              <a:rPr lang="en-US" smtClean="0"/>
+              <a:t>Click to edit Master text styles</a:t>
+            </a:r>
+          </a:p>
+          <a:p>
+            <a:pPr lvl="1"/>
+            <a:r>
+              <a:rPr lang="en-US" smtClean="0"/>
+              <a:t>Second level</a:t>
+            </a:r>
+          </a:p>
+          <a:p>
+            <a:pPr lvl="2"/>
+            <a:r>
+              <a:rPr lang="en-US" smtClean="0"/>
+              <a:t>Third level</a:t>
+            </a:r>
+          </a:p>
+          <a:p>
+            <a:pPr lvl="3"/>
+            <a:r>
+              <a:rPr lang="en-US" smtClean="0"/>
+              <a:t>Fourth level</a:t>
+            </a:r>
+          </a:p>
+          <a:p>
+            <a:pPr lvl="4"/>
+            <a:r>
+              <a:rPr lang="en-US" smtClean="0"/>
+              <a:t>Fifth level</a:t>
+            </a:r>
+            <a:endParaRPr lang="en-US"/>
+          </a:p>
+        </p:txBody>
+      </p:sp>
+      <p:sp>
+        <p:nvSpPr>
+          <p:cNvPr id="6" name="Footer Placeholder 5"/>
+          <p:cNvSpPr>
+            <a:spLocks noGrp="1"/>
+          </p:cNvSpPr>
+          <p:nvPr>
+            <p:ph type="ftr" sz="quarter" idx="4"/>
+          </p:nvPr>
+        </p:nvSpPr>
+        <p:spPr>
+          <a:xfrm>
+            <a:off x="0" y="8685213"/>
+            <a:ext cx="2971800" cy="457200"/>
+          </a:xfrm>
+          <a:prstGeom prst="rect">
+            <a:avLst/>
+          </a:prstGeom>
+        </p:spPr>
+        <p:txBody>
+          <a:bodyPr vert="horz" lIns="91440" tIns="45720" rIns="91440" bIns="45720" rtlCol="0" anchor="b"/>
+          <a:lstStyle>
+            <a:lvl1pPr algn="l">
+              <a:defRPr sz="1200"/>
+            </a:lvl1pPr>
+          </a:lstStyle>
+          <a:p>
+            <a:endParaRPr lang="en-US"/>
+          </a:p>
+        </p:txBody>
+      </p:sp>
+      <p:sp>
+        <p:nvSpPr>
+          <p:cNvPr id="7" name="Slide Number Placeholder 6"/>
+          <p:cNvSpPr>
+            <a:spLocks noGrp="1"/>
+          </p:cNvSpPr>
+          <p:nvPr>
+            <p:ph type="sldNum" sz="quarter" idx="5"/>
+          </p:nvPr>
+        </p:nvSpPr>
+        <p:spPr>
+          <a:xfrm>
+            <a:off x="3884613" y="8685213"/>
+            <a:ext cx="2971800" cy="457200"/>
+          </a:xfrm>
+          <a:prstGeom prst="rect">
+            <a:avLst/>
+          </a:prstGeom>
+        </p:spPr>
+        <p:txBody>
+          <a:bodyPr vert="horz" lIns="91440" tIns="45720" rIns="91440" bIns="45720" rtlCol="0" anchor="b"/>
+          <a:lstStyle>
+            <a:lvl1pPr algn="r">
+              <a:defRPr sz="1200"/>
+            </a:lvl1pPr>
+          </a:lstStyle>
+          <a:p>
+            <a:fld id="{23F25543-CDE9-4CD3-908D-BDAD6E318A91}" type="slidenum">
+              <a:rPr lang="en-US" smtClean="0"/>
+              <a:t>‹#›</a:t>
+            </a:fld>
+            <a:endParaRPr lang="en-US"/>
+          </a:p>
+        </p:txBody>
+      </p:sp>
+    </p:spTree>
+    <p:extLst>
+      <p:ext uri="{BB962C8B-B14F-4D97-AF65-F5344CB8AC3E}">
+        <p14:creationId xmlns:p14="http://schemas.microsoft.com/office/powerpoint/2010/main" val="167752398"/>
+      </p:ext>
+    </p:extLst>
+  </p:cSld>
+  <p:clrMap bg1="lt1" tx1="dk1" bg2="lt2" tx2="dk2" accent1="accent1" accent2="accent2" accent3="accent3" accent4="accent4" accent5="accent5" accent6="accent6" hlink="hlink" folHlink="folHlink"/>
+  <p:notesStyle>
+    <a:lvl1pPr marL="0" algn="l" defTabSz="914400" rtl="0" eaLnBrk="1" latinLnBrk="0" hangingPunct="1">
+      <a:defRPr sz="1200" kern="1200">
+        <a:solidFill>
+          <a:schemeClr val="tx1"/>
+        </a:solidFill>
+        <a:latin typeface="+mn-lt"/>
+        <a:ea typeface="+mn-ea"/>
+        <a:cs typeface="+mn-cs"/>
+      </a:defRPr>
+    </a:lvl1pPr>
+    <a:lvl2pPr marL="457200" algn="l" defTabSz="914400" rtl="0" eaLnBrk="1" latinLnBrk="0" hangingPunct="1">
+      <a:defRPr sz="1200" kern="1200">
+        <a:solidFill>
+          <a:schemeClr val="tx1"/>
+        </a:solidFill>
+        <a:latin typeface="+mn-lt"/>
+        <a:ea typeface="+mn-ea"/>
+        <a:cs typeface="+mn-cs"/>
+      </a:defRPr>
+    </a:lvl2pPr>
+    <a:lvl3pPr marL="914400" algn="l" defTabSz="914400" rtl="0" eaLnBrk="1" latinLnBrk="0" hangingPunct="1">
+      <a:defRPr sz="1200" kern="1200">
+        <a:solidFill>
+          <a:schemeClr val="tx1"/>
+        </a:solidFill>
+        <a:latin typeface="+mn-lt"/>
+        <a:ea typeface="+mn-ea"/>
+        <a:cs typeface="+mn-cs"/>
+      </a:defRPr>
+    </a:lvl3pPr>
+    <a:lvl4pPr marL="1371600" algn="l" defTabSz="914400" rtl="0" eaLnBrk="1" latinLnBrk="0" hangingPunct="1">
+      <a:defRPr sz="1200" kern="1200">
+        <a:solidFill>
+          <a:schemeClr val="tx1"/>
+        </a:solidFill>
+        <a:latin typeface="+mn-lt"/>
+        <a:ea typeface="+mn-ea"/>
+        <a:cs typeface="+mn-cs"/>
+      </a:defRPr>
+    </a:lvl4pPr>
+    <a:lvl5pPr marL="1828800" algn="l" defTabSz="914400" rtl="0" eaLnBrk="1" latinLnBrk="0" hangingPunct="1">
+      <a:defRPr sz="1200" kern="1200">
+        <a:solidFill>
+          <a:schemeClr val="tx1"/>
+        </a:solidFill>
+        <a:latin typeface="+mn-lt"/>
+        <a:ea typeface="+mn-ea"/>
+        <a:cs typeface="+mn-cs"/>
+      </a:defRPr>
+    </a:lvl5pPr>
+    <a:lvl6pPr marL="2286000" algn="l" defTabSz="914400" rtl="0" eaLnBrk="1" latinLnBrk="0" hangingPunct="1">
+      <a:defRPr sz="1200" kern="1200">
+        <a:solidFill>
+          <a:schemeClr val="tx1"/>
+        </a:solidFill>
+        <a:latin typeface="+mn-lt"/>
+        <a:ea typeface="+mn-ea"/>
+        <a:cs typeface="+mn-cs"/>
+      </a:defRPr>
+    </a:lvl6pPr>
+    <a:lvl7pPr marL="2743200" algn="l" defTabSz="914400" rtl="0" eaLnBrk="1" latinLnBrk="0" hangingPunct="1">
+      <a:defRPr sz="1200" kern="1200">
+        <a:solidFill>
+          <a:schemeClr val="tx1"/>
+        </a:solidFill>
+        <a:latin typeface="+mn-lt"/>
+        <a:ea typeface="+mn-ea"/>
+        <a:cs typeface="+mn-cs"/>
+      </a:defRPr>
+    </a:lvl7pPr>
+    <a:lvl8pPr marL="3200400" algn="l" defTabSz="914400" rtl="0" eaLnBrk="1" latinLnBrk="0" hangingPunct="1">
+      <a:defRPr sz="1200" kern="1200">
+        <a:solidFill>
+          <a:schemeClr val="tx1"/>
+        </a:solidFill>
+        <a:latin typeface="+mn-lt"/>
+        <a:ea typeface="+mn-ea"/>
+        <a:cs typeface="+mn-cs"/>
+      </a:defRPr>
+    </a:lvl8pPr>
+    <a:lvl9pPr marL="3657600" algn="l" defTabSz="914400" rtl="0" eaLnBrk="1" latinLnBrk="0" hangingPunct="1">
+      <a:defRPr sz="1200" kern="1200">
+        <a:solidFill>
+          <a:schemeClr val="tx1"/>
+        </a:solidFill>
+        <a:latin typeface="+mn-lt"/>
+        <a:ea typeface="+mn-ea"/>
+        <a:cs typeface="+mn-cs"/>
+      </a:defRPr>
+    </a:lvl9pPr>
+  </p:notesStyle>
+</p:notesMaster>
+</file>
+
+<file path=ppt/notesSlides/notesSlide1.xml><?xml version="1.0" encoding="utf-8"?>
+<p:notes xmlns:a="http://schemas.openxmlformats.org/drawingml/2006/main" xmlns:r="http://schemas.openxmlformats.org/officeDocument/2006/relationships" xmlns:p="http://schemas.openxmlformats.org/presentationml/2006/main">
+  <p:cSld>
+    <p:spTree>
+      <p:nvGrpSpPr>
+        <p:cNvPr id="1" name=""/>
+        <p:cNvGrpSpPr/>
+        <p:nvPr/>
+      </p:nvGrpSpPr>
+      <p:grpSpPr>
+        <a:xfrm>
+          <a:off x="0" y="0"/>
+          <a:ext cx="0" cy="0"/>
+          <a:chOff x="0" y="0"/>
+          <a:chExt cx="0" cy="0"/>
+        </a:xfrm>
+      </p:grpSpPr>
+      <p:sp>
+        <p:nvSpPr>
+          <p:cNvPr id="2" name="Slide Image Placeholder 1"/>
+          <p:cNvSpPr>
+            <a:spLocks noGrp="1" noRot="1" noChangeAspect="1"/>
+          </p:cNvSpPr>
+          <p:nvPr>
+            <p:ph type="sldImg"/>
+          </p:nvPr>
+        </p:nvSpPr>
+        <p:spPr/>
+      </p:sp>
+      <p:sp>
+        <p:nvSpPr>
+          <p:cNvPr id="3" name="Notes Placeholder 2"/>
+          <p:cNvSpPr>
+            <a:spLocks noGrp="1"/>
+          </p:cNvSpPr>
+          <p:nvPr>
+            <p:ph type="body" idx="1"/>
+          </p:nvPr>
+        </p:nvSpPr>
+        <p:spPr/>
+        <p:txBody>
+          <a:bodyPr/>
+          <a:lstStyle/>
+          <a:p>
+            <a:r>
+              <a:rPr lang="en-US" dirty="0" err="1"/>
+              <a:t>ICASSP</a:t>
+            </a:r>
+            <a:r>
+              <a:rPr lang="en-US" dirty="0"/>
+              <a:t> (2015</a:t>
+            </a:r>
+            <a:r>
+              <a:rPr lang="en-US" dirty="0" smtClean="0"/>
+              <a:t>) – 2015 IEEE International Conference on Acoustics, Speech and Signal Processing (</a:t>
+            </a:r>
+            <a:r>
+              <a:rPr lang="en-US" dirty="0" err="1" smtClean="0"/>
+              <a:t>ICASSP</a:t>
+            </a:r>
+            <a:r>
+              <a:rPr lang="en-US" dirty="0" smtClean="0"/>
+              <a:t>)</a:t>
+            </a:r>
+          </a:p>
+          <a:p>
+            <a:r>
+              <a:rPr lang="en-US" dirty="0" smtClean="0"/>
+              <a:t>Date of Conference: 19-24 </a:t>
+            </a:r>
+            <a:r>
+              <a:rPr lang="en-US" dirty="0"/>
+              <a:t>April </a:t>
+            </a:r>
+            <a:r>
+              <a:rPr lang="en-US" dirty="0" smtClean="0"/>
+              <a:t>2015</a:t>
+            </a:r>
+          </a:p>
+          <a:p>
+            <a:r>
+              <a:rPr lang="en-US" dirty="0" smtClean="0"/>
+              <a:t>Page(s): 4619-4623</a:t>
+            </a:r>
+          </a:p>
+          <a:p>
+            <a:r>
+              <a:rPr lang="en-US" dirty="0" err="1"/>
+              <a:t>DOI</a:t>
+            </a:r>
+            <a:r>
+              <a:rPr lang="en-US" dirty="0"/>
+              <a:t>: </a:t>
+            </a:r>
+            <a:r>
+              <a:rPr lang="en-US" u="sng" dirty="0">
+                <a:hlinkClick r:id="rId3"/>
+              </a:rPr>
+              <a:t>10.1109/</a:t>
+            </a:r>
+            <a:r>
+              <a:rPr lang="en-US" u="sng" dirty="0" err="1">
+                <a:hlinkClick r:id="rId3"/>
+              </a:rPr>
+              <a:t>ICASSP.2015.7178846</a:t>
+            </a:r>
+            <a:endParaRPr lang="en-US" dirty="0"/>
+          </a:p>
+        </p:txBody>
+      </p:sp>
+      <p:sp>
+        <p:nvSpPr>
+          <p:cNvPr id="4" name="Slide Number Placeholder 3"/>
+          <p:cNvSpPr>
+            <a:spLocks noGrp="1"/>
+          </p:cNvSpPr>
+          <p:nvPr>
+            <p:ph type="sldNum" sz="quarter" idx="10"/>
+          </p:nvPr>
+        </p:nvSpPr>
+        <p:spPr/>
+        <p:txBody>
+          <a:bodyPr/>
+          <a:lstStyle/>
+          <a:p>
+            <a:fld id="{23F25543-CDE9-4CD3-908D-BDAD6E318A91}" type="slidenum">
+              <a:rPr lang="en-US" smtClean="0"/>
+              <a:t>1</a:t>
+            </a:fld>
+            <a:endParaRPr lang="en-US"/>
+          </a:p>
+        </p:txBody>
+      </p:sp>
+    </p:spTree>
+    <p:extLst>
+      <p:ext uri="{BB962C8B-B14F-4D97-AF65-F5344CB8AC3E}">
+        <p14:creationId xmlns:p14="http://schemas.microsoft.com/office/powerpoint/2010/main" val="947457210"/>
+      </p:ext>
+    </p:extLst>
+  </p:cSld>
+  <p:clrMapOvr>
+    <a:masterClrMapping/>
+  </p:clrMapOvr>
+</p:notes>
+</file>
+
+<file path=ppt/notesSlides/notesSlide2.xml><?xml version="1.0" encoding="utf-8"?>
+<p:notes xmlns:a="http://schemas.openxmlformats.org/drawingml/2006/main" xmlns:r="http://schemas.openxmlformats.org/officeDocument/2006/relationships" xmlns:p="http://schemas.openxmlformats.org/presentationml/2006/main">
+  <p:cSld>
+    <p:spTree>
+      <p:nvGrpSpPr>
+        <p:cNvPr id="1" name=""/>
+        <p:cNvGrpSpPr/>
+        <p:nvPr/>
+      </p:nvGrpSpPr>
+      <p:grpSpPr>
+        <a:xfrm>
+          <a:off x="0" y="0"/>
+          <a:ext cx="0" cy="0"/>
+          <a:chOff x="0" y="0"/>
+          <a:chExt cx="0" cy="0"/>
+        </a:xfrm>
+      </p:grpSpPr>
+      <p:sp>
+        <p:nvSpPr>
+          <p:cNvPr id="2" name="Slide Image Placeholder 1"/>
+          <p:cNvSpPr>
+            <a:spLocks noGrp="1" noRot="1" noChangeAspect="1"/>
+          </p:cNvSpPr>
+          <p:nvPr>
+            <p:ph type="sldImg"/>
+          </p:nvPr>
+        </p:nvSpPr>
+        <p:spPr/>
+      </p:sp>
+      <p:sp>
+        <p:nvSpPr>
+          <p:cNvPr id="3" name="Notes Placeholder 2"/>
+          <p:cNvSpPr>
+            <a:spLocks noGrp="1"/>
+          </p:cNvSpPr>
+          <p:nvPr>
+            <p:ph type="body" idx="1"/>
+          </p:nvPr>
+        </p:nvSpPr>
+        <p:spPr/>
+        <p:txBody>
+          <a:bodyPr/>
+          <a:lstStyle/>
+          <a:p>
+            <a:r>
+              <a:rPr lang="en-US" dirty="0" smtClean="0"/>
+              <a:t>A</a:t>
+            </a:r>
+            <a:r>
+              <a:rPr lang="en-US" dirty="0"/>
+              <a:t> </a:t>
+            </a:r>
+            <a:r>
+              <a:rPr lang="en-US" b="1" dirty="0"/>
+              <a:t>maximum a posteriori probability (MAP) </a:t>
+            </a:r>
+            <a:r>
+              <a:rPr lang="en-US" dirty="0" smtClean="0"/>
+              <a:t>estimate is a mode of the posterior distribution. </a:t>
+            </a:r>
+          </a:p>
+          <a:p>
+            <a:r>
+              <a:rPr lang="en-US" dirty="0" smtClean="0"/>
+              <a:t>The</a:t>
+            </a:r>
+            <a:r>
+              <a:rPr lang="en-US" dirty="0"/>
+              <a:t> </a:t>
+            </a:r>
+            <a:r>
+              <a:rPr lang="en-US" b="1" dirty="0"/>
+              <a:t>posterior probability</a:t>
+            </a:r>
+            <a:r>
+              <a:rPr lang="en-US" dirty="0"/>
+              <a:t> of </a:t>
+            </a:r>
+            <a:r>
+              <a:rPr lang="en-US" dirty="0" smtClean="0"/>
+              <a:t>a random event or </a:t>
+            </a:r>
+            <a:r>
+              <a:rPr lang="en-US" dirty="0"/>
+              <a:t>an uncertain </a:t>
+            </a:r>
+            <a:r>
+              <a:rPr lang="en-US" dirty="0" smtClean="0"/>
+              <a:t>proposition </a:t>
+            </a:r>
+            <a:r>
+              <a:rPr lang="en-US" dirty="0"/>
+              <a:t>is </a:t>
+            </a:r>
+            <a:r>
+              <a:rPr lang="en-US" dirty="0" smtClean="0"/>
+              <a:t>the conditional probability</a:t>
+            </a:r>
+            <a:r>
+              <a:rPr lang="en-US" dirty="0"/>
+              <a:t> that is assigned after the relevant </a:t>
+            </a:r>
+            <a:r>
+              <a:rPr lang="en-US" dirty="0" smtClean="0"/>
+              <a:t>evidence or </a:t>
+            </a:r>
+            <a:r>
+              <a:rPr lang="en-US" dirty="0"/>
+              <a:t>background is taken into account. Similarly, </a:t>
+            </a:r>
+            <a:r>
+              <a:rPr lang="en-US" dirty="0" smtClean="0"/>
+              <a:t>the </a:t>
+            </a:r>
+            <a:r>
+              <a:rPr lang="en-US" b="1" dirty="0" smtClean="0"/>
+              <a:t>posterior </a:t>
+            </a:r>
+            <a:r>
+              <a:rPr lang="en-US" b="1" dirty="0"/>
+              <a:t>probability distribution</a:t>
+            </a:r>
+            <a:r>
+              <a:rPr lang="en-US" dirty="0"/>
+              <a:t> is </a:t>
+            </a:r>
+            <a:r>
+              <a:rPr lang="en-US" dirty="0" smtClean="0"/>
+              <a:t>the probability distribution of </a:t>
+            </a:r>
+            <a:r>
+              <a:rPr lang="en-US" dirty="0"/>
+              <a:t>an unknown quantity, treated as </a:t>
+            </a:r>
+            <a:r>
+              <a:rPr lang="en-US" dirty="0" smtClean="0"/>
+              <a:t>a random variable, conditional on the </a:t>
+            </a:r>
+            <a:r>
+              <a:rPr lang="en-US" dirty="0"/>
+              <a:t>evidence obtained from an experiment or survey</a:t>
+            </a:r>
+            <a:r>
+              <a:rPr lang="en-US" dirty="0" smtClean="0"/>
+              <a:t>.</a:t>
+            </a:r>
+          </a:p>
+          <a:p>
+            <a:r>
+              <a:rPr lang="en-US" dirty="0" smtClean="0"/>
+              <a:t>"</a:t>
+            </a:r>
+            <a:r>
+              <a:rPr lang="en-US" dirty="0"/>
+              <a:t>Posterior", in this context, means after taking into account the relevant evidence related to the particular case being examined.</a:t>
+            </a:r>
+          </a:p>
+        </p:txBody>
+      </p:sp>
+      <p:sp>
+        <p:nvSpPr>
+          <p:cNvPr id="4" name="Slide Number Placeholder 3"/>
+          <p:cNvSpPr>
+            <a:spLocks noGrp="1"/>
+          </p:cNvSpPr>
+          <p:nvPr>
+            <p:ph type="sldNum" sz="quarter" idx="10"/>
+          </p:nvPr>
+        </p:nvSpPr>
+        <p:spPr/>
+        <p:txBody>
+          <a:bodyPr/>
+          <a:lstStyle/>
+          <a:p>
+            <a:fld id="{23F25543-CDE9-4CD3-908D-BDAD6E318A91}" type="slidenum">
+              <a:rPr lang="en-US" smtClean="0"/>
+              <a:t>2</a:t>
+            </a:fld>
+            <a:endParaRPr lang="en-US"/>
+          </a:p>
+        </p:txBody>
+      </p:sp>
+    </p:spTree>
+    <p:extLst>
+      <p:ext uri="{BB962C8B-B14F-4D97-AF65-F5344CB8AC3E}">
+        <p14:creationId xmlns:p14="http://schemas.microsoft.com/office/powerpoint/2010/main" val="1102373927"/>
+      </p:ext>
+    </p:extLst>
+  </p:cSld>
+  <p:clrMapOvr>
+    <a:masterClrMapping/>
+  </p:clrMapOvr>
+</p:notes>
+</file>
+
+<file path=ppt/notesSlides/notesSlide3.xml><?xml version="1.0" encoding="utf-8"?>
+<p:notes xmlns:a="http://schemas.openxmlformats.org/drawingml/2006/main" xmlns:r="http://schemas.openxmlformats.org/officeDocument/2006/relationships" xmlns:p="http://schemas.openxmlformats.org/presentationml/2006/main">
+  <p:cSld>
+    <p:spTree>
+      <p:nvGrpSpPr>
+        <p:cNvPr id="1" name=""/>
+        <p:cNvGrpSpPr/>
+        <p:nvPr/>
+      </p:nvGrpSpPr>
+      <p:grpSpPr>
+        <a:xfrm>
+          <a:off x="0" y="0"/>
+          <a:ext cx="0" cy="0"/>
+          <a:chOff x="0" y="0"/>
+          <a:chExt cx="0" cy="0"/>
+        </a:xfrm>
+      </p:grpSpPr>
+      <p:sp>
+        <p:nvSpPr>
+          <p:cNvPr id="2" name="Slide Image Placeholder 1"/>
+          <p:cNvSpPr>
+            <a:spLocks noGrp="1" noRot="1" noChangeAspect="1"/>
+          </p:cNvSpPr>
+          <p:nvPr>
+            <p:ph type="sldImg"/>
+          </p:nvPr>
+        </p:nvSpPr>
+        <p:spPr/>
+      </p:sp>
+      <p:sp>
+        <p:nvSpPr>
+          <p:cNvPr id="3" name="Notes Placeholder 2"/>
+          <p:cNvSpPr>
+            <a:spLocks noGrp="1"/>
+          </p:cNvSpPr>
+          <p:nvPr>
+            <p:ph type="body" idx="1"/>
+          </p:nvPr>
+        </p:nvSpPr>
+        <p:spPr/>
+        <p:txBody>
+          <a:bodyPr/>
+          <a:lstStyle/>
+          <a:p>
+            <a:endParaRPr lang="en-US"/>
+          </a:p>
+        </p:txBody>
+      </p:sp>
+      <p:sp>
+        <p:nvSpPr>
+          <p:cNvPr id="4" name="Slide Number Placeholder 3"/>
+          <p:cNvSpPr>
+            <a:spLocks noGrp="1"/>
+          </p:cNvSpPr>
+          <p:nvPr>
+            <p:ph type="sldNum" sz="quarter" idx="10"/>
+          </p:nvPr>
+        </p:nvSpPr>
+        <p:spPr/>
+        <p:txBody>
+          <a:bodyPr/>
+          <a:lstStyle/>
+          <a:p>
+            <a:fld id="{23F25543-CDE9-4CD3-908D-BDAD6E318A91}" type="slidenum">
+              <a:rPr lang="en-US" smtClean="0"/>
+              <a:t>3</a:t>
+            </a:fld>
+            <a:endParaRPr lang="en-US"/>
+          </a:p>
+        </p:txBody>
+      </p:sp>
+    </p:spTree>
+    <p:extLst>
+      <p:ext uri="{BB962C8B-B14F-4D97-AF65-F5344CB8AC3E}">
+        <p14:creationId xmlns:p14="http://schemas.microsoft.com/office/powerpoint/2010/main" val="1323894078"/>
+      </p:ext>
+    </p:extLst>
+  </p:cSld>
+  <p:clrMapOvr>
+    <a:masterClrMapping/>
+  </p:clrMapOvr>
+</p:notes>
+</file>
+
+<file path=ppt/notesSlides/notesSlide4.xml><?xml version="1.0" encoding="utf-8"?>
+<p:notes xmlns:a="http://schemas.openxmlformats.org/drawingml/2006/main" xmlns:r="http://schemas.openxmlformats.org/officeDocument/2006/relationships" xmlns:p="http://schemas.openxmlformats.org/presentationml/2006/main">
+  <p:cSld>
+    <p:spTree>
+      <p:nvGrpSpPr>
+        <p:cNvPr id="1" name=""/>
+        <p:cNvGrpSpPr/>
+        <p:nvPr/>
+      </p:nvGrpSpPr>
+      <p:grpSpPr>
+        <a:xfrm>
+          <a:off x="0" y="0"/>
+          <a:ext cx="0" cy="0"/>
+          <a:chOff x="0" y="0"/>
+          <a:chExt cx="0" cy="0"/>
+        </a:xfrm>
+      </p:grpSpPr>
+      <p:sp>
+        <p:nvSpPr>
+          <p:cNvPr id="2" name="Slide Image Placeholder 1"/>
+          <p:cNvSpPr>
+            <a:spLocks noGrp="1" noRot="1" noChangeAspect="1"/>
+          </p:cNvSpPr>
+          <p:nvPr>
+            <p:ph type="sldImg"/>
+          </p:nvPr>
+        </p:nvSpPr>
+        <p:spPr/>
+      </p:sp>
+      <p:sp>
+        <p:nvSpPr>
+          <p:cNvPr id="3" name="Notes Placeholder 2"/>
+          <p:cNvSpPr>
+            <a:spLocks noGrp="1"/>
+          </p:cNvSpPr>
+          <p:nvPr>
+            <p:ph type="body" idx="1"/>
+          </p:nvPr>
+        </p:nvSpPr>
+        <p:spPr/>
+        <p:txBody>
+          <a:bodyPr/>
+          <a:lstStyle/>
+          <a:p>
+            <a:endParaRPr lang="en-US"/>
+          </a:p>
+        </p:txBody>
+      </p:sp>
+      <p:sp>
+        <p:nvSpPr>
+          <p:cNvPr id="4" name="Slide Number Placeholder 3"/>
+          <p:cNvSpPr>
+            <a:spLocks noGrp="1"/>
+          </p:cNvSpPr>
+          <p:nvPr>
+            <p:ph type="sldNum" sz="quarter" idx="10"/>
+          </p:nvPr>
+        </p:nvSpPr>
+        <p:spPr/>
+        <p:txBody>
+          <a:bodyPr/>
+          <a:lstStyle/>
+          <a:p>
+            <a:fld id="{23F25543-CDE9-4CD3-908D-BDAD6E318A91}" type="slidenum">
+              <a:rPr lang="en-US" smtClean="0"/>
+              <a:t>4</a:t>
+            </a:fld>
+            <a:endParaRPr lang="en-US"/>
+          </a:p>
+        </p:txBody>
+      </p:sp>
+    </p:spTree>
+    <p:extLst>
+      <p:ext uri="{BB962C8B-B14F-4D97-AF65-F5344CB8AC3E}">
+        <p14:creationId xmlns:p14="http://schemas.microsoft.com/office/powerpoint/2010/main" val="4258287050"/>
+      </p:ext>
+    </p:extLst>
+  </p:cSld>
+  <p:clrMapOvr>
+    <a:masterClrMapping/>
+  </p:clrMapOvr>
+</p:notes>
+</file>
+
+<file path=ppt/notesSlides/notesSlide5.xml><?xml version="1.0" encoding="utf-8"?>
+<p:notes xmlns:a="http://schemas.openxmlformats.org/drawingml/2006/main" xmlns:r="http://schemas.openxmlformats.org/officeDocument/2006/relationships" xmlns:p="http://schemas.openxmlformats.org/presentationml/2006/main">
+  <p:cSld>
+    <p:spTree>
+      <p:nvGrpSpPr>
+        <p:cNvPr id="1" name=""/>
+        <p:cNvGrpSpPr/>
+        <p:nvPr/>
+      </p:nvGrpSpPr>
+      <p:grpSpPr>
+        <a:xfrm>
+          <a:off x="0" y="0"/>
+          <a:ext cx="0" cy="0"/>
+          <a:chOff x="0" y="0"/>
+          <a:chExt cx="0" cy="0"/>
+        </a:xfrm>
+      </p:grpSpPr>
+      <p:sp>
+        <p:nvSpPr>
+          <p:cNvPr id="2" name="Slide Image Placeholder 1"/>
+          <p:cNvSpPr>
+            <a:spLocks noGrp="1" noRot="1" noChangeAspect="1"/>
+          </p:cNvSpPr>
+          <p:nvPr>
+            <p:ph type="sldImg"/>
+          </p:nvPr>
+        </p:nvSpPr>
+        <p:spPr/>
+      </p:sp>
+      <p:sp>
+        <p:nvSpPr>
+          <p:cNvPr id="3" name="Notes Placeholder 2"/>
+          <p:cNvSpPr>
+            <a:spLocks noGrp="1"/>
+          </p:cNvSpPr>
+          <p:nvPr>
+            <p:ph type="body" idx="1"/>
+          </p:nvPr>
+        </p:nvSpPr>
+        <p:spPr/>
+        <p:txBody>
+          <a:bodyPr/>
+          <a:lstStyle/>
+          <a:p>
+            <a:endParaRPr lang="en-US"/>
+          </a:p>
+        </p:txBody>
+      </p:sp>
+      <p:sp>
+        <p:nvSpPr>
+          <p:cNvPr id="4" name="Slide Number Placeholder 3"/>
+          <p:cNvSpPr>
+            <a:spLocks noGrp="1"/>
+          </p:cNvSpPr>
+          <p:nvPr>
+            <p:ph type="sldNum" sz="quarter" idx="10"/>
+          </p:nvPr>
+        </p:nvSpPr>
+        <p:spPr/>
+        <p:txBody>
+          <a:bodyPr/>
+          <a:lstStyle/>
+          <a:p>
+            <a:fld id="{23F25543-CDE9-4CD3-908D-BDAD6E318A91}" type="slidenum">
+              <a:rPr lang="en-US" smtClean="0"/>
+              <a:t>5</a:t>
+            </a:fld>
+            <a:endParaRPr lang="en-US"/>
+          </a:p>
+        </p:txBody>
+      </p:sp>
+    </p:spTree>
+    <p:extLst>
+      <p:ext uri="{BB962C8B-B14F-4D97-AF65-F5344CB8AC3E}">
+        <p14:creationId xmlns:p14="http://schemas.microsoft.com/office/powerpoint/2010/main" val="2924614641"/>
+      </p:ext>
+    </p:extLst>
+  </p:cSld>
+  <p:clrMapOvr>
+    <a:masterClrMapping/>
+  </p:clrMapOvr>
+</p:notes>
+</file>
+
+<file path=ppt/notesSlides/notesSlide6.xml><?xml version="1.0" encoding="utf-8"?>
+<p:notes xmlns:a="http://schemas.openxmlformats.org/drawingml/2006/main" xmlns:r="http://schemas.openxmlformats.org/officeDocument/2006/relationships" xmlns:p="http://schemas.openxmlformats.org/presentationml/2006/main">
+  <p:cSld>
+    <p:spTree>
+      <p:nvGrpSpPr>
+        <p:cNvPr id="1" name=""/>
+        <p:cNvGrpSpPr/>
+        <p:nvPr/>
+      </p:nvGrpSpPr>
+      <p:grpSpPr>
+        <a:xfrm>
+          <a:off x="0" y="0"/>
+          <a:ext cx="0" cy="0"/>
+          <a:chOff x="0" y="0"/>
+          <a:chExt cx="0" cy="0"/>
+        </a:xfrm>
+      </p:grpSpPr>
+      <p:sp>
+        <p:nvSpPr>
+          <p:cNvPr id="2" name="Slide Image Placeholder 1"/>
+          <p:cNvSpPr>
+            <a:spLocks noGrp="1" noRot="1" noChangeAspect="1"/>
+          </p:cNvSpPr>
+          <p:nvPr>
+            <p:ph type="sldImg"/>
+          </p:nvPr>
+        </p:nvSpPr>
+        <p:spPr/>
+      </p:sp>
+      <p:sp>
+        <p:nvSpPr>
+          <p:cNvPr id="3" name="Notes Placeholder 2"/>
+          <p:cNvSpPr>
+            <a:spLocks noGrp="1"/>
+          </p:cNvSpPr>
+          <p:nvPr>
+            <p:ph type="body" idx="1"/>
+          </p:nvPr>
+        </p:nvSpPr>
+        <p:spPr/>
+        <p:txBody>
+          <a:bodyPr/>
+          <a:lstStyle/>
+          <a:p>
+            <a:endParaRPr lang="en-US"/>
+          </a:p>
+        </p:txBody>
+      </p:sp>
+      <p:sp>
+        <p:nvSpPr>
+          <p:cNvPr id="4" name="Slide Number Placeholder 3"/>
+          <p:cNvSpPr>
+            <a:spLocks noGrp="1"/>
+          </p:cNvSpPr>
+          <p:nvPr>
+            <p:ph type="sldNum" sz="quarter" idx="10"/>
+          </p:nvPr>
+        </p:nvSpPr>
+        <p:spPr/>
+        <p:txBody>
+          <a:bodyPr/>
+          <a:lstStyle/>
+          <a:p>
+            <a:fld id="{23F25543-CDE9-4CD3-908D-BDAD6E318A91}" type="slidenum">
+              <a:rPr lang="en-US" smtClean="0"/>
+              <a:t>6</a:t>
+            </a:fld>
+            <a:endParaRPr lang="en-US"/>
+          </a:p>
+        </p:txBody>
+      </p:sp>
+    </p:spTree>
+    <p:extLst>
+      <p:ext uri="{BB962C8B-B14F-4D97-AF65-F5344CB8AC3E}">
+        <p14:creationId xmlns:p14="http://schemas.microsoft.com/office/powerpoint/2010/main" val="1717325897"/>
+      </p:ext>
+    </p:extLst>
+  </p:cSld>
+  <p:clrMapOvr>
+    <a:masterClrMapping/>
+  </p:clrMapOvr>
+</p:notes>
+</file>
+
+<file path=ppt/notesSlides/notesSlide7.xml><?xml version="1.0" encoding="utf-8"?>
+<p:notes xmlns:a="http://schemas.openxmlformats.org/drawingml/2006/main" xmlns:r="http://schemas.openxmlformats.org/officeDocument/2006/relationships" xmlns:p="http://schemas.openxmlformats.org/presentationml/2006/main">
+  <p:cSld>
+    <p:spTree>
+      <p:nvGrpSpPr>
+        <p:cNvPr id="1" name=""/>
+        <p:cNvGrpSpPr/>
+        <p:nvPr/>
+      </p:nvGrpSpPr>
+      <p:grpSpPr>
+        <a:xfrm>
+          <a:off x="0" y="0"/>
+          <a:ext cx="0" cy="0"/>
+          <a:chOff x="0" y="0"/>
+          <a:chExt cx="0" cy="0"/>
+        </a:xfrm>
+      </p:grpSpPr>
+      <p:sp>
+        <p:nvSpPr>
+          <p:cNvPr id="2" name="Slide Image Placeholder 1"/>
+          <p:cNvSpPr>
+            <a:spLocks noGrp="1" noRot="1" noChangeAspect="1"/>
+          </p:cNvSpPr>
+          <p:nvPr>
+            <p:ph type="sldImg"/>
+          </p:nvPr>
+        </p:nvSpPr>
+        <p:spPr/>
+      </p:sp>
+      <p:sp>
+        <p:nvSpPr>
+          <p:cNvPr id="3" name="Notes Placeholder 2"/>
+          <p:cNvSpPr>
+            <a:spLocks noGrp="1"/>
+          </p:cNvSpPr>
+          <p:nvPr>
+            <p:ph type="body" idx="1"/>
+          </p:nvPr>
+        </p:nvSpPr>
+        <p:spPr/>
+        <p:txBody>
+          <a:bodyPr/>
+          <a:lstStyle/>
+          <a:p>
+            <a:r>
+              <a:rPr lang="en-US" dirty="0" err="1" smtClean="0"/>
+              <a:t>WER</a:t>
+            </a:r>
+            <a:r>
+              <a:rPr lang="en-US" dirty="0" smtClean="0"/>
+              <a:t>: phone sequence for an infrequent word that matches the pronunciation of a different and more frequent word that would now be </a:t>
+            </a:r>
+            <a:r>
+              <a:rPr lang="en-US" dirty="0" err="1" smtClean="0"/>
+              <a:t>mirecognized</a:t>
+            </a:r>
+            <a:endParaRPr lang="en-US" dirty="0" smtClean="0"/>
+          </a:p>
+          <a:p>
+            <a:endParaRPr lang="en-US" dirty="0" smtClean="0"/>
+          </a:p>
+          <a:p>
+            <a:r>
+              <a:rPr lang="en-US" dirty="0" err="1" smtClean="0"/>
+              <a:t>SxS</a:t>
+            </a:r>
+            <a:r>
+              <a:rPr lang="en-US" dirty="0" smtClean="0"/>
+              <a:t>: Acoustic model, language model, and vocabulary are the same in both engines. Only the lexicon changes.</a:t>
+            </a:r>
+            <a:endParaRPr lang="en-US" dirty="0"/>
+          </a:p>
+          <a:p>
+            <a:endParaRPr lang="en-US" dirty="0"/>
+          </a:p>
+          <a:p>
+            <a:r>
+              <a:rPr lang="en-US" dirty="0" err="1" smtClean="0"/>
+              <a:t>SxS</a:t>
+            </a:r>
+            <a:r>
+              <a:rPr lang="en-US" dirty="0" smtClean="0"/>
+              <a:t> </a:t>
+            </a:r>
+            <a:r>
+              <a:rPr lang="en-US" dirty="0"/>
+              <a:t>experiments have the advantage of focusing </a:t>
+            </a:r>
+            <a:r>
+              <a:rPr lang="en-US" dirty="0" smtClean="0"/>
+              <a:t>on cases </a:t>
+            </a:r>
+            <a:r>
+              <a:rPr lang="en-US" dirty="0"/>
+              <a:t>where pronunciation changes do affect the recognition </a:t>
+            </a:r>
+            <a:r>
+              <a:rPr lang="en-US" dirty="0" smtClean="0"/>
+              <a:t>results. They </a:t>
+            </a:r>
+            <a:r>
+              <a:rPr lang="en-US" dirty="0"/>
+              <a:t>typically show more “movement” than </a:t>
+            </a:r>
+            <a:r>
+              <a:rPr lang="en-US" dirty="0" err="1"/>
+              <a:t>WER</a:t>
+            </a:r>
+            <a:r>
+              <a:rPr lang="en-US" dirty="0"/>
+              <a:t> </a:t>
+            </a:r>
+            <a:r>
+              <a:rPr lang="en-US" dirty="0" smtClean="0"/>
+              <a:t>measurements on </a:t>
+            </a:r>
+            <a:r>
+              <a:rPr lang="en-US" dirty="0"/>
+              <a:t>fixed test sets.</a:t>
+            </a:r>
+          </a:p>
+        </p:txBody>
+      </p:sp>
+      <p:sp>
+        <p:nvSpPr>
+          <p:cNvPr id="4" name="Slide Number Placeholder 3"/>
+          <p:cNvSpPr>
+            <a:spLocks noGrp="1"/>
+          </p:cNvSpPr>
+          <p:nvPr>
+            <p:ph type="sldNum" sz="quarter" idx="10"/>
+          </p:nvPr>
+        </p:nvSpPr>
+        <p:spPr/>
+        <p:txBody>
+          <a:bodyPr/>
+          <a:lstStyle/>
+          <a:p>
+            <a:fld id="{23F25543-CDE9-4CD3-908D-BDAD6E318A91}" type="slidenum">
+              <a:rPr lang="en-US" smtClean="0"/>
+              <a:t>7</a:t>
+            </a:fld>
+            <a:endParaRPr lang="en-US"/>
+          </a:p>
+        </p:txBody>
+      </p:sp>
+    </p:spTree>
+    <p:extLst>
+      <p:ext uri="{BB962C8B-B14F-4D97-AF65-F5344CB8AC3E}">
+        <p14:creationId xmlns:p14="http://schemas.microsoft.com/office/powerpoint/2010/main" val="2932354260"/>
+      </p:ext>
+    </p:extLst>
+  </p:cSld>
+  <p:clrMapOvr>
+    <a:masterClrMapping/>
+  </p:clrMapOvr>
+</p:notes>
+</file>
+
+<file path=ppt/notesSlides/notesSlide8.xml><?xml version="1.0" encoding="utf-8"?>
+<p:notes xmlns:a="http://schemas.openxmlformats.org/drawingml/2006/main" xmlns:r="http://schemas.openxmlformats.org/officeDocument/2006/relationships" xmlns:p="http://schemas.openxmlformats.org/presentationml/2006/main">
+  <p:cSld>
+    <p:spTree>
+      <p:nvGrpSpPr>
+        <p:cNvPr id="1" name=""/>
+        <p:cNvGrpSpPr/>
+        <p:nvPr/>
+      </p:nvGrpSpPr>
+      <p:grpSpPr>
+        <a:xfrm>
+          <a:off x="0" y="0"/>
+          <a:ext cx="0" cy="0"/>
+          <a:chOff x="0" y="0"/>
+          <a:chExt cx="0" cy="0"/>
+        </a:xfrm>
+      </p:grpSpPr>
+      <p:sp>
+        <p:nvSpPr>
+          <p:cNvPr id="2" name="Slide Image Placeholder 1"/>
+          <p:cNvSpPr>
+            <a:spLocks noGrp="1" noRot="1" noChangeAspect="1"/>
+          </p:cNvSpPr>
+          <p:nvPr>
+            <p:ph type="sldImg"/>
+          </p:nvPr>
+        </p:nvSpPr>
+        <p:spPr/>
+      </p:sp>
+      <p:sp>
+        <p:nvSpPr>
+          <p:cNvPr id="3" name="Notes Placeholder 2"/>
+          <p:cNvSpPr>
+            <a:spLocks noGrp="1"/>
+          </p:cNvSpPr>
+          <p:nvPr>
+            <p:ph type="body" idx="1"/>
+          </p:nvPr>
+        </p:nvSpPr>
+        <p:spPr/>
+        <p:txBody>
+          <a:bodyPr/>
+          <a:lstStyle/>
+          <a:p>
+            <a:r>
+              <a:rPr lang="en-US" dirty="0" smtClean="0"/>
+              <a:t>An experiment is considered positive if its </a:t>
+            </a:r>
+            <a:r>
+              <a:rPr lang="en-US" dirty="0" err="1" smtClean="0"/>
+              <a:t>SxS</a:t>
+            </a:r>
+            <a:r>
+              <a:rPr lang="en-US" dirty="0" smtClean="0"/>
+              <a:t> score is higher than that of the corresponding baseline. Generally this means it has fewer nonsense/unusable queries and more usable and exact queries.</a:t>
+            </a:r>
+          </a:p>
+          <a:p>
+            <a:endParaRPr lang="en-US" dirty="0" smtClean="0"/>
+          </a:p>
+          <a:p>
+            <a:r>
+              <a:rPr lang="en-US" dirty="0" smtClean="0"/>
+              <a:t>Keyboard Correction:</a:t>
+            </a:r>
+          </a:p>
+          <a:p>
+            <a:r>
+              <a:rPr lang="en-US" dirty="0" smtClean="0"/>
+              <a:t>We </a:t>
+            </a:r>
+            <a:r>
+              <a:rPr lang="en-US" dirty="0"/>
+              <a:t>see a small reduction in word error rate on each test </a:t>
+            </a:r>
+            <a:r>
+              <a:rPr lang="en-US" dirty="0" smtClean="0"/>
+              <a:t>set.</a:t>
+            </a:r>
+          </a:p>
+          <a:p>
+            <a:r>
+              <a:rPr lang="en-US" dirty="0" err="1" smtClean="0"/>
+              <a:t>SxS</a:t>
+            </a:r>
+            <a:r>
+              <a:rPr lang="en-US" dirty="0" smtClean="0"/>
+              <a:t> score improvements from adding new pronunciations to the baseline ASR engine</a:t>
+            </a:r>
+          </a:p>
+          <a:p>
+            <a:endParaRPr lang="en-US" dirty="0"/>
+          </a:p>
+          <a:p>
+            <a:r>
+              <a:rPr lang="en-US" dirty="0" smtClean="0"/>
+              <a:t>Alternate Selection:</a:t>
+            </a:r>
+          </a:p>
+          <a:p>
+            <a:r>
+              <a:rPr lang="en-US" dirty="0" smtClean="0"/>
+              <a:t>The </a:t>
+            </a:r>
+            <a:r>
+              <a:rPr lang="en-US" dirty="0"/>
+              <a:t>amount of data flowing through the Alternate Selection </a:t>
+            </a:r>
+            <a:r>
+              <a:rPr lang="en-US" dirty="0" smtClean="0"/>
+              <a:t>pipeline is </a:t>
+            </a:r>
+            <a:r>
+              <a:rPr lang="en-US" dirty="0"/>
+              <a:t>smaller than that from Keyboard Corrections. As a result, </a:t>
+            </a:r>
+            <a:r>
+              <a:rPr lang="en-US" dirty="0" smtClean="0"/>
+              <a:t>the system </a:t>
+            </a:r>
+            <a:r>
+              <a:rPr lang="en-US" dirty="0"/>
+              <a:t>learns fewer pronunciations, and our experiments showed </a:t>
+            </a:r>
+            <a:r>
+              <a:rPr lang="en-US" dirty="0" smtClean="0"/>
+              <a:t>no impact </a:t>
+            </a:r>
+            <a:r>
+              <a:rPr lang="en-US" dirty="0"/>
+              <a:t>on standard test set word error rates. However, </a:t>
+            </a:r>
+            <a:r>
+              <a:rPr lang="en-US" dirty="0" err="1"/>
+              <a:t>SxS</a:t>
+            </a:r>
+            <a:r>
+              <a:rPr lang="en-US" dirty="0"/>
+              <a:t> </a:t>
+            </a:r>
+            <a:r>
+              <a:rPr lang="en-US" dirty="0" smtClean="0"/>
+              <a:t>evaluations showed </a:t>
+            </a:r>
+            <a:r>
+              <a:rPr lang="en-US" dirty="0"/>
+              <a:t>significant improvements</a:t>
+            </a:r>
+            <a:r>
+              <a:rPr lang="en-US" dirty="0" smtClean="0"/>
+              <a:t>.</a:t>
+            </a:r>
+          </a:p>
+          <a:p>
+            <a:endParaRPr lang="en-US" dirty="0"/>
+          </a:p>
+          <a:p>
+            <a:r>
+              <a:rPr lang="en-US" dirty="0" smtClean="0"/>
+              <a:t>Side-by-side experiments demonstrate that the pronunciations learned via our methods significantly improve the quality of a production-quality speech recognition system.</a:t>
+            </a:r>
+          </a:p>
+          <a:p>
+            <a:endParaRPr lang="en-US" dirty="0" smtClean="0"/>
+          </a:p>
+          <a:p>
+            <a:endParaRPr lang="en-US" dirty="0"/>
+          </a:p>
+        </p:txBody>
+      </p:sp>
+      <p:sp>
+        <p:nvSpPr>
+          <p:cNvPr id="4" name="Slide Number Placeholder 3"/>
+          <p:cNvSpPr>
+            <a:spLocks noGrp="1"/>
+          </p:cNvSpPr>
+          <p:nvPr>
+            <p:ph type="sldNum" sz="quarter" idx="10"/>
+          </p:nvPr>
+        </p:nvSpPr>
+        <p:spPr/>
+        <p:txBody>
+          <a:bodyPr/>
+          <a:lstStyle/>
+          <a:p>
+            <a:fld id="{23F25543-CDE9-4CD3-908D-BDAD6E318A91}" type="slidenum">
+              <a:rPr lang="en-US" smtClean="0"/>
+              <a:t>8</a:t>
+            </a:fld>
+            <a:endParaRPr lang="en-US"/>
+          </a:p>
+        </p:txBody>
+      </p:sp>
+    </p:spTree>
+    <p:extLst>
+      <p:ext uri="{BB962C8B-B14F-4D97-AF65-F5344CB8AC3E}">
+        <p14:creationId xmlns:p14="http://schemas.microsoft.com/office/powerpoint/2010/main" val="2271397538"/>
+      </p:ext>
+    </p:extLst>
+  </p:cSld>
+  <p:clrMapOvr>
+    <a:masterClrMapping/>
+  </p:clrMapOvr>
+</p:notes>
+</file>
+
+<file path=ppt/notesSlides/notesSlide9.xml><?xml version="1.0" encoding="utf-8"?>
+<p:notes xmlns:a="http://schemas.openxmlformats.org/drawingml/2006/main" xmlns:r="http://schemas.openxmlformats.org/officeDocument/2006/relationships" xmlns:p="http://schemas.openxmlformats.org/presentationml/2006/main">
+  <p:cSld>
+    <p:spTree>
+      <p:nvGrpSpPr>
+        <p:cNvPr id="1" name=""/>
+        <p:cNvGrpSpPr/>
+        <p:nvPr/>
+      </p:nvGrpSpPr>
+      <p:grpSpPr>
+        <a:xfrm>
+          <a:off x="0" y="0"/>
+          <a:ext cx="0" cy="0"/>
+          <a:chOff x="0" y="0"/>
+          <a:chExt cx="0" cy="0"/>
+        </a:xfrm>
+      </p:grpSpPr>
+      <p:sp>
+        <p:nvSpPr>
+          <p:cNvPr id="2" name="Slide Image Placeholder 1"/>
+          <p:cNvSpPr>
+            <a:spLocks noGrp="1" noRot="1" noChangeAspect="1"/>
+          </p:cNvSpPr>
+          <p:nvPr>
+            <p:ph type="sldImg"/>
+          </p:nvPr>
+        </p:nvSpPr>
+        <p:spPr/>
+      </p:sp>
+      <p:sp>
+        <p:nvSpPr>
+          <p:cNvPr id="3" name="Notes Placeholder 2"/>
+          <p:cNvSpPr>
+            <a:spLocks noGrp="1"/>
+          </p:cNvSpPr>
+          <p:nvPr>
+            <p:ph type="body" idx="1"/>
+          </p:nvPr>
+        </p:nvSpPr>
+        <p:spPr/>
+        <p:txBody>
+          <a:bodyPr/>
+          <a:lstStyle/>
+          <a:p>
+            <a:endParaRPr lang="en-US"/>
+          </a:p>
+        </p:txBody>
+      </p:sp>
+      <p:sp>
+        <p:nvSpPr>
+          <p:cNvPr id="4" name="Slide Number Placeholder 3"/>
+          <p:cNvSpPr>
+            <a:spLocks noGrp="1"/>
+          </p:cNvSpPr>
+          <p:nvPr>
+            <p:ph type="sldNum" sz="quarter" idx="10"/>
+          </p:nvPr>
+        </p:nvSpPr>
+        <p:spPr/>
+        <p:txBody>
+          <a:bodyPr/>
+          <a:lstStyle/>
+          <a:p>
+            <a:fld id="{23F25543-CDE9-4CD3-908D-BDAD6E318A91}" type="slidenum">
+              <a:rPr lang="en-US" smtClean="0"/>
+              <a:t>9</a:t>
+            </a:fld>
+            <a:endParaRPr lang="en-US"/>
+          </a:p>
+        </p:txBody>
+      </p:sp>
+    </p:spTree>
+    <p:extLst>
+      <p:ext uri="{BB962C8B-B14F-4D97-AF65-F5344CB8AC3E}">
+        <p14:creationId xmlns:p14="http://schemas.microsoft.com/office/powerpoint/2010/main" val="2756502993"/>
+      </p:ext>
+    </p:extLst>
+  </p:cSld>
+  <p:clrMapOvr>
+    <a:masterClrMapping/>
+  </p:clrMapOvr>
+</p:notes>
+</file>
+
 <file path=ppt/slideLayouts/slideLayout1.xml><?xml version="1.0" encoding="utf-8"?>
 <p:sldLayout xmlns:a="http://schemas.openxmlformats.org/drawingml/2006/main" xmlns:r="http://schemas.openxmlformats.org/officeDocument/2006/relationships" xmlns:p="http://schemas.openxmlformats.org/presentationml/2006/main" type="title" preserve="1">
   <p:cSld name="Title Slide">
@@ -248,7 +1727,7 @@
           <a:p>
             <a:fld id="{48A87A34-81AB-432B-8DAE-1953F412C126}" type="datetimeFigureOut">
               <a:rPr lang="en-US" dirty="0"/>
-              <a:t>23-Feb-2016</a:t>
+              <a:t>24-Feb-2016</a:t>
             </a:fld>
             <a:endParaRPr lang="en-US" dirty="0"/>
           </a:p>
@@ -530,7 +2009,7 @@
           <a:p>
             <a:fld id="{48A87A34-81AB-432B-8DAE-1953F412C126}" type="datetimeFigureOut">
               <a:rPr lang="en-US" dirty="0"/>
-              <a:t>23-Feb-2016</a:t>
+              <a:t>24-Feb-2016</a:t>
             </a:fld>
             <a:endParaRPr lang="en-US" dirty="0"/>
           </a:p>
@@ -717,7 +2196,7 @@
           <a:p>
             <a:fld id="{48A87A34-81AB-432B-8DAE-1953F412C126}" type="datetimeFigureOut">
               <a:rPr lang="en-US" dirty="0"/>
-              <a:t>23-Feb-2016</a:t>
+              <a:t>24-Feb-2016</a:t>
             </a:fld>
             <a:endParaRPr lang="en-US" dirty="0"/>
           </a:p>
@@ -973,7 +2452,7 @@
           <a:p>
             <a:fld id="{48A87A34-81AB-432B-8DAE-1953F412C126}" type="datetimeFigureOut">
               <a:rPr lang="en-US" dirty="0"/>
-              <a:t>23-Feb-2016</a:t>
+              <a:t>24-Feb-2016</a:t>
             </a:fld>
             <a:endParaRPr lang="en-US" dirty="0"/>
           </a:p>
@@ -1392,7 +2871,7 @@
           <a:p>
             <a:fld id="{48A87A34-81AB-432B-8DAE-1953F412C126}" type="datetimeFigureOut">
               <a:rPr lang="en-US" dirty="0"/>
-              <a:t>23-Feb-2016</a:t>
+              <a:t>24-Feb-2016</a:t>
             </a:fld>
             <a:endParaRPr lang="en-US" dirty="0"/>
           </a:p>
@@ -1933,7 +3412,7 @@
           <a:p>
             <a:fld id="{48A87A34-81AB-432B-8DAE-1953F412C126}" type="datetimeFigureOut">
               <a:rPr lang="en-US" dirty="0"/>
-              <a:t>23-Feb-2016</a:t>
+              <a:t>24-Feb-2016</a:t>
             </a:fld>
             <a:endParaRPr lang="en-US" dirty="0"/>
           </a:p>
@@ -2768,7 +4247,7 @@
           <a:p>
             <a:fld id="{48A87A34-81AB-432B-8DAE-1953F412C126}" type="datetimeFigureOut">
               <a:rPr lang="en-US" dirty="0"/>
-              <a:t>23-Feb-2016</a:t>
+              <a:t>24-Feb-2016</a:t>
             </a:fld>
             <a:endParaRPr lang="en-US" dirty="0"/>
           </a:p>
@@ -2933,7 +4412,7 @@
           <a:p>
             <a:fld id="{48A87A34-81AB-432B-8DAE-1953F412C126}" type="datetimeFigureOut">
               <a:rPr lang="en-US" dirty="0"/>
-              <a:t>23-Feb-2016</a:t>
+              <a:t>24-Feb-2016</a:t>
             </a:fld>
             <a:endParaRPr lang="en-US" dirty="0"/>
           </a:p>
@@ -3112,7 +4591,7 @@
           <a:p>
             <a:fld id="{48A87A34-81AB-432B-8DAE-1953F412C126}" type="datetimeFigureOut">
               <a:rPr lang="en-US" dirty="0"/>
-              <a:t>23-Feb-2016</a:t>
+              <a:t>24-Feb-2016</a:t>
             </a:fld>
             <a:endParaRPr lang="en-US" dirty="0"/>
           </a:p>
@@ -3277,7 +4756,7 @@
           <a:p>
             <a:fld id="{48A87A34-81AB-432B-8DAE-1953F412C126}" type="datetimeFigureOut">
               <a:rPr lang="en-US" dirty="0"/>
-              <a:t>23-Feb-2016</a:t>
+              <a:t>24-Feb-2016</a:t>
             </a:fld>
             <a:endParaRPr lang="en-US" dirty="0"/>
           </a:p>
@@ -3520,7 +4999,7 @@
           <a:p>
             <a:fld id="{48A87A34-81AB-432B-8DAE-1953F412C126}" type="datetimeFigureOut">
               <a:rPr lang="en-US" dirty="0"/>
-              <a:t>23-Feb-2016</a:t>
+              <a:t>24-Feb-2016</a:t>
             </a:fld>
             <a:endParaRPr lang="en-US" dirty="0"/>
           </a:p>
@@ -3752,7 +5231,7 @@
           <a:p>
             <a:fld id="{48A87A34-81AB-432B-8DAE-1953F412C126}" type="datetimeFigureOut">
               <a:rPr lang="en-US" dirty="0"/>
-              <a:t>23-Feb-2016</a:t>
+              <a:t>24-Feb-2016</a:t>
             </a:fld>
             <a:endParaRPr lang="en-US" dirty="0"/>
           </a:p>
@@ -4120,7 +5599,7 @@
           <a:p>
             <a:fld id="{48A87A34-81AB-432B-8DAE-1953F412C126}" type="datetimeFigureOut">
               <a:rPr lang="en-US" dirty="0"/>
-              <a:t>23-Feb-2016</a:t>
+              <a:t>24-Feb-2016</a:t>
             </a:fld>
             <a:endParaRPr lang="en-US" dirty="0"/>
           </a:p>
@@ -4233,7 +5712,7 @@
           <a:p>
             <a:fld id="{48A87A34-81AB-432B-8DAE-1953F412C126}" type="datetimeFigureOut">
               <a:rPr lang="en-US" dirty="0"/>
-              <a:t>23-Feb-2016</a:t>
+              <a:t>24-Feb-2016</a:t>
             </a:fld>
             <a:endParaRPr lang="en-US" dirty="0"/>
           </a:p>
@@ -4323,7 +5802,7 @@
           <a:p>
             <a:fld id="{48A87A34-81AB-432B-8DAE-1953F412C126}" type="datetimeFigureOut">
               <a:rPr lang="en-US" dirty="0"/>
-              <a:t>23-Feb-2016</a:t>
+              <a:t>24-Feb-2016</a:t>
             </a:fld>
             <a:endParaRPr lang="en-US" dirty="0"/>
           </a:p>
@@ -4569,7 +6048,7 @@
           <a:p>
             <a:fld id="{48A87A34-81AB-432B-8DAE-1953F412C126}" type="datetimeFigureOut">
               <a:rPr lang="en-US" dirty="0"/>
-              <a:t>23-Feb-2016</a:t>
+              <a:t>24-Feb-2016</a:t>
             </a:fld>
             <a:endParaRPr lang="en-US" dirty="0"/>
           </a:p>
@@ -4851,7 +6330,7 @@
           <a:p>
             <a:fld id="{48A87A34-81AB-432B-8DAE-1953F412C126}" type="datetimeFigureOut">
               <a:rPr lang="en-US" dirty="0"/>
-              <a:t>23-Feb-2016</a:t>
+              <a:t>24-Feb-2016</a:t>
             </a:fld>
             <a:endParaRPr lang="en-US" dirty="0"/>
           </a:p>
@@ -5060,7 +6539,7 @@
             <a:fld id="{48A87A34-81AB-432B-8DAE-1953F412C126}" type="datetimeFigureOut">
               <a:rPr lang="en-US" dirty="0"/>
               <a:pPr/>
-              <a:t>23-Feb-2016</a:t>
+              <a:t>24-Feb-2016</a:t>
             </a:fld>
             <a:endParaRPr lang="en-US" dirty="0"/>
           </a:p>
@@ -5549,19 +7028,19 @@
         </p:nvSpPr>
         <p:spPr>
           <a:xfrm>
-            <a:off x="1595269" y="914400"/>
-            <a:ext cx="9001462" cy="3300984"/>
+            <a:off x="1371600" y="914400"/>
+            <a:ext cx="9235440" cy="3300984"/>
           </a:xfrm>
         </p:spPr>
         <p:txBody>
-          <a:bodyPr>
+          <a:bodyPr anchor="ctr" anchorCtr="0">
             <a:normAutofit fontScale="90000"/>
           </a:bodyPr>
           <a:lstStyle/>
           <a:p>
             <a:r>
               <a:rPr lang="en-US" dirty="0" smtClean="0"/>
-              <a:t>Fix it where it fails: pronunciation learning by mining error correction from speech logs</a:t>
+              <a:t>Fix it where it fails: pronunciation learning by mining error corrections from speech logs</a:t>
             </a:r>
             <a:endParaRPr lang="en-US" dirty="0"/>
           </a:p>
@@ -5604,12 +7083,8 @@
               <a:t> Peng, </a:t>
             </a:r>
             <a:r>
-              <a:rPr lang="en-US" dirty="0" err="1"/>
-              <a:t>Franc¸oise</a:t>
-            </a:r>
-            <a:r>
-              <a:rPr lang="en-US" dirty="0"/>
-              <a:t> </a:t>
+              <a:rPr lang="en-US" dirty="0" smtClean="0"/>
+              <a:t>Françoise </a:t>
             </a:r>
             <a:r>
               <a:rPr lang="en-US" dirty="0" err="1"/>
@@ -5684,6 +7159,10 @@
           <a:bodyPr/>
           <a:lstStyle/>
           <a:p>
+            <a:r>
+              <a:rPr lang="en-US" dirty="0" smtClean="0"/>
+              <a:t>Overview</a:t>
+            </a:r>
             <a:endParaRPr lang="en-US" dirty="0"/>
           </a:p>
         </p:txBody>
@@ -5710,9 +7189,109 @@
           <a:p>
             <a:r>
               <a:rPr lang="en-US" dirty="0" smtClean="0"/>
-              <a:t>Automatic speech recognition (ASR) system pronunciation dictionary (or lexicon) </a:t>
-            </a:r>
-            <a:endParaRPr lang="en-US" dirty="0"/>
+              <a:t>Automatic speech recognition (ASR) systems include a pronunciation dictionary (or lexicon) and a grapheme </a:t>
+            </a:r>
+            <a:r>
+              <a:rPr lang="en-US" dirty="0"/>
+              <a:t>to phoneme </a:t>
+            </a:r>
+            <a:r>
+              <a:rPr lang="en-US" dirty="0" smtClean="0"/>
+              <a:t>(</a:t>
+            </a:r>
+            <a:r>
+              <a:rPr lang="en-US" dirty="0" err="1"/>
+              <a:t>G2P</a:t>
+            </a:r>
+            <a:r>
+              <a:rPr lang="en-US" dirty="0" smtClean="0"/>
+              <a:t>) engine</a:t>
+            </a:r>
+          </a:p>
+          <a:p>
+            <a:pPr lvl="1"/>
+            <a:r>
+              <a:rPr lang="en-US" dirty="0" smtClean="0"/>
+              <a:t>The lexicon consists of word-pronunciation pairs written by linguist</a:t>
+            </a:r>
+          </a:p>
+          <a:p>
+            <a:pPr lvl="2"/>
+            <a:r>
+              <a:rPr lang="en-US" dirty="0" smtClean="0"/>
+              <a:t>Hand-generated – cannot keep up with growing vocabulary</a:t>
+            </a:r>
+          </a:p>
+          <a:p>
+            <a:pPr lvl="1"/>
+            <a:r>
+              <a:rPr lang="en-US" dirty="0" err="1" smtClean="0"/>
+              <a:t>G2P</a:t>
+            </a:r>
+            <a:r>
+              <a:rPr lang="en-US" dirty="0" smtClean="0"/>
+              <a:t> has limited accuracy</a:t>
+            </a:r>
+          </a:p>
+          <a:p>
+            <a:pPr lvl="2"/>
+            <a:r>
+              <a:rPr lang="en-US" dirty="0" smtClean="0"/>
+              <a:t>Proper names – pronunciation can be influenced by historical or foreign-origin factors</a:t>
+            </a:r>
+          </a:p>
+          <a:p>
+            <a:r>
+              <a:rPr lang="en-US" dirty="0"/>
+              <a:t>Speech recognition task </a:t>
+            </a:r>
+            <a:r>
+              <a:rPr lang="en-US" dirty="0" smtClean="0"/>
+              <a:t>in general finds </a:t>
+            </a:r>
+            <a:r>
+              <a:rPr lang="en-US" dirty="0"/>
+              <a:t>the word sequence that has the </a:t>
+            </a:r>
+            <a:r>
+              <a:rPr lang="en-US" dirty="0" smtClean="0"/>
+              <a:t>maximum </a:t>
+            </a:r>
+            <a:r>
+              <a:rPr lang="en-US" dirty="0"/>
+              <a:t>posterior probability given the acoustic </a:t>
+            </a:r>
+            <a:r>
+              <a:rPr lang="en-US" dirty="0" smtClean="0"/>
+              <a:t>observations</a:t>
+            </a:r>
+          </a:p>
+          <a:p>
+            <a:pPr lvl="1"/>
+            <a:r>
+              <a:rPr lang="en-US" dirty="0" smtClean="0"/>
+              <a:t>Relies heavily on a lexicon</a:t>
+            </a:r>
+          </a:p>
+          <a:p>
+            <a:pPr lvl="1"/>
+            <a:r>
+              <a:rPr lang="en-US" dirty="0" smtClean="0"/>
+              <a:t>Uses a </a:t>
+            </a:r>
+            <a:r>
+              <a:rPr lang="en-US" dirty="0" err="1" smtClean="0"/>
+              <a:t>G2P</a:t>
+            </a:r>
+            <a:r>
+              <a:rPr lang="en-US" dirty="0" smtClean="0"/>
+              <a:t> for words not found in the lexicon</a:t>
+            </a:r>
+            <a:endParaRPr lang="en-US" dirty="0"/>
+          </a:p>
+          <a:p>
+            <a:pPr lvl="2"/>
+            <a:endParaRPr lang="en-US" dirty="0" smtClean="0"/>
           </a:p>
         </p:txBody>
       </p:sp>
@@ -5798,7 +7377,7 @@
           <a:p>
             <a:r>
               <a:rPr lang="en-US" dirty="0" smtClean="0"/>
-              <a:t>Research on machine learning for grapheme to phoneme conversion (</a:t>
+              <a:t>Research on machine learning for </a:t>
             </a:r>
             <a:r>
               <a:rPr lang="en-US" dirty="0" err="1" smtClean="0"/>
@@ -5806,7 +7385,7 @@
             </a:r>
             <a:r>
               <a:rPr lang="en-US" dirty="0" smtClean="0"/>
-              <a:t>):</a:t>
+              <a:t> conversion:</a:t>
             </a:r>
           </a:p>
           <a:p>
@@ -5962,6 +7541,10 @@
           <a:bodyPr/>
           <a:lstStyle/>
           <a:p>
+            <a:r>
+              <a:rPr lang="en-US" dirty="0" smtClean="0"/>
+              <a:t>New Approach</a:t>
+            </a:r>
             <a:endParaRPr lang="en-US" dirty="0"/>
           </a:p>
         </p:txBody>
@@ -5996,6 +7579,12 @@
             <a:r>
               <a:rPr lang="en-US" dirty="0" smtClean="0"/>
               <a:t>Do not need to identify bad pronunciations ahead of time</a:t>
+            </a:r>
+          </a:p>
+          <a:p>
+            <a:r>
+              <a:rPr lang="en-US" dirty="0"/>
+              <a:t>Language-independent</a:t>
             </a:r>
           </a:p>
           <a:p>
@@ -6239,7 +7828,7 @@
           </p:nvPr>
         </p:nvPicPr>
         <p:blipFill rotWithShape="1">
-          <a:blip r:embed="rId2">
+          <a:blip r:embed="rId3">
             <a:extLst>
               <a:ext uri="{28A0092B-C50C-407E-A947-70E740481C1C}">
                 <a14:useLocalDpi xmlns:a14="http://schemas.microsoft.com/office/drawing/2010/main" val="0"/>
@@ -6268,7 +7857,7 @@
           <p:nvPr/>
         </p:nvPicPr>
         <p:blipFill rotWithShape="1">
-          <a:blip r:embed="rId3">
+          <a:blip r:embed="rId4">
             <a:extLst>
               <a:ext uri="{28A0092B-C50C-407E-A947-70E740481C1C}">
                 <a14:useLocalDpi xmlns:a14="http://schemas.microsoft.com/office/drawing/2010/main" val="0"/>
@@ -6358,7 +7947,7 @@
         <p:spPr>
           <a:xfrm>
             <a:off x="913795" y="1600200"/>
-            <a:ext cx="5106004" cy="4572000"/>
+            <a:ext cx="10287000" cy="1885950"/>
           </a:xfrm>
         </p:spPr>
         <p:txBody>
@@ -6373,7 +7962,7 @@
           <a:p>
             <a:r>
               <a:rPr lang="en-US" dirty="0" smtClean="0"/>
-              <a:t>User selection provides a high quality correction, so no extra classifier is needed</a:t>
+              <a:t>User selection provides a high quality correction, so no extra classifier needed</a:t>
             </a:r>
           </a:p>
           <a:p>
@@ -6392,7 +7981,7 @@
           </p:nvPr>
         </p:nvPicPr>
         <p:blipFill rotWithShape="1">
-          <a:blip r:embed="rId2">
+          <a:blip r:embed="rId3">
             <a:extLst>
               <a:ext uri="{28A0092B-C50C-407E-A947-70E740481C1C}">
                 <a14:useLocalDpi xmlns:a14="http://schemas.microsoft.com/office/drawing/2010/main" val="0"/>
@@ -6404,7 +7993,7 @@
         </p:blipFill>
         <p:spPr>
           <a:xfrm>
-            <a:off x="7097149" y="2274569"/>
+            <a:off x="1839349" y="3441793"/>
             <a:ext cx="3384724" cy="2378651"/>
           </a:xfrm>
           <a:prstGeom prst="rect">
@@ -6421,7 +8010,7 @@
           <p:nvPr/>
         </p:nvPicPr>
         <p:blipFill rotWithShape="1">
-          <a:blip r:embed="rId3">
+          <a:blip r:embed="rId4">
             <a:extLst>
               <a:ext uri="{28A0092B-C50C-407E-A947-70E740481C1C}">
                 <a14:useLocalDpi xmlns:a14="http://schemas.microsoft.com/office/drawing/2010/main" val="0"/>
@@ -6433,7 +8022,7 @@
         </p:blipFill>
         <p:spPr>
           <a:xfrm>
-            <a:off x="7212066" y="4983480"/>
+            <a:off x="6537696" y="3863340"/>
             <a:ext cx="3225966" cy="1259874"/>
           </a:xfrm>
           <a:prstGeom prst="rect">
@@ -6493,174 +8082,131 @@
           <a:p>
             <a:r>
               <a:rPr lang="en-US" dirty="0" smtClean="0"/>
-              <a:t>Results</a:t>
-            </a:r>
-            <a:endParaRPr lang="en-US" dirty="0"/>
-          </a:p>
-        </p:txBody>
-      </p:sp>
-      <p:sp>
-        <p:nvSpPr>
-          <p:cNvPr id="3" name="Text Placeholder 2"/>
-          <p:cNvSpPr>
-            <a:spLocks noGrp="1"/>
-          </p:cNvSpPr>
-          <p:nvPr>
-            <p:ph type="body" idx="1"/>
+              <a:t>Testing</a:t>
+            </a:r>
+            <a:endParaRPr lang="en-US" dirty="0"/>
+          </a:p>
+        </p:txBody>
+      </p:sp>
+      <p:sp>
+        <p:nvSpPr>
+          <p:cNvPr id="3" name="Content Placeholder 2"/>
+          <p:cNvSpPr>
+            <a:spLocks noGrp="1"/>
+          </p:cNvSpPr>
+          <p:nvPr>
+            <p:ph idx="1"/>
           </p:nvPr>
         </p:nvSpPr>
         <p:spPr>
           <a:xfrm>
-            <a:off x="1141804" y="1600200"/>
-            <a:ext cx="4879199" cy="823912"/>
+            <a:off x="913795" y="1600200"/>
+            <a:ext cx="10353762" cy="4572000"/>
           </a:xfrm>
         </p:spPr>
         <p:txBody>
-          <a:bodyPr anchor="ctr"/>
-          <a:lstStyle/>
-          <a:p>
-            <a:pPr algn="ctr"/>
-            <a:r>
-              <a:rPr lang="en-US" dirty="0" smtClean="0"/>
-              <a:t>Keyboard Correction Data</a:t>
-            </a:r>
-          </a:p>
-        </p:txBody>
-      </p:sp>
-      <p:sp>
-        <p:nvSpPr>
-          <p:cNvPr id="5" name="Text Placeholder 4"/>
-          <p:cNvSpPr>
-            <a:spLocks noGrp="1"/>
-          </p:cNvSpPr>
-          <p:nvPr>
-            <p:ph type="body" sz="quarter" idx="3"/>
-          </p:nvPr>
-        </p:nvSpPr>
-        <p:spPr>
-          <a:xfrm>
-            <a:off x="6402003" y="1600200"/>
-            <a:ext cx="4865554" cy="823912"/>
-          </a:xfrm>
-        </p:spPr>
-        <p:txBody>
-          <a:bodyPr anchor="ctr"/>
-          <a:lstStyle/>
-          <a:p>
-            <a:pPr algn="ctr"/>
-            <a:r>
-              <a:rPr lang="en-US" dirty="0" smtClean="0"/>
-              <a:t>Alternate Selection Data</a:t>
-            </a:r>
-            <a:endParaRPr lang="en-US" dirty="0"/>
-          </a:p>
-        </p:txBody>
-      </p:sp>
-      <p:pic>
-        <p:nvPicPr>
-          <p:cNvPr id="7" name="Content Placeholder 6"/>
-          <p:cNvPicPr>
-            <a:picLocks noGrp="1" noChangeAspect="1"/>
-          </p:cNvPicPr>
-          <p:nvPr>
-            <p:ph sz="half" idx="2"/>
-          </p:nvPr>
-        </p:nvPicPr>
-        <p:blipFill rotWithShape="1">
-          <a:blip r:embed="rId2">
-            <a:extLst>
-              <a:ext uri="{28A0092B-C50C-407E-A947-70E740481C1C}">
-                <a14:useLocalDpi xmlns:a14="http://schemas.microsoft.com/office/drawing/2010/main" val="0"/>
-              </a:ext>
-            </a:extLst>
-          </a:blip>
-          <a:srcRect l="573" t="5061"/>
-          <a:stretch/>
-        </p:blipFill>
-        <p:spPr>
-          <a:xfrm>
-            <a:off x="1819547" y="2903220"/>
-            <a:ext cx="3276953" cy="1030950"/>
-          </a:xfrm>
-          <a:prstGeom prst="rect">
-            <a:avLst/>
-          </a:prstGeom>
-        </p:spPr>
-      </p:pic>
-      <p:pic>
-        <p:nvPicPr>
-          <p:cNvPr id="8" name="Picture 7"/>
-          <p:cNvPicPr>
-            <a:picLocks noChangeAspect="1"/>
-          </p:cNvPicPr>
-          <p:nvPr/>
-        </p:nvPicPr>
-        <p:blipFill rotWithShape="1">
-          <a:blip r:embed="rId3">
-            <a:extLst>
-              <a:ext uri="{28A0092B-C50C-407E-A947-70E740481C1C}">
-                <a14:useLocalDpi xmlns:a14="http://schemas.microsoft.com/office/drawing/2010/main" val="0"/>
-              </a:ext>
-            </a:extLst>
-          </a:blip>
-          <a:srcRect t="8203"/>
-          <a:stretch/>
-        </p:blipFill>
-        <p:spPr>
-          <a:xfrm>
-            <a:off x="1953088" y="4609387"/>
-            <a:ext cx="3143412" cy="897734"/>
-          </a:xfrm>
-          <a:prstGeom prst="rect">
-            <a:avLst/>
-          </a:prstGeom>
-        </p:spPr>
-      </p:pic>
-      <p:pic>
-        <p:nvPicPr>
-          <p:cNvPr id="10" name="Picture 3" descr="U:\git\COSC757\Assignments\ArticleSummary\Figure 5.PNG"/>
-          <p:cNvPicPr>
-            <a:picLocks noGrp="1" noChangeAspect="1" noChangeArrowheads="1"/>
-          </p:cNvPicPr>
-          <p:nvPr>
-            <p:ph sz="quarter" idx="4"/>
-          </p:nvPr>
-        </p:nvPicPr>
-        <p:blipFill rotWithShape="1">
-          <a:blip r:embed="rId4">
-            <a:extLst>
-              <a:ext uri="{28A0092B-C50C-407E-A947-70E740481C1C}">
-                <a14:useLocalDpi xmlns:a14="http://schemas.microsoft.com/office/drawing/2010/main" val="0"/>
-              </a:ext>
-            </a:extLst>
-          </a:blip>
-          <a:srcRect t="10391"/>
-          <a:stretch/>
-        </p:blipFill>
-        <p:spPr bwMode="auto">
-          <a:xfrm>
-            <a:off x="7077769" y="2929138"/>
-            <a:ext cx="3696216" cy="2577983"/>
-          </a:xfrm>
-          <a:prstGeom prst="rect">
-            <a:avLst/>
-          </a:prstGeom>
-          <a:noFill/>
-          <a:extLst>
-            <a:ext uri="{909E8E84-426E-40DD-AFC4-6F175D3DCCD1}">
-              <a14:hiddenFill xmlns:a14="http://schemas.microsoft.com/office/drawing/2010/main">
-                <a:solidFill>
-                  <a:srgbClr val="FFFFFF"/>
-                </a:solidFill>
-              </a14:hiddenFill>
-            </a:ext>
-          </a:extLst>
-        </p:spPr>
-      </p:pic>
+          <a:bodyPr>
+            <a:normAutofit fontScale="92500" lnSpcReduction="10000"/>
+          </a:bodyPr>
+          <a:lstStyle/>
+          <a:p>
+            <a:r>
+              <a:rPr lang="en-US" dirty="0" smtClean="0"/>
+              <a:t>Word error rate (</a:t>
+            </a:r>
+            <a:r>
+              <a:rPr lang="en-US" dirty="0" err="1" smtClean="0"/>
+              <a:t>WER</a:t>
+            </a:r>
+            <a:r>
+              <a:rPr lang="en-US" dirty="0" smtClean="0"/>
+              <a:t>) evaluation:</a:t>
+            </a:r>
+          </a:p>
+          <a:p>
+            <a:pPr lvl="1"/>
+            <a:r>
+              <a:rPr lang="en-US" dirty="0" smtClean="0"/>
+              <a:t>Anonymized speech queries randomly selected from traffic logs and human-transcribed</a:t>
+            </a:r>
+          </a:p>
+          <a:p>
+            <a:pPr lvl="1"/>
+            <a:r>
+              <a:rPr lang="en-US" dirty="0" smtClean="0"/>
+              <a:t>The most frequently used words already have a good pronunciation, but are still useful to ensure no learned “rogue” pronunciations</a:t>
+            </a:r>
+          </a:p>
+          <a:p>
+            <a:r>
+              <a:rPr lang="en-US" dirty="0" smtClean="0"/>
+              <a:t>Side-by-side (</a:t>
+            </a:r>
+            <a:r>
+              <a:rPr lang="en-US" dirty="0" err="1" smtClean="0"/>
+              <a:t>SxS</a:t>
+            </a:r>
+            <a:r>
+              <a:rPr lang="en-US" dirty="0" smtClean="0"/>
+              <a:t>) tests:</a:t>
+            </a:r>
+          </a:p>
+          <a:p>
+            <a:pPr lvl="1"/>
+            <a:r>
+              <a:rPr lang="en-US" dirty="0" smtClean="0"/>
+              <a:t>Two ASR engines: one with the learned pronunciations and one without</a:t>
+            </a:r>
+          </a:p>
+          <a:p>
+            <a:pPr lvl="1"/>
+            <a:r>
+              <a:rPr lang="en-US" dirty="0" smtClean="0"/>
+              <a:t>Both engines are fed the exact same queries from anonymized voice search logs</a:t>
+            </a:r>
+          </a:p>
+          <a:p>
+            <a:pPr lvl="1"/>
+            <a:r>
+              <a:rPr lang="en-US" dirty="0" smtClean="0"/>
+              <a:t>Queries with differing recognition transcripts are evaluated by human raters and marked as one of four categories:</a:t>
+            </a:r>
+          </a:p>
+          <a:p>
+            <a:pPr lvl="2"/>
+            <a:r>
+              <a:rPr lang="en-US" dirty="0" smtClean="0"/>
+              <a:t>Nonsense: the transcript is nonsense</a:t>
+            </a:r>
+          </a:p>
+          <a:p>
+            <a:pPr lvl="2"/>
+            <a:r>
+              <a:rPr lang="en-US" dirty="0" smtClean="0"/>
+              <a:t>Unusable: the transcript does not correspond to the audio</a:t>
+            </a:r>
+          </a:p>
+          <a:p>
+            <a:pPr lvl="2"/>
+            <a:r>
+              <a:rPr lang="en-US" dirty="0" smtClean="0"/>
+              <a:t>Usable: the transcript contains only small errors</a:t>
+            </a:r>
+          </a:p>
+          <a:p>
+            <a:pPr lvl="2"/>
+            <a:r>
+              <a:rPr lang="en-US" dirty="0" smtClean="0"/>
+              <a:t>Exact: the transcript matches the spoken audio exactly</a:t>
+            </a:r>
+            <a:endParaRPr lang="en-US" dirty="0"/>
+          </a:p>
+        </p:txBody>
+      </p:sp>
     </p:spTree>
     <p:extLst>
       <p:ext uri="{BB962C8B-B14F-4D97-AF65-F5344CB8AC3E}">
-        <p14:creationId xmlns:p14="http://schemas.microsoft.com/office/powerpoint/2010/main" val="1548367371"/>
+        <p14:creationId xmlns:p14="http://schemas.microsoft.com/office/powerpoint/2010/main" val="3294197162"/>
       </p:ext>
     </p:extLst>
   </p:cSld>
@@ -6709,7 +8255,64 @@
           <a:p>
             <a:r>
               <a:rPr lang="en-US" dirty="0" smtClean="0"/>
-              <a:t>Results (cont.)</a:t>
+              <a:t>Results</a:t>
+            </a:r>
+            <a:endParaRPr lang="en-US" dirty="0"/>
+          </a:p>
+        </p:txBody>
+      </p:sp>
+      <p:sp>
+        <p:nvSpPr>
+          <p:cNvPr id="3" name="Text Placeholder 2"/>
+          <p:cNvSpPr>
+            <a:spLocks noGrp="1"/>
+          </p:cNvSpPr>
+          <p:nvPr>
+            <p:ph type="body" idx="1"/>
+          </p:nvPr>
+        </p:nvSpPr>
+        <p:spPr>
+          <a:xfrm>
+            <a:off x="1143000" y="1371600"/>
+            <a:ext cx="3657600" cy="823912"/>
+          </a:xfrm>
+        </p:spPr>
+        <p:txBody>
+          <a:bodyPr anchor="ctr"/>
+          <a:lstStyle/>
+          <a:p>
+            <a:pPr algn="ctr"/>
+            <a:r>
+              <a:rPr lang="en-US" dirty="0" smtClean="0"/>
+              <a:t>Keyboard Correction</a:t>
+            </a:r>
+          </a:p>
+        </p:txBody>
+      </p:sp>
+      <p:sp>
+        <p:nvSpPr>
+          <p:cNvPr id="5" name="Text Placeholder 4"/>
+          <p:cNvSpPr>
+            <a:spLocks noGrp="1"/>
+          </p:cNvSpPr>
+          <p:nvPr>
+            <p:ph type="body" sz="quarter" idx="3"/>
+          </p:nvPr>
+        </p:nvSpPr>
+        <p:spPr>
+          <a:xfrm>
+            <a:off x="7543800" y="1371600"/>
+            <a:ext cx="3200400" cy="823912"/>
+          </a:xfrm>
+        </p:spPr>
+        <p:txBody>
+          <a:bodyPr anchor="ctr"/>
+          <a:lstStyle/>
+          <a:p>
+            <a:pPr algn="ctr"/>
+            <a:r>
+              <a:rPr lang="en-US" dirty="0" smtClean="0"/>
+              <a:t>Alternate Selection</a:t>
             </a:r>
             <a:endParaRPr lang="en-US" dirty="0"/>
           </a:p>
@@ -6717,16 +8320,372 @@
       </p:sp>
       <p:pic>
         <p:nvPicPr>
-          <p:cNvPr id="4" name="Picture 2" descr="U:\git\COSC757\Assignments\ArticleSummary\Table 5.PNG"/>
+          <p:cNvPr id="7" name="Content Placeholder 6"/>
+          <p:cNvPicPr>
+            <a:picLocks noGrp="1" noChangeAspect="1"/>
+          </p:cNvPicPr>
+          <p:nvPr>
+            <p:ph sz="half" idx="2"/>
+          </p:nvPr>
+        </p:nvPicPr>
+        <p:blipFill rotWithShape="1">
+          <a:blip r:embed="rId3">
+            <a:extLst>
+              <a:ext uri="{28A0092B-C50C-407E-A947-70E740481C1C}">
+                <a14:useLocalDpi xmlns:a14="http://schemas.microsoft.com/office/drawing/2010/main" val="0"/>
+              </a:ext>
+            </a:extLst>
+          </a:blip>
+          <a:srcRect l="573" t="5061"/>
+          <a:stretch/>
+        </p:blipFill>
+        <p:spPr>
+          <a:xfrm>
+            <a:off x="1339487" y="2240280"/>
+            <a:ext cx="3276953" cy="1030950"/>
+          </a:xfrm>
+          <a:prstGeom prst="rect">
+            <a:avLst/>
+          </a:prstGeom>
+        </p:spPr>
+      </p:pic>
+      <p:pic>
+        <p:nvPicPr>
+          <p:cNvPr id="8" name="Picture 7"/>
+          <p:cNvPicPr>
+            <a:picLocks noChangeAspect="1"/>
+          </p:cNvPicPr>
+          <p:nvPr/>
+        </p:nvPicPr>
+        <p:blipFill rotWithShape="1">
+          <a:blip r:embed="rId4">
+            <a:extLst>
+              <a:ext uri="{28A0092B-C50C-407E-A947-70E740481C1C}">
+                <a14:useLocalDpi xmlns:a14="http://schemas.microsoft.com/office/drawing/2010/main" val="0"/>
+              </a:ext>
+            </a:extLst>
+          </a:blip>
+          <a:srcRect t="8203"/>
+          <a:stretch/>
+        </p:blipFill>
+        <p:spPr>
+          <a:xfrm>
+            <a:off x="1393018" y="3603547"/>
+            <a:ext cx="3143412" cy="897734"/>
+          </a:xfrm>
+          <a:prstGeom prst="rect">
+            <a:avLst/>
+          </a:prstGeom>
+        </p:spPr>
+      </p:pic>
+      <p:pic>
+        <p:nvPicPr>
+          <p:cNvPr id="10" name="Picture 3" descr="U:\git\COSC757\Assignments\ArticleSummary\Figure 5.PNG"/>
           <p:cNvPicPr>
             <a:picLocks noGrp="1" noChangeAspect="1" noChangeArrowheads="1"/>
           </p:cNvPicPr>
           <p:nvPr>
-            <p:ph idx="1"/>
-          </p:nvPr>
+            <p:ph sz="quarter" idx="4"/>
+          </p:nvPr>
+        </p:nvPicPr>
+        <p:blipFill rotWithShape="1">
+          <a:blip r:embed="rId5">
+            <a:extLst>
+              <a:ext uri="{28A0092B-C50C-407E-A947-70E740481C1C}">
+                <a14:useLocalDpi xmlns:a14="http://schemas.microsoft.com/office/drawing/2010/main" val="0"/>
+              </a:ext>
+            </a:extLst>
+          </a:blip>
+          <a:srcRect t="10391" b="3311"/>
+          <a:stretch/>
+        </p:blipFill>
+        <p:spPr bwMode="auto">
+          <a:xfrm>
+            <a:off x="7409239" y="2112127"/>
+            <a:ext cx="3696216" cy="2482733"/>
+          </a:xfrm>
+          <a:prstGeom prst="rect">
+            <a:avLst/>
+          </a:prstGeom>
+          <a:noFill/>
+          <a:extLst>
+            <a:ext uri="{909E8E84-426E-40DD-AFC4-6F175D3DCCD1}">
+              <a14:hiddenFill xmlns:a14="http://schemas.microsoft.com/office/drawing/2010/main">
+                <a:solidFill>
+                  <a:srgbClr val="FFFFFF"/>
+                </a:solidFill>
+              </a14:hiddenFill>
+            </a:ext>
+          </a:extLst>
+        </p:spPr>
+      </p:pic>
+      <p:sp>
+        <p:nvSpPr>
+          <p:cNvPr id="11" name="Text Placeholder 4"/>
+          <p:cNvSpPr txBox="1">
+            <a:spLocks/>
+          </p:cNvSpPr>
+          <p:nvPr/>
+        </p:nvSpPr>
+        <p:spPr>
+          <a:xfrm>
+            <a:off x="5257800" y="4114800"/>
+            <a:ext cx="1828800" cy="823912"/>
+          </a:xfrm>
+          <a:prstGeom prst="rect">
+            <a:avLst/>
+          </a:prstGeom>
+        </p:spPr>
+        <p:txBody>
+          <a:bodyPr vert="horz" lIns="91440" tIns="45720" rIns="91440" bIns="45720" rtlCol="0" anchor="ctr">
+            <a:normAutofit/>
+          </a:bodyPr>
+          <a:lstStyle>
+            <a:lvl1pPr marL="0" indent="0" algn="l" defTabSz="914400" rtl="0" eaLnBrk="1" latinLnBrk="0" hangingPunct="1">
+              <a:lnSpc>
+                <a:spcPct val="100000"/>
+              </a:lnSpc>
+              <a:spcBef>
+                <a:spcPts val="1000"/>
+              </a:spcBef>
+              <a:buFont typeface="Arial" panose="020B0604020202020204" pitchFamily="34" charset="0"/>
+              <a:buNone/>
+              <a:defRPr sz="2400" b="1" kern="1200">
+                <a:solidFill>
+                  <a:schemeClr val="tx1"/>
+                </a:solidFill>
+                <a:effectLst>
+                  <a:outerShdw blurRad="50800" dist="38100" dir="2700000" algn="tl" rotWithShape="0">
+                    <a:srgbClr val="000000">
+                      <a:alpha val="48000"/>
+                    </a:srgbClr>
+                  </a:outerShdw>
+                </a:effectLst>
+                <a:latin typeface="+mn-lt"/>
+                <a:ea typeface="+mn-ea"/>
+                <a:cs typeface="+mn-cs"/>
+              </a:defRPr>
+            </a:lvl1pPr>
+            <a:lvl2pPr marL="457200" indent="0" algn="l" defTabSz="914400" rtl="0" eaLnBrk="1" latinLnBrk="0" hangingPunct="1">
+              <a:lnSpc>
+                <a:spcPct val="120000"/>
+              </a:lnSpc>
+              <a:spcBef>
+                <a:spcPts val="500"/>
+              </a:spcBef>
+              <a:buFont typeface="Arial" panose="020B0604020202020204" pitchFamily="34" charset="0"/>
+              <a:buNone/>
+              <a:defRPr sz="2000" b="1" kern="1200">
+                <a:solidFill>
+                  <a:schemeClr val="tx1"/>
+                </a:solidFill>
+                <a:effectLst>
+                  <a:outerShdw blurRad="50800" dist="38100" dir="2700000" algn="tl" rotWithShape="0">
+                    <a:srgbClr val="000000">
+                      <a:alpha val="48000"/>
+                    </a:srgbClr>
+                  </a:outerShdw>
+                </a:effectLst>
+                <a:latin typeface="+mn-lt"/>
+                <a:ea typeface="+mn-ea"/>
+                <a:cs typeface="+mn-cs"/>
+              </a:defRPr>
+            </a:lvl2pPr>
+            <a:lvl3pPr marL="914400" indent="0" algn="l" defTabSz="914400" rtl="0" eaLnBrk="1" latinLnBrk="0" hangingPunct="1">
+              <a:lnSpc>
+                <a:spcPct val="120000"/>
+              </a:lnSpc>
+              <a:spcBef>
+                <a:spcPts val="500"/>
+              </a:spcBef>
+              <a:buFont typeface="Arial" panose="020B0604020202020204" pitchFamily="34" charset="0"/>
+              <a:buNone/>
+              <a:defRPr sz="1800" b="1" kern="1200">
+                <a:solidFill>
+                  <a:schemeClr val="tx1"/>
+                </a:solidFill>
+                <a:effectLst>
+                  <a:outerShdw blurRad="50800" dist="38100" dir="2700000" algn="tl" rotWithShape="0">
+                    <a:srgbClr val="000000">
+                      <a:alpha val="48000"/>
+                    </a:srgbClr>
+                  </a:outerShdw>
+                </a:effectLst>
+                <a:latin typeface="+mn-lt"/>
+                <a:ea typeface="+mn-ea"/>
+                <a:cs typeface="+mn-cs"/>
+              </a:defRPr>
+            </a:lvl3pPr>
+            <a:lvl4pPr marL="1371600" indent="0" algn="l" defTabSz="914400" rtl="0" eaLnBrk="1" latinLnBrk="0" hangingPunct="1">
+              <a:lnSpc>
+                <a:spcPct val="120000"/>
+              </a:lnSpc>
+              <a:spcBef>
+                <a:spcPts val="500"/>
+              </a:spcBef>
+              <a:buFont typeface="Arial" panose="020B0604020202020204" pitchFamily="34" charset="0"/>
+              <a:buNone/>
+              <a:defRPr sz="1600" b="1" kern="1200">
+                <a:solidFill>
+                  <a:schemeClr val="tx1"/>
+                </a:solidFill>
+                <a:effectLst>
+                  <a:outerShdw blurRad="50800" dist="38100" dir="2700000" algn="tl" rotWithShape="0">
+                    <a:srgbClr val="000000">
+                      <a:alpha val="48000"/>
+                    </a:srgbClr>
+                  </a:outerShdw>
+                </a:effectLst>
+                <a:latin typeface="+mn-lt"/>
+                <a:ea typeface="+mn-ea"/>
+                <a:cs typeface="+mn-cs"/>
+              </a:defRPr>
+            </a:lvl4pPr>
+            <a:lvl5pPr marL="1828800" indent="0" algn="l" defTabSz="914400" rtl="0" eaLnBrk="1" latinLnBrk="0" hangingPunct="1">
+              <a:lnSpc>
+                <a:spcPct val="120000"/>
+              </a:lnSpc>
+              <a:spcBef>
+                <a:spcPts val="500"/>
+              </a:spcBef>
+              <a:buFont typeface="Arial" panose="020B0604020202020204" pitchFamily="34" charset="0"/>
+              <a:buNone/>
+              <a:defRPr sz="1600" b="1" kern="1200">
+                <a:solidFill>
+                  <a:schemeClr val="tx1"/>
+                </a:solidFill>
+                <a:effectLst>
+                  <a:outerShdw blurRad="50800" dist="38100" dir="2700000" algn="tl" rotWithShape="0">
+                    <a:srgbClr val="000000">
+                      <a:alpha val="48000"/>
+                    </a:srgbClr>
+                  </a:outerShdw>
+                </a:effectLst>
+                <a:latin typeface="+mn-lt"/>
+                <a:ea typeface="+mn-ea"/>
+                <a:cs typeface="+mn-cs"/>
+              </a:defRPr>
+            </a:lvl5pPr>
+            <a:lvl6pPr marL="2286000" indent="0" algn="l" defTabSz="914400" rtl="0" eaLnBrk="1" latinLnBrk="0" hangingPunct="1">
+              <a:lnSpc>
+                <a:spcPct val="120000"/>
+              </a:lnSpc>
+              <a:spcBef>
+                <a:spcPts val="500"/>
+              </a:spcBef>
+              <a:buFont typeface="Arial" panose="020B0604020202020204" pitchFamily="34" charset="0"/>
+              <a:buNone/>
+              <a:defRPr sz="1600" b="1" kern="1200">
+                <a:solidFill>
+                  <a:schemeClr val="tx1"/>
+                </a:solidFill>
+                <a:effectLst>
+                  <a:outerShdw blurRad="50800" dist="38100" dir="2700000" algn="tl" rotWithShape="0">
+                    <a:srgbClr val="000000">
+                      <a:alpha val="48000"/>
+                    </a:srgbClr>
+                  </a:outerShdw>
+                </a:effectLst>
+                <a:latin typeface="+mn-lt"/>
+                <a:ea typeface="+mn-ea"/>
+                <a:cs typeface="+mn-cs"/>
+              </a:defRPr>
+            </a:lvl6pPr>
+            <a:lvl7pPr marL="2743200" indent="0" algn="l" defTabSz="914400" rtl="0" eaLnBrk="1" latinLnBrk="0" hangingPunct="1">
+              <a:lnSpc>
+                <a:spcPct val="120000"/>
+              </a:lnSpc>
+              <a:spcBef>
+                <a:spcPts val="500"/>
+              </a:spcBef>
+              <a:buFont typeface="Arial" panose="020B0604020202020204" pitchFamily="34" charset="0"/>
+              <a:buNone/>
+              <a:defRPr sz="1600" b="1" kern="1200">
+                <a:solidFill>
+                  <a:schemeClr val="tx1"/>
+                </a:solidFill>
+                <a:effectLst>
+                  <a:outerShdw blurRad="50800" dist="38100" dir="2700000" algn="tl" rotWithShape="0">
+                    <a:srgbClr val="000000">
+                      <a:alpha val="48000"/>
+                    </a:srgbClr>
+                  </a:outerShdw>
+                </a:effectLst>
+                <a:latin typeface="+mn-lt"/>
+                <a:ea typeface="+mn-ea"/>
+                <a:cs typeface="+mn-cs"/>
+              </a:defRPr>
+            </a:lvl7pPr>
+            <a:lvl8pPr marL="3200400" indent="0" algn="l" defTabSz="914400" rtl="0" eaLnBrk="1" latinLnBrk="0" hangingPunct="1">
+              <a:lnSpc>
+                <a:spcPct val="120000"/>
+              </a:lnSpc>
+              <a:spcBef>
+                <a:spcPts val="500"/>
+              </a:spcBef>
+              <a:buFont typeface="Arial" panose="020B0604020202020204" pitchFamily="34" charset="0"/>
+              <a:buNone/>
+              <a:defRPr sz="1600" b="1" kern="1200">
+                <a:solidFill>
+                  <a:schemeClr val="tx1"/>
+                </a:solidFill>
+                <a:effectLst>
+                  <a:outerShdw blurRad="50800" dist="38100" dir="2700000" algn="tl" rotWithShape="0">
+                    <a:srgbClr val="000000">
+                      <a:alpha val="48000"/>
+                    </a:srgbClr>
+                  </a:outerShdw>
+                </a:effectLst>
+                <a:latin typeface="+mn-lt"/>
+                <a:ea typeface="+mn-ea"/>
+                <a:cs typeface="+mn-cs"/>
+              </a:defRPr>
+            </a:lvl8pPr>
+            <a:lvl9pPr marL="3657600" indent="0" algn="l" defTabSz="914400" rtl="0" eaLnBrk="1" latinLnBrk="0" hangingPunct="1">
+              <a:lnSpc>
+                <a:spcPct val="120000"/>
+              </a:lnSpc>
+              <a:spcBef>
+                <a:spcPts val="500"/>
+              </a:spcBef>
+              <a:buFont typeface="Arial" panose="020B0604020202020204" pitchFamily="34" charset="0"/>
+              <a:buNone/>
+              <a:defRPr sz="1600" b="1" kern="1200">
+                <a:solidFill>
+                  <a:schemeClr val="tx1"/>
+                </a:solidFill>
+                <a:effectLst>
+                  <a:outerShdw blurRad="50800" dist="38100" dir="2700000" algn="tl" rotWithShape="0">
+                    <a:srgbClr val="000000">
+                      <a:alpha val="48000"/>
+                    </a:srgbClr>
+                  </a:outerShdw>
+                </a:effectLst>
+                <a:latin typeface="+mn-lt"/>
+                <a:ea typeface="+mn-ea"/>
+                <a:cs typeface="+mn-cs"/>
+              </a:defRPr>
+            </a:lvl9pPr>
+          </a:lstStyle>
+          <a:p>
+            <a:pPr algn="ctr"/>
+            <a:r>
+              <a:rPr lang="en-US" dirty="0" smtClean="0"/>
+              <a:t>Together</a:t>
+            </a:r>
+          </a:p>
+        </p:txBody>
+      </p:sp>
+      <p:pic>
+        <p:nvPicPr>
+          <p:cNvPr id="12" name="Picture 2" descr="U:\git\COSC757\Assignments\ArticleSummary\Table 5.PNG"/>
+          <p:cNvPicPr>
+            <a:picLocks noChangeAspect="1" noChangeArrowheads="1"/>
+          </p:cNvPicPr>
+          <p:nvPr/>
         </p:nvPicPr>
         <p:blipFill>
-          <a:blip r:embed="rId2">
+          <a:blip r:embed="rId6">
             <a:extLst>
               <a:ext uri="{28A0092B-C50C-407E-A947-70E740481C1C}">
                 <a14:useLocalDpi xmlns:a14="http://schemas.microsoft.com/office/drawing/2010/main" val="0"/>
@@ -6740,7 +8699,7 @@
         </p:blipFill>
         <p:spPr bwMode="auto">
           <a:xfrm>
-            <a:off x="4468729" y="3273390"/>
+            <a:off x="4536430" y="4996371"/>
             <a:ext cx="3245017" cy="1339919"/>
           </a:xfrm>
           <a:prstGeom prst="rect">
@@ -6761,7 +8720,7 @@
     </p:spTree>
     <p:extLst>
       <p:ext uri="{BB962C8B-B14F-4D97-AF65-F5344CB8AC3E}">
-        <p14:creationId xmlns:p14="http://schemas.microsoft.com/office/powerpoint/2010/main" val="3294197162"/>
+        <p14:creationId xmlns:p14="http://schemas.microsoft.com/office/powerpoint/2010/main" val="1548367371"/>
       </p:ext>
     </p:extLst>
   </p:cSld>
@@ -7107,4 +9066,289 @@
     </a:ext>
   </a:extLst>
 </a:theme>
+</file>
+
+<file path=ppt/theme/theme2.xml><?xml version="1.0" encoding="utf-8"?>
+<a:theme xmlns:a="http://schemas.openxmlformats.org/drawingml/2006/main" name="Office Theme">
+  <a:themeElements>
+    <a:clrScheme name="Office">
+      <a:dk1>
+        <a:sysClr val="windowText" lastClr="000000"/>
+      </a:dk1>
+      <a:lt1>
+        <a:sysClr val="window" lastClr="FFFFFF"/>
+      </a:lt1>
+      <a:dk2>
+        <a:srgbClr val="1F497D"/>
+      </a:dk2>
+      <a:lt2>
+        <a:srgbClr val="EEECE1"/>
+      </a:lt2>
+      <a:accent1>
+        <a:srgbClr val="4F81BD"/>
+      </a:accent1>
+      <a:accent2>
+        <a:srgbClr val="C0504D"/>
+      </a:accent2>
+      <a:accent3>
+        <a:srgbClr val="9BBB59"/>
+      </a:accent3>
+      <a:accent4>
+        <a:srgbClr val="8064A2"/>
+      </a:accent4>
+      <a:accent5>
+        <a:srgbClr val="4BACC6"/>
+      </a:accent5>
+      <a:accent6>
+        <a:srgbClr val="F79646"/>
+      </a:accent6>
+      <a:hlink>
+        <a:srgbClr val="0000FF"/>
+      </a:hlink>
+      <a:folHlink>
+        <a:srgbClr val="800080"/>
+      </a:folHlink>
+    </a:clrScheme>
+    <a:fontScheme name="Office">
+      <a:majorFont>
+        <a:latin typeface="Calibri"/>
+        <a:ea typeface=""/>
+        <a:cs typeface=""/>
+        <a:font script="Jpan" typeface="ＭＳ Ｐゴシック"/>
+        <a:font script="Hang" typeface="맑은 고딕"/>
+        <a:font script="Hans" typeface="宋体"/>
+        <a:font script="Hant" typeface="新細明體"/>
+        <a:font script="Arab" typeface="Times New Roman"/>
+        <a:font script="Hebr" typeface="Times New Roman"/>
+        <a:font script="Thai" typeface="Angsana New"/>
+        <a:font script="Ethi" typeface="Nyala"/>
+        <a:font script="Beng" typeface="Vrinda"/>
+        <a:font script="Gujr" typeface="Shruti"/>
+        <a:font script="Khmr" typeface="MoolBoran"/>
+        <a:font script="Knda" typeface="Tunga"/>
+        <a:font script="Guru" typeface="Raavi"/>
+        <a:font script="Cans" typeface="Euphemia"/>
+        <a:font script="Cher" typeface="Plantagenet Cherokee"/>
+        <a:font script="Yiii" typeface="Microsoft Yi Baiti"/>
+        <a:font script="Tibt" typeface="Microsoft Himalaya"/>
+        <a:font script="Thaa" typeface="MV Boli"/>
+        <a:font script="Deva" typeface="Mangal"/>
+        <a:font script="Telu" typeface="Gautami"/>
+        <a:font script="Taml" typeface="Latha"/>
+        <a:font script="Syrc" typeface="Estrangelo Edessa"/>
+        <a:font script="Orya" typeface="Kalinga"/>
+        <a:font script="Mlym" typeface="Kartika"/>
+        <a:font script="Laoo" typeface="DokChampa"/>
+        <a:font script="Sinh" typeface="Iskoola Pota"/>
+        <a:font script="Mong" typeface="Mongolian Baiti"/>
+        <a:font script="Viet" typeface="Times New Roman"/>
+        <a:font script="Uigh" typeface="Microsoft Uighur"/>
+        <a:font script="Geor" typeface="Sylfaen"/>
+      </a:majorFont>
+      <a:minorFont>
+        <a:latin typeface="Calibri"/>
+        <a:ea typeface=""/>
+        <a:cs typeface=""/>
+        <a:font script="Jpan" typeface="ＭＳ Ｐゴシック"/>
+        <a:font script="Hang" typeface="맑은 고딕"/>
+        <a:font script="Hans" typeface="宋体"/>
+        <a:font script="Hant" typeface="新細明體"/>
+        <a:font script="Arab" typeface="Arial"/>
+        <a:font script="Hebr" typeface="Arial"/>
+        <a:font script="Thai" typeface="Cordia New"/>
+        <a:font script="Ethi" typeface="Nyala"/>
+        <a:font script="Beng" typeface="Vrinda"/>
+        <a:font script="Gujr" typeface="Shruti"/>
+        <a:font script="Khmr" typeface="DaunPenh"/>
+        <a:font script="Knda" typeface="Tunga"/>
+        <a:font script="Guru" typeface="Raavi"/>
+        <a:font script="Cans" typeface="Euphemia"/>
+        <a:font script="Cher" typeface="Plantagenet Cherokee"/>
+        <a:font script="Yiii" typeface="Microsoft Yi Baiti"/>
+        <a:font script="Tibt" typeface="Microsoft Himalaya"/>
+        <a:font script="Thaa" typeface="MV Boli"/>
+        <a:font script="Deva" typeface="Mangal"/>
+        <a:font script="Telu" typeface="Gautami"/>
+        <a:font script="Taml" typeface="Latha"/>
+        <a:font script="Syrc" typeface="Estrangelo Edessa"/>
+        <a:font script="Orya" typeface="Kalinga"/>
+        <a:font script="Mlym" typeface="Kartika"/>
+        <a:font script="Laoo" typeface="DokChampa"/>
+        <a:font script="Sinh" typeface="Iskoola Pota"/>
+        <a:font script="Mong" typeface="Mongolian Baiti"/>
+        <a:font script="Viet" typeface="Arial"/>
+        <a:font script="Uigh" typeface="Microsoft Uighur"/>
+        <a:font script="Geor" typeface="Sylfaen"/>
+      </a:minorFont>
+    </a:fontScheme>
+    <a:fmtScheme name="Office">
+      <a:fillStyleLst>
+        <a:solidFill>
+          <a:schemeClr val="phClr"/>
+        </a:solidFill>
+        <a:gradFill rotWithShape="1">
+          <a:gsLst>
+            <a:gs pos="0">
+              <a:schemeClr val="phClr">
+                <a:tint val="50000"/>
+                <a:satMod val="300000"/>
+              </a:schemeClr>
+            </a:gs>
+            <a:gs pos="35000">
+              <a:schemeClr val="phClr">
+                <a:tint val="37000"/>
+                <a:satMod val="300000"/>
+              </a:schemeClr>
+            </a:gs>
+            <a:gs pos="100000">
+              <a:schemeClr val="phClr">
+                <a:tint val="15000"/>
+                <a:satMod val="350000"/>
+              </a:schemeClr>
+            </a:gs>
+          </a:gsLst>
+          <a:lin ang="16200000" scaled="1"/>
+        </a:gradFill>
+        <a:gradFill rotWithShape="1">
+          <a:gsLst>
+            <a:gs pos="0">
+              <a:schemeClr val="phClr">
+                <a:shade val="51000"/>
+                <a:satMod val="130000"/>
+              </a:schemeClr>
+            </a:gs>
+            <a:gs pos="80000">
+              <a:schemeClr val="phClr">
+                <a:shade val="93000"/>
+                <a:satMod val="130000"/>
+              </a:schemeClr>
+            </a:gs>
+            <a:gs pos="100000">
+              <a:schemeClr val="phClr">
+                <a:shade val="94000"/>
+                <a:satMod val="135000"/>
+              </a:schemeClr>
+            </a:gs>
+          </a:gsLst>
+          <a:lin ang="16200000" scaled="0"/>
+        </a:gradFill>
+      </a:fillStyleLst>
+      <a:lnStyleLst>
+        <a:ln w="9525" cap="flat" cmpd="sng" algn="ctr">
+          <a:solidFill>
+            <a:schemeClr val="phClr">
+              <a:shade val="95000"/>
+              <a:satMod val="105000"/>
+            </a:schemeClr>
+          </a:solidFill>
+          <a:prstDash val="solid"/>
+        </a:ln>
+        <a:ln w="25400" cap="flat" cmpd="sng" algn="ctr">
+          <a:solidFill>
+            <a:schemeClr val="phClr"/>
+          </a:solidFill>
+          <a:prstDash val="solid"/>
+        </a:ln>
+        <a:ln w="38100" cap="flat" cmpd="sng" algn="ctr">
+          <a:solidFill>
+            <a:schemeClr val="phClr"/>
+          </a:solidFill>
+          <a:prstDash val="solid"/>
+        </a:ln>
+      </a:lnStyleLst>
+      <a:effectStyleLst>
+        <a:effectStyle>
+          <a:effectLst>
+            <a:outerShdw blurRad="40000" dist="20000" dir="5400000" rotWithShape="0">
+              <a:srgbClr val="000000">
+                <a:alpha val="38000"/>
+              </a:srgbClr>
+            </a:outerShdw>
+          </a:effectLst>
+        </a:effectStyle>
+        <a:effectStyle>
+          <a:effectLst>
+            <a:outerShdw blurRad="40000" dist="23000" dir="5400000" rotWithShape="0">
+              <a:srgbClr val="000000">
+                <a:alpha val="35000"/>
+              </a:srgbClr>
+            </a:outerShdw>
+          </a:effectLst>
+        </a:effectStyle>
+        <a:effectStyle>
+          <a:effectLst>
+            <a:outerShdw blurRad="40000" dist="23000" dir="5400000" rotWithShape="0">
+              <a:srgbClr val="000000">
+                <a:alpha val="35000"/>
+              </a:srgbClr>
+            </a:outerShdw>
+          </a:effectLst>
+          <a:scene3d>
+            <a:camera prst="orthographicFront">
+              <a:rot lat="0" lon="0" rev="0"/>
+            </a:camera>
+            <a:lightRig rig="threePt" dir="t">
+              <a:rot lat="0" lon="0" rev="1200000"/>
+            </a:lightRig>
+          </a:scene3d>
+          <a:sp3d>
+            <a:bevelT w="63500" h="25400"/>
+          </a:sp3d>
+        </a:effectStyle>
+      </a:effectStyleLst>
+      <a:bgFillStyleLst>
+        <a:solidFill>
+          <a:schemeClr val="phClr"/>
+        </a:solidFill>
+        <a:gradFill rotWithShape="1">
+          <a:gsLst>
+            <a:gs pos="0">
+              <a:schemeClr val="phClr">
+                <a:tint val="40000"/>
+                <a:satMod val="350000"/>
+              </a:schemeClr>
+            </a:gs>
+            <a:gs pos="40000">
+              <a:schemeClr val="phClr">
+                <a:tint val="45000"/>
+                <a:shade val="99000"/>
+                <a:satMod val="350000"/>
+              </a:schemeClr>
+            </a:gs>
+            <a:gs pos="100000">
+              <a:schemeClr val="phClr">
+                <a:shade val="20000"/>
+                <a:satMod val="255000"/>
+              </a:schemeClr>
+            </a:gs>
+          </a:gsLst>
+          <a:path path="circle">
+            <a:fillToRect l="50000" t="-80000" r="50000" b="180000"/>
+          </a:path>
+        </a:gradFill>
+        <a:gradFill rotWithShape="1">
+          <a:gsLst>
+            <a:gs pos="0">
+              <a:schemeClr val="phClr">
+                <a:tint val="80000"/>
+                <a:satMod val="300000"/>
+              </a:schemeClr>
+            </a:gs>
+            <a:gs pos="100000">
+              <a:schemeClr val="phClr">
+                <a:shade val="30000"/>
+                <a:satMod val="200000"/>
+              </a:schemeClr>
+            </a:gs>
+          </a:gsLst>
+          <a:path path="circle">
+            <a:fillToRect l="50000" t="50000" r="50000" b="50000"/>
+          </a:path>
+        </a:gradFill>
+      </a:bgFillStyleLst>
+    </a:fmtScheme>
+  </a:themeElements>
+  <a:objectDefaults/>
+  <a:extraClrSchemeLst/>
+</a:theme>
 </file>
</xml_diff>

<commit_message>
"Final" updates to summary and summary slides for COSC757
</commit_message>
<xml_diff>
--- a/Assignments/ArticleSummary/ArticleSummarySlides-MJS.pptx
+++ b/Assignments/ArticleSummary/ArticleSummarySlides-MJS.pptx
@@ -4,19 +4,12 @@
   <p:sldMasterIdLst>
     <p:sldMasterId id="2147483648" r:id="rId1"/>
   </p:sldMasterIdLst>
-  <p:notesMasterIdLst>
-    <p:notesMasterId r:id="rId11"/>
-  </p:notesMasterIdLst>
   <p:sldIdLst>
     <p:sldId id="258" r:id="rId2"/>
-    <p:sldId id="270" r:id="rId3"/>
-    <p:sldId id="269" r:id="rId4"/>
-    <p:sldId id="257" r:id="rId5"/>
-    <p:sldId id="265" r:id="rId6"/>
-    <p:sldId id="266" r:id="rId7"/>
-    <p:sldId id="268" r:id="rId8"/>
-    <p:sldId id="267" r:id="rId9"/>
-    <p:sldId id="262" r:id="rId10"/>
+    <p:sldId id="257" r:id="rId3"/>
+    <p:sldId id="259" r:id="rId4"/>
+    <p:sldId id="261" r:id="rId5"/>
+    <p:sldId id="262" r:id="rId6"/>
   </p:sldIdLst>
   <p:sldSz cx="12192000" cy="6858000"/>
   <p:notesSz cx="6858000" cy="9144000"/>
@@ -118,1482 +111,6 @@
 </p:presentation>
 </file>
 
-<file path=ppt/notesMasters/notesMaster1.xml><?xml version="1.0" encoding="utf-8"?>
-<p:notesMaster xmlns:a="http://schemas.openxmlformats.org/drawingml/2006/main" xmlns:r="http://schemas.openxmlformats.org/officeDocument/2006/relationships" xmlns:p="http://schemas.openxmlformats.org/presentationml/2006/main">
-  <p:cSld>
-    <p:bg>
-      <p:bgRef idx="1001">
-        <a:schemeClr val="bg1"/>
-      </p:bgRef>
-    </p:bg>
-    <p:spTree>
-      <p:nvGrpSpPr>
-        <p:cNvPr id="1" name=""/>
-        <p:cNvGrpSpPr/>
-        <p:nvPr/>
-      </p:nvGrpSpPr>
-      <p:grpSpPr>
-        <a:xfrm>
-          <a:off x="0" y="0"/>
-          <a:ext cx="0" cy="0"/>
-          <a:chOff x="0" y="0"/>
-          <a:chExt cx="0" cy="0"/>
-        </a:xfrm>
-      </p:grpSpPr>
-      <p:sp>
-        <p:nvSpPr>
-          <p:cNvPr id="2" name="Header Placeholder 1"/>
-          <p:cNvSpPr>
-            <a:spLocks noGrp="1"/>
-          </p:cNvSpPr>
-          <p:nvPr>
-            <p:ph type="hdr" sz="quarter"/>
-          </p:nvPr>
-        </p:nvSpPr>
-        <p:spPr>
-          <a:xfrm>
-            <a:off x="0" y="0"/>
-            <a:ext cx="2971800" cy="457200"/>
-          </a:xfrm>
-          <a:prstGeom prst="rect">
-            <a:avLst/>
-          </a:prstGeom>
-        </p:spPr>
-        <p:txBody>
-          <a:bodyPr vert="horz" lIns="91440" tIns="45720" rIns="91440" bIns="45720" rtlCol="0"/>
-          <a:lstStyle>
-            <a:lvl1pPr algn="l">
-              <a:defRPr sz="1200"/>
-            </a:lvl1pPr>
-          </a:lstStyle>
-          <a:p>
-            <a:endParaRPr lang="en-US"/>
-          </a:p>
-        </p:txBody>
-      </p:sp>
-      <p:sp>
-        <p:nvSpPr>
-          <p:cNvPr id="3" name="Date Placeholder 2"/>
-          <p:cNvSpPr>
-            <a:spLocks noGrp="1"/>
-          </p:cNvSpPr>
-          <p:nvPr>
-            <p:ph type="dt" idx="1"/>
-          </p:nvPr>
-        </p:nvSpPr>
-        <p:spPr>
-          <a:xfrm>
-            <a:off x="3884613" y="0"/>
-            <a:ext cx="2971800" cy="457200"/>
-          </a:xfrm>
-          <a:prstGeom prst="rect">
-            <a:avLst/>
-          </a:prstGeom>
-        </p:spPr>
-        <p:txBody>
-          <a:bodyPr vert="horz" lIns="91440" tIns="45720" rIns="91440" bIns="45720" rtlCol="0"/>
-          <a:lstStyle>
-            <a:lvl1pPr algn="r">
-              <a:defRPr sz="1200"/>
-            </a:lvl1pPr>
-          </a:lstStyle>
-          <a:p>
-            <a:fld id="{5BA0C6F3-6BF8-4DC2-B398-E4ECE6AE51D5}" type="datetimeFigureOut">
-              <a:rPr lang="en-US" smtClean="0"/>
-              <a:t>24-Feb-2016</a:t>
-            </a:fld>
-            <a:endParaRPr lang="en-US"/>
-          </a:p>
-        </p:txBody>
-      </p:sp>
-      <p:sp>
-        <p:nvSpPr>
-          <p:cNvPr id="4" name="Slide Image Placeholder 3"/>
-          <p:cNvSpPr>
-            <a:spLocks noGrp="1" noRot="1" noChangeAspect="1"/>
-          </p:cNvSpPr>
-          <p:nvPr>
-            <p:ph type="sldImg" idx="2"/>
-          </p:nvPr>
-        </p:nvSpPr>
-        <p:spPr>
-          <a:xfrm>
-            <a:off x="381000" y="685800"/>
-            <a:ext cx="6096000" cy="3429000"/>
-          </a:xfrm>
-          <a:prstGeom prst="rect">
-            <a:avLst/>
-          </a:prstGeom>
-          <a:noFill/>
-          <a:ln w="12700">
-            <a:solidFill>
-              <a:prstClr val="black"/>
-            </a:solidFill>
-          </a:ln>
-        </p:spPr>
-        <p:txBody>
-          <a:bodyPr vert="horz" lIns="91440" tIns="45720" rIns="91440" bIns="45720" rtlCol="0" anchor="ctr"/>
-          <a:lstStyle/>
-          <a:p>
-            <a:endParaRPr lang="en-US"/>
-          </a:p>
-        </p:txBody>
-      </p:sp>
-      <p:sp>
-        <p:nvSpPr>
-          <p:cNvPr id="5" name="Notes Placeholder 4"/>
-          <p:cNvSpPr>
-            <a:spLocks noGrp="1"/>
-          </p:cNvSpPr>
-          <p:nvPr>
-            <p:ph type="body" sz="quarter" idx="3"/>
-          </p:nvPr>
-        </p:nvSpPr>
-        <p:spPr>
-          <a:xfrm>
-            <a:off x="685800" y="4343400"/>
-            <a:ext cx="5486400" cy="4114800"/>
-          </a:xfrm>
-          <a:prstGeom prst="rect">
-            <a:avLst/>
-          </a:prstGeom>
-        </p:spPr>
-        <p:txBody>
-          <a:bodyPr vert="horz" lIns="91440" tIns="45720" rIns="91440" bIns="45720" rtlCol="0"/>
-          <a:lstStyle/>
-          <a:p>
-            <a:pPr lvl="0"/>
-            <a:r>
-              <a:rPr lang="en-US" smtClean="0"/>
-              <a:t>Click to edit Master text styles</a:t>
-            </a:r>
-          </a:p>
-          <a:p>
-            <a:pPr lvl="1"/>
-            <a:r>
-              <a:rPr lang="en-US" smtClean="0"/>
-              <a:t>Second level</a:t>
-            </a:r>
-          </a:p>
-          <a:p>
-            <a:pPr lvl="2"/>
-            <a:r>
-              <a:rPr lang="en-US" smtClean="0"/>
-              <a:t>Third level</a:t>
-            </a:r>
-          </a:p>
-          <a:p>
-            <a:pPr lvl="3"/>
-            <a:r>
-              <a:rPr lang="en-US" smtClean="0"/>
-              <a:t>Fourth level</a:t>
-            </a:r>
-          </a:p>
-          <a:p>
-            <a:pPr lvl="4"/>
-            <a:r>
-              <a:rPr lang="en-US" smtClean="0"/>
-              <a:t>Fifth level</a:t>
-            </a:r>
-            <a:endParaRPr lang="en-US"/>
-          </a:p>
-        </p:txBody>
-      </p:sp>
-      <p:sp>
-        <p:nvSpPr>
-          <p:cNvPr id="6" name="Footer Placeholder 5"/>
-          <p:cNvSpPr>
-            <a:spLocks noGrp="1"/>
-          </p:cNvSpPr>
-          <p:nvPr>
-            <p:ph type="ftr" sz="quarter" idx="4"/>
-          </p:nvPr>
-        </p:nvSpPr>
-        <p:spPr>
-          <a:xfrm>
-            <a:off x="0" y="8685213"/>
-            <a:ext cx="2971800" cy="457200"/>
-          </a:xfrm>
-          <a:prstGeom prst="rect">
-            <a:avLst/>
-          </a:prstGeom>
-        </p:spPr>
-        <p:txBody>
-          <a:bodyPr vert="horz" lIns="91440" tIns="45720" rIns="91440" bIns="45720" rtlCol="0" anchor="b"/>
-          <a:lstStyle>
-            <a:lvl1pPr algn="l">
-              <a:defRPr sz="1200"/>
-            </a:lvl1pPr>
-          </a:lstStyle>
-          <a:p>
-            <a:endParaRPr lang="en-US"/>
-          </a:p>
-        </p:txBody>
-      </p:sp>
-      <p:sp>
-        <p:nvSpPr>
-          <p:cNvPr id="7" name="Slide Number Placeholder 6"/>
-          <p:cNvSpPr>
-            <a:spLocks noGrp="1"/>
-          </p:cNvSpPr>
-          <p:nvPr>
-            <p:ph type="sldNum" sz="quarter" idx="5"/>
-          </p:nvPr>
-        </p:nvSpPr>
-        <p:spPr>
-          <a:xfrm>
-            <a:off x="3884613" y="8685213"/>
-            <a:ext cx="2971800" cy="457200"/>
-          </a:xfrm>
-          <a:prstGeom prst="rect">
-            <a:avLst/>
-          </a:prstGeom>
-        </p:spPr>
-        <p:txBody>
-          <a:bodyPr vert="horz" lIns="91440" tIns="45720" rIns="91440" bIns="45720" rtlCol="0" anchor="b"/>
-          <a:lstStyle>
-            <a:lvl1pPr algn="r">
-              <a:defRPr sz="1200"/>
-            </a:lvl1pPr>
-          </a:lstStyle>
-          <a:p>
-            <a:fld id="{23F25543-CDE9-4CD3-908D-BDAD6E318A91}" type="slidenum">
-              <a:rPr lang="en-US" smtClean="0"/>
-              <a:t>‹#›</a:t>
-            </a:fld>
-            <a:endParaRPr lang="en-US"/>
-          </a:p>
-        </p:txBody>
-      </p:sp>
-    </p:spTree>
-    <p:extLst>
-      <p:ext uri="{BB962C8B-B14F-4D97-AF65-F5344CB8AC3E}">
-        <p14:creationId xmlns:p14="http://schemas.microsoft.com/office/powerpoint/2010/main" val="167752398"/>
-      </p:ext>
-    </p:extLst>
-  </p:cSld>
-  <p:clrMap bg1="lt1" tx1="dk1" bg2="lt2" tx2="dk2" accent1="accent1" accent2="accent2" accent3="accent3" accent4="accent4" accent5="accent5" accent6="accent6" hlink="hlink" folHlink="folHlink"/>
-  <p:notesStyle>
-    <a:lvl1pPr marL="0" algn="l" defTabSz="914400" rtl="0" eaLnBrk="1" latinLnBrk="0" hangingPunct="1">
-      <a:defRPr sz="1200" kern="1200">
-        <a:solidFill>
-          <a:schemeClr val="tx1"/>
-        </a:solidFill>
-        <a:latin typeface="+mn-lt"/>
-        <a:ea typeface="+mn-ea"/>
-        <a:cs typeface="+mn-cs"/>
-      </a:defRPr>
-    </a:lvl1pPr>
-    <a:lvl2pPr marL="457200" algn="l" defTabSz="914400" rtl="0" eaLnBrk="1" latinLnBrk="0" hangingPunct="1">
-      <a:defRPr sz="1200" kern="1200">
-        <a:solidFill>
-          <a:schemeClr val="tx1"/>
-        </a:solidFill>
-        <a:latin typeface="+mn-lt"/>
-        <a:ea typeface="+mn-ea"/>
-        <a:cs typeface="+mn-cs"/>
-      </a:defRPr>
-    </a:lvl2pPr>
-    <a:lvl3pPr marL="914400" algn="l" defTabSz="914400" rtl="0" eaLnBrk="1" latinLnBrk="0" hangingPunct="1">
-      <a:defRPr sz="1200" kern="1200">
-        <a:solidFill>
-          <a:schemeClr val="tx1"/>
-        </a:solidFill>
-        <a:latin typeface="+mn-lt"/>
-        <a:ea typeface="+mn-ea"/>
-        <a:cs typeface="+mn-cs"/>
-      </a:defRPr>
-    </a:lvl3pPr>
-    <a:lvl4pPr marL="1371600" algn="l" defTabSz="914400" rtl="0" eaLnBrk="1" latinLnBrk="0" hangingPunct="1">
-      <a:defRPr sz="1200" kern="1200">
-        <a:solidFill>
-          <a:schemeClr val="tx1"/>
-        </a:solidFill>
-        <a:latin typeface="+mn-lt"/>
-        <a:ea typeface="+mn-ea"/>
-        <a:cs typeface="+mn-cs"/>
-      </a:defRPr>
-    </a:lvl4pPr>
-    <a:lvl5pPr marL="1828800" algn="l" defTabSz="914400" rtl="0" eaLnBrk="1" latinLnBrk="0" hangingPunct="1">
-      <a:defRPr sz="1200" kern="1200">
-        <a:solidFill>
-          <a:schemeClr val="tx1"/>
-        </a:solidFill>
-        <a:latin typeface="+mn-lt"/>
-        <a:ea typeface="+mn-ea"/>
-        <a:cs typeface="+mn-cs"/>
-      </a:defRPr>
-    </a:lvl5pPr>
-    <a:lvl6pPr marL="2286000" algn="l" defTabSz="914400" rtl="0" eaLnBrk="1" latinLnBrk="0" hangingPunct="1">
-      <a:defRPr sz="1200" kern="1200">
-        <a:solidFill>
-          <a:schemeClr val="tx1"/>
-        </a:solidFill>
-        <a:latin typeface="+mn-lt"/>
-        <a:ea typeface="+mn-ea"/>
-        <a:cs typeface="+mn-cs"/>
-      </a:defRPr>
-    </a:lvl6pPr>
-    <a:lvl7pPr marL="2743200" algn="l" defTabSz="914400" rtl="0" eaLnBrk="1" latinLnBrk="0" hangingPunct="1">
-      <a:defRPr sz="1200" kern="1200">
-        <a:solidFill>
-          <a:schemeClr val="tx1"/>
-        </a:solidFill>
-        <a:latin typeface="+mn-lt"/>
-        <a:ea typeface="+mn-ea"/>
-        <a:cs typeface="+mn-cs"/>
-      </a:defRPr>
-    </a:lvl7pPr>
-    <a:lvl8pPr marL="3200400" algn="l" defTabSz="914400" rtl="0" eaLnBrk="1" latinLnBrk="0" hangingPunct="1">
-      <a:defRPr sz="1200" kern="1200">
-        <a:solidFill>
-          <a:schemeClr val="tx1"/>
-        </a:solidFill>
-        <a:latin typeface="+mn-lt"/>
-        <a:ea typeface="+mn-ea"/>
-        <a:cs typeface="+mn-cs"/>
-      </a:defRPr>
-    </a:lvl8pPr>
-    <a:lvl9pPr marL="3657600" algn="l" defTabSz="914400" rtl="0" eaLnBrk="1" latinLnBrk="0" hangingPunct="1">
-      <a:defRPr sz="1200" kern="1200">
-        <a:solidFill>
-          <a:schemeClr val="tx1"/>
-        </a:solidFill>
-        <a:latin typeface="+mn-lt"/>
-        <a:ea typeface="+mn-ea"/>
-        <a:cs typeface="+mn-cs"/>
-      </a:defRPr>
-    </a:lvl9pPr>
-  </p:notesStyle>
-</p:notesMaster>
-</file>
-
-<file path=ppt/notesSlides/notesSlide1.xml><?xml version="1.0" encoding="utf-8"?>
-<p:notes xmlns:a="http://schemas.openxmlformats.org/drawingml/2006/main" xmlns:r="http://schemas.openxmlformats.org/officeDocument/2006/relationships" xmlns:p="http://schemas.openxmlformats.org/presentationml/2006/main">
-  <p:cSld>
-    <p:spTree>
-      <p:nvGrpSpPr>
-        <p:cNvPr id="1" name=""/>
-        <p:cNvGrpSpPr/>
-        <p:nvPr/>
-      </p:nvGrpSpPr>
-      <p:grpSpPr>
-        <a:xfrm>
-          <a:off x="0" y="0"/>
-          <a:ext cx="0" cy="0"/>
-          <a:chOff x="0" y="0"/>
-          <a:chExt cx="0" cy="0"/>
-        </a:xfrm>
-      </p:grpSpPr>
-      <p:sp>
-        <p:nvSpPr>
-          <p:cNvPr id="2" name="Slide Image Placeholder 1"/>
-          <p:cNvSpPr>
-            <a:spLocks noGrp="1" noRot="1" noChangeAspect="1"/>
-          </p:cNvSpPr>
-          <p:nvPr>
-            <p:ph type="sldImg"/>
-          </p:nvPr>
-        </p:nvSpPr>
-        <p:spPr/>
-      </p:sp>
-      <p:sp>
-        <p:nvSpPr>
-          <p:cNvPr id="3" name="Notes Placeholder 2"/>
-          <p:cNvSpPr>
-            <a:spLocks noGrp="1"/>
-          </p:cNvSpPr>
-          <p:nvPr>
-            <p:ph type="body" idx="1"/>
-          </p:nvPr>
-        </p:nvSpPr>
-        <p:spPr/>
-        <p:txBody>
-          <a:bodyPr/>
-          <a:lstStyle/>
-          <a:p>
-            <a:r>
-              <a:rPr lang="en-US" dirty="0" err="1"/>
-              <a:t>ICASSP</a:t>
-            </a:r>
-            <a:r>
-              <a:rPr lang="en-US" dirty="0"/>
-              <a:t> (2015</a:t>
-            </a:r>
-            <a:r>
-              <a:rPr lang="en-US" dirty="0" smtClean="0"/>
-              <a:t>) – 2015 IEEE International Conference on Acoustics, Speech and Signal Processing (</a:t>
-            </a:r>
-            <a:r>
-              <a:rPr lang="en-US" dirty="0" err="1" smtClean="0"/>
-              <a:t>ICASSP</a:t>
-            </a:r>
-            <a:r>
-              <a:rPr lang="en-US" dirty="0" smtClean="0"/>
-              <a:t>)</a:t>
-            </a:r>
-          </a:p>
-          <a:p>
-            <a:r>
-              <a:rPr lang="en-US" dirty="0" smtClean="0"/>
-              <a:t>Date of Conference: 19-24 </a:t>
-            </a:r>
-            <a:r>
-              <a:rPr lang="en-US" dirty="0"/>
-              <a:t>April </a:t>
-            </a:r>
-            <a:r>
-              <a:rPr lang="en-US" dirty="0" smtClean="0"/>
-              <a:t>2015</a:t>
-            </a:r>
-          </a:p>
-          <a:p>
-            <a:r>
-              <a:rPr lang="en-US" dirty="0" smtClean="0"/>
-              <a:t>Page(s): 4619-4623</a:t>
-            </a:r>
-          </a:p>
-          <a:p>
-            <a:r>
-              <a:rPr lang="en-US" dirty="0" err="1"/>
-              <a:t>DOI</a:t>
-            </a:r>
-            <a:r>
-              <a:rPr lang="en-US" dirty="0"/>
-              <a:t>: </a:t>
-            </a:r>
-            <a:r>
-              <a:rPr lang="en-US" u="sng" dirty="0">
-                <a:hlinkClick r:id="rId3"/>
-              </a:rPr>
-              <a:t>10.1109/</a:t>
-            </a:r>
-            <a:r>
-              <a:rPr lang="en-US" u="sng" dirty="0" err="1">
-                <a:hlinkClick r:id="rId3"/>
-              </a:rPr>
-              <a:t>ICASSP.2015.7178846</a:t>
-            </a:r>
-            <a:endParaRPr lang="en-US" dirty="0"/>
-          </a:p>
-        </p:txBody>
-      </p:sp>
-      <p:sp>
-        <p:nvSpPr>
-          <p:cNvPr id="4" name="Slide Number Placeholder 3"/>
-          <p:cNvSpPr>
-            <a:spLocks noGrp="1"/>
-          </p:cNvSpPr>
-          <p:nvPr>
-            <p:ph type="sldNum" sz="quarter" idx="10"/>
-          </p:nvPr>
-        </p:nvSpPr>
-        <p:spPr/>
-        <p:txBody>
-          <a:bodyPr/>
-          <a:lstStyle/>
-          <a:p>
-            <a:fld id="{23F25543-CDE9-4CD3-908D-BDAD6E318A91}" type="slidenum">
-              <a:rPr lang="en-US" smtClean="0"/>
-              <a:t>1</a:t>
-            </a:fld>
-            <a:endParaRPr lang="en-US"/>
-          </a:p>
-        </p:txBody>
-      </p:sp>
-    </p:spTree>
-    <p:extLst>
-      <p:ext uri="{BB962C8B-B14F-4D97-AF65-F5344CB8AC3E}">
-        <p14:creationId xmlns:p14="http://schemas.microsoft.com/office/powerpoint/2010/main" val="947457210"/>
-      </p:ext>
-    </p:extLst>
-  </p:cSld>
-  <p:clrMapOvr>
-    <a:masterClrMapping/>
-  </p:clrMapOvr>
-</p:notes>
-</file>
-
-<file path=ppt/notesSlides/notesSlide2.xml><?xml version="1.0" encoding="utf-8"?>
-<p:notes xmlns:a="http://schemas.openxmlformats.org/drawingml/2006/main" xmlns:r="http://schemas.openxmlformats.org/officeDocument/2006/relationships" xmlns:p="http://schemas.openxmlformats.org/presentationml/2006/main">
-  <p:cSld>
-    <p:spTree>
-      <p:nvGrpSpPr>
-        <p:cNvPr id="1" name=""/>
-        <p:cNvGrpSpPr/>
-        <p:nvPr/>
-      </p:nvGrpSpPr>
-      <p:grpSpPr>
-        <a:xfrm>
-          <a:off x="0" y="0"/>
-          <a:ext cx="0" cy="0"/>
-          <a:chOff x="0" y="0"/>
-          <a:chExt cx="0" cy="0"/>
-        </a:xfrm>
-      </p:grpSpPr>
-      <p:sp>
-        <p:nvSpPr>
-          <p:cNvPr id="2" name="Slide Image Placeholder 1"/>
-          <p:cNvSpPr>
-            <a:spLocks noGrp="1" noRot="1" noChangeAspect="1"/>
-          </p:cNvSpPr>
-          <p:nvPr>
-            <p:ph type="sldImg"/>
-          </p:nvPr>
-        </p:nvSpPr>
-        <p:spPr/>
-      </p:sp>
-      <p:sp>
-        <p:nvSpPr>
-          <p:cNvPr id="3" name="Notes Placeholder 2"/>
-          <p:cNvSpPr>
-            <a:spLocks noGrp="1"/>
-          </p:cNvSpPr>
-          <p:nvPr>
-            <p:ph type="body" idx="1"/>
-          </p:nvPr>
-        </p:nvSpPr>
-        <p:spPr/>
-        <p:txBody>
-          <a:bodyPr/>
-          <a:lstStyle/>
-          <a:p>
-            <a:r>
-              <a:rPr lang="en-US" dirty="0" smtClean="0"/>
-              <a:t>A</a:t>
-            </a:r>
-            <a:r>
-              <a:rPr lang="en-US" dirty="0"/>
-              <a:t> </a:t>
-            </a:r>
-            <a:r>
-              <a:rPr lang="en-US" b="1" dirty="0"/>
-              <a:t>maximum a posteriori probability (MAP) </a:t>
-            </a:r>
-            <a:r>
-              <a:rPr lang="en-US" dirty="0" smtClean="0"/>
-              <a:t>estimate is a mode of the posterior distribution. </a:t>
-            </a:r>
-          </a:p>
-          <a:p>
-            <a:r>
-              <a:rPr lang="en-US" dirty="0" smtClean="0"/>
-              <a:t>The</a:t>
-            </a:r>
-            <a:r>
-              <a:rPr lang="en-US" dirty="0"/>
-              <a:t> </a:t>
-            </a:r>
-            <a:r>
-              <a:rPr lang="en-US" b="1" dirty="0"/>
-              <a:t>posterior probability</a:t>
-            </a:r>
-            <a:r>
-              <a:rPr lang="en-US" dirty="0"/>
-              <a:t> of </a:t>
-            </a:r>
-            <a:r>
-              <a:rPr lang="en-US" dirty="0" smtClean="0"/>
-              <a:t>a random event or </a:t>
-            </a:r>
-            <a:r>
-              <a:rPr lang="en-US" dirty="0"/>
-              <a:t>an uncertain </a:t>
-            </a:r>
-            <a:r>
-              <a:rPr lang="en-US" dirty="0" smtClean="0"/>
-              <a:t>proposition </a:t>
-            </a:r>
-            <a:r>
-              <a:rPr lang="en-US" dirty="0"/>
-              <a:t>is </a:t>
-            </a:r>
-            <a:r>
-              <a:rPr lang="en-US" dirty="0" smtClean="0"/>
-              <a:t>the conditional probability</a:t>
-            </a:r>
-            <a:r>
-              <a:rPr lang="en-US" dirty="0"/>
-              <a:t> that is assigned after the relevant </a:t>
-            </a:r>
-            <a:r>
-              <a:rPr lang="en-US" dirty="0" smtClean="0"/>
-              <a:t>evidence or </a:t>
-            </a:r>
-            <a:r>
-              <a:rPr lang="en-US" dirty="0"/>
-              <a:t>background is taken into account. Similarly, </a:t>
-            </a:r>
-            <a:r>
-              <a:rPr lang="en-US" dirty="0" smtClean="0"/>
-              <a:t>the </a:t>
-            </a:r>
-            <a:r>
-              <a:rPr lang="en-US" b="1" dirty="0" smtClean="0"/>
-              <a:t>posterior </a:t>
-            </a:r>
-            <a:r>
-              <a:rPr lang="en-US" b="1" dirty="0"/>
-              <a:t>probability distribution</a:t>
-            </a:r>
-            <a:r>
-              <a:rPr lang="en-US" dirty="0"/>
-              <a:t> is </a:t>
-            </a:r>
-            <a:r>
-              <a:rPr lang="en-US" dirty="0" smtClean="0"/>
-              <a:t>the probability distribution of </a:t>
-            </a:r>
-            <a:r>
-              <a:rPr lang="en-US" dirty="0"/>
-              <a:t>an unknown quantity, treated as </a:t>
-            </a:r>
-            <a:r>
-              <a:rPr lang="en-US" dirty="0" smtClean="0"/>
-              <a:t>a random variable, conditional on the </a:t>
-            </a:r>
-            <a:r>
-              <a:rPr lang="en-US" dirty="0"/>
-              <a:t>evidence obtained from an experiment or survey</a:t>
-            </a:r>
-            <a:r>
-              <a:rPr lang="en-US" dirty="0" smtClean="0"/>
-              <a:t>.</a:t>
-            </a:r>
-          </a:p>
-          <a:p>
-            <a:r>
-              <a:rPr lang="en-US" dirty="0" smtClean="0"/>
-              <a:t>"</a:t>
-            </a:r>
-            <a:r>
-              <a:rPr lang="en-US" dirty="0"/>
-              <a:t>Posterior", in this context, means after taking into account the relevant evidence related to the particular case being examined.</a:t>
-            </a:r>
-          </a:p>
-        </p:txBody>
-      </p:sp>
-      <p:sp>
-        <p:nvSpPr>
-          <p:cNvPr id="4" name="Slide Number Placeholder 3"/>
-          <p:cNvSpPr>
-            <a:spLocks noGrp="1"/>
-          </p:cNvSpPr>
-          <p:nvPr>
-            <p:ph type="sldNum" sz="quarter" idx="10"/>
-          </p:nvPr>
-        </p:nvSpPr>
-        <p:spPr/>
-        <p:txBody>
-          <a:bodyPr/>
-          <a:lstStyle/>
-          <a:p>
-            <a:fld id="{23F25543-CDE9-4CD3-908D-BDAD6E318A91}" type="slidenum">
-              <a:rPr lang="en-US" smtClean="0"/>
-              <a:t>2</a:t>
-            </a:fld>
-            <a:endParaRPr lang="en-US"/>
-          </a:p>
-        </p:txBody>
-      </p:sp>
-    </p:spTree>
-    <p:extLst>
-      <p:ext uri="{BB962C8B-B14F-4D97-AF65-F5344CB8AC3E}">
-        <p14:creationId xmlns:p14="http://schemas.microsoft.com/office/powerpoint/2010/main" val="1102373927"/>
-      </p:ext>
-    </p:extLst>
-  </p:cSld>
-  <p:clrMapOvr>
-    <a:masterClrMapping/>
-  </p:clrMapOvr>
-</p:notes>
-</file>
-
-<file path=ppt/notesSlides/notesSlide3.xml><?xml version="1.0" encoding="utf-8"?>
-<p:notes xmlns:a="http://schemas.openxmlformats.org/drawingml/2006/main" xmlns:r="http://schemas.openxmlformats.org/officeDocument/2006/relationships" xmlns:p="http://schemas.openxmlformats.org/presentationml/2006/main">
-  <p:cSld>
-    <p:spTree>
-      <p:nvGrpSpPr>
-        <p:cNvPr id="1" name=""/>
-        <p:cNvGrpSpPr/>
-        <p:nvPr/>
-      </p:nvGrpSpPr>
-      <p:grpSpPr>
-        <a:xfrm>
-          <a:off x="0" y="0"/>
-          <a:ext cx="0" cy="0"/>
-          <a:chOff x="0" y="0"/>
-          <a:chExt cx="0" cy="0"/>
-        </a:xfrm>
-      </p:grpSpPr>
-      <p:sp>
-        <p:nvSpPr>
-          <p:cNvPr id="2" name="Slide Image Placeholder 1"/>
-          <p:cNvSpPr>
-            <a:spLocks noGrp="1" noRot="1" noChangeAspect="1"/>
-          </p:cNvSpPr>
-          <p:nvPr>
-            <p:ph type="sldImg"/>
-          </p:nvPr>
-        </p:nvSpPr>
-        <p:spPr/>
-      </p:sp>
-      <p:sp>
-        <p:nvSpPr>
-          <p:cNvPr id="3" name="Notes Placeholder 2"/>
-          <p:cNvSpPr>
-            <a:spLocks noGrp="1"/>
-          </p:cNvSpPr>
-          <p:nvPr>
-            <p:ph type="body" idx="1"/>
-          </p:nvPr>
-        </p:nvSpPr>
-        <p:spPr/>
-        <p:txBody>
-          <a:bodyPr/>
-          <a:lstStyle/>
-          <a:p>
-            <a:endParaRPr lang="en-US"/>
-          </a:p>
-        </p:txBody>
-      </p:sp>
-      <p:sp>
-        <p:nvSpPr>
-          <p:cNvPr id="4" name="Slide Number Placeholder 3"/>
-          <p:cNvSpPr>
-            <a:spLocks noGrp="1"/>
-          </p:cNvSpPr>
-          <p:nvPr>
-            <p:ph type="sldNum" sz="quarter" idx="10"/>
-          </p:nvPr>
-        </p:nvSpPr>
-        <p:spPr/>
-        <p:txBody>
-          <a:bodyPr/>
-          <a:lstStyle/>
-          <a:p>
-            <a:fld id="{23F25543-CDE9-4CD3-908D-BDAD6E318A91}" type="slidenum">
-              <a:rPr lang="en-US" smtClean="0"/>
-              <a:t>3</a:t>
-            </a:fld>
-            <a:endParaRPr lang="en-US"/>
-          </a:p>
-        </p:txBody>
-      </p:sp>
-    </p:spTree>
-    <p:extLst>
-      <p:ext uri="{BB962C8B-B14F-4D97-AF65-F5344CB8AC3E}">
-        <p14:creationId xmlns:p14="http://schemas.microsoft.com/office/powerpoint/2010/main" val="1323894078"/>
-      </p:ext>
-    </p:extLst>
-  </p:cSld>
-  <p:clrMapOvr>
-    <a:masterClrMapping/>
-  </p:clrMapOvr>
-</p:notes>
-</file>
-
-<file path=ppt/notesSlides/notesSlide4.xml><?xml version="1.0" encoding="utf-8"?>
-<p:notes xmlns:a="http://schemas.openxmlformats.org/drawingml/2006/main" xmlns:r="http://schemas.openxmlformats.org/officeDocument/2006/relationships" xmlns:p="http://schemas.openxmlformats.org/presentationml/2006/main">
-  <p:cSld>
-    <p:spTree>
-      <p:nvGrpSpPr>
-        <p:cNvPr id="1" name=""/>
-        <p:cNvGrpSpPr/>
-        <p:nvPr/>
-      </p:nvGrpSpPr>
-      <p:grpSpPr>
-        <a:xfrm>
-          <a:off x="0" y="0"/>
-          <a:ext cx="0" cy="0"/>
-          <a:chOff x="0" y="0"/>
-          <a:chExt cx="0" cy="0"/>
-        </a:xfrm>
-      </p:grpSpPr>
-      <p:sp>
-        <p:nvSpPr>
-          <p:cNvPr id="2" name="Slide Image Placeholder 1"/>
-          <p:cNvSpPr>
-            <a:spLocks noGrp="1" noRot="1" noChangeAspect="1"/>
-          </p:cNvSpPr>
-          <p:nvPr>
-            <p:ph type="sldImg"/>
-          </p:nvPr>
-        </p:nvSpPr>
-        <p:spPr/>
-      </p:sp>
-      <p:sp>
-        <p:nvSpPr>
-          <p:cNvPr id="3" name="Notes Placeholder 2"/>
-          <p:cNvSpPr>
-            <a:spLocks noGrp="1"/>
-          </p:cNvSpPr>
-          <p:nvPr>
-            <p:ph type="body" idx="1"/>
-          </p:nvPr>
-        </p:nvSpPr>
-        <p:spPr/>
-        <p:txBody>
-          <a:bodyPr/>
-          <a:lstStyle/>
-          <a:p>
-            <a:endParaRPr lang="en-US"/>
-          </a:p>
-        </p:txBody>
-      </p:sp>
-      <p:sp>
-        <p:nvSpPr>
-          <p:cNvPr id="4" name="Slide Number Placeholder 3"/>
-          <p:cNvSpPr>
-            <a:spLocks noGrp="1"/>
-          </p:cNvSpPr>
-          <p:nvPr>
-            <p:ph type="sldNum" sz="quarter" idx="10"/>
-          </p:nvPr>
-        </p:nvSpPr>
-        <p:spPr/>
-        <p:txBody>
-          <a:bodyPr/>
-          <a:lstStyle/>
-          <a:p>
-            <a:fld id="{23F25543-CDE9-4CD3-908D-BDAD6E318A91}" type="slidenum">
-              <a:rPr lang="en-US" smtClean="0"/>
-              <a:t>4</a:t>
-            </a:fld>
-            <a:endParaRPr lang="en-US"/>
-          </a:p>
-        </p:txBody>
-      </p:sp>
-    </p:spTree>
-    <p:extLst>
-      <p:ext uri="{BB962C8B-B14F-4D97-AF65-F5344CB8AC3E}">
-        <p14:creationId xmlns:p14="http://schemas.microsoft.com/office/powerpoint/2010/main" val="4258287050"/>
-      </p:ext>
-    </p:extLst>
-  </p:cSld>
-  <p:clrMapOvr>
-    <a:masterClrMapping/>
-  </p:clrMapOvr>
-</p:notes>
-</file>
-
-<file path=ppt/notesSlides/notesSlide5.xml><?xml version="1.0" encoding="utf-8"?>
-<p:notes xmlns:a="http://schemas.openxmlformats.org/drawingml/2006/main" xmlns:r="http://schemas.openxmlformats.org/officeDocument/2006/relationships" xmlns:p="http://schemas.openxmlformats.org/presentationml/2006/main">
-  <p:cSld>
-    <p:spTree>
-      <p:nvGrpSpPr>
-        <p:cNvPr id="1" name=""/>
-        <p:cNvGrpSpPr/>
-        <p:nvPr/>
-      </p:nvGrpSpPr>
-      <p:grpSpPr>
-        <a:xfrm>
-          <a:off x="0" y="0"/>
-          <a:ext cx="0" cy="0"/>
-          <a:chOff x="0" y="0"/>
-          <a:chExt cx="0" cy="0"/>
-        </a:xfrm>
-      </p:grpSpPr>
-      <p:sp>
-        <p:nvSpPr>
-          <p:cNvPr id="2" name="Slide Image Placeholder 1"/>
-          <p:cNvSpPr>
-            <a:spLocks noGrp="1" noRot="1" noChangeAspect="1"/>
-          </p:cNvSpPr>
-          <p:nvPr>
-            <p:ph type="sldImg"/>
-          </p:nvPr>
-        </p:nvSpPr>
-        <p:spPr/>
-      </p:sp>
-      <p:sp>
-        <p:nvSpPr>
-          <p:cNvPr id="3" name="Notes Placeholder 2"/>
-          <p:cNvSpPr>
-            <a:spLocks noGrp="1"/>
-          </p:cNvSpPr>
-          <p:nvPr>
-            <p:ph type="body" idx="1"/>
-          </p:nvPr>
-        </p:nvSpPr>
-        <p:spPr/>
-        <p:txBody>
-          <a:bodyPr/>
-          <a:lstStyle/>
-          <a:p>
-            <a:endParaRPr lang="en-US"/>
-          </a:p>
-        </p:txBody>
-      </p:sp>
-      <p:sp>
-        <p:nvSpPr>
-          <p:cNvPr id="4" name="Slide Number Placeholder 3"/>
-          <p:cNvSpPr>
-            <a:spLocks noGrp="1"/>
-          </p:cNvSpPr>
-          <p:nvPr>
-            <p:ph type="sldNum" sz="quarter" idx="10"/>
-          </p:nvPr>
-        </p:nvSpPr>
-        <p:spPr/>
-        <p:txBody>
-          <a:bodyPr/>
-          <a:lstStyle/>
-          <a:p>
-            <a:fld id="{23F25543-CDE9-4CD3-908D-BDAD6E318A91}" type="slidenum">
-              <a:rPr lang="en-US" smtClean="0"/>
-              <a:t>5</a:t>
-            </a:fld>
-            <a:endParaRPr lang="en-US"/>
-          </a:p>
-        </p:txBody>
-      </p:sp>
-    </p:spTree>
-    <p:extLst>
-      <p:ext uri="{BB962C8B-B14F-4D97-AF65-F5344CB8AC3E}">
-        <p14:creationId xmlns:p14="http://schemas.microsoft.com/office/powerpoint/2010/main" val="2924614641"/>
-      </p:ext>
-    </p:extLst>
-  </p:cSld>
-  <p:clrMapOvr>
-    <a:masterClrMapping/>
-  </p:clrMapOvr>
-</p:notes>
-</file>
-
-<file path=ppt/notesSlides/notesSlide6.xml><?xml version="1.0" encoding="utf-8"?>
-<p:notes xmlns:a="http://schemas.openxmlformats.org/drawingml/2006/main" xmlns:r="http://schemas.openxmlformats.org/officeDocument/2006/relationships" xmlns:p="http://schemas.openxmlformats.org/presentationml/2006/main">
-  <p:cSld>
-    <p:spTree>
-      <p:nvGrpSpPr>
-        <p:cNvPr id="1" name=""/>
-        <p:cNvGrpSpPr/>
-        <p:nvPr/>
-      </p:nvGrpSpPr>
-      <p:grpSpPr>
-        <a:xfrm>
-          <a:off x="0" y="0"/>
-          <a:ext cx="0" cy="0"/>
-          <a:chOff x="0" y="0"/>
-          <a:chExt cx="0" cy="0"/>
-        </a:xfrm>
-      </p:grpSpPr>
-      <p:sp>
-        <p:nvSpPr>
-          <p:cNvPr id="2" name="Slide Image Placeholder 1"/>
-          <p:cNvSpPr>
-            <a:spLocks noGrp="1" noRot="1" noChangeAspect="1"/>
-          </p:cNvSpPr>
-          <p:nvPr>
-            <p:ph type="sldImg"/>
-          </p:nvPr>
-        </p:nvSpPr>
-        <p:spPr/>
-      </p:sp>
-      <p:sp>
-        <p:nvSpPr>
-          <p:cNvPr id="3" name="Notes Placeholder 2"/>
-          <p:cNvSpPr>
-            <a:spLocks noGrp="1"/>
-          </p:cNvSpPr>
-          <p:nvPr>
-            <p:ph type="body" idx="1"/>
-          </p:nvPr>
-        </p:nvSpPr>
-        <p:spPr/>
-        <p:txBody>
-          <a:bodyPr/>
-          <a:lstStyle/>
-          <a:p>
-            <a:endParaRPr lang="en-US"/>
-          </a:p>
-        </p:txBody>
-      </p:sp>
-      <p:sp>
-        <p:nvSpPr>
-          <p:cNvPr id="4" name="Slide Number Placeholder 3"/>
-          <p:cNvSpPr>
-            <a:spLocks noGrp="1"/>
-          </p:cNvSpPr>
-          <p:nvPr>
-            <p:ph type="sldNum" sz="quarter" idx="10"/>
-          </p:nvPr>
-        </p:nvSpPr>
-        <p:spPr/>
-        <p:txBody>
-          <a:bodyPr/>
-          <a:lstStyle/>
-          <a:p>
-            <a:fld id="{23F25543-CDE9-4CD3-908D-BDAD6E318A91}" type="slidenum">
-              <a:rPr lang="en-US" smtClean="0"/>
-              <a:t>6</a:t>
-            </a:fld>
-            <a:endParaRPr lang="en-US"/>
-          </a:p>
-        </p:txBody>
-      </p:sp>
-    </p:spTree>
-    <p:extLst>
-      <p:ext uri="{BB962C8B-B14F-4D97-AF65-F5344CB8AC3E}">
-        <p14:creationId xmlns:p14="http://schemas.microsoft.com/office/powerpoint/2010/main" val="1717325897"/>
-      </p:ext>
-    </p:extLst>
-  </p:cSld>
-  <p:clrMapOvr>
-    <a:masterClrMapping/>
-  </p:clrMapOvr>
-</p:notes>
-</file>
-
-<file path=ppt/notesSlides/notesSlide7.xml><?xml version="1.0" encoding="utf-8"?>
-<p:notes xmlns:a="http://schemas.openxmlformats.org/drawingml/2006/main" xmlns:r="http://schemas.openxmlformats.org/officeDocument/2006/relationships" xmlns:p="http://schemas.openxmlformats.org/presentationml/2006/main">
-  <p:cSld>
-    <p:spTree>
-      <p:nvGrpSpPr>
-        <p:cNvPr id="1" name=""/>
-        <p:cNvGrpSpPr/>
-        <p:nvPr/>
-      </p:nvGrpSpPr>
-      <p:grpSpPr>
-        <a:xfrm>
-          <a:off x="0" y="0"/>
-          <a:ext cx="0" cy="0"/>
-          <a:chOff x="0" y="0"/>
-          <a:chExt cx="0" cy="0"/>
-        </a:xfrm>
-      </p:grpSpPr>
-      <p:sp>
-        <p:nvSpPr>
-          <p:cNvPr id="2" name="Slide Image Placeholder 1"/>
-          <p:cNvSpPr>
-            <a:spLocks noGrp="1" noRot="1" noChangeAspect="1"/>
-          </p:cNvSpPr>
-          <p:nvPr>
-            <p:ph type="sldImg"/>
-          </p:nvPr>
-        </p:nvSpPr>
-        <p:spPr/>
-      </p:sp>
-      <p:sp>
-        <p:nvSpPr>
-          <p:cNvPr id="3" name="Notes Placeholder 2"/>
-          <p:cNvSpPr>
-            <a:spLocks noGrp="1"/>
-          </p:cNvSpPr>
-          <p:nvPr>
-            <p:ph type="body" idx="1"/>
-          </p:nvPr>
-        </p:nvSpPr>
-        <p:spPr/>
-        <p:txBody>
-          <a:bodyPr/>
-          <a:lstStyle/>
-          <a:p>
-            <a:r>
-              <a:rPr lang="en-US" dirty="0" err="1" smtClean="0"/>
-              <a:t>WER</a:t>
-            </a:r>
-            <a:r>
-              <a:rPr lang="en-US" dirty="0" smtClean="0"/>
-              <a:t>: phone sequence for an infrequent word that matches the pronunciation of a different and more frequent word that would now be </a:t>
-            </a:r>
-            <a:r>
-              <a:rPr lang="en-US" dirty="0" err="1" smtClean="0"/>
-              <a:t>mirecognized</a:t>
-            </a:r>
-            <a:endParaRPr lang="en-US" dirty="0" smtClean="0"/>
-          </a:p>
-          <a:p>
-            <a:endParaRPr lang="en-US" dirty="0" smtClean="0"/>
-          </a:p>
-          <a:p>
-            <a:r>
-              <a:rPr lang="en-US" dirty="0" err="1" smtClean="0"/>
-              <a:t>SxS</a:t>
-            </a:r>
-            <a:r>
-              <a:rPr lang="en-US" dirty="0" smtClean="0"/>
-              <a:t>: Acoustic model, language model, and vocabulary are the same in both engines. Only the lexicon changes.</a:t>
-            </a:r>
-            <a:endParaRPr lang="en-US" dirty="0"/>
-          </a:p>
-          <a:p>
-            <a:endParaRPr lang="en-US" dirty="0"/>
-          </a:p>
-          <a:p>
-            <a:r>
-              <a:rPr lang="en-US" dirty="0" err="1" smtClean="0"/>
-              <a:t>SxS</a:t>
-            </a:r>
-            <a:r>
-              <a:rPr lang="en-US" dirty="0" smtClean="0"/>
-              <a:t> </a:t>
-            </a:r>
-            <a:r>
-              <a:rPr lang="en-US" dirty="0"/>
-              <a:t>experiments have the advantage of focusing </a:t>
-            </a:r>
-            <a:r>
-              <a:rPr lang="en-US" dirty="0" smtClean="0"/>
-              <a:t>on cases </a:t>
-            </a:r>
-            <a:r>
-              <a:rPr lang="en-US" dirty="0"/>
-              <a:t>where pronunciation changes do affect the recognition </a:t>
-            </a:r>
-            <a:r>
-              <a:rPr lang="en-US" dirty="0" smtClean="0"/>
-              <a:t>results. They </a:t>
-            </a:r>
-            <a:r>
-              <a:rPr lang="en-US" dirty="0"/>
-              <a:t>typically show more “movement” than </a:t>
-            </a:r>
-            <a:r>
-              <a:rPr lang="en-US" dirty="0" err="1"/>
-              <a:t>WER</a:t>
-            </a:r>
-            <a:r>
-              <a:rPr lang="en-US" dirty="0"/>
-              <a:t> </a:t>
-            </a:r>
-            <a:r>
-              <a:rPr lang="en-US" dirty="0" smtClean="0"/>
-              <a:t>measurements on </a:t>
-            </a:r>
-            <a:r>
-              <a:rPr lang="en-US" dirty="0"/>
-              <a:t>fixed test sets.</a:t>
-            </a:r>
-          </a:p>
-        </p:txBody>
-      </p:sp>
-      <p:sp>
-        <p:nvSpPr>
-          <p:cNvPr id="4" name="Slide Number Placeholder 3"/>
-          <p:cNvSpPr>
-            <a:spLocks noGrp="1"/>
-          </p:cNvSpPr>
-          <p:nvPr>
-            <p:ph type="sldNum" sz="quarter" idx="10"/>
-          </p:nvPr>
-        </p:nvSpPr>
-        <p:spPr/>
-        <p:txBody>
-          <a:bodyPr/>
-          <a:lstStyle/>
-          <a:p>
-            <a:fld id="{23F25543-CDE9-4CD3-908D-BDAD6E318A91}" type="slidenum">
-              <a:rPr lang="en-US" smtClean="0"/>
-              <a:t>7</a:t>
-            </a:fld>
-            <a:endParaRPr lang="en-US"/>
-          </a:p>
-        </p:txBody>
-      </p:sp>
-    </p:spTree>
-    <p:extLst>
-      <p:ext uri="{BB962C8B-B14F-4D97-AF65-F5344CB8AC3E}">
-        <p14:creationId xmlns:p14="http://schemas.microsoft.com/office/powerpoint/2010/main" val="2932354260"/>
-      </p:ext>
-    </p:extLst>
-  </p:cSld>
-  <p:clrMapOvr>
-    <a:masterClrMapping/>
-  </p:clrMapOvr>
-</p:notes>
-</file>
-
-<file path=ppt/notesSlides/notesSlide8.xml><?xml version="1.0" encoding="utf-8"?>
-<p:notes xmlns:a="http://schemas.openxmlformats.org/drawingml/2006/main" xmlns:r="http://schemas.openxmlformats.org/officeDocument/2006/relationships" xmlns:p="http://schemas.openxmlformats.org/presentationml/2006/main">
-  <p:cSld>
-    <p:spTree>
-      <p:nvGrpSpPr>
-        <p:cNvPr id="1" name=""/>
-        <p:cNvGrpSpPr/>
-        <p:nvPr/>
-      </p:nvGrpSpPr>
-      <p:grpSpPr>
-        <a:xfrm>
-          <a:off x="0" y="0"/>
-          <a:ext cx="0" cy="0"/>
-          <a:chOff x="0" y="0"/>
-          <a:chExt cx="0" cy="0"/>
-        </a:xfrm>
-      </p:grpSpPr>
-      <p:sp>
-        <p:nvSpPr>
-          <p:cNvPr id="2" name="Slide Image Placeholder 1"/>
-          <p:cNvSpPr>
-            <a:spLocks noGrp="1" noRot="1" noChangeAspect="1"/>
-          </p:cNvSpPr>
-          <p:nvPr>
-            <p:ph type="sldImg"/>
-          </p:nvPr>
-        </p:nvSpPr>
-        <p:spPr/>
-      </p:sp>
-      <p:sp>
-        <p:nvSpPr>
-          <p:cNvPr id="3" name="Notes Placeholder 2"/>
-          <p:cNvSpPr>
-            <a:spLocks noGrp="1"/>
-          </p:cNvSpPr>
-          <p:nvPr>
-            <p:ph type="body" idx="1"/>
-          </p:nvPr>
-        </p:nvSpPr>
-        <p:spPr/>
-        <p:txBody>
-          <a:bodyPr/>
-          <a:lstStyle/>
-          <a:p>
-            <a:r>
-              <a:rPr lang="en-US" dirty="0" smtClean="0"/>
-              <a:t>An experiment is considered positive if its </a:t>
-            </a:r>
-            <a:r>
-              <a:rPr lang="en-US" dirty="0" err="1" smtClean="0"/>
-              <a:t>SxS</a:t>
-            </a:r>
-            <a:r>
-              <a:rPr lang="en-US" dirty="0" smtClean="0"/>
-              <a:t> score is higher than that of the corresponding baseline. Generally this means it has fewer nonsense/unusable queries and more usable and exact queries.</a:t>
-            </a:r>
-          </a:p>
-          <a:p>
-            <a:endParaRPr lang="en-US" dirty="0" smtClean="0"/>
-          </a:p>
-          <a:p>
-            <a:r>
-              <a:rPr lang="en-US" dirty="0" smtClean="0"/>
-              <a:t>Keyboard Correction:</a:t>
-            </a:r>
-          </a:p>
-          <a:p>
-            <a:r>
-              <a:rPr lang="en-US" dirty="0" smtClean="0"/>
-              <a:t>We </a:t>
-            </a:r>
-            <a:r>
-              <a:rPr lang="en-US" dirty="0"/>
-              <a:t>see a small reduction in word error rate on each test </a:t>
-            </a:r>
-            <a:r>
-              <a:rPr lang="en-US" dirty="0" smtClean="0"/>
-              <a:t>set.</a:t>
-            </a:r>
-          </a:p>
-          <a:p>
-            <a:r>
-              <a:rPr lang="en-US" dirty="0" err="1" smtClean="0"/>
-              <a:t>SxS</a:t>
-            </a:r>
-            <a:r>
-              <a:rPr lang="en-US" dirty="0" smtClean="0"/>
-              <a:t> score improvements from adding new pronunciations to the baseline ASR engine</a:t>
-            </a:r>
-          </a:p>
-          <a:p>
-            <a:endParaRPr lang="en-US" dirty="0"/>
-          </a:p>
-          <a:p>
-            <a:r>
-              <a:rPr lang="en-US" dirty="0" smtClean="0"/>
-              <a:t>Alternate Selection:</a:t>
-            </a:r>
-          </a:p>
-          <a:p>
-            <a:r>
-              <a:rPr lang="en-US" dirty="0" smtClean="0"/>
-              <a:t>The </a:t>
-            </a:r>
-            <a:r>
-              <a:rPr lang="en-US" dirty="0"/>
-              <a:t>amount of data flowing through the Alternate Selection </a:t>
-            </a:r>
-            <a:r>
-              <a:rPr lang="en-US" dirty="0" smtClean="0"/>
-              <a:t>pipeline is </a:t>
-            </a:r>
-            <a:r>
-              <a:rPr lang="en-US" dirty="0"/>
-              <a:t>smaller than that from Keyboard Corrections. As a result, </a:t>
-            </a:r>
-            <a:r>
-              <a:rPr lang="en-US" dirty="0" smtClean="0"/>
-              <a:t>the system </a:t>
-            </a:r>
-            <a:r>
-              <a:rPr lang="en-US" dirty="0"/>
-              <a:t>learns fewer pronunciations, and our experiments showed </a:t>
-            </a:r>
-            <a:r>
-              <a:rPr lang="en-US" dirty="0" smtClean="0"/>
-              <a:t>no impact </a:t>
-            </a:r>
-            <a:r>
-              <a:rPr lang="en-US" dirty="0"/>
-              <a:t>on standard test set word error rates. However, </a:t>
-            </a:r>
-            <a:r>
-              <a:rPr lang="en-US" dirty="0" err="1"/>
-              <a:t>SxS</a:t>
-            </a:r>
-            <a:r>
-              <a:rPr lang="en-US" dirty="0"/>
-              <a:t> </a:t>
-            </a:r>
-            <a:r>
-              <a:rPr lang="en-US" dirty="0" smtClean="0"/>
-              <a:t>evaluations showed </a:t>
-            </a:r>
-            <a:r>
-              <a:rPr lang="en-US" dirty="0"/>
-              <a:t>significant improvements</a:t>
-            </a:r>
-            <a:r>
-              <a:rPr lang="en-US" dirty="0" smtClean="0"/>
-              <a:t>.</a:t>
-            </a:r>
-          </a:p>
-          <a:p>
-            <a:endParaRPr lang="en-US" dirty="0"/>
-          </a:p>
-          <a:p>
-            <a:r>
-              <a:rPr lang="en-US" dirty="0" smtClean="0"/>
-              <a:t>Side-by-side experiments demonstrate that the pronunciations learned via our methods significantly improve the quality of a production-quality speech recognition system.</a:t>
-            </a:r>
-          </a:p>
-          <a:p>
-            <a:endParaRPr lang="en-US" dirty="0" smtClean="0"/>
-          </a:p>
-          <a:p>
-            <a:endParaRPr lang="en-US" dirty="0"/>
-          </a:p>
-        </p:txBody>
-      </p:sp>
-      <p:sp>
-        <p:nvSpPr>
-          <p:cNvPr id="4" name="Slide Number Placeholder 3"/>
-          <p:cNvSpPr>
-            <a:spLocks noGrp="1"/>
-          </p:cNvSpPr>
-          <p:nvPr>
-            <p:ph type="sldNum" sz="quarter" idx="10"/>
-          </p:nvPr>
-        </p:nvSpPr>
-        <p:spPr/>
-        <p:txBody>
-          <a:bodyPr/>
-          <a:lstStyle/>
-          <a:p>
-            <a:fld id="{23F25543-CDE9-4CD3-908D-BDAD6E318A91}" type="slidenum">
-              <a:rPr lang="en-US" smtClean="0"/>
-              <a:t>8</a:t>
-            </a:fld>
-            <a:endParaRPr lang="en-US"/>
-          </a:p>
-        </p:txBody>
-      </p:sp>
-    </p:spTree>
-    <p:extLst>
-      <p:ext uri="{BB962C8B-B14F-4D97-AF65-F5344CB8AC3E}">
-        <p14:creationId xmlns:p14="http://schemas.microsoft.com/office/powerpoint/2010/main" val="2271397538"/>
-      </p:ext>
-    </p:extLst>
-  </p:cSld>
-  <p:clrMapOvr>
-    <a:masterClrMapping/>
-  </p:clrMapOvr>
-</p:notes>
-</file>
-
-<file path=ppt/notesSlides/notesSlide9.xml><?xml version="1.0" encoding="utf-8"?>
-<p:notes xmlns:a="http://schemas.openxmlformats.org/drawingml/2006/main" xmlns:r="http://schemas.openxmlformats.org/officeDocument/2006/relationships" xmlns:p="http://schemas.openxmlformats.org/presentationml/2006/main">
-  <p:cSld>
-    <p:spTree>
-      <p:nvGrpSpPr>
-        <p:cNvPr id="1" name=""/>
-        <p:cNvGrpSpPr/>
-        <p:nvPr/>
-      </p:nvGrpSpPr>
-      <p:grpSpPr>
-        <a:xfrm>
-          <a:off x="0" y="0"/>
-          <a:ext cx="0" cy="0"/>
-          <a:chOff x="0" y="0"/>
-          <a:chExt cx="0" cy="0"/>
-        </a:xfrm>
-      </p:grpSpPr>
-      <p:sp>
-        <p:nvSpPr>
-          <p:cNvPr id="2" name="Slide Image Placeholder 1"/>
-          <p:cNvSpPr>
-            <a:spLocks noGrp="1" noRot="1" noChangeAspect="1"/>
-          </p:cNvSpPr>
-          <p:nvPr>
-            <p:ph type="sldImg"/>
-          </p:nvPr>
-        </p:nvSpPr>
-        <p:spPr/>
-      </p:sp>
-      <p:sp>
-        <p:nvSpPr>
-          <p:cNvPr id="3" name="Notes Placeholder 2"/>
-          <p:cNvSpPr>
-            <a:spLocks noGrp="1"/>
-          </p:cNvSpPr>
-          <p:nvPr>
-            <p:ph type="body" idx="1"/>
-          </p:nvPr>
-        </p:nvSpPr>
-        <p:spPr/>
-        <p:txBody>
-          <a:bodyPr/>
-          <a:lstStyle/>
-          <a:p>
-            <a:endParaRPr lang="en-US"/>
-          </a:p>
-        </p:txBody>
-      </p:sp>
-      <p:sp>
-        <p:nvSpPr>
-          <p:cNvPr id="4" name="Slide Number Placeholder 3"/>
-          <p:cNvSpPr>
-            <a:spLocks noGrp="1"/>
-          </p:cNvSpPr>
-          <p:nvPr>
-            <p:ph type="sldNum" sz="quarter" idx="10"/>
-          </p:nvPr>
-        </p:nvSpPr>
-        <p:spPr/>
-        <p:txBody>
-          <a:bodyPr/>
-          <a:lstStyle/>
-          <a:p>
-            <a:fld id="{23F25543-CDE9-4CD3-908D-BDAD6E318A91}" type="slidenum">
-              <a:rPr lang="en-US" smtClean="0"/>
-              <a:t>9</a:t>
-            </a:fld>
-            <a:endParaRPr lang="en-US"/>
-          </a:p>
-        </p:txBody>
-      </p:sp>
-    </p:spTree>
-    <p:extLst>
-      <p:ext uri="{BB962C8B-B14F-4D97-AF65-F5344CB8AC3E}">
-        <p14:creationId xmlns:p14="http://schemas.microsoft.com/office/powerpoint/2010/main" val="2756502993"/>
-      </p:ext>
-    </p:extLst>
-  </p:cSld>
-  <p:clrMapOvr>
-    <a:masterClrMapping/>
-  </p:clrMapOvr>
-</p:notes>
-</file>
-
 <file path=ppt/slideLayouts/slideLayout1.xml><?xml version="1.0" encoding="utf-8"?>
 <p:sldLayout xmlns:a="http://schemas.openxmlformats.org/drawingml/2006/main" xmlns:r="http://schemas.openxmlformats.org/officeDocument/2006/relationships" xmlns:p="http://schemas.openxmlformats.org/presentationml/2006/main" type="title" preserve="1">
   <p:cSld name="Title Slide">
@@ -1727,7 +244,7 @@
           <a:p>
             <a:fld id="{48A87A34-81AB-432B-8DAE-1953F412C126}" type="datetimeFigureOut">
               <a:rPr lang="en-US" dirty="0"/>
-              <a:t>24-Feb-2016</a:t>
+              <a:t>22-Feb-16</a:t>
             </a:fld>
             <a:endParaRPr lang="en-US" dirty="0"/>
           </a:p>
@@ -2009,7 +526,7 @@
           <a:p>
             <a:fld id="{48A87A34-81AB-432B-8DAE-1953F412C126}" type="datetimeFigureOut">
               <a:rPr lang="en-US" dirty="0"/>
-              <a:t>24-Feb-2016</a:t>
+              <a:t>22-Feb-16</a:t>
             </a:fld>
             <a:endParaRPr lang="en-US" dirty="0"/>
           </a:p>
@@ -2196,7 +713,7 @@
           <a:p>
             <a:fld id="{48A87A34-81AB-432B-8DAE-1953F412C126}" type="datetimeFigureOut">
               <a:rPr lang="en-US" dirty="0"/>
-              <a:t>24-Feb-2016</a:t>
+              <a:t>22-Feb-16</a:t>
             </a:fld>
             <a:endParaRPr lang="en-US" dirty="0"/>
           </a:p>
@@ -2452,7 +969,7 @@
           <a:p>
             <a:fld id="{48A87A34-81AB-432B-8DAE-1953F412C126}" type="datetimeFigureOut">
               <a:rPr lang="en-US" dirty="0"/>
-              <a:t>24-Feb-2016</a:t>
+              <a:t>22-Feb-16</a:t>
             </a:fld>
             <a:endParaRPr lang="en-US" dirty="0"/>
           </a:p>
@@ -2871,7 +1388,7 @@
           <a:p>
             <a:fld id="{48A87A34-81AB-432B-8DAE-1953F412C126}" type="datetimeFigureOut">
               <a:rPr lang="en-US" dirty="0"/>
-              <a:t>24-Feb-2016</a:t>
+              <a:t>22-Feb-16</a:t>
             </a:fld>
             <a:endParaRPr lang="en-US" dirty="0"/>
           </a:p>
@@ -3412,7 +1929,7 @@
           <a:p>
             <a:fld id="{48A87A34-81AB-432B-8DAE-1953F412C126}" type="datetimeFigureOut">
               <a:rPr lang="en-US" dirty="0"/>
-              <a:t>24-Feb-2016</a:t>
+              <a:t>22-Feb-16</a:t>
             </a:fld>
             <a:endParaRPr lang="en-US" dirty="0"/>
           </a:p>
@@ -4247,7 +2764,7 @@
           <a:p>
             <a:fld id="{48A87A34-81AB-432B-8DAE-1953F412C126}" type="datetimeFigureOut">
               <a:rPr lang="en-US" dirty="0"/>
-              <a:t>24-Feb-2016</a:t>
+              <a:t>22-Feb-16</a:t>
             </a:fld>
             <a:endParaRPr lang="en-US" dirty="0"/>
           </a:p>
@@ -4412,7 +2929,7 @@
           <a:p>
             <a:fld id="{48A87A34-81AB-432B-8DAE-1953F412C126}" type="datetimeFigureOut">
               <a:rPr lang="en-US" dirty="0"/>
-              <a:t>24-Feb-2016</a:t>
+              <a:t>22-Feb-16</a:t>
             </a:fld>
             <a:endParaRPr lang="en-US" dirty="0"/>
           </a:p>
@@ -4591,7 +3108,7 @@
           <a:p>
             <a:fld id="{48A87A34-81AB-432B-8DAE-1953F412C126}" type="datetimeFigureOut">
               <a:rPr lang="en-US" dirty="0"/>
-              <a:t>24-Feb-2016</a:t>
+              <a:t>22-Feb-16</a:t>
             </a:fld>
             <a:endParaRPr lang="en-US" dirty="0"/>
           </a:p>
@@ -4756,7 +3273,7 @@
           <a:p>
             <a:fld id="{48A87A34-81AB-432B-8DAE-1953F412C126}" type="datetimeFigureOut">
               <a:rPr lang="en-US" dirty="0"/>
-              <a:t>24-Feb-2016</a:t>
+              <a:t>22-Feb-16</a:t>
             </a:fld>
             <a:endParaRPr lang="en-US" dirty="0"/>
           </a:p>
@@ -4999,7 +3516,7 @@
           <a:p>
             <a:fld id="{48A87A34-81AB-432B-8DAE-1953F412C126}" type="datetimeFigureOut">
               <a:rPr lang="en-US" dirty="0"/>
-              <a:t>24-Feb-2016</a:t>
+              <a:t>22-Feb-16</a:t>
             </a:fld>
             <a:endParaRPr lang="en-US" dirty="0"/>
           </a:p>
@@ -5231,7 +3748,7 @@
           <a:p>
             <a:fld id="{48A87A34-81AB-432B-8DAE-1953F412C126}" type="datetimeFigureOut">
               <a:rPr lang="en-US" dirty="0"/>
-              <a:t>24-Feb-2016</a:t>
+              <a:t>22-Feb-16</a:t>
             </a:fld>
             <a:endParaRPr lang="en-US" dirty="0"/>
           </a:p>
@@ -5599,7 +4116,7 @@
           <a:p>
             <a:fld id="{48A87A34-81AB-432B-8DAE-1953F412C126}" type="datetimeFigureOut">
               <a:rPr lang="en-US" dirty="0"/>
-              <a:t>24-Feb-2016</a:t>
+              <a:t>22-Feb-16</a:t>
             </a:fld>
             <a:endParaRPr lang="en-US" dirty="0"/>
           </a:p>
@@ -5712,7 +4229,7 @@
           <a:p>
             <a:fld id="{48A87A34-81AB-432B-8DAE-1953F412C126}" type="datetimeFigureOut">
               <a:rPr lang="en-US" dirty="0"/>
-              <a:t>24-Feb-2016</a:t>
+              <a:t>22-Feb-16</a:t>
             </a:fld>
             <a:endParaRPr lang="en-US" dirty="0"/>
           </a:p>
@@ -5802,7 +4319,7 @@
           <a:p>
             <a:fld id="{48A87A34-81AB-432B-8DAE-1953F412C126}" type="datetimeFigureOut">
               <a:rPr lang="en-US" dirty="0"/>
-              <a:t>24-Feb-2016</a:t>
+              <a:t>22-Feb-16</a:t>
             </a:fld>
             <a:endParaRPr lang="en-US" dirty="0"/>
           </a:p>
@@ -6048,7 +4565,7 @@
           <a:p>
             <a:fld id="{48A87A34-81AB-432B-8DAE-1953F412C126}" type="datetimeFigureOut">
               <a:rPr lang="en-US" dirty="0"/>
-              <a:t>24-Feb-2016</a:t>
+              <a:t>22-Feb-16</a:t>
             </a:fld>
             <a:endParaRPr lang="en-US" dirty="0"/>
           </a:p>
@@ -6330,7 +4847,7 @@
           <a:p>
             <a:fld id="{48A87A34-81AB-432B-8DAE-1953F412C126}" type="datetimeFigureOut">
               <a:rPr lang="en-US" dirty="0"/>
-              <a:t>24-Feb-2016</a:t>
+              <a:t>22-Feb-16</a:t>
             </a:fld>
             <a:endParaRPr lang="en-US" dirty="0"/>
           </a:p>
@@ -6539,7 +5056,7 @@
             <a:fld id="{48A87A34-81AB-432B-8DAE-1953F412C126}" type="datetimeFigureOut">
               <a:rPr lang="en-US" dirty="0"/>
               <a:pPr/>
-              <a:t>24-Feb-2016</a:t>
+              <a:t>22-Feb-16</a:t>
             </a:fld>
             <a:endParaRPr lang="en-US" dirty="0"/>
           </a:p>
@@ -7028,19 +5545,19 @@
         </p:nvSpPr>
         <p:spPr>
           <a:xfrm>
-            <a:off x="1371600" y="914400"/>
-            <a:ext cx="9235440" cy="3300984"/>
+            <a:off x="1595269" y="914400"/>
+            <a:ext cx="9001462" cy="3300984"/>
           </a:xfrm>
         </p:spPr>
         <p:txBody>
-          <a:bodyPr anchor="ctr" anchorCtr="0">
+          <a:bodyPr>
             <a:normAutofit fontScale="90000"/>
           </a:bodyPr>
           <a:lstStyle/>
           <a:p>
             <a:r>
               <a:rPr lang="en-US" dirty="0" smtClean="0"/>
-              <a:t>Fix it where it fails: pronunciation learning by mining error corrections from speech logs</a:t>
+              <a:t>Fix it where it fails: pronunciation learning by mining error correction from speech logs</a:t>
             </a:r>
             <a:endParaRPr lang="en-US" dirty="0"/>
           </a:p>
@@ -7083,8 +5600,12 @@
               <a:t> Peng, </a:t>
             </a:r>
             <a:r>
-              <a:rPr lang="en-US" dirty="0" smtClean="0"/>
-              <a:t>Françoise </a:t>
+              <a:rPr lang="en-US" dirty="0" err="1"/>
+              <a:t>Franc¸oise</a:t>
+            </a:r>
+            <a:r>
+              <a:rPr lang="en-US" dirty="0"/>
+              <a:t> </a:t>
             </a:r>
             <a:r>
               <a:rPr lang="en-US" dirty="0" err="1"/>
@@ -7149,21 +5670,12 @@
             <p:ph type="title"/>
           </p:nvPr>
         </p:nvSpPr>
-        <p:spPr>
-          <a:xfrm>
-            <a:off x="913795" y="457200"/>
-            <a:ext cx="10353761" cy="914400"/>
-          </a:xfrm>
-        </p:spPr>
-        <p:txBody>
-          <a:bodyPr/>
-          <a:lstStyle/>
-          <a:p>
-            <a:r>
-              <a:rPr lang="en-US" dirty="0" smtClean="0"/>
-              <a:t>Overview</a:t>
-            </a:r>
-            <a:endParaRPr lang="en-US" dirty="0"/>
+        <p:spPr/>
+        <p:txBody>
+          <a:bodyPr/>
+          <a:lstStyle/>
+          <a:p>
+            <a:endParaRPr lang="en-US"/>
           </a:p>
         </p:txBody>
       </p:sp>
@@ -7177,128 +5689,19 @@
             <p:ph idx="1"/>
           </p:nvPr>
         </p:nvSpPr>
-        <p:spPr>
-          <a:xfrm>
-            <a:off x="913795" y="1600200"/>
-            <a:ext cx="10353762" cy="4572000"/>
-          </a:xfrm>
-        </p:spPr>
-        <p:txBody>
-          <a:bodyPr/>
-          <a:lstStyle/>
-          <a:p>
-            <a:r>
-              <a:rPr lang="en-US" dirty="0" smtClean="0"/>
-              <a:t>Automatic speech recognition (ASR) systems include a pronunciation dictionary (or lexicon) and a grapheme </a:t>
-            </a:r>
-            <a:r>
-              <a:rPr lang="en-US" dirty="0"/>
-              <a:t>to phoneme </a:t>
-            </a:r>
-            <a:r>
-              <a:rPr lang="en-US" dirty="0" smtClean="0"/>
-              <a:t>(</a:t>
-            </a:r>
-            <a:r>
-              <a:rPr lang="en-US" dirty="0" err="1"/>
-              <a:t>G2P</a:t>
-            </a:r>
-            <a:r>
-              <a:rPr lang="en-US" dirty="0" smtClean="0"/>
-              <a:t>) engine</a:t>
-            </a:r>
-          </a:p>
-          <a:p>
-            <a:pPr lvl="1"/>
-            <a:r>
-              <a:rPr lang="en-US" dirty="0" smtClean="0"/>
-              <a:t>The lexicon consists of word-pronunciation pairs written by linguist</a:t>
-            </a:r>
-          </a:p>
-          <a:p>
-            <a:pPr lvl="2"/>
-            <a:r>
-              <a:rPr lang="en-US" dirty="0" smtClean="0"/>
-              <a:t>Hand-generated – cannot keep up with growing vocabulary</a:t>
-            </a:r>
-          </a:p>
-          <a:p>
-            <a:pPr lvl="1"/>
-            <a:r>
-              <a:rPr lang="en-US" dirty="0" err="1" smtClean="0"/>
-              <a:t>G2P</a:t>
-            </a:r>
-            <a:r>
-              <a:rPr lang="en-US" dirty="0" smtClean="0"/>
-              <a:t> has limited accuracy</a:t>
-            </a:r>
-          </a:p>
-          <a:p>
-            <a:pPr lvl="2"/>
-            <a:r>
-              <a:rPr lang="en-US" dirty="0" smtClean="0"/>
-              <a:t>Proper names – pronunciation can be influenced by historical or foreign-origin factors</a:t>
-            </a:r>
-          </a:p>
-          <a:p>
-            <a:r>
-              <a:rPr lang="en-US" dirty="0"/>
-              <a:t>Speech recognition task </a:t>
-            </a:r>
-            <a:r>
-              <a:rPr lang="en-US" dirty="0" smtClean="0"/>
-              <a:t>in general finds </a:t>
-            </a:r>
-            <a:r>
-              <a:rPr lang="en-US" dirty="0"/>
-              <a:t>the word sequence that has the </a:t>
-            </a:r>
-            <a:r>
-              <a:rPr lang="en-US" dirty="0" smtClean="0"/>
-              <a:t>maximum </a:t>
-            </a:r>
-            <a:r>
-              <a:rPr lang="en-US" dirty="0"/>
-              <a:t>posterior probability given the acoustic </a:t>
-            </a:r>
-            <a:r>
-              <a:rPr lang="en-US" dirty="0" smtClean="0"/>
-              <a:t>observations</a:t>
-            </a:r>
-          </a:p>
-          <a:p>
-            <a:pPr lvl="1"/>
-            <a:r>
-              <a:rPr lang="en-US" dirty="0" smtClean="0"/>
-              <a:t>Relies heavily on a lexicon</a:t>
-            </a:r>
-          </a:p>
-          <a:p>
-            <a:pPr lvl="1"/>
-            <a:r>
-              <a:rPr lang="en-US" dirty="0" smtClean="0"/>
-              <a:t>Uses a </a:t>
-            </a:r>
-            <a:r>
-              <a:rPr lang="en-US" dirty="0" err="1" smtClean="0"/>
-              <a:t>G2P</a:t>
-            </a:r>
-            <a:r>
-              <a:rPr lang="en-US" dirty="0" smtClean="0"/>
-              <a:t> for words not found in the lexicon</a:t>
-            </a:r>
-            <a:endParaRPr lang="en-US" dirty="0"/>
-          </a:p>
-          <a:p>
-            <a:pPr lvl="2"/>
-            <a:endParaRPr lang="en-US" dirty="0" smtClean="0"/>
+        <p:spPr/>
+        <p:txBody>
+          <a:bodyPr/>
+          <a:lstStyle/>
+          <a:p>
+            <a:endParaRPr lang="en-US"/>
           </a:p>
         </p:txBody>
       </p:sp>
     </p:spTree>
     <p:extLst>
       <p:ext uri="{BB962C8B-B14F-4D97-AF65-F5344CB8AC3E}">
-        <p14:creationId xmlns:p14="http://schemas.microsoft.com/office/powerpoint/2010/main" val="1643602549"/>
+        <p14:creationId xmlns:p14="http://schemas.microsoft.com/office/powerpoint/2010/main" val="582041634"/>
       </p:ext>
     </p:extLst>
   </p:cSld>
@@ -7325,176 +5728,70 @@
           <a:chExt cx="0" cy="0"/>
         </a:xfrm>
       </p:grpSpPr>
-      <p:sp>
-        <p:nvSpPr>
-          <p:cNvPr id="2" name="Title 1"/>
-          <p:cNvSpPr>
-            <a:spLocks noGrp="1"/>
-          </p:cNvSpPr>
-          <p:nvPr>
-            <p:ph type="title"/>
-          </p:nvPr>
-        </p:nvSpPr>
+      <p:pic>
+        <p:nvPicPr>
+          <p:cNvPr id="2" name="Picture 1"/>
+          <p:cNvPicPr>
+            <a:picLocks noChangeAspect="1"/>
+          </p:cNvPicPr>
+          <p:nvPr/>
+        </p:nvPicPr>
+        <p:blipFill>
+          <a:blip r:embed="rId2">
+            <a:extLst>
+              <a:ext uri="{28A0092B-C50C-407E-A947-70E740481C1C}">
+                <a14:useLocalDpi xmlns:a14="http://schemas.microsoft.com/office/drawing/2010/main" val="0"/>
+              </a:ext>
+            </a:extLst>
+          </a:blip>
+          <a:stretch>
+            <a:fillRect/>
+          </a:stretch>
+        </p:blipFill>
         <p:spPr>
           <a:xfrm>
-            <a:off x="913795" y="457200"/>
-            <a:ext cx="10353761" cy="914400"/>
+            <a:off x="1025621" y="1663303"/>
+            <a:ext cx="3295819" cy="1371670"/>
           </a:xfrm>
+          <a:prstGeom prst="rect">
+            <a:avLst/>
+          </a:prstGeom>
         </p:spPr>
-        <p:txBody>
-          <a:bodyPr/>
-          <a:lstStyle/>
-          <a:p>
-            <a:r>
-              <a:rPr lang="en-US" dirty="0" smtClean="0"/>
-              <a:t>Existing/related work</a:t>
-            </a:r>
-            <a:endParaRPr lang="en-US" dirty="0"/>
-          </a:p>
-        </p:txBody>
-      </p:sp>
-      <p:sp>
-        <p:nvSpPr>
-          <p:cNvPr id="3" name="Content Placeholder 2"/>
-          <p:cNvSpPr>
-            <a:spLocks noGrp="1"/>
-          </p:cNvSpPr>
-          <p:nvPr>
-            <p:ph idx="1"/>
-          </p:nvPr>
-        </p:nvSpPr>
+      </p:pic>
+      <p:pic>
+        <p:nvPicPr>
+          <p:cNvPr id="3" name="Picture 2"/>
+          <p:cNvPicPr>
+            <a:picLocks noChangeAspect="1"/>
+          </p:cNvPicPr>
+          <p:nvPr/>
+        </p:nvPicPr>
+        <p:blipFill>
+          <a:blip r:embed="rId3">
+            <a:extLst>
+              <a:ext uri="{28A0092B-C50C-407E-A947-70E740481C1C}">
+                <a14:useLocalDpi xmlns:a14="http://schemas.microsoft.com/office/drawing/2010/main" val="0"/>
+              </a:ext>
+            </a:extLst>
+          </a:blip>
+          <a:stretch>
+            <a:fillRect/>
+          </a:stretch>
+        </p:blipFill>
         <p:spPr>
           <a:xfrm>
-            <a:off x="913795" y="1600200"/>
-            <a:ext cx="10353762" cy="4572000"/>
+            <a:off x="6180187" y="1624150"/>
+            <a:ext cx="3384724" cy="2787793"/>
           </a:xfrm>
+          <a:prstGeom prst="rect">
+            <a:avLst/>
+          </a:prstGeom>
         </p:spPr>
-        <p:txBody>
-          <a:bodyPr>
-            <a:normAutofit fontScale="92500" lnSpcReduction="10000"/>
-          </a:bodyPr>
-          <a:lstStyle/>
-          <a:p>
-            <a:r>
-              <a:rPr lang="en-US" dirty="0" smtClean="0"/>
-              <a:t>Research on machine learning for </a:t>
-            </a:r>
-            <a:r>
-              <a:rPr lang="en-US" dirty="0" err="1" smtClean="0"/>
-              <a:t>G2P</a:t>
-            </a:r>
-            <a:r>
-              <a:rPr lang="en-US" dirty="0" smtClean="0"/>
-              <a:t> conversion:</a:t>
-            </a:r>
-          </a:p>
-          <a:p>
-            <a:pPr lvl="1"/>
-            <a:r>
-              <a:rPr lang="en-US" dirty="0" smtClean="0"/>
-              <a:t>Decision tree classifier to learn pronunciation rules</a:t>
-            </a:r>
-          </a:p>
-          <a:p>
-            <a:pPr lvl="1"/>
-            <a:r>
-              <a:rPr lang="en-US" dirty="0" smtClean="0"/>
-              <a:t>Joint </a:t>
-            </a:r>
-            <a:r>
-              <a:rPr lang="en-US" dirty="0" err="1" smtClean="0"/>
-              <a:t>ngram</a:t>
-            </a:r>
-            <a:r>
-              <a:rPr lang="en-US" dirty="0" smtClean="0"/>
-              <a:t> model</a:t>
-            </a:r>
-          </a:p>
-          <a:p>
-            <a:pPr lvl="1"/>
-            <a:r>
-              <a:rPr lang="en-US" dirty="0" smtClean="0"/>
-              <a:t>Maximum </a:t>
-            </a:r>
-            <a:r>
-              <a:rPr lang="en-US" dirty="0" err="1" smtClean="0"/>
-              <a:t>entroy</a:t>
-            </a:r>
-            <a:r>
-              <a:rPr lang="en-US" dirty="0" smtClean="0"/>
-              <a:t> model</a:t>
-            </a:r>
-          </a:p>
-          <a:p>
-            <a:pPr lvl="1"/>
-            <a:r>
-              <a:rPr lang="en-US" dirty="0" smtClean="0"/>
-              <a:t>Active learning</a:t>
-            </a:r>
-          </a:p>
-          <a:p>
-            <a:pPr lvl="1"/>
-            <a:r>
-              <a:rPr lang="en-US" dirty="0" smtClean="0"/>
-              <a:t>Recurrent neural network</a:t>
-            </a:r>
-          </a:p>
-          <a:p>
-            <a:r>
-              <a:rPr lang="en-US" dirty="0" smtClean="0"/>
-              <a:t>Studies on detection speech recognition errors:</a:t>
-            </a:r>
-          </a:p>
-          <a:p>
-            <a:pPr lvl="1"/>
-            <a:r>
-              <a:rPr lang="en-US" dirty="0" smtClean="0"/>
-              <a:t>Using acoustic and prosodic features to identify corrections</a:t>
-            </a:r>
-          </a:p>
-          <a:p>
-            <a:pPr lvl="1"/>
-            <a:r>
-              <a:rPr lang="en-US" dirty="0" smtClean="0"/>
-              <a:t>Prosodic features to detect recognition errors</a:t>
-            </a:r>
-          </a:p>
-          <a:p>
-            <a:pPr lvl="1"/>
-            <a:r>
-              <a:rPr lang="en-US" dirty="0" smtClean="0"/>
-              <a:t>Examining features related to the user’s speaking style to detect speech errors</a:t>
-            </a:r>
-          </a:p>
-          <a:p>
-            <a:pPr lvl="1"/>
-            <a:r>
-              <a:rPr lang="en-US" dirty="0" smtClean="0"/>
-              <a:t>Decision-tree based method to detect voice query retires</a:t>
-            </a:r>
-          </a:p>
-          <a:p>
-            <a:pPr lvl="1"/>
-            <a:r>
-              <a:rPr lang="en-US" dirty="0" smtClean="0"/>
-              <a:t>Co-</a:t>
-            </a:r>
-            <a:r>
-              <a:rPr lang="en-US" dirty="0" err="1" smtClean="0"/>
-              <a:t>occurence</a:t>
-            </a:r>
-            <a:r>
-              <a:rPr lang="en-US" dirty="0" smtClean="0"/>
-              <a:t> method for detecting and correcting misrecognition</a:t>
-            </a:r>
-            <a:endParaRPr lang="en-US" dirty="0"/>
-          </a:p>
-        </p:txBody>
-      </p:sp>
+      </p:pic>
     </p:spTree>
     <p:extLst>
       <p:ext uri="{BB962C8B-B14F-4D97-AF65-F5344CB8AC3E}">
-        <p14:creationId xmlns:p14="http://schemas.microsoft.com/office/powerpoint/2010/main" val="3723262291"/>
+        <p14:creationId xmlns:p14="http://schemas.microsoft.com/office/powerpoint/2010/main" val="561919222"/>
       </p:ext>
     </p:extLst>
   </p:cSld>
@@ -7521,105 +5818,130 @@
           <a:chExt cx="0" cy="0"/>
         </a:xfrm>
       </p:grpSpPr>
-      <p:sp>
-        <p:nvSpPr>
-          <p:cNvPr id="2" name="Title 1"/>
-          <p:cNvSpPr>
-            <a:spLocks noGrp="1"/>
-          </p:cNvSpPr>
-          <p:nvPr>
-            <p:ph type="title"/>
-          </p:nvPr>
-        </p:nvSpPr>
+      <p:pic>
+        <p:nvPicPr>
+          <p:cNvPr id="2" name="Picture 1"/>
+          <p:cNvPicPr>
+            <a:picLocks noChangeAspect="1"/>
+          </p:cNvPicPr>
+          <p:nvPr/>
+        </p:nvPicPr>
+        <p:blipFill>
+          <a:blip r:embed="rId2">
+            <a:extLst>
+              <a:ext uri="{28A0092B-C50C-407E-A947-70E740481C1C}">
+                <a14:useLocalDpi xmlns:a14="http://schemas.microsoft.com/office/drawing/2010/main" val="0"/>
+              </a:ext>
+            </a:extLst>
+          </a:blip>
+          <a:stretch>
+            <a:fillRect/>
+          </a:stretch>
+        </p:blipFill>
         <p:spPr>
           <a:xfrm>
-            <a:off x="913795" y="457200"/>
-            <a:ext cx="10353761" cy="914400"/>
+            <a:off x="1161968" y="703094"/>
+            <a:ext cx="3162463" cy="1289116"/>
           </a:xfrm>
+          <a:prstGeom prst="rect">
+            <a:avLst/>
+          </a:prstGeom>
         </p:spPr>
-        <p:txBody>
-          <a:bodyPr/>
-          <a:lstStyle/>
-          <a:p>
-            <a:r>
-              <a:rPr lang="en-US" dirty="0" smtClean="0"/>
-              <a:t>New Approach</a:t>
-            </a:r>
-            <a:endParaRPr lang="en-US" dirty="0"/>
-          </a:p>
-        </p:txBody>
-      </p:sp>
-      <p:sp>
-        <p:nvSpPr>
-          <p:cNvPr id="3" name="Content Placeholder 2"/>
-          <p:cNvSpPr>
-            <a:spLocks noGrp="1"/>
-          </p:cNvSpPr>
-          <p:nvPr>
-            <p:ph idx="1"/>
-          </p:nvPr>
-        </p:nvSpPr>
+      </p:pic>
+      <p:pic>
+        <p:nvPicPr>
+          <p:cNvPr id="3" name="Picture 2"/>
+          <p:cNvPicPr>
+            <a:picLocks noChangeAspect="1"/>
+          </p:cNvPicPr>
+          <p:nvPr/>
+        </p:nvPicPr>
+        <p:blipFill>
+          <a:blip r:embed="rId3">
+            <a:extLst>
+              <a:ext uri="{28A0092B-C50C-407E-A947-70E740481C1C}">
+                <a14:useLocalDpi xmlns:a14="http://schemas.microsoft.com/office/drawing/2010/main" val="0"/>
+              </a:ext>
+            </a:extLst>
+          </a:blip>
+          <a:stretch>
+            <a:fillRect/>
+          </a:stretch>
+        </p:blipFill>
         <p:spPr>
           <a:xfrm>
-            <a:off x="913795" y="1600200"/>
-            <a:ext cx="10353762" cy="4572000"/>
+            <a:off x="6320526" y="805145"/>
+            <a:ext cx="3225966" cy="1346269"/>
           </a:xfrm>
+          <a:prstGeom prst="rect">
+            <a:avLst/>
+          </a:prstGeom>
         </p:spPr>
-        <p:txBody>
-          <a:bodyPr/>
-          <a:lstStyle/>
-          <a:p>
-            <a:r>
-              <a:rPr lang="en-US" dirty="0" smtClean="0"/>
-              <a:t>Correction data focuses specifically on the areas of weaknesses of the system</a:t>
-            </a:r>
-          </a:p>
-          <a:p>
-            <a:pPr lvl="1"/>
-            <a:r>
-              <a:rPr lang="en-US" dirty="0" smtClean="0"/>
-              <a:t>Do not need to identify bad pronunciations ahead of time</a:t>
-            </a:r>
-          </a:p>
-          <a:p>
-            <a:r>
-              <a:rPr lang="en-US" dirty="0"/>
-              <a:t>Language-independent</a:t>
-            </a:r>
-          </a:p>
-          <a:p>
-            <a:r>
-              <a:rPr lang="en-US" dirty="0" smtClean="0"/>
-              <a:t>Corrections are provided by the users who spoke them, who know how they want to pronounce the words</a:t>
-            </a:r>
-          </a:p>
-          <a:p>
-            <a:r>
-              <a:rPr lang="en-US" dirty="0" smtClean="0"/>
-              <a:t>Using two different types of correction data:</a:t>
-            </a:r>
-          </a:p>
-          <a:p>
-            <a:pPr lvl="1"/>
-            <a:r>
-              <a:rPr lang="en-US" dirty="0" smtClean="0"/>
-              <a:t>Keyboard Correction</a:t>
-            </a:r>
-          </a:p>
-          <a:p>
-            <a:pPr lvl="1"/>
-            <a:r>
-              <a:rPr lang="en-US" dirty="0" smtClean="0"/>
-              <a:t>Selected Alternate</a:t>
-            </a:r>
-            <a:endParaRPr lang="en-US" dirty="0"/>
-          </a:p>
-        </p:txBody>
-      </p:sp>
+      </p:pic>
+      <p:pic>
+        <p:nvPicPr>
+          <p:cNvPr id="4" name="Picture 3"/>
+          <p:cNvPicPr>
+            <a:picLocks noChangeAspect="1"/>
+          </p:cNvPicPr>
+          <p:nvPr/>
+        </p:nvPicPr>
+        <p:blipFill>
+          <a:blip r:embed="rId4">
+            <a:extLst>
+              <a:ext uri="{28A0092B-C50C-407E-A947-70E740481C1C}">
+                <a14:useLocalDpi xmlns:a14="http://schemas.microsoft.com/office/drawing/2010/main" val="0"/>
+              </a:ext>
+            </a:extLst>
+          </a:blip>
+          <a:stretch>
+            <a:fillRect/>
+          </a:stretch>
+        </p:blipFill>
+        <p:spPr>
+          <a:xfrm>
+            <a:off x="1269461" y="3826572"/>
+            <a:ext cx="3295819" cy="1085906"/>
+          </a:xfrm>
+          <a:prstGeom prst="rect">
+            <a:avLst/>
+          </a:prstGeom>
+        </p:spPr>
+      </p:pic>
+      <p:pic>
+        <p:nvPicPr>
+          <p:cNvPr id="5" name="Picture 4"/>
+          <p:cNvPicPr>
+            <a:picLocks noChangeAspect="1"/>
+          </p:cNvPicPr>
+          <p:nvPr/>
+        </p:nvPicPr>
+        <p:blipFill>
+          <a:blip r:embed="rId5">
+            <a:extLst>
+              <a:ext uri="{28A0092B-C50C-407E-A947-70E740481C1C}">
+                <a14:useLocalDpi xmlns:a14="http://schemas.microsoft.com/office/drawing/2010/main" val="0"/>
+              </a:ext>
+            </a:extLst>
+          </a:blip>
+          <a:stretch>
+            <a:fillRect/>
+          </a:stretch>
+        </p:blipFill>
+        <p:spPr>
+          <a:xfrm>
+            <a:off x="6797231" y="3680254"/>
+            <a:ext cx="3143412" cy="977950"/>
+          </a:xfrm>
+          <a:prstGeom prst="rect">
+            <a:avLst/>
+          </a:prstGeom>
+        </p:spPr>
+      </p:pic>
     </p:spTree>
     <p:extLst>
       <p:ext uri="{BB962C8B-B14F-4D97-AF65-F5344CB8AC3E}">
-        <p14:creationId xmlns:p14="http://schemas.microsoft.com/office/powerpoint/2010/main" val="582041634"/>
+        <p14:creationId xmlns:p14="http://schemas.microsoft.com/office/powerpoint/2010/main" val="504783391"/>
       </p:ext>
     </p:extLst>
   </p:cSld>
@@ -7656,20 +5978,16 @@
             <p:ph type="title"/>
           </p:nvPr>
         </p:nvSpPr>
-        <p:spPr>
-          <a:xfrm>
-            <a:off x="913795" y="457200"/>
-            <a:ext cx="10353761" cy="914400"/>
-          </a:xfrm>
-        </p:spPr>
-        <p:txBody>
-          <a:bodyPr/>
-          <a:lstStyle/>
-          <a:p>
-            <a:r>
-              <a:rPr lang="en-US" dirty="0"/>
-              <a:t>Keyboard correction data</a:t>
-            </a:r>
+        <p:spPr/>
+        <p:txBody>
+          <a:bodyPr/>
+          <a:lstStyle/>
+          <a:p>
+            <a:r>
+              <a:rPr lang="en-US" smtClean="0"/>
+              <a:t>Thoughtful Questions</a:t>
+            </a:r>
+            <a:endParaRPr lang="en-US"/>
           </a:p>
         </p:txBody>
       </p:sp>
@@ -7680,1122 +5998,15 @@
             <a:spLocks noGrp="1"/>
           </p:cNvSpPr>
           <p:nvPr>
-            <p:ph sz="half" idx="1"/>
-          </p:nvPr>
-        </p:nvSpPr>
-        <p:spPr>
-          <a:xfrm>
-            <a:off x="913795" y="1600200"/>
-            <a:ext cx="6858000" cy="4800600"/>
-          </a:xfrm>
-        </p:spPr>
-        <p:txBody>
-          <a:bodyPr>
-            <a:normAutofit fontScale="85000" lnSpcReduction="20000"/>
-          </a:bodyPr>
-          <a:lstStyle/>
-          <a:p>
-            <a:r>
-              <a:rPr lang="en-US" dirty="0" smtClean="0"/>
-              <a:t>User makes a voice query, then issues a typed query shortly after</a:t>
-            </a:r>
-          </a:p>
-          <a:p>
-            <a:pPr lvl="1"/>
-            <a:r>
-              <a:rPr lang="en-US" dirty="0" smtClean="0"/>
-              <a:t>Within 30 seconds</a:t>
-            </a:r>
-          </a:p>
-          <a:p>
-            <a:r>
-              <a:rPr lang="en-US" dirty="0" smtClean="0"/>
-              <a:t>Analysis showed only 30-40% of these pairs are true corrections</a:t>
-            </a:r>
-          </a:p>
-          <a:p>
-            <a:r>
-              <a:rPr lang="en-US" dirty="0"/>
-              <a:t>Correction data classifier features</a:t>
-            </a:r>
-          </a:p>
-          <a:p>
-            <a:pPr lvl="1"/>
-            <a:r>
-              <a:rPr lang="en-US" dirty="0"/>
-              <a:t>Word-based:</a:t>
-            </a:r>
-          </a:p>
-          <a:p>
-            <a:pPr lvl="2"/>
-            <a:r>
-              <a:rPr lang="en-US" dirty="0"/>
-              <a:t>Unigram </a:t>
-            </a:r>
-            <a:r>
-              <a:rPr lang="en-US" dirty="0" smtClean="0"/>
-              <a:t>counts, number </a:t>
-            </a:r>
-            <a:r>
-              <a:rPr lang="en-US" dirty="0"/>
-              <a:t>of word </a:t>
-            </a:r>
-            <a:r>
-              <a:rPr lang="en-US" dirty="0" smtClean="0"/>
-              <a:t>overlaps, and language </a:t>
-            </a:r>
-            <a:r>
-              <a:rPr lang="en-US" dirty="0"/>
-              <a:t>model costs</a:t>
-            </a:r>
-          </a:p>
-          <a:p>
-            <a:pPr lvl="1"/>
-            <a:r>
-              <a:rPr lang="en-US" dirty="0"/>
-              <a:t>Character-based:</a:t>
-            </a:r>
-          </a:p>
-          <a:p>
-            <a:pPr lvl="2"/>
-            <a:r>
-              <a:rPr lang="en-US" dirty="0"/>
-              <a:t>Character </a:t>
-            </a:r>
-            <a:r>
-              <a:rPr lang="en-US" dirty="0" smtClean="0"/>
-              <a:t>counts, and edit </a:t>
-            </a:r>
-            <a:r>
-              <a:rPr lang="en-US" dirty="0"/>
-              <a:t>distance between the recognized and typed queries</a:t>
-            </a:r>
-          </a:p>
-          <a:p>
-            <a:pPr lvl="1"/>
-            <a:r>
-              <a:rPr lang="en-US" dirty="0"/>
-              <a:t>Phoneme:</a:t>
-            </a:r>
-          </a:p>
-          <a:p>
-            <a:pPr lvl="2"/>
-            <a:r>
-              <a:rPr lang="en-US" dirty="0" smtClean="0"/>
-              <a:t>Counts and edit distance between the phoneme sequences corresponding to the recognition results and typed query</a:t>
-            </a:r>
-          </a:p>
-          <a:p>
-            <a:pPr lvl="1"/>
-            <a:r>
-              <a:rPr lang="en-US" dirty="0" smtClean="0"/>
-              <a:t>Acoustic</a:t>
-            </a:r>
-            <a:r>
-              <a:rPr lang="en-US" dirty="0"/>
-              <a:t>:</a:t>
-            </a:r>
-          </a:p>
-          <a:p>
-            <a:pPr lvl="2"/>
-            <a:r>
-              <a:rPr lang="en-US" dirty="0"/>
-              <a:t>Forced phone alignment costs</a:t>
-            </a:r>
-          </a:p>
-          <a:p>
-            <a:pPr lvl="2"/>
-            <a:r>
-              <a:rPr lang="en-US" dirty="0"/>
-              <a:t>Waveform-to-transcript length </a:t>
-            </a:r>
-            <a:r>
-              <a:rPr lang="en-US" dirty="0" smtClean="0"/>
-              <a:t>ratio</a:t>
-            </a:r>
-            <a:endParaRPr lang="en-US" dirty="0"/>
-          </a:p>
-        </p:txBody>
-      </p:sp>
-      <p:pic>
-        <p:nvPicPr>
-          <p:cNvPr id="9" name="Content Placeholder 4"/>
-          <p:cNvPicPr>
-            <a:picLocks noGrp="1" noChangeAspect="1"/>
-          </p:cNvPicPr>
-          <p:nvPr>
-            <p:ph sz="half" idx="2"/>
-          </p:nvPr>
-        </p:nvPicPr>
-        <p:blipFill rotWithShape="1">
-          <a:blip r:embed="rId3">
-            <a:extLst>
-              <a:ext uri="{28A0092B-C50C-407E-A947-70E740481C1C}">
-                <a14:useLocalDpi xmlns:a14="http://schemas.microsoft.com/office/drawing/2010/main" val="0"/>
-              </a:ext>
-            </a:extLst>
-          </a:blip>
-          <a:srcRect b="25545"/>
-          <a:stretch/>
-        </p:blipFill>
-        <p:spPr>
-          <a:xfrm>
-            <a:off x="8149501" y="2152551"/>
-            <a:ext cx="3295819" cy="1021277"/>
-          </a:xfrm>
-          <a:prstGeom prst="rect">
-            <a:avLst/>
-          </a:prstGeom>
-        </p:spPr>
-      </p:pic>
-      <p:pic>
-        <p:nvPicPr>
-          <p:cNvPr id="10" name="Picture 9"/>
-          <p:cNvPicPr>
-            <a:picLocks noChangeAspect="1"/>
-          </p:cNvPicPr>
-          <p:nvPr/>
-        </p:nvPicPr>
-        <p:blipFill rotWithShape="1">
-          <a:blip r:embed="rId4">
-            <a:extLst>
-              <a:ext uri="{28A0092B-C50C-407E-A947-70E740481C1C}">
-                <a14:useLocalDpi xmlns:a14="http://schemas.microsoft.com/office/drawing/2010/main" val="0"/>
-              </a:ext>
-            </a:extLst>
-          </a:blip>
-          <a:srcRect t="7525"/>
-          <a:stretch/>
-        </p:blipFill>
-        <p:spPr>
-          <a:xfrm>
-            <a:off x="8282856" y="4114800"/>
-            <a:ext cx="3162463" cy="1192110"/>
-          </a:xfrm>
-          <a:prstGeom prst="rect">
-            <a:avLst/>
-          </a:prstGeom>
-        </p:spPr>
-      </p:pic>
-    </p:spTree>
-    <p:extLst>
-      <p:ext uri="{BB962C8B-B14F-4D97-AF65-F5344CB8AC3E}">
-        <p14:creationId xmlns:p14="http://schemas.microsoft.com/office/powerpoint/2010/main" val="2949745998"/>
-      </p:ext>
-    </p:extLst>
-  </p:cSld>
-  <p:clrMapOvr>
-    <a:masterClrMapping/>
-  </p:clrMapOvr>
-</p:sld>
-</file>
-
-<file path=ppt/slides/slide6.xml><?xml version="1.0" encoding="utf-8"?>
-<p:sld xmlns:a="http://schemas.openxmlformats.org/drawingml/2006/main" xmlns:r="http://schemas.openxmlformats.org/officeDocument/2006/relationships" xmlns:p="http://schemas.openxmlformats.org/presentationml/2006/main">
-  <p:cSld>
-    <p:spTree>
-      <p:nvGrpSpPr>
-        <p:cNvPr id="1" name=""/>
-        <p:cNvGrpSpPr/>
-        <p:nvPr/>
-      </p:nvGrpSpPr>
-      <p:grpSpPr>
-        <a:xfrm>
-          <a:off x="0" y="0"/>
-          <a:ext cx="0" cy="0"/>
-          <a:chOff x="0" y="0"/>
-          <a:chExt cx="0" cy="0"/>
-        </a:xfrm>
-      </p:grpSpPr>
-      <p:sp>
-        <p:nvSpPr>
-          <p:cNvPr id="2" name="Title 1"/>
-          <p:cNvSpPr>
-            <a:spLocks noGrp="1"/>
-          </p:cNvSpPr>
-          <p:nvPr>
-            <p:ph type="title"/>
-          </p:nvPr>
-        </p:nvSpPr>
-        <p:spPr>
-          <a:xfrm>
-            <a:off x="913795" y="457200"/>
-            <a:ext cx="10353761" cy="914400"/>
-          </a:xfrm>
-        </p:spPr>
-        <p:txBody>
-          <a:bodyPr/>
-          <a:lstStyle/>
-          <a:p>
-            <a:r>
-              <a:rPr lang="en-US" dirty="0"/>
-              <a:t>Selected alternate data</a:t>
-            </a:r>
-          </a:p>
-        </p:txBody>
-      </p:sp>
-      <p:sp>
-        <p:nvSpPr>
-          <p:cNvPr id="3" name="Content Placeholder 2"/>
-          <p:cNvSpPr>
-            <a:spLocks noGrp="1"/>
-          </p:cNvSpPr>
-          <p:nvPr>
-            <p:ph sz="half" idx="1"/>
-          </p:nvPr>
-        </p:nvSpPr>
-        <p:spPr>
-          <a:xfrm>
-            <a:off x="913795" y="1600200"/>
-            <a:ext cx="10287000" cy="1885950"/>
-          </a:xfrm>
-        </p:spPr>
-        <p:txBody>
-          <a:bodyPr/>
-          <a:lstStyle/>
-          <a:p>
-            <a:r>
-              <a:rPr lang="en-US" dirty="0" smtClean="0"/>
-              <a:t>Google voice search user interface allows users to manually select from a list of alternative recognition results</a:t>
-            </a:r>
-          </a:p>
-          <a:p>
-            <a:r>
-              <a:rPr lang="en-US" dirty="0" smtClean="0"/>
-              <a:t>User selection provides a high quality correction, so no extra classifier needed</a:t>
-            </a:r>
-          </a:p>
-          <a:p>
-            <a:endParaRPr lang="en-US" dirty="0"/>
-          </a:p>
-        </p:txBody>
-      </p:sp>
-      <p:pic>
-        <p:nvPicPr>
-          <p:cNvPr id="6" name="Content Placeholder 5"/>
-          <p:cNvPicPr>
-            <a:picLocks noGrp="1" noChangeAspect="1"/>
-          </p:cNvPicPr>
-          <p:nvPr>
-            <p:ph sz="half" idx="2"/>
-          </p:nvPr>
-        </p:nvPicPr>
-        <p:blipFill rotWithShape="1">
-          <a:blip r:embed="rId3">
-            <a:extLst>
-              <a:ext uri="{28A0092B-C50C-407E-A947-70E740481C1C}">
-                <a14:useLocalDpi xmlns:a14="http://schemas.microsoft.com/office/drawing/2010/main" val="0"/>
-              </a:ext>
-            </a:extLst>
-          </a:blip>
-          <a:srcRect t="3607" b="11068"/>
-          <a:stretch/>
-        </p:blipFill>
-        <p:spPr>
-          <a:xfrm>
-            <a:off x="1839349" y="3441793"/>
-            <a:ext cx="3384724" cy="2378651"/>
-          </a:xfrm>
-          <a:prstGeom prst="rect">
-            <a:avLst/>
-          </a:prstGeom>
-        </p:spPr>
-      </p:pic>
-      <p:pic>
-        <p:nvPicPr>
-          <p:cNvPr id="7" name="Picture 6"/>
-          <p:cNvPicPr>
-            <a:picLocks noChangeAspect="1"/>
-          </p:cNvPicPr>
-          <p:nvPr/>
-        </p:nvPicPr>
-        <p:blipFill rotWithShape="1">
-          <a:blip r:embed="rId4">
-            <a:extLst>
-              <a:ext uri="{28A0092B-C50C-407E-A947-70E740481C1C}">
-                <a14:useLocalDpi xmlns:a14="http://schemas.microsoft.com/office/drawing/2010/main" val="0"/>
-              </a:ext>
-            </a:extLst>
-          </a:blip>
-          <a:srcRect t="6417"/>
-          <a:stretch/>
-        </p:blipFill>
-        <p:spPr>
-          <a:xfrm>
-            <a:off x="6537696" y="3863340"/>
-            <a:ext cx="3225966" cy="1259874"/>
-          </a:xfrm>
-          <a:prstGeom prst="rect">
-            <a:avLst/>
-          </a:prstGeom>
-        </p:spPr>
-      </p:pic>
-    </p:spTree>
-    <p:extLst>
-      <p:ext uri="{BB962C8B-B14F-4D97-AF65-F5344CB8AC3E}">
-        <p14:creationId xmlns:p14="http://schemas.microsoft.com/office/powerpoint/2010/main" val="261239048"/>
-      </p:ext>
-    </p:extLst>
-  </p:cSld>
-  <p:clrMapOvr>
-    <a:masterClrMapping/>
-  </p:clrMapOvr>
-</p:sld>
-</file>
-
-<file path=ppt/slides/slide7.xml><?xml version="1.0" encoding="utf-8"?>
-<p:sld xmlns:a="http://schemas.openxmlformats.org/drawingml/2006/main" xmlns:r="http://schemas.openxmlformats.org/officeDocument/2006/relationships" xmlns:p="http://schemas.openxmlformats.org/presentationml/2006/main">
-  <p:cSld>
-    <p:spTree>
-      <p:nvGrpSpPr>
-        <p:cNvPr id="1" name=""/>
-        <p:cNvGrpSpPr/>
-        <p:nvPr/>
-      </p:nvGrpSpPr>
-      <p:grpSpPr>
-        <a:xfrm>
-          <a:off x="0" y="0"/>
-          <a:ext cx="0" cy="0"/>
-          <a:chOff x="0" y="0"/>
-          <a:chExt cx="0" cy="0"/>
-        </a:xfrm>
-      </p:grpSpPr>
-      <p:sp>
-        <p:nvSpPr>
-          <p:cNvPr id="2" name="Title 1"/>
-          <p:cNvSpPr>
-            <a:spLocks noGrp="1"/>
-          </p:cNvSpPr>
-          <p:nvPr>
-            <p:ph type="title"/>
-          </p:nvPr>
-        </p:nvSpPr>
-        <p:spPr>
-          <a:xfrm>
-            <a:off x="913795" y="457200"/>
-            <a:ext cx="10353761" cy="914400"/>
-          </a:xfrm>
-        </p:spPr>
-        <p:txBody>
-          <a:bodyPr/>
-          <a:lstStyle/>
-          <a:p>
-            <a:r>
-              <a:rPr lang="en-US" dirty="0" smtClean="0"/>
-              <a:t>Testing</a:t>
-            </a:r>
-            <a:endParaRPr lang="en-US" dirty="0"/>
-          </a:p>
-        </p:txBody>
-      </p:sp>
-      <p:sp>
-        <p:nvSpPr>
-          <p:cNvPr id="3" name="Content Placeholder 2"/>
-          <p:cNvSpPr>
-            <a:spLocks noGrp="1"/>
-          </p:cNvSpPr>
-          <p:nvPr>
             <p:ph idx="1"/>
           </p:nvPr>
         </p:nvSpPr>
-        <p:spPr>
-          <a:xfrm>
-            <a:off x="913795" y="1600200"/>
-            <a:ext cx="10353762" cy="4572000"/>
-          </a:xfrm>
-        </p:spPr>
-        <p:txBody>
-          <a:bodyPr>
-            <a:normAutofit fontScale="92500" lnSpcReduction="10000"/>
-          </a:bodyPr>
-          <a:lstStyle/>
-          <a:p>
-            <a:r>
-              <a:rPr lang="en-US" dirty="0" smtClean="0"/>
-              <a:t>Word error rate (</a:t>
-            </a:r>
-            <a:r>
-              <a:rPr lang="en-US" dirty="0" err="1" smtClean="0"/>
-              <a:t>WER</a:t>
-            </a:r>
-            <a:r>
-              <a:rPr lang="en-US" dirty="0" smtClean="0"/>
-              <a:t>) evaluation:</a:t>
-            </a:r>
-          </a:p>
-          <a:p>
-            <a:pPr lvl="1"/>
-            <a:r>
-              <a:rPr lang="en-US" dirty="0" smtClean="0"/>
-              <a:t>Anonymized speech queries randomly selected from traffic logs and human-transcribed</a:t>
-            </a:r>
-          </a:p>
-          <a:p>
-            <a:pPr lvl="1"/>
-            <a:r>
-              <a:rPr lang="en-US" dirty="0" smtClean="0"/>
-              <a:t>The most frequently used words already have a good pronunciation, but are still useful to ensure no learned “rogue” pronunciations</a:t>
-            </a:r>
-          </a:p>
-          <a:p>
-            <a:r>
-              <a:rPr lang="en-US" dirty="0" smtClean="0"/>
-              <a:t>Side-by-side (</a:t>
-            </a:r>
-            <a:r>
-              <a:rPr lang="en-US" dirty="0" err="1" smtClean="0"/>
-              <a:t>SxS</a:t>
-            </a:r>
-            <a:r>
-              <a:rPr lang="en-US" dirty="0" smtClean="0"/>
-              <a:t>) tests:</a:t>
-            </a:r>
-          </a:p>
-          <a:p>
-            <a:pPr lvl="1"/>
-            <a:r>
-              <a:rPr lang="en-US" dirty="0" smtClean="0"/>
-              <a:t>Two ASR engines: one with the learned pronunciations and one without</a:t>
-            </a:r>
-          </a:p>
-          <a:p>
-            <a:pPr lvl="1"/>
-            <a:r>
-              <a:rPr lang="en-US" dirty="0" smtClean="0"/>
-              <a:t>Both engines are fed the exact same queries from anonymized voice search logs</a:t>
-            </a:r>
-          </a:p>
-          <a:p>
-            <a:pPr lvl="1"/>
-            <a:r>
-              <a:rPr lang="en-US" dirty="0" smtClean="0"/>
-              <a:t>Queries with differing recognition transcripts are evaluated by human raters and marked as one of four categories:</a:t>
-            </a:r>
-          </a:p>
-          <a:p>
-            <a:pPr lvl="2"/>
-            <a:r>
-              <a:rPr lang="en-US" dirty="0" smtClean="0"/>
-              <a:t>Nonsense: the transcript is nonsense</a:t>
-            </a:r>
-          </a:p>
-          <a:p>
-            <a:pPr lvl="2"/>
-            <a:r>
-              <a:rPr lang="en-US" dirty="0" smtClean="0"/>
-              <a:t>Unusable: the transcript does not correspond to the audio</a:t>
-            </a:r>
-          </a:p>
-          <a:p>
-            <a:pPr lvl="2"/>
-            <a:r>
-              <a:rPr lang="en-US" dirty="0" smtClean="0"/>
-              <a:t>Usable: the transcript contains only small errors</a:t>
-            </a:r>
-          </a:p>
-          <a:p>
-            <a:pPr lvl="2"/>
-            <a:r>
-              <a:rPr lang="en-US" dirty="0" smtClean="0"/>
-              <a:t>Exact: the transcript matches the spoken audio exactly</a:t>
-            </a:r>
-            <a:endParaRPr lang="en-US" dirty="0"/>
-          </a:p>
-        </p:txBody>
-      </p:sp>
-    </p:spTree>
-    <p:extLst>
-      <p:ext uri="{BB962C8B-B14F-4D97-AF65-F5344CB8AC3E}">
-        <p14:creationId xmlns:p14="http://schemas.microsoft.com/office/powerpoint/2010/main" val="3294197162"/>
-      </p:ext>
-    </p:extLst>
-  </p:cSld>
-  <p:clrMapOvr>
-    <a:masterClrMapping/>
-  </p:clrMapOvr>
-</p:sld>
-</file>
-
-<file path=ppt/slides/slide8.xml><?xml version="1.0" encoding="utf-8"?>
-<p:sld xmlns:a="http://schemas.openxmlformats.org/drawingml/2006/main" xmlns:r="http://schemas.openxmlformats.org/officeDocument/2006/relationships" xmlns:p="http://schemas.openxmlformats.org/presentationml/2006/main">
-  <p:cSld>
-    <p:spTree>
-      <p:nvGrpSpPr>
-        <p:cNvPr id="1" name=""/>
-        <p:cNvGrpSpPr/>
-        <p:nvPr/>
-      </p:nvGrpSpPr>
-      <p:grpSpPr>
-        <a:xfrm>
-          <a:off x="0" y="0"/>
-          <a:ext cx="0" cy="0"/>
-          <a:chOff x="0" y="0"/>
-          <a:chExt cx="0" cy="0"/>
-        </a:xfrm>
-      </p:grpSpPr>
-      <p:sp>
-        <p:nvSpPr>
-          <p:cNvPr id="2" name="Title 1"/>
-          <p:cNvSpPr>
-            <a:spLocks noGrp="1"/>
-          </p:cNvSpPr>
-          <p:nvPr>
-            <p:ph type="title"/>
-          </p:nvPr>
-        </p:nvSpPr>
-        <p:spPr>
-          <a:xfrm>
-            <a:off x="913795" y="457200"/>
-            <a:ext cx="10353761" cy="914400"/>
-          </a:xfrm>
-        </p:spPr>
-        <p:txBody>
-          <a:bodyPr/>
-          <a:lstStyle/>
-          <a:p>
-            <a:r>
-              <a:rPr lang="en-US" dirty="0" smtClean="0"/>
-              <a:t>Results</a:t>
-            </a:r>
-            <a:endParaRPr lang="en-US" dirty="0"/>
-          </a:p>
-        </p:txBody>
-      </p:sp>
-      <p:sp>
-        <p:nvSpPr>
-          <p:cNvPr id="3" name="Text Placeholder 2"/>
-          <p:cNvSpPr>
-            <a:spLocks noGrp="1"/>
-          </p:cNvSpPr>
-          <p:nvPr>
-            <p:ph type="body" idx="1"/>
-          </p:nvPr>
-        </p:nvSpPr>
-        <p:spPr>
-          <a:xfrm>
-            <a:off x="1143000" y="1371600"/>
-            <a:ext cx="3657600" cy="823912"/>
-          </a:xfrm>
-        </p:spPr>
-        <p:txBody>
-          <a:bodyPr anchor="ctr"/>
-          <a:lstStyle/>
-          <a:p>
-            <a:pPr algn="ctr"/>
-            <a:r>
-              <a:rPr lang="en-US" dirty="0" smtClean="0"/>
-              <a:t>Keyboard Correction</a:t>
-            </a:r>
-          </a:p>
-        </p:txBody>
-      </p:sp>
-      <p:sp>
-        <p:nvSpPr>
-          <p:cNvPr id="5" name="Text Placeholder 4"/>
-          <p:cNvSpPr>
-            <a:spLocks noGrp="1"/>
-          </p:cNvSpPr>
-          <p:nvPr>
-            <p:ph type="body" sz="quarter" idx="3"/>
-          </p:nvPr>
-        </p:nvSpPr>
-        <p:spPr>
-          <a:xfrm>
-            <a:off x="7543800" y="1371600"/>
-            <a:ext cx="3200400" cy="823912"/>
-          </a:xfrm>
-        </p:spPr>
-        <p:txBody>
-          <a:bodyPr anchor="ctr"/>
-          <a:lstStyle/>
-          <a:p>
-            <a:pPr algn="ctr"/>
-            <a:r>
-              <a:rPr lang="en-US" dirty="0" smtClean="0"/>
-              <a:t>Alternate Selection</a:t>
-            </a:r>
-            <a:endParaRPr lang="en-US" dirty="0"/>
-          </a:p>
-        </p:txBody>
-      </p:sp>
-      <p:pic>
-        <p:nvPicPr>
-          <p:cNvPr id="7" name="Content Placeholder 6"/>
-          <p:cNvPicPr>
-            <a:picLocks noGrp="1" noChangeAspect="1"/>
-          </p:cNvPicPr>
-          <p:nvPr>
-            <p:ph sz="half" idx="2"/>
-          </p:nvPr>
-        </p:nvPicPr>
-        <p:blipFill rotWithShape="1">
-          <a:blip r:embed="rId3">
-            <a:extLst>
-              <a:ext uri="{28A0092B-C50C-407E-A947-70E740481C1C}">
-                <a14:useLocalDpi xmlns:a14="http://schemas.microsoft.com/office/drawing/2010/main" val="0"/>
-              </a:ext>
-            </a:extLst>
-          </a:blip>
-          <a:srcRect l="573" t="5061"/>
-          <a:stretch/>
-        </p:blipFill>
-        <p:spPr>
-          <a:xfrm>
-            <a:off x="1339487" y="2240280"/>
-            <a:ext cx="3276953" cy="1030950"/>
-          </a:xfrm>
-          <a:prstGeom prst="rect">
-            <a:avLst/>
-          </a:prstGeom>
-        </p:spPr>
-      </p:pic>
-      <p:pic>
-        <p:nvPicPr>
-          <p:cNvPr id="8" name="Picture 7"/>
-          <p:cNvPicPr>
-            <a:picLocks noChangeAspect="1"/>
-          </p:cNvPicPr>
-          <p:nvPr/>
-        </p:nvPicPr>
-        <p:blipFill rotWithShape="1">
-          <a:blip r:embed="rId4">
-            <a:extLst>
-              <a:ext uri="{28A0092B-C50C-407E-A947-70E740481C1C}">
-                <a14:useLocalDpi xmlns:a14="http://schemas.microsoft.com/office/drawing/2010/main" val="0"/>
-              </a:ext>
-            </a:extLst>
-          </a:blip>
-          <a:srcRect t="8203"/>
-          <a:stretch/>
-        </p:blipFill>
-        <p:spPr>
-          <a:xfrm>
-            <a:off x="1393018" y="3603547"/>
-            <a:ext cx="3143412" cy="897734"/>
-          </a:xfrm>
-          <a:prstGeom prst="rect">
-            <a:avLst/>
-          </a:prstGeom>
-        </p:spPr>
-      </p:pic>
-      <p:pic>
-        <p:nvPicPr>
-          <p:cNvPr id="10" name="Picture 3" descr="U:\git\COSC757\Assignments\ArticleSummary\Figure 5.PNG"/>
-          <p:cNvPicPr>
-            <a:picLocks noGrp="1" noChangeAspect="1" noChangeArrowheads="1"/>
-          </p:cNvPicPr>
-          <p:nvPr>
-            <p:ph sz="quarter" idx="4"/>
-          </p:nvPr>
-        </p:nvPicPr>
-        <p:blipFill rotWithShape="1">
-          <a:blip r:embed="rId5">
-            <a:extLst>
-              <a:ext uri="{28A0092B-C50C-407E-A947-70E740481C1C}">
-                <a14:useLocalDpi xmlns:a14="http://schemas.microsoft.com/office/drawing/2010/main" val="0"/>
-              </a:ext>
-            </a:extLst>
-          </a:blip>
-          <a:srcRect t="10391" b="3311"/>
-          <a:stretch/>
-        </p:blipFill>
-        <p:spPr bwMode="auto">
-          <a:xfrm>
-            <a:off x="7409239" y="2112127"/>
-            <a:ext cx="3696216" cy="2482733"/>
-          </a:xfrm>
-          <a:prstGeom prst="rect">
-            <a:avLst/>
-          </a:prstGeom>
-          <a:noFill/>
-          <a:extLst>
-            <a:ext uri="{909E8E84-426E-40DD-AFC4-6F175D3DCCD1}">
-              <a14:hiddenFill xmlns:a14="http://schemas.microsoft.com/office/drawing/2010/main">
-                <a:solidFill>
-                  <a:srgbClr val="FFFFFF"/>
-                </a:solidFill>
-              </a14:hiddenFill>
-            </a:ext>
-          </a:extLst>
-        </p:spPr>
-      </p:pic>
-      <p:sp>
-        <p:nvSpPr>
-          <p:cNvPr id="11" name="Text Placeholder 4"/>
-          <p:cNvSpPr txBox="1">
-            <a:spLocks/>
-          </p:cNvSpPr>
-          <p:nvPr/>
-        </p:nvSpPr>
-        <p:spPr>
-          <a:xfrm>
-            <a:off x="5257800" y="4114800"/>
-            <a:ext cx="1828800" cy="823912"/>
-          </a:xfrm>
-          <a:prstGeom prst="rect">
-            <a:avLst/>
-          </a:prstGeom>
-        </p:spPr>
-        <p:txBody>
-          <a:bodyPr vert="horz" lIns="91440" tIns="45720" rIns="91440" bIns="45720" rtlCol="0" anchor="ctr">
-            <a:normAutofit/>
-          </a:bodyPr>
-          <a:lstStyle>
-            <a:lvl1pPr marL="0" indent="0" algn="l" defTabSz="914400" rtl="0" eaLnBrk="1" latinLnBrk="0" hangingPunct="1">
-              <a:lnSpc>
-                <a:spcPct val="100000"/>
-              </a:lnSpc>
-              <a:spcBef>
-                <a:spcPts val="1000"/>
-              </a:spcBef>
-              <a:buFont typeface="Arial" panose="020B0604020202020204" pitchFamily="34" charset="0"/>
-              <a:buNone/>
-              <a:defRPr sz="2400" b="1" kern="1200">
-                <a:solidFill>
-                  <a:schemeClr val="tx1"/>
-                </a:solidFill>
-                <a:effectLst>
-                  <a:outerShdw blurRad="50800" dist="38100" dir="2700000" algn="tl" rotWithShape="0">
-                    <a:srgbClr val="000000">
-                      <a:alpha val="48000"/>
-                    </a:srgbClr>
-                  </a:outerShdw>
-                </a:effectLst>
-                <a:latin typeface="+mn-lt"/>
-                <a:ea typeface="+mn-ea"/>
-                <a:cs typeface="+mn-cs"/>
-              </a:defRPr>
-            </a:lvl1pPr>
-            <a:lvl2pPr marL="457200" indent="0" algn="l" defTabSz="914400" rtl="0" eaLnBrk="1" latinLnBrk="0" hangingPunct="1">
-              <a:lnSpc>
-                <a:spcPct val="120000"/>
-              </a:lnSpc>
-              <a:spcBef>
-                <a:spcPts val="500"/>
-              </a:spcBef>
-              <a:buFont typeface="Arial" panose="020B0604020202020204" pitchFamily="34" charset="0"/>
-              <a:buNone/>
-              <a:defRPr sz="2000" b="1" kern="1200">
-                <a:solidFill>
-                  <a:schemeClr val="tx1"/>
-                </a:solidFill>
-                <a:effectLst>
-                  <a:outerShdw blurRad="50800" dist="38100" dir="2700000" algn="tl" rotWithShape="0">
-                    <a:srgbClr val="000000">
-                      <a:alpha val="48000"/>
-                    </a:srgbClr>
-                  </a:outerShdw>
-                </a:effectLst>
-                <a:latin typeface="+mn-lt"/>
-                <a:ea typeface="+mn-ea"/>
-                <a:cs typeface="+mn-cs"/>
-              </a:defRPr>
-            </a:lvl2pPr>
-            <a:lvl3pPr marL="914400" indent="0" algn="l" defTabSz="914400" rtl="0" eaLnBrk="1" latinLnBrk="0" hangingPunct="1">
-              <a:lnSpc>
-                <a:spcPct val="120000"/>
-              </a:lnSpc>
-              <a:spcBef>
-                <a:spcPts val="500"/>
-              </a:spcBef>
-              <a:buFont typeface="Arial" panose="020B0604020202020204" pitchFamily="34" charset="0"/>
-              <a:buNone/>
-              <a:defRPr sz="1800" b="1" kern="1200">
-                <a:solidFill>
-                  <a:schemeClr val="tx1"/>
-                </a:solidFill>
-                <a:effectLst>
-                  <a:outerShdw blurRad="50800" dist="38100" dir="2700000" algn="tl" rotWithShape="0">
-                    <a:srgbClr val="000000">
-                      <a:alpha val="48000"/>
-                    </a:srgbClr>
-                  </a:outerShdw>
-                </a:effectLst>
-                <a:latin typeface="+mn-lt"/>
-                <a:ea typeface="+mn-ea"/>
-                <a:cs typeface="+mn-cs"/>
-              </a:defRPr>
-            </a:lvl3pPr>
-            <a:lvl4pPr marL="1371600" indent="0" algn="l" defTabSz="914400" rtl="0" eaLnBrk="1" latinLnBrk="0" hangingPunct="1">
-              <a:lnSpc>
-                <a:spcPct val="120000"/>
-              </a:lnSpc>
-              <a:spcBef>
-                <a:spcPts val="500"/>
-              </a:spcBef>
-              <a:buFont typeface="Arial" panose="020B0604020202020204" pitchFamily="34" charset="0"/>
-              <a:buNone/>
-              <a:defRPr sz="1600" b="1" kern="1200">
-                <a:solidFill>
-                  <a:schemeClr val="tx1"/>
-                </a:solidFill>
-                <a:effectLst>
-                  <a:outerShdw blurRad="50800" dist="38100" dir="2700000" algn="tl" rotWithShape="0">
-                    <a:srgbClr val="000000">
-                      <a:alpha val="48000"/>
-                    </a:srgbClr>
-                  </a:outerShdw>
-                </a:effectLst>
-                <a:latin typeface="+mn-lt"/>
-                <a:ea typeface="+mn-ea"/>
-                <a:cs typeface="+mn-cs"/>
-              </a:defRPr>
-            </a:lvl4pPr>
-            <a:lvl5pPr marL="1828800" indent="0" algn="l" defTabSz="914400" rtl="0" eaLnBrk="1" latinLnBrk="0" hangingPunct="1">
-              <a:lnSpc>
-                <a:spcPct val="120000"/>
-              </a:lnSpc>
-              <a:spcBef>
-                <a:spcPts val="500"/>
-              </a:spcBef>
-              <a:buFont typeface="Arial" panose="020B0604020202020204" pitchFamily="34" charset="0"/>
-              <a:buNone/>
-              <a:defRPr sz="1600" b="1" kern="1200">
-                <a:solidFill>
-                  <a:schemeClr val="tx1"/>
-                </a:solidFill>
-                <a:effectLst>
-                  <a:outerShdw blurRad="50800" dist="38100" dir="2700000" algn="tl" rotWithShape="0">
-                    <a:srgbClr val="000000">
-                      <a:alpha val="48000"/>
-                    </a:srgbClr>
-                  </a:outerShdw>
-                </a:effectLst>
-                <a:latin typeface="+mn-lt"/>
-                <a:ea typeface="+mn-ea"/>
-                <a:cs typeface="+mn-cs"/>
-              </a:defRPr>
-            </a:lvl5pPr>
-            <a:lvl6pPr marL="2286000" indent="0" algn="l" defTabSz="914400" rtl="0" eaLnBrk="1" latinLnBrk="0" hangingPunct="1">
-              <a:lnSpc>
-                <a:spcPct val="120000"/>
-              </a:lnSpc>
-              <a:spcBef>
-                <a:spcPts val="500"/>
-              </a:spcBef>
-              <a:buFont typeface="Arial" panose="020B0604020202020204" pitchFamily="34" charset="0"/>
-              <a:buNone/>
-              <a:defRPr sz="1600" b="1" kern="1200">
-                <a:solidFill>
-                  <a:schemeClr val="tx1"/>
-                </a:solidFill>
-                <a:effectLst>
-                  <a:outerShdw blurRad="50800" dist="38100" dir="2700000" algn="tl" rotWithShape="0">
-                    <a:srgbClr val="000000">
-                      <a:alpha val="48000"/>
-                    </a:srgbClr>
-                  </a:outerShdw>
-                </a:effectLst>
-                <a:latin typeface="+mn-lt"/>
-                <a:ea typeface="+mn-ea"/>
-                <a:cs typeface="+mn-cs"/>
-              </a:defRPr>
-            </a:lvl6pPr>
-            <a:lvl7pPr marL="2743200" indent="0" algn="l" defTabSz="914400" rtl="0" eaLnBrk="1" latinLnBrk="0" hangingPunct="1">
-              <a:lnSpc>
-                <a:spcPct val="120000"/>
-              </a:lnSpc>
-              <a:spcBef>
-                <a:spcPts val="500"/>
-              </a:spcBef>
-              <a:buFont typeface="Arial" panose="020B0604020202020204" pitchFamily="34" charset="0"/>
-              <a:buNone/>
-              <a:defRPr sz="1600" b="1" kern="1200">
-                <a:solidFill>
-                  <a:schemeClr val="tx1"/>
-                </a:solidFill>
-                <a:effectLst>
-                  <a:outerShdw blurRad="50800" dist="38100" dir="2700000" algn="tl" rotWithShape="0">
-                    <a:srgbClr val="000000">
-                      <a:alpha val="48000"/>
-                    </a:srgbClr>
-                  </a:outerShdw>
-                </a:effectLst>
-                <a:latin typeface="+mn-lt"/>
-                <a:ea typeface="+mn-ea"/>
-                <a:cs typeface="+mn-cs"/>
-              </a:defRPr>
-            </a:lvl7pPr>
-            <a:lvl8pPr marL="3200400" indent="0" algn="l" defTabSz="914400" rtl="0" eaLnBrk="1" latinLnBrk="0" hangingPunct="1">
-              <a:lnSpc>
-                <a:spcPct val="120000"/>
-              </a:lnSpc>
-              <a:spcBef>
-                <a:spcPts val="500"/>
-              </a:spcBef>
-              <a:buFont typeface="Arial" panose="020B0604020202020204" pitchFamily="34" charset="0"/>
-              <a:buNone/>
-              <a:defRPr sz="1600" b="1" kern="1200">
-                <a:solidFill>
-                  <a:schemeClr val="tx1"/>
-                </a:solidFill>
-                <a:effectLst>
-                  <a:outerShdw blurRad="50800" dist="38100" dir="2700000" algn="tl" rotWithShape="0">
-                    <a:srgbClr val="000000">
-                      <a:alpha val="48000"/>
-                    </a:srgbClr>
-                  </a:outerShdw>
-                </a:effectLst>
-                <a:latin typeface="+mn-lt"/>
-                <a:ea typeface="+mn-ea"/>
-                <a:cs typeface="+mn-cs"/>
-              </a:defRPr>
-            </a:lvl8pPr>
-            <a:lvl9pPr marL="3657600" indent="0" algn="l" defTabSz="914400" rtl="0" eaLnBrk="1" latinLnBrk="0" hangingPunct="1">
-              <a:lnSpc>
-                <a:spcPct val="120000"/>
-              </a:lnSpc>
-              <a:spcBef>
-                <a:spcPts val="500"/>
-              </a:spcBef>
-              <a:buFont typeface="Arial" panose="020B0604020202020204" pitchFamily="34" charset="0"/>
-              <a:buNone/>
-              <a:defRPr sz="1600" b="1" kern="1200">
-                <a:solidFill>
-                  <a:schemeClr val="tx1"/>
-                </a:solidFill>
-                <a:effectLst>
-                  <a:outerShdw blurRad="50800" dist="38100" dir="2700000" algn="tl" rotWithShape="0">
-                    <a:srgbClr val="000000">
-                      <a:alpha val="48000"/>
-                    </a:srgbClr>
-                  </a:outerShdw>
-                </a:effectLst>
-                <a:latin typeface="+mn-lt"/>
-                <a:ea typeface="+mn-ea"/>
-                <a:cs typeface="+mn-cs"/>
-              </a:defRPr>
-            </a:lvl9pPr>
-          </a:lstStyle>
-          <a:p>
-            <a:pPr algn="ctr"/>
-            <a:r>
-              <a:rPr lang="en-US" dirty="0" smtClean="0"/>
-              <a:t>Together</a:t>
-            </a:r>
-          </a:p>
-        </p:txBody>
-      </p:sp>
-      <p:pic>
-        <p:nvPicPr>
-          <p:cNvPr id="12" name="Picture 2" descr="U:\git\COSC757\Assignments\ArticleSummary\Table 5.PNG"/>
-          <p:cNvPicPr>
-            <a:picLocks noChangeAspect="1" noChangeArrowheads="1"/>
-          </p:cNvPicPr>
-          <p:nvPr/>
-        </p:nvPicPr>
-        <p:blipFill>
-          <a:blip r:embed="rId6">
-            <a:extLst>
-              <a:ext uri="{28A0092B-C50C-407E-A947-70E740481C1C}">
-                <a14:useLocalDpi xmlns:a14="http://schemas.microsoft.com/office/drawing/2010/main" val="0"/>
-              </a:ext>
-            </a:extLst>
-          </a:blip>
-          <a:srcRect/>
-          <a:stretch>
-            <a:fillRect/>
-          </a:stretch>
-        </p:blipFill>
-        <p:spPr bwMode="auto">
-          <a:xfrm>
-            <a:off x="4536430" y="4996371"/>
-            <a:ext cx="3245017" cy="1339919"/>
-          </a:xfrm>
-          <a:prstGeom prst="rect">
-            <a:avLst/>
-          </a:prstGeom>
-          <a:noFill/>
-          <a:extLst>
-            <a:ext uri="{909E8E84-426E-40DD-AFC4-6F175D3DCCD1}">
-              <a14:hiddenFill xmlns:a14="http://schemas.microsoft.com/office/drawing/2010/main">
-                <a:solidFill>
-                  <a:srgbClr val="FFFFFF"/>
-                </a:solidFill>
-              </a14:hiddenFill>
-            </a:ext>
-          </a:extLst>
-        </p:spPr>
-      </p:pic>
-    </p:spTree>
-    <p:extLst>
-      <p:ext uri="{BB962C8B-B14F-4D97-AF65-F5344CB8AC3E}">
-        <p14:creationId xmlns:p14="http://schemas.microsoft.com/office/powerpoint/2010/main" val="1548367371"/>
-      </p:ext>
-    </p:extLst>
-  </p:cSld>
-  <p:clrMapOvr>
-    <a:masterClrMapping/>
-  </p:clrMapOvr>
-</p:sld>
-</file>
-
-<file path=ppt/slides/slide9.xml><?xml version="1.0" encoding="utf-8"?>
-<p:sld xmlns:a="http://schemas.openxmlformats.org/drawingml/2006/main" xmlns:r="http://schemas.openxmlformats.org/officeDocument/2006/relationships" xmlns:p="http://schemas.openxmlformats.org/presentationml/2006/main">
-  <p:cSld>
-    <p:spTree>
-      <p:nvGrpSpPr>
-        <p:cNvPr id="1" name=""/>
-        <p:cNvGrpSpPr/>
-        <p:nvPr/>
-      </p:nvGrpSpPr>
-      <p:grpSpPr>
-        <a:xfrm>
-          <a:off x="0" y="0"/>
-          <a:ext cx="0" cy="0"/>
-          <a:chOff x="0" y="0"/>
-          <a:chExt cx="0" cy="0"/>
-        </a:xfrm>
-      </p:grpSpPr>
-      <p:sp>
-        <p:nvSpPr>
-          <p:cNvPr id="2" name="Title 1"/>
-          <p:cNvSpPr>
-            <a:spLocks noGrp="1"/>
-          </p:cNvSpPr>
-          <p:nvPr>
-            <p:ph type="title"/>
-          </p:nvPr>
-        </p:nvSpPr>
-        <p:spPr>
-          <a:xfrm>
-            <a:off x="913795" y="457200"/>
-            <a:ext cx="10353761" cy="914400"/>
-          </a:xfrm>
-        </p:spPr>
-        <p:txBody>
-          <a:bodyPr/>
-          <a:lstStyle/>
-          <a:p>
-            <a:r>
-              <a:rPr lang="en-US" dirty="0" smtClean="0"/>
-              <a:t>Thoughtful Questions</a:t>
-            </a:r>
-            <a:endParaRPr lang="en-US" dirty="0"/>
-          </a:p>
-        </p:txBody>
-      </p:sp>
-      <p:sp>
-        <p:nvSpPr>
-          <p:cNvPr id="3" name="Content Placeholder 2"/>
-          <p:cNvSpPr>
-            <a:spLocks noGrp="1"/>
-          </p:cNvSpPr>
-          <p:nvPr>
-            <p:ph idx="1"/>
-          </p:nvPr>
-        </p:nvSpPr>
-        <p:spPr>
-          <a:xfrm>
-            <a:off x="913795" y="1600200"/>
-            <a:ext cx="10353762" cy="4572000"/>
-          </a:xfrm>
-        </p:spPr>
-        <p:txBody>
-          <a:bodyPr/>
-          <a:lstStyle/>
-          <a:p>
-            <a:endParaRPr lang="en-US" dirty="0"/>
+        <p:spPr/>
+        <p:txBody>
+          <a:bodyPr/>
+          <a:lstStyle/>
+          <a:p>
+            <a:endParaRPr lang="en-US"/>
           </a:p>
         </p:txBody>
       </p:sp>
@@ -9062,293 +6273,8 @@
   <a:extraClrSchemeLst/>
   <a:extLst>
     <a:ext uri="{05A4C25C-085E-4340-85A3-A5531E510DB2}">
-      <thm15:themeFamily xmlns:thm15="http://schemas.microsoft.com/office/thememl/2012/main" xmlns="" name="Damask" id="{F9A299A0-33D0-4E0F-9F3F-7163E3744208}" vid="{746EEEEA-FB6A-406B-B510-531588D54811}"/>
+      <thm15:themeFamily xmlns:thm15="http://schemas.microsoft.com/office/thememl/2012/main" name="Damask" id="{F9A299A0-33D0-4E0F-9F3F-7163E3744208}" vid="{746EEEEA-FB6A-406B-B510-531588D54811}"/>
     </a:ext>
   </a:extLst>
 </a:theme>
-</file>
-
-<file path=ppt/theme/theme2.xml><?xml version="1.0" encoding="utf-8"?>
-<a:theme xmlns:a="http://schemas.openxmlformats.org/drawingml/2006/main" name="Office Theme">
-  <a:themeElements>
-    <a:clrScheme name="Office">
-      <a:dk1>
-        <a:sysClr val="windowText" lastClr="000000"/>
-      </a:dk1>
-      <a:lt1>
-        <a:sysClr val="window" lastClr="FFFFFF"/>
-      </a:lt1>
-      <a:dk2>
-        <a:srgbClr val="1F497D"/>
-      </a:dk2>
-      <a:lt2>
-        <a:srgbClr val="EEECE1"/>
-      </a:lt2>
-      <a:accent1>
-        <a:srgbClr val="4F81BD"/>
-      </a:accent1>
-      <a:accent2>
-        <a:srgbClr val="C0504D"/>
-      </a:accent2>
-      <a:accent3>
-        <a:srgbClr val="9BBB59"/>
-      </a:accent3>
-      <a:accent4>
-        <a:srgbClr val="8064A2"/>
-      </a:accent4>
-      <a:accent5>
-        <a:srgbClr val="4BACC6"/>
-      </a:accent5>
-      <a:accent6>
-        <a:srgbClr val="F79646"/>
-      </a:accent6>
-      <a:hlink>
-        <a:srgbClr val="0000FF"/>
-      </a:hlink>
-      <a:folHlink>
-        <a:srgbClr val="800080"/>
-      </a:folHlink>
-    </a:clrScheme>
-    <a:fontScheme name="Office">
-      <a:majorFont>
-        <a:latin typeface="Calibri"/>
-        <a:ea typeface=""/>
-        <a:cs typeface=""/>
-        <a:font script="Jpan" typeface="ＭＳ Ｐゴシック"/>
-        <a:font script="Hang" typeface="맑은 고딕"/>
-        <a:font script="Hans" typeface="宋体"/>
-        <a:font script="Hant" typeface="新細明體"/>
-        <a:font script="Arab" typeface="Times New Roman"/>
-        <a:font script="Hebr" typeface="Times New Roman"/>
-        <a:font script="Thai" typeface="Angsana New"/>
-        <a:font script="Ethi" typeface="Nyala"/>
-        <a:font script="Beng" typeface="Vrinda"/>
-        <a:font script="Gujr" typeface="Shruti"/>
-        <a:font script="Khmr" typeface="MoolBoran"/>
-        <a:font script="Knda" typeface="Tunga"/>
-        <a:font script="Guru" typeface="Raavi"/>
-        <a:font script="Cans" typeface="Euphemia"/>
-        <a:font script="Cher" typeface="Plantagenet Cherokee"/>
-        <a:font script="Yiii" typeface="Microsoft Yi Baiti"/>
-        <a:font script="Tibt" typeface="Microsoft Himalaya"/>
-        <a:font script="Thaa" typeface="MV Boli"/>
-        <a:font script="Deva" typeface="Mangal"/>
-        <a:font script="Telu" typeface="Gautami"/>
-        <a:font script="Taml" typeface="Latha"/>
-        <a:font script="Syrc" typeface="Estrangelo Edessa"/>
-        <a:font script="Orya" typeface="Kalinga"/>
-        <a:font script="Mlym" typeface="Kartika"/>
-        <a:font script="Laoo" typeface="DokChampa"/>
-        <a:font script="Sinh" typeface="Iskoola Pota"/>
-        <a:font script="Mong" typeface="Mongolian Baiti"/>
-        <a:font script="Viet" typeface="Times New Roman"/>
-        <a:font script="Uigh" typeface="Microsoft Uighur"/>
-        <a:font script="Geor" typeface="Sylfaen"/>
-      </a:majorFont>
-      <a:minorFont>
-        <a:latin typeface="Calibri"/>
-        <a:ea typeface=""/>
-        <a:cs typeface=""/>
-        <a:font script="Jpan" typeface="ＭＳ Ｐゴシック"/>
-        <a:font script="Hang" typeface="맑은 고딕"/>
-        <a:font script="Hans" typeface="宋体"/>
-        <a:font script="Hant" typeface="新細明體"/>
-        <a:font script="Arab" typeface="Arial"/>
-        <a:font script="Hebr" typeface="Arial"/>
-        <a:font script="Thai" typeface="Cordia New"/>
-        <a:font script="Ethi" typeface="Nyala"/>
-        <a:font script="Beng" typeface="Vrinda"/>
-        <a:font script="Gujr" typeface="Shruti"/>
-        <a:font script="Khmr" typeface="DaunPenh"/>
-        <a:font script="Knda" typeface="Tunga"/>
-        <a:font script="Guru" typeface="Raavi"/>
-        <a:font script="Cans" typeface="Euphemia"/>
-        <a:font script="Cher" typeface="Plantagenet Cherokee"/>
-        <a:font script="Yiii" typeface="Microsoft Yi Baiti"/>
-        <a:font script="Tibt" typeface="Microsoft Himalaya"/>
-        <a:font script="Thaa" typeface="MV Boli"/>
-        <a:font script="Deva" typeface="Mangal"/>
-        <a:font script="Telu" typeface="Gautami"/>
-        <a:font script="Taml" typeface="Latha"/>
-        <a:font script="Syrc" typeface="Estrangelo Edessa"/>
-        <a:font script="Orya" typeface="Kalinga"/>
-        <a:font script="Mlym" typeface="Kartika"/>
-        <a:font script="Laoo" typeface="DokChampa"/>
-        <a:font script="Sinh" typeface="Iskoola Pota"/>
-        <a:font script="Mong" typeface="Mongolian Baiti"/>
-        <a:font script="Viet" typeface="Arial"/>
-        <a:font script="Uigh" typeface="Microsoft Uighur"/>
-        <a:font script="Geor" typeface="Sylfaen"/>
-      </a:minorFont>
-    </a:fontScheme>
-    <a:fmtScheme name="Office">
-      <a:fillStyleLst>
-        <a:solidFill>
-          <a:schemeClr val="phClr"/>
-        </a:solidFill>
-        <a:gradFill rotWithShape="1">
-          <a:gsLst>
-            <a:gs pos="0">
-              <a:schemeClr val="phClr">
-                <a:tint val="50000"/>
-                <a:satMod val="300000"/>
-              </a:schemeClr>
-            </a:gs>
-            <a:gs pos="35000">
-              <a:schemeClr val="phClr">
-                <a:tint val="37000"/>
-                <a:satMod val="300000"/>
-              </a:schemeClr>
-            </a:gs>
-            <a:gs pos="100000">
-              <a:schemeClr val="phClr">
-                <a:tint val="15000"/>
-                <a:satMod val="350000"/>
-              </a:schemeClr>
-            </a:gs>
-          </a:gsLst>
-          <a:lin ang="16200000" scaled="1"/>
-        </a:gradFill>
-        <a:gradFill rotWithShape="1">
-          <a:gsLst>
-            <a:gs pos="0">
-              <a:schemeClr val="phClr">
-                <a:shade val="51000"/>
-                <a:satMod val="130000"/>
-              </a:schemeClr>
-            </a:gs>
-            <a:gs pos="80000">
-              <a:schemeClr val="phClr">
-                <a:shade val="93000"/>
-                <a:satMod val="130000"/>
-              </a:schemeClr>
-            </a:gs>
-            <a:gs pos="100000">
-              <a:schemeClr val="phClr">
-                <a:shade val="94000"/>
-                <a:satMod val="135000"/>
-              </a:schemeClr>
-            </a:gs>
-          </a:gsLst>
-          <a:lin ang="16200000" scaled="0"/>
-        </a:gradFill>
-      </a:fillStyleLst>
-      <a:lnStyleLst>
-        <a:ln w="9525" cap="flat" cmpd="sng" algn="ctr">
-          <a:solidFill>
-            <a:schemeClr val="phClr">
-              <a:shade val="95000"/>
-              <a:satMod val="105000"/>
-            </a:schemeClr>
-          </a:solidFill>
-          <a:prstDash val="solid"/>
-        </a:ln>
-        <a:ln w="25400" cap="flat" cmpd="sng" algn="ctr">
-          <a:solidFill>
-            <a:schemeClr val="phClr"/>
-          </a:solidFill>
-          <a:prstDash val="solid"/>
-        </a:ln>
-        <a:ln w="38100" cap="flat" cmpd="sng" algn="ctr">
-          <a:solidFill>
-            <a:schemeClr val="phClr"/>
-          </a:solidFill>
-          <a:prstDash val="solid"/>
-        </a:ln>
-      </a:lnStyleLst>
-      <a:effectStyleLst>
-        <a:effectStyle>
-          <a:effectLst>
-            <a:outerShdw blurRad="40000" dist="20000" dir="5400000" rotWithShape="0">
-              <a:srgbClr val="000000">
-                <a:alpha val="38000"/>
-              </a:srgbClr>
-            </a:outerShdw>
-          </a:effectLst>
-        </a:effectStyle>
-        <a:effectStyle>
-          <a:effectLst>
-            <a:outerShdw blurRad="40000" dist="23000" dir="5400000" rotWithShape="0">
-              <a:srgbClr val="000000">
-                <a:alpha val="35000"/>
-              </a:srgbClr>
-            </a:outerShdw>
-          </a:effectLst>
-        </a:effectStyle>
-        <a:effectStyle>
-          <a:effectLst>
-            <a:outerShdw blurRad="40000" dist="23000" dir="5400000" rotWithShape="0">
-              <a:srgbClr val="000000">
-                <a:alpha val="35000"/>
-              </a:srgbClr>
-            </a:outerShdw>
-          </a:effectLst>
-          <a:scene3d>
-            <a:camera prst="orthographicFront">
-              <a:rot lat="0" lon="0" rev="0"/>
-            </a:camera>
-            <a:lightRig rig="threePt" dir="t">
-              <a:rot lat="0" lon="0" rev="1200000"/>
-            </a:lightRig>
-          </a:scene3d>
-          <a:sp3d>
-            <a:bevelT w="63500" h="25400"/>
-          </a:sp3d>
-        </a:effectStyle>
-      </a:effectStyleLst>
-      <a:bgFillStyleLst>
-        <a:solidFill>
-          <a:schemeClr val="phClr"/>
-        </a:solidFill>
-        <a:gradFill rotWithShape="1">
-          <a:gsLst>
-            <a:gs pos="0">
-              <a:schemeClr val="phClr">
-                <a:tint val="40000"/>
-                <a:satMod val="350000"/>
-              </a:schemeClr>
-            </a:gs>
-            <a:gs pos="40000">
-              <a:schemeClr val="phClr">
-                <a:tint val="45000"/>
-                <a:shade val="99000"/>
-                <a:satMod val="350000"/>
-              </a:schemeClr>
-            </a:gs>
-            <a:gs pos="100000">
-              <a:schemeClr val="phClr">
-                <a:shade val="20000"/>
-                <a:satMod val="255000"/>
-              </a:schemeClr>
-            </a:gs>
-          </a:gsLst>
-          <a:path path="circle">
-            <a:fillToRect l="50000" t="-80000" r="50000" b="180000"/>
-          </a:path>
-        </a:gradFill>
-        <a:gradFill rotWithShape="1">
-          <a:gsLst>
-            <a:gs pos="0">
-              <a:schemeClr val="phClr">
-                <a:tint val="80000"/>
-                <a:satMod val="300000"/>
-              </a:schemeClr>
-            </a:gs>
-            <a:gs pos="100000">
-              <a:schemeClr val="phClr">
-                <a:shade val="30000"/>
-                <a:satMod val="200000"/>
-              </a:schemeClr>
-            </a:gs>
-          </a:gsLst>
-          <a:path path="circle">
-            <a:fillToRect l="50000" t="50000" r="50000" b="50000"/>
-          </a:path>
-        </a:gradFill>
-      </a:bgFillStyleLst>
-    </a:fmtScheme>
-  </a:themeElements>
-  <a:objectDefaults/>
-  <a:extraClrSchemeLst/>
-</a:theme>
 </file>
</xml_diff>

<commit_message>
Fix problem with old version of slides; Updates to slides for Thoughts/Questions; Update summary paper to include my conclusion (good/bad/future).
</commit_message>
<xml_diff>
--- a/Assignments/ArticleSummary/ArticleSummarySlides-MJS.pptx
+++ b/Assignments/ArticleSummary/ArticleSummarySlides-MJS.pptx
@@ -4,12 +4,19 @@
   <p:sldMasterIdLst>
     <p:sldMasterId id="2147483648" r:id="rId1"/>
   </p:sldMasterIdLst>
+  <p:notesMasterIdLst>
+    <p:notesMasterId r:id="rId11"/>
+  </p:notesMasterIdLst>
   <p:sldIdLst>
     <p:sldId id="258" r:id="rId2"/>
-    <p:sldId id="257" r:id="rId3"/>
-    <p:sldId id="259" r:id="rId4"/>
-    <p:sldId id="261" r:id="rId5"/>
-    <p:sldId id="262" r:id="rId6"/>
+    <p:sldId id="270" r:id="rId3"/>
+    <p:sldId id="269" r:id="rId4"/>
+    <p:sldId id="257" r:id="rId5"/>
+    <p:sldId id="265" r:id="rId6"/>
+    <p:sldId id="266" r:id="rId7"/>
+    <p:sldId id="268" r:id="rId8"/>
+    <p:sldId id="267" r:id="rId9"/>
+    <p:sldId id="262" r:id="rId10"/>
   </p:sldIdLst>
   <p:sldSz cx="12192000" cy="6858000"/>
   <p:notesSz cx="6858000" cy="9144000"/>
@@ -108,7 +115,1513 @@
       </a:defRPr>
     </a:lvl9pPr>
   </p:defaultTextStyle>
+  <p:extLst>
+    <p:ext uri="{EFAFB233-063F-42B5-8137-9DF3F51BA10A}">
+      <p15:sldGuideLst xmlns:p15="http://schemas.microsoft.com/office/powerpoint/2012/main">
+        <p15:guide id="1" orient="horz" pos="2160">
+          <p15:clr>
+            <a:srgbClr val="A4A3A4"/>
+          </p15:clr>
+        </p15:guide>
+        <p15:guide id="2" pos="3840">
+          <p15:clr>
+            <a:srgbClr val="A4A3A4"/>
+          </p15:clr>
+        </p15:guide>
+      </p15:sldGuideLst>
+    </p:ext>
+    <p:ext uri="{2D200454-40CA-4A62-9FC3-DE9A4176ACB9}">
+      <p15:notesGuideLst xmlns:p15="http://schemas.microsoft.com/office/powerpoint/2012/main">
+        <p15:guide id="1" orient="horz" pos="2880">
+          <p15:clr>
+            <a:srgbClr val="A4A3A4"/>
+          </p15:clr>
+        </p15:guide>
+        <p15:guide id="2" pos="2160">
+          <p15:clr>
+            <a:srgbClr val="A4A3A4"/>
+          </p15:clr>
+        </p15:guide>
+      </p15:notesGuideLst>
+    </p:ext>
+  </p:extLst>
 </p:presentation>
+</file>
+
+<file path=ppt/notesMasters/notesMaster1.xml><?xml version="1.0" encoding="utf-8"?>
+<p:notesMaster xmlns:a="http://schemas.openxmlformats.org/drawingml/2006/main" xmlns:r="http://schemas.openxmlformats.org/officeDocument/2006/relationships" xmlns:p="http://schemas.openxmlformats.org/presentationml/2006/main">
+  <p:cSld>
+    <p:bg>
+      <p:bgRef idx="1001">
+        <a:schemeClr val="bg1"/>
+      </p:bgRef>
+    </p:bg>
+    <p:spTree>
+      <p:nvGrpSpPr>
+        <p:cNvPr id="1" name=""/>
+        <p:cNvGrpSpPr/>
+        <p:nvPr/>
+      </p:nvGrpSpPr>
+      <p:grpSpPr>
+        <a:xfrm>
+          <a:off x="0" y="0"/>
+          <a:ext cx="0" cy="0"/>
+          <a:chOff x="0" y="0"/>
+          <a:chExt cx="0" cy="0"/>
+        </a:xfrm>
+      </p:grpSpPr>
+      <p:sp>
+        <p:nvSpPr>
+          <p:cNvPr id="2" name="Header Placeholder 1"/>
+          <p:cNvSpPr>
+            <a:spLocks noGrp="1"/>
+          </p:cNvSpPr>
+          <p:nvPr>
+            <p:ph type="hdr" sz="quarter"/>
+          </p:nvPr>
+        </p:nvSpPr>
+        <p:spPr>
+          <a:xfrm>
+            <a:off x="0" y="0"/>
+            <a:ext cx="2971800" cy="457200"/>
+          </a:xfrm>
+          <a:prstGeom prst="rect">
+            <a:avLst/>
+          </a:prstGeom>
+        </p:spPr>
+        <p:txBody>
+          <a:bodyPr vert="horz" lIns="91440" tIns="45720" rIns="91440" bIns="45720" rtlCol="0"/>
+          <a:lstStyle>
+            <a:lvl1pPr algn="l">
+              <a:defRPr sz="1200"/>
+            </a:lvl1pPr>
+          </a:lstStyle>
+          <a:p>
+            <a:endParaRPr lang="en-US"/>
+          </a:p>
+        </p:txBody>
+      </p:sp>
+      <p:sp>
+        <p:nvSpPr>
+          <p:cNvPr id="3" name="Date Placeholder 2"/>
+          <p:cNvSpPr>
+            <a:spLocks noGrp="1"/>
+          </p:cNvSpPr>
+          <p:nvPr>
+            <p:ph type="dt" idx="1"/>
+          </p:nvPr>
+        </p:nvSpPr>
+        <p:spPr>
+          <a:xfrm>
+            <a:off x="3884613" y="0"/>
+            <a:ext cx="2971800" cy="457200"/>
+          </a:xfrm>
+          <a:prstGeom prst="rect">
+            <a:avLst/>
+          </a:prstGeom>
+        </p:spPr>
+        <p:txBody>
+          <a:bodyPr vert="horz" lIns="91440" tIns="45720" rIns="91440" bIns="45720" rtlCol="0"/>
+          <a:lstStyle>
+            <a:lvl1pPr algn="r">
+              <a:defRPr sz="1200"/>
+            </a:lvl1pPr>
+          </a:lstStyle>
+          <a:p>
+            <a:fld id="{5BA0C6F3-6BF8-4DC2-B398-E4ECE6AE51D5}" type="datetimeFigureOut">
+              <a:rPr lang="en-US" smtClean="0"/>
+              <a:t>24-Feb-16</a:t>
+            </a:fld>
+            <a:endParaRPr lang="en-US"/>
+          </a:p>
+        </p:txBody>
+      </p:sp>
+      <p:sp>
+        <p:nvSpPr>
+          <p:cNvPr id="4" name="Slide Image Placeholder 3"/>
+          <p:cNvSpPr>
+            <a:spLocks noGrp="1" noRot="1" noChangeAspect="1"/>
+          </p:cNvSpPr>
+          <p:nvPr>
+            <p:ph type="sldImg" idx="2"/>
+          </p:nvPr>
+        </p:nvSpPr>
+        <p:spPr>
+          <a:xfrm>
+            <a:off x="381000" y="685800"/>
+            <a:ext cx="6096000" cy="3429000"/>
+          </a:xfrm>
+          <a:prstGeom prst="rect">
+            <a:avLst/>
+          </a:prstGeom>
+          <a:noFill/>
+          <a:ln w="12700">
+            <a:solidFill>
+              <a:prstClr val="black"/>
+            </a:solidFill>
+          </a:ln>
+        </p:spPr>
+        <p:txBody>
+          <a:bodyPr vert="horz" lIns="91440" tIns="45720" rIns="91440" bIns="45720" rtlCol="0" anchor="ctr"/>
+          <a:lstStyle/>
+          <a:p>
+            <a:endParaRPr lang="en-US"/>
+          </a:p>
+        </p:txBody>
+      </p:sp>
+      <p:sp>
+        <p:nvSpPr>
+          <p:cNvPr id="5" name="Notes Placeholder 4"/>
+          <p:cNvSpPr>
+            <a:spLocks noGrp="1"/>
+          </p:cNvSpPr>
+          <p:nvPr>
+            <p:ph type="body" sz="quarter" idx="3"/>
+          </p:nvPr>
+        </p:nvSpPr>
+        <p:spPr>
+          <a:xfrm>
+            <a:off x="685800" y="4343400"/>
+            <a:ext cx="5486400" cy="4114800"/>
+          </a:xfrm>
+          <a:prstGeom prst="rect">
+            <a:avLst/>
+          </a:prstGeom>
+        </p:spPr>
+        <p:txBody>
+          <a:bodyPr vert="horz" lIns="91440" tIns="45720" rIns="91440" bIns="45720" rtlCol="0"/>
+          <a:lstStyle/>
+          <a:p>
+            <a:pPr lvl="0"/>
+            <a:r>
+              <a:rPr lang="en-US" smtClean="0"/>
+              <a:t>Click to edit Master text styles</a:t>
+            </a:r>
+          </a:p>
+          <a:p>
+            <a:pPr lvl="1"/>
+            <a:r>
+              <a:rPr lang="en-US" smtClean="0"/>
+              <a:t>Second level</a:t>
+            </a:r>
+          </a:p>
+          <a:p>
+            <a:pPr lvl="2"/>
+            <a:r>
+              <a:rPr lang="en-US" smtClean="0"/>
+              <a:t>Third level</a:t>
+            </a:r>
+          </a:p>
+          <a:p>
+            <a:pPr lvl="3"/>
+            <a:r>
+              <a:rPr lang="en-US" smtClean="0"/>
+              <a:t>Fourth level</a:t>
+            </a:r>
+          </a:p>
+          <a:p>
+            <a:pPr lvl="4"/>
+            <a:r>
+              <a:rPr lang="en-US" smtClean="0"/>
+              <a:t>Fifth level</a:t>
+            </a:r>
+            <a:endParaRPr lang="en-US"/>
+          </a:p>
+        </p:txBody>
+      </p:sp>
+      <p:sp>
+        <p:nvSpPr>
+          <p:cNvPr id="6" name="Footer Placeholder 5"/>
+          <p:cNvSpPr>
+            <a:spLocks noGrp="1"/>
+          </p:cNvSpPr>
+          <p:nvPr>
+            <p:ph type="ftr" sz="quarter" idx="4"/>
+          </p:nvPr>
+        </p:nvSpPr>
+        <p:spPr>
+          <a:xfrm>
+            <a:off x="0" y="8685213"/>
+            <a:ext cx="2971800" cy="457200"/>
+          </a:xfrm>
+          <a:prstGeom prst="rect">
+            <a:avLst/>
+          </a:prstGeom>
+        </p:spPr>
+        <p:txBody>
+          <a:bodyPr vert="horz" lIns="91440" tIns="45720" rIns="91440" bIns="45720" rtlCol="0" anchor="b"/>
+          <a:lstStyle>
+            <a:lvl1pPr algn="l">
+              <a:defRPr sz="1200"/>
+            </a:lvl1pPr>
+          </a:lstStyle>
+          <a:p>
+            <a:endParaRPr lang="en-US"/>
+          </a:p>
+        </p:txBody>
+      </p:sp>
+      <p:sp>
+        <p:nvSpPr>
+          <p:cNvPr id="7" name="Slide Number Placeholder 6"/>
+          <p:cNvSpPr>
+            <a:spLocks noGrp="1"/>
+          </p:cNvSpPr>
+          <p:nvPr>
+            <p:ph type="sldNum" sz="quarter" idx="5"/>
+          </p:nvPr>
+        </p:nvSpPr>
+        <p:spPr>
+          <a:xfrm>
+            <a:off x="3884613" y="8685213"/>
+            <a:ext cx="2971800" cy="457200"/>
+          </a:xfrm>
+          <a:prstGeom prst="rect">
+            <a:avLst/>
+          </a:prstGeom>
+        </p:spPr>
+        <p:txBody>
+          <a:bodyPr vert="horz" lIns="91440" tIns="45720" rIns="91440" bIns="45720" rtlCol="0" anchor="b"/>
+          <a:lstStyle>
+            <a:lvl1pPr algn="r">
+              <a:defRPr sz="1200"/>
+            </a:lvl1pPr>
+          </a:lstStyle>
+          <a:p>
+            <a:fld id="{23F25543-CDE9-4CD3-908D-BDAD6E318A91}" type="slidenum">
+              <a:rPr lang="en-US" smtClean="0"/>
+              <a:t>‹#›</a:t>
+            </a:fld>
+            <a:endParaRPr lang="en-US"/>
+          </a:p>
+        </p:txBody>
+      </p:sp>
+    </p:spTree>
+    <p:extLst>
+      <p:ext uri="{BB962C8B-B14F-4D97-AF65-F5344CB8AC3E}">
+        <p14:creationId xmlns:p14="http://schemas.microsoft.com/office/powerpoint/2010/main" val="167752398"/>
+      </p:ext>
+    </p:extLst>
+  </p:cSld>
+  <p:clrMap bg1="lt1" tx1="dk1" bg2="lt2" tx2="dk2" accent1="accent1" accent2="accent2" accent3="accent3" accent4="accent4" accent5="accent5" accent6="accent6" hlink="hlink" folHlink="folHlink"/>
+  <p:notesStyle>
+    <a:lvl1pPr marL="0" algn="l" defTabSz="914400" rtl="0" eaLnBrk="1" latinLnBrk="0" hangingPunct="1">
+      <a:defRPr sz="1200" kern="1200">
+        <a:solidFill>
+          <a:schemeClr val="tx1"/>
+        </a:solidFill>
+        <a:latin typeface="+mn-lt"/>
+        <a:ea typeface="+mn-ea"/>
+        <a:cs typeface="+mn-cs"/>
+      </a:defRPr>
+    </a:lvl1pPr>
+    <a:lvl2pPr marL="457200" algn="l" defTabSz="914400" rtl="0" eaLnBrk="1" latinLnBrk="0" hangingPunct="1">
+      <a:defRPr sz="1200" kern="1200">
+        <a:solidFill>
+          <a:schemeClr val="tx1"/>
+        </a:solidFill>
+        <a:latin typeface="+mn-lt"/>
+        <a:ea typeface="+mn-ea"/>
+        <a:cs typeface="+mn-cs"/>
+      </a:defRPr>
+    </a:lvl2pPr>
+    <a:lvl3pPr marL="914400" algn="l" defTabSz="914400" rtl="0" eaLnBrk="1" latinLnBrk="0" hangingPunct="1">
+      <a:defRPr sz="1200" kern="1200">
+        <a:solidFill>
+          <a:schemeClr val="tx1"/>
+        </a:solidFill>
+        <a:latin typeface="+mn-lt"/>
+        <a:ea typeface="+mn-ea"/>
+        <a:cs typeface="+mn-cs"/>
+      </a:defRPr>
+    </a:lvl3pPr>
+    <a:lvl4pPr marL="1371600" algn="l" defTabSz="914400" rtl="0" eaLnBrk="1" latinLnBrk="0" hangingPunct="1">
+      <a:defRPr sz="1200" kern="1200">
+        <a:solidFill>
+          <a:schemeClr val="tx1"/>
+        </a:solidFill>
+        <a:latin typeface="+mn-lt"/>
+        <a:ea typeface="+mn-ea"/>
+        <a:cs typeface="+mn-cs"/>
+      </a:defRPr>
+    </a:lvl4pPr>
+    <a:lvl5pPr marL="1828800" algn="l" defTabSz="914400" rtl="0" eaLnBrk="1" latinLnBrk="0" hangingPunct="1">
+      <a:defRPr sz="1200" kern="1200">
+        <a:solidFill>
+          <a:schemeClr val="tx1"/>
+        </a:solidFill>
+        <a:latin typeface="+mn-lt"/>
+        <a:ea typeface="+mn-ea"/>
+        <a:cs typeface="+mn-cs"/>
+      </a:defRPr>
+    </a:lvl5pPr>
+    <a:lvl6pPr marL="2286000" algn="l" defTabSz="914400" rtl="0" eaLnBrk="1" latinLnBrk="0" hangingPunct="1">
+      <a:defRPr sz="1200" kern="1200">
+        <a:solidFill>
+          <a:schemeClr val="tx1"/>
+        </a:solidFill>
+        <a:latin typeface="+mn-lt"/>
+        <a:ea typeface="+mn-ea"/>
+        <a:cs typeface="+mn-cs"/>
+      </a:defRPr>
+    </a:lvl6pPr>
+    <a:lvl7pPr marL="2743200" algn="l" defTabSz="914400" rtl="0" eaLnBrk="1" latinLnBrk="0" hangingPunct="1">
+      <a:defRPr sz="1200" kern="1200">
+        <a:solidFill>
+          <a:schemeClr val="tx1"/>
+        </a:solidFill>
+        <a:latin typeface="+mn-lt"/>
+        <a:ea typeface="+mn-ea"/>
+        <a:cs typeface="+mn-cs"/>
+      </a:defRPr>
+    </a:lvl7pPr>
+    <a:lvl8pPr marL="3200400" algn="l" defTabSz="914400" rtl="0" eaLnBrk="1" latinLnBrk="0" hangingPunct="1">
+      <a:defRPr sz="1200" kern="1200">
+        <a:solidFill>
+          <a:schemeClr val="tx1"/>
+        </a:solidFill>
+        <a:latin typeface="+mn-lt"/>
+        <a:ea typeface="+mn-ea"/>
+        <a:cs typeface="+mn-cs"/>
+      </a:defRPr>
+    </a:lvl8pPr>
+    <a:lvl9pPr marL="3657600" algn="l" defTabSz="914400" rtl="0" eaLnBrk="1" latinLnBrk="0" hangingPunct="1">
+      <a:defRPr sz="1200" kern="1200">
+        <a:solidFill>
+          <a:schemeClr val="tx1"/>
+        </a:solidFill>
+        <a:latin typeface="+mn-lt"/>
+        <a:ea typeface="+mn-ea"/>
+        <a:cs typeface="+mn-cs"/>
+      </a:defRPr>
+    </a:lvl9pPr>
+  </p:notesStyle>
+</p:notesMaster>
+</file>
+
+<file path=ppt/notesSlides/notesSlide1.xml><?xml version="1.0" encoding="utf-8"?>
+<p:notes xmlns:a="http://schemas.openxmlformats.org/drawingml/2006/main" xmlns:r="http://schemas.openxmlformats.org/officeDocument/2006/relationships" xmlns:p="http://schemas.openxmlformats.org/presentationml/2006/main">
+  <p:cSld>
+    <p:spTree>
+      <p:nvGrpSpPr>
+        <p:cNvPr id="1" name=""/>
+        <p:cNvGrpSpPr/>
+        <p:nvPr/>
+      </p:nvGrpSpPr>
+      <p:grpSpPr>
+        <a:xfrm>
+          <a:off x="0" y="0"/>
+          <a:ext cx="0" cy="0"/>
+          <a:chOff x="0" y="0"/>
+          <a:chExt cx="0" cy="0"/>
+        </a:xfrm>
+      </p:grpSpPr>
+      <p:sp>
+        <p:nvSpPr>
+          <p:cNvPr id="2" name="Slide Image Placeholder 1"/>
+          <p:cNvSpPr>
+            <a:spLocks noGrp="1" noRot="1" noChangeAspect="1"/>
+          </p:cNvSpPr>
+          <p:nvPr>
+            <p:ph type="sldImg"/>
+          </p:nvPr>
+        </p:nvSpPr>
+        <p:spPr/>
+      </p:sp>
+      <p:sp>
+        <p:nvSpPr>
+          <p:cNvPr id="3" name="Notes Placeholder 2"/>
+          <p:cNvSpPr>
+            <a:spLocks noGrp="1"/>
+          </p:cNvSpPr>
+          <p:nvPr>
+            <p:ph type="body" idx="1"/>
+          </p:nvPr>
+        </p:nvSpPr>
+        <p:spPr/>
+        <p:txBody>
+          <a:bodyPr/>
+          <a:lstStyle/>
+          <a:p>
+            <a:r>
+              <a:rPr lang="en-US" dirty="0" err="1"/>
+              <a:t>ICASSP</a:t>
+            </a:r>
+            <a:r>
+              <a:rPr lang="en-US" dirty="0"/>
+              <a:t> (2015</a:t>
+            </a:r>
+            <a:r>
+              <a:rPr lang="en-US" dirty="0" smtClean="0"/>
+              <a:t>) – 2015 IEEE International Conference on Acoustics, Speech and Signal Processing (</a:t>
+            </a:r>
+            <a:r>
+              <a:rPr lang="en-US" dirty="0" err="1" smtClean="0"/>
+              <a:t>ICASSP</a:t>
+            </a:r>
+            <a:r>
+              <a:rPr lang="en-US" dirty="0" smtClean="0"/>
+              <a:t>)</a:t>
+            </a:r>
+          </a:p>
+          <a:p>
+            <a:r>
+              <a:rPr lang="en-US" dirty="0" smtClean="0"/>
+              <a:t>Date of Conference: 19-24 </a:t>
+            </a:r>
+            <a:r>
+              <a:rPr lang="en-US" dirty="0"/>
+              <a:t>April </a:t>
+            </a:r>
+            <a:r>
+              <a:rPr lang="en-US" dirty="0" smtClean="0"/>
+              <a:t>2015</a:t>
+            </a:r>
+          </a:p>
+          <a:p>
+            <a:r>
+              <a:rPr lang="en-US" dirty="0" smtClean="0"/>
+              <a:t>Page(s): 4619-4623</a:t>
+            </a:r>
+          </a:p>
+          <a:p>
+            <a:r>
+              <a:rPr lang="en-US" dirty="0" err="1"/>
+              <a:t>DOI</a:t>
+            </a:r>
+            <a:r>
+              <a:rPr lang="en-US" dirty="0"/>
+              <a:t>: </a:t>
+            </a:r>
+            <a:r>
+              <a:rPr lang="en-US" u="sng" dirty="0">
+                <a:hlinkClick r:id="rId3"/>
+              </a:rPr>
+              <a:t>10.1109/</a:t>
+            </a:r>
+            <a:r>
+              <a:rPr lang="en-US" u="sng" dirty="0" err="1">
+                <a:hlinkClick r:id="rId3"/>
+              </a:rPr>
+              <a:t>ICASSP.2015.7178846</a:t>
+            </a:r>
+            <a:endParaRPr lang="en-US" dirty="0"/>
+          </a:p>
+        </p:txBody>
+      </p:sp>
+      <p:sp>
+        <p:nvSpPr>
+          <p:cNvPr id="4" name="Slide Number Placeholder 3"/>
+          <p:cNvSpPr>
+            <a:spLocks noGrp="1"/>
+          </p:cNvSpPr>
+          <p:nvPr>
+            <p:ph type="sldNum" sz="quarter" idx="10"/>
+          </p:nvPr>
+        </p:nvSpPr>
+        <p:spPr/>
+        <p:txBody>
+          <a:bodyPr/>
+          <a:lstStyle/>
+          <a:p>
+            <a:fld id="{23F25543-CDE9-4CD3-908D-BDAD6E318A91}" type="slidenum">
+              <a:rPr lang="en-US" smtClean="0"/>
+              <a:t>1</a:t>
+            </a:fld>
+            <a:endParaRPr lang="en-US"/>
+          </a:p>
+        </p:txBody>
+      </p:sp>
+    </p:spTree>
+    <p:extLst>
+      <p:ext uri="{BB962C8B-B14F-4D97-AF65-F5344CB8AC3E}">
+        <p14:creationId xmlns:p14="http://schemas.microsoft.com/office/powerpoint/2010/main" val="947457210"/>
+      </p:ext>
+    </p:extLst>
+  </p:cSld>
+  <p:clrMapOvr>
+    <a:masterClrMapping/>
+  </p:clrMapOvr>
+</p:notes>
+</file>
+
+<file path=ppt/notesSlides/notesSlide2.xml><?xml version="1.0" encoding="utf-8"?>
+<p:notes xmlns:a="http://schemas.openxmlformats.org/drawingml/2006/main" xmlns:r="http://schemas.openxmlformats.org/officeDocument/2006/relationships" xmlns:p="http://schemas.openxmlformats.org/presentationml/2006/main">
+  <p:cSld>
+    <p:spTree>
+      <p:nvGrpSpPr>
+        <p:cNvPr id="1" name=""/>
+        <p:cNvGrpSpPr/>
+        <p:nvPr/>
+      </p:nvGrpSpPr>
+      <p:grpSpPr>
+        <a:xfrm>
+          <a:off x="0" y="0"/>
+          <a:ext cx="0" cy="0"/>
+          <a:chOff x="0" y="0"/>
+          <a:chExt cx="0" cy="0"/>
+        </a:xfrm>
+      </p:grpSpPr>
+      <p:sp>
+        <p:nvSpPr>
+          <p:cNvPr id="2" name="Slide Image Placeholder 1"/>
+          <p:cNvSpPr>
+            <a:spLocks noGrp="1" noRot="1" noChangeAspect="1"/>
+          </p:cNvSpPr>
+          <p:nvPr>
+            <p:ph type="sldImg"/>
+          </p:nvPr>
+        </p:nvSpPr>
+        <p:spPr/>
+      </p:sp>
+      <p:sp>
+        <p:nvSpPr>
+          <p:cNvPr id="3" name="Notes Placeholder 2"/>
+          <p:cNvSpPr>
+            <a:spLocks noGrp="1"/>
+          </p:cNvSpPr>
+          <p:nvPr>
+            <p:ph type="body" idx="1"/>
+          </p:nvPr>
+        </p:nvSpPr>
+        <p:spPr/>
+        <p:txBody>
+          <a:bodyPr/>
+          <a:lstStyle/>
+          <a:p>
+            <a:r>
+              <a:rPr lang="en-US" dirty="0" smtClean="0"/>
+              <a:t>A</a:t>
+            </a:r>
+            <a:r>
+              <a:rPr lang="en-US" dirty="0"/>
+              <a:t> </a:t>
+            </a:r>
+            <a:r>
+              <a:rPr lang="en-US" b="1" dirty="0"/>
+              <a:t>maximum a posteriori probability (MAP) </a:t>
+            </a:r>
+            <a:r>
+              <a:rPr lang="en-US" dirty="0" smtClean="0"/>
+              <a:t>estimate is a mode of the posterior distribution. </a:t>
+            </a:r>
+          </a:p>
+          <a:p>
+            <a:r>
+              <a:rPr lang="en-US" dirty="0" smtClean="0"/>
+              <a:t>The</a:t>
+            </a:r>
+            <a:r>
+              <a:rPr lang="en-US" dirty="0"/>
+              <a:t> </a:t>
+            </a:r>
+            <a:r>
+              <a:rPr lang="en-US" b="1" dirty="0"/>
+              <a:t>posterior probability</a:t>
+            </a:r>
+            <a:r>
+              <a:rPr lang="en-US" dirty="0"/>
+              <a:t> of </a:t>
+            </a:r>
+            <a:r>
+              <a:rPr lang="en-US" dirty="0" smtClean="0"/>
+              <a:t>a random event or </a:t>
+            </a:r>
+            <a:r>
+              <a:rPr lang="en-US" dirty="0"/>
+              <a:t>an uncertain </a:t>
+            </a:r>
+            <a:r>
+              <a:rPr lang="en-US" dirty="0" smtClean="0"/>
+              <a:t>proposition </a:t>
+            </a:r>
+            <a:r>
+              <a:rPr lang="en-US" dirty="0"/>
+              <a:t>is </a:t>
+            </a:r>
+            <a:r>
+              <a:rPr lang="en-US" dirty="0" smtClean="0"/>
+              <a:t>the conditional probability</a:t>
+            </a:r>
+            <a:r>
+              <a:rPr lang="en-US" dirty="0"/>
+              <a:t> that is assigned after the relevant </a:t>
+            </a:r>
+            <a:r>
+              <a:rPr lang="en-US" dirty="0" smtClean="0"/>
+              <a:t>evidence or </a:t>
+            </a:r>
+            <a:r>
+              <a:rPr lang="en-US" dirty="0"/>
+              <a:t>background is taken into account. Similarly, </a:t>
+            </a:r>
+            <a:r>
+              <a:rPr lang="en-US" dirty="0" smtClean="0"/>
+              <a:t>the </a:t>
+            </a:r>
+            <a:r>
+              <a:rPr lang="en-US" b="1" dirty="0" smtClean="0"/>
+              <a:t>posterior </a:t>
+            </a:r>
+            <a:r>
+              <a:rPr lang="en-US" b="1" dirty="0"/>
+              <a:t>probability distribution</a:t>
+            </a:r>
+            <a:r>
+              <a:rPr lang="en-US" dirty="0"/>
+              <a:t> is </a:t>
+            </a:r>
+            <a:r>
+              <a:rPr lang="en-US" dirty="0" smtClean="0"/>
+              <a:t>the probability distribution of </a:t>
+            </a:r>
+            <a:r>
+              <a:rPr lang="en-US" dirty="0"/>
+              <a:t>an unknown quantity, treated as </a:t>
+            </a:r>
+            <a:r>
+              <a:rPr lang="en-US" dirty="0" smtClean="0"/>
+              <a:t>a random variable, conditional on the </a:t>
+            </a:r>
+            <a:r>
+              <a:rPr lang="en-US" dirty="0"/>
+              <a:t>evidence obtained from an experiment or survey</a:t>
+            </a:r>
+            <a:r>
+              <a:rPr lang="en-US" dirty="0" smtClean="0"/>
+              <a:t>.</a:t>
+            </a:r>
+          </a:p>
+          <a:p>
+            <a:r>
+              <a:rPr lang="en-US" dirty="0" smtClean="0"/>
+              <a:t>"</a:t>
+            </a:r>
+            <a:r>
+              <a:rPr lang="en-US" dirty="0"/>
+              <a:t>Posterior", in this context, means after taking into account the relevant evidence related to the particular case being examined.</a:t>
+            </a:r>
+          </a:p>
+        </p:txBody>
+      </p:sp>
+      <p:sp>
+        <p:nvSpPr>
+          <p:cNvPr id="4" name="Slide Number Placeholder 3"/>
+          <p:cNvSpPr>
+            <a:spLocks noGrp="1"/>
+          </p:cNvSpPr>
+          <p:nvPr>
+            <p:ph type="sldNum" sz="quarter" idx="10"/>
+          </p:nvPr>
+        </p:nvSpPr>
+        <p:spPr/>
+        <p:txBody>
+          <a:bodyPr/>
+          <a:lstStyle/>
+          <a:p>
+            <a:fld id="{23F25543-CDE9-4CD3-908D-BDAD6E318A91}" type="slidenum">
+              <a:rPr lang="en-US" smtClean="0"/>
+              <a:t>2</a:t>
+            </a:fld>
+            <a:endParaRPr lang="en-US"/>
+          </a:p>
+        </p:txBody>
+      </p:sp>
+    </p:spTree>
+    <p:extLst>
+      <p:ext uri="{BB962C8B-B14F-4D97-AF65-F5344CB8AC3E}">
+        <p14:creationId xmlns:p14="http://schemas.microsoft.com/office/powerpoint/2010/main" val="1102373927"/>
+      </p:ext>
+    </p:extLst>
+  </p:cSld>
+  <p:clrMapOvr>
+    <a:masterClrMapping/>
+  </p:clrMapOvr>
+</p:notes>
+</file>
+
+<file path=ppt/notesSlides/notesSlide3.xml><?xml version="1.0" encoding="utf-8"?>
+<p:notes xmlns:a="http://schemas.openxmlformats.org/drawingml/2006/main" xmlns:r="http://schemas.openxmlformats.org/officeDocument/2006/relationships" xmlns:p="http://schemas.openxmlformats.org/presentationml/2006/main">
+  <p:cSld>
+    <p:spTree>
+      <p:nvGrpSpPr>
+        <p:cNvPr id="1" name=""/>
+        <p:cNvGrpSpPr/>
+        <p:nvPr/>
+      </p:nvGrpSpPr>
+      <p:grpSpPr>
+        <a:xfrm>
+          <a:off x="0" y="0"/>
+          <a:ext cx="0" cy="0"/>
+          <a:chOff x="0" y="0"/>
+          <a:chExt cx="0" cy="0"/>
+        </a:xfrm>
+      </p:grpSpPr>
+      <p:sp>
+        <p:nvSpPr>
+          <p:cNvPr id="2" name="Slide Image Placeholder 1"/>
+          <p:cNvSpPr>
+            <a:spLocks noGrp="1" noRot="1" noChangeAspect="1"/>
+          </p:cNvSpPr>
+          <p:nvPr>
+            <p:ph type="sldImg"/>
+          </p:nvPr>
+        </p:nvSpPr>
+        <p:spPr/>
+      </p:sp>
+      <p:sp>
+        <p:nvSpPr>
+          <p:cNvPr id="3" name="Notes Placeholder 2"/>
+          <p:cNvSpPr>
+            <a:spLocks noGrp="1"/>
+          </p:cNvSpPr>
+          <p:nvPr>
+            <p:ph type="body" idx="1"/>
+          </p:nvPr>
+        </p:nvSpPr>
+        <p:spPr/>
+        <p:txBody>
+          <a:bodyPr/>
+          <a:lstStyle/>
+          <a:p>
+            <a:endParaRPr lang="en-US"/>
+          </a:p>
+        </p:txBody>
+      </p:sp>
+      <p:sp>
+        <p:nvSpPr>
+          <p:cNvPr id="4" name="Slide Number Placeholder 3"/>
+          <p:cNvSpPr>
+            <a:spLocks noGrp="1"/>
+          </p:cNvSpPr>
+          <p:nvPr>
+            <p:ph type="sldNum" sz="quarter" idx="10"/>
+          </p:nvPr>
+        </p:nvSpPr>
+        <p:spPr/>
+        <p:txBody>
+          <a:bodyPr/>
+          <a:lstStyle/>
+          <a:p>
+            <a:fld id="{23F25543-CDE9-4CD3-908D-BDAD6E318A91}" type="slidenum">
+              <a:rPr lang="en-US" smtClean="0"/>
+              <a:t>3</a:t>
+            </a:fld>
+            <a:endParaRPr lang="en-US"/>
+          </a:p>
+        </p:txBody>
+      </p:sp>
+    </p:spTree>
+    <p:extLst>
+      <p:ext uri="{BB962C8B-B14F-4D97-AF65-F5344CB8AC3E}">
+        <p14:creationId xmlns:p14="http://schemas.microsoft.com/office/powerpoint/2010/main" val="1323894078"/>
+      </p:ext>
+    </p:extLst>
+  </p:cSld>
+  <p:clrMapOvr>
+    <a:masterClrMapping/>
+  </p:clrMapOvr>
+</p:notes>
+</file>
+
+<file path=ppt/notesSlides/notesSlide4.xml><?xml version="1.0" encoding="utf-8"?>
+<p:notes xmlns:a="http://schemas.openxmlformats.org/drawingml/2006/main" xmlns:r="http://schemas.openxmlformats.org/officeDocument/2006/relationships" xmlns:p="http://schemas.openxmlformats.org/presentationml/2006/main">
+  <p:cSld>
+    <p:spTree>
+      <p:nvGrpSpPr>
+        <p:cNvPr id="1" name=""/>
+        <p:cNvGrpSpPr/>
+        <p:nvPr/>
+      </p:nvGrpSpPr>
+      <p:grpSpPr>
+        <a:xfrm>
+          <a:off x="0" y="0"/>
+          <a:ext cx="0" cy="0"/>
+          <a:chOff x="0" y="0"/>
+          <a:chExt cx="0" cy="0"/>
+        </a:xfrm>
+      </p:grpSpPr>
+      <p:sp>
+        <p:nvSpPr>
+          <p:cNvPr id="2" name="Slide Image Placeholder 1"/>
+          <p:cNvSpPr>
+            <a:spLocks noGrp="1" noRot="1" noChangeAspect="1"/>
+          </p:cNvSpPr>
+          <p:nvPr>
+            <p:ph type="sldImg"/>
+          </p:nvPr>
+        </p:nvSpPr>
+        <p:spPr/>
+      </p:sp>
+      <p:sp>
+        <p:nvSpPr>
+          <p:cNvPr id="3" name="Notes Placeholder 2"/>
+          <p:cNvSpPr>
+            <a:spLocks noGrp="1"/>
+          </p:cNvSpPr>
+          <p:nvPr>
+            <p:ph type="body" idx="1"/>
+          </p:nvPr>
+        </p:nvSpPr>
+        <p:spPr/>
+        <p:txBody>
+          <a:bodyPr/>
+          <a:lstStyle/>
+          <a:p>
+            <a:endParaRPr lang="en-US"/>
+          </a:p>
+        </p:txBody>
+      </p:sp>
+      <p:sp>
+        <p:nvSpPr>
+          <p:cNvPr id="4" name="Slide Number Placeholder 3"/>
+          <p:cNvSpPr>
+            <a:spLocks noGrp="1"/>
+          </p:cNvSpPr>
+          <p:nvPr>
+            <p:ph type="sldNum" sz="quarter" idx="10"/>
+          </p:nvPr>
+        </p:nvSpPr>
+        <p:spPr/>
+        <p:txBody>
+          <a:bodyPr/>
+          <a:lstStyle/>
+          <a:p>
+            <a:fld id="{23F25543-CDE9-4CD3-908D-BDAD6E318A91}" type="slidenum">
+              <a:rPr lang="en-US" smtClean="0"/>
+              <a:t>4</a:t>
+            </a:fld>
+            <a:endParaRPr lang="en-US"/>
+          </a:p>
+        </p:txBody>
+      </p:sp>
+    </p:spTree>
+    <p:extLst>
+      <p:ext uri="{BB962C8B-B14F-4D97-AF65-F5344CB8AC3E}">
+        <p14:creationId xmlns:p14="http://schemas.microsoft.com/office/powerpoint/2010/main" val="4258287050"/>
+      </p:ext>
+    </p:extLst>
+  </p:cSld>
+  <p:clrMapOvr>
+    <a:masterClrMapping/>
+  </p:clrMapOvr>
+</p:notes>
+</file>
+
+<file path=ppt/notesSlides/notesSlide5.xml><?xml version="1.0" encoding="utf-8"?>
+<p:notes xmlns:a="http://schemas.openxmlformats.org/drawingml/2006/main" xmlns:r="http://schemas.openxmlformats.org/officeDocument/2006/relationships" xmlns:p="http://schemas.openxmlformats.org/presentationml/2006/main">
+  <p:cSld>
+    <p:spTree>
+      <p:nvGrpSpPr>
+        <p:cNvPr id="1" name=""/>
+        <p:cNvGrpSpPr/>
+        <p:nvPr/>
+      </p:nvGrpSpPr>
+      <p:grpSpPr>
+        <a:xfrm>
+          <a:off x="0" y="0"/>
+          <a:ext cx="0" cy="0"/>
+          <a:chOff x="0" y="0"/>
+          <a:chExt cx="0" cy="0"/>
+        </a:xfrm>
+      </p:grpSpPr>
+      <p:sp>
+        <p:nvSpPr>
+          <p:cNvPr id="2" name="Slide Image Placeholder 1"/>
+          <p:cNvSpPr>
+            <a:spLocks noGrp="1" noRot="1" noChangeAspect="1"/>
+          </p:cNvSpPr>
+          <p:nvPr>
+            <p:ph type="sldImg"/>
+          </p:nvPr>
+        </p:nvSpPr>
+        <p:spPr/>
+      </p:sp>
+      <p:sp>
+        <p:nvSpPr>
+          <p:cNvPr id="3" name="Notes Placeholder 2"/>
+          <p:cNvSpPr>
+            <a:spLocks noGrp="1"/>
+          </p:cNvSpPr>
+          <p:nvPr>
+            <p:ph type="body" idx="1"/>
+          </p:nvPr>
+        </p:nvSpPr>
+        <p:spPr/>
+        <p:txBody>
+          <a:bodyPr/>
+          <a:lstStyle/>
+          <a:p>
+            <a:endParaRPr lang="en-US"/>
+          </a:p>
+        </p:txBody>
+      </p:sp>
+      <p:sp>
+        <p:nvSpPr>
+          <p:cNvPr id="4" name="Slide Number Placeholder 3"/>
+          <p:cNvSpPr>
+            <a:spLocks noGrp="1"/>
+          </p:cNvSpPr>
+          <p:nvPr>
+            <p:ph type="sldNum" sz="quarter" idx="10"/>
+          </p:nvPr>
+        </p:nvSpPr>
+        <p:spPr/>
+        <p:txBody>
+          <a:bodyPr/>
+          <a:lstStyle/>
+          <a:p>
+            <a:fld id="{23F25543-CDE9-4CD3-908D-BDAD6E318A91}" type="slidenum">
+              <a:rPr lang="en-US" smtClean="0"/>
+              <a:t>5</a:t>
+            </a:fld>
+            <a:endParaRPr lang="en-US"/>
+          </a:p>
+        </p:txBody>
+      </p:sp>
+    </p:spTree>
+    <p:extLst>
+      <p:ext uri="{BB962C8B-B14F-4D97-AF65-F5344CB8AC3E}">
+        <p14:creationId xmlns:p14="http://schemas.microsoft.com/office/powerpoint/2010/main" val="2924614641"/>
+      </p:ext>
+    </p:extLst>
+  </p:cSld>
+  <p:clrMapOvr>
+    <a:masterClrMapping/>
+  </p:clrMapOvr>
+</p:notes>
+</file>
+
+<file path=ppt/notesSlides/notesSlide6.xml><?xml version="1.0" encoding="utf-8"?>
+<p:notes xmlns:a="http://schemas.openxmlformats.org/drawingml/2006/main" xmlns:r="http://schemas.openxmlformats.org/officeDocument/2006/relationships" xmlns:p="http://schemas.openxmlformats.org/presentationml/2006/main">
+  <p:cSld>
+    <p:spTree>
+      <p:nvGrpSpPr>
+        <p:cNvPr id="1" name=""/>
+        <p:cNvGrpSpPr/>
+        <p:nvPr/>
+      </p:nvGrpSpPr>
+      <p:grpSpPr>
+        <a:xfrm>
+          <a:off x="0" y="0"/>
+          <a:ext cx="0" cy="0"/>
+          <a:chOff x="0" y="0"/>
+          <a:chExt cx="0" cy="0"/>
+        </a:xfrm>
+      </p:grpSpPr>
+      <p:sp>
+        <p:nvSpPr>
+          <p:cNvPr id="2" name="Slide Image Placeholder 1"/>
+          <p:cNvSpPr>
+            <a:spLocks noGrp="1" noRot="1" noChangeAspect="1"/>
+          </p:cNvSpPr>
+          <p:nvPr>
+            <p:ph type="sldImg"/>
+          </p:nvPr>
+        </p:nvSpPr>
+        <p:spPr/>
+      </p:sp>
+      <p:sp>
+        <p:nvSpPr>
+          <p:cNvPr id="3" name="Notes Placeholder 2"/>
+          <p:cNvSpPr>
+            <a:spLocks noGrp="1"/>
+          </p:cNvSpPr>
+          <p:nvPr>
+            <p:ph type="body" idx="1"/>
+          </p:nvPr>
+        </p:nvSpPr>
+        <p:spPr/>
+        <p:txBody>
+          <a:bodyPr/>
+          <a:lstStyle/>
+          <a:p>
+            <a:endParaRPr lang="en-US"/>
+          </a:p>
+        </p:txBody>
+      </p:sp>
+      <p:sp>
+        <p:nvSpPr>
+          <p:cNvPr id="4" name="Slide Number Placeholder 3"/>
+          <p:cNvSpPr>
+            <a:spLocks noGrp="1"/>
+          </p:cNvSpPr>
+          <p:nvPr>
+            <p:ph type="sldNum" sz="quarter" idx="10"/>
+          </p:nvPr>
+        </p:nvSpPr>
+        <p:spPr/>
+        <p:txBody>
+          <a:bodyPr/>
+          <a:lstStyle/>
+          <a:p>
+            <a:fld id="{23F25543-CDE9-4CD3-908D-BDAD6E318A91}" type="slidenum">
+              <a:rPr lang="en-US" smtClean="0"/>
+              <a:t>6</a:t>
+            </a:fld>
+            <a:endParaRPr lang="en-US"/>
+          </a:p>
+        </p:txBody>
+      </p:sp>
+    </p:spTree>
+    <p:extLst>
+      <p:ext uri="{BB962C8B-B14F-4D97-AF65-F5344CB8AC3E}">
+        <p14:creationId xmlns:p14="http://schemas.microsoft.com/office/powerpoint/2010/main" val="1717325897"/>
+      </p:ext>
+    </p:extLst>
+  </p:cSld>
+  <p:clrMapOvr>
+    <a:masterClrMapping/>
+  </p:clrMapOvr>
+</p:notes>
+</file>
+
+<file path=ppt/notesSlides/notesSlide7.xml><?xml version="1.0" encoding="utf-8"?>
+<p:notes xmlns:a="http://schemas.openxmlformats.org/drawingml/2006/main" xmlns:r="http://schemas.openxmlformats.org/officeDocument/2006/relationships" xmlns:p="http://schemas.openxmlformats.org/presentationml/2006/main">
+  <p:cSld>
+    <p:spTree>
+      <p:nvGrpSpPr>
+        <p:cNvPr id="1" name=""/>
+        <p:cNvGrpSpPr/>
+        <p:nvPr/>
+      </p:nvGrpSpPr>
+      <p:grpSpPr>
+        <a:xfrm>
+          <a:off x="0" y="0"/>
+          <a:ext cx="0" cy="0"/>
+          <a:chOff x="0" y="0"/>
+          <a:chExt cx="0" cy="0"/>
+        </a:xfrm>
+      </p:grpSpPr>
+      <p:sp>
+        <p:nvSpPr>
+          <p:cNvPr id="2" name="Slide Image Placeholder 1"/>
+          <p:cNvSpPr>
+            <a:spLocks noGrp="1" noRot="1" noChangeAspect="1"/>
+          </p:cNvSpPr>
+          <p:nvPr>
+            <p:ph type="sldImg"/>
+          </p:nvPr>
+        </p:nvSpPr>
+        <p:spPr/>
+      </p:sp>
+      <p:sp>
+        <p:nvSpPr>
+          <p:cNvPr id="3" name="Notes Placeholder 2"/>
+          <p:cNvSpPr>
+            <a:spLocks noGrp="1"/>
+          </p:cNvSpPr>
+          <p:nvPr>
+            <p:ph type="body" idx="1"/>
+          </p:nvPr>
+        </p:nvSpPr>
+        <p:spPr/>
+        <p:txBody>
+          <a:bodyPr/>
+          <a:lstStyle/>
+          <a:p>
+            <a:r>
+              <a:rPr lang="en-US" dirty="0" err="1" smtClean="0"/>
+              <a:t>WER</a:t>
+            </a:r>
+            <a:r>
+              <a:rPr lang="en-US" dirty="0" smtClean="0"/>
+              <a:t>: phone sequence for an infrequent word that matches the pronunciation of a different and more frequent word that would now be </a:t>
+            </a:r>
+            <a:r>
+              <a:rPr lang="en-US" dirty="0" err="1" smtClean="0"/>
+              <a:t>mirecognized</a:t>
+            </a:r>
+            <a:endParaRPr lang="en-US" dirty="0" smtClean="0"/>
+          </a:p>
+          <a:p>
+            <a:endParaRPr lang="en-US" dirty="0" smtClean="0"/>
+          </a:p>
+          <a:p>
+            <a:r>
+              <a:rPr lang="en-US" dirty="0" err="1" smtClean="0"/>
+              <a:t>SxS</a:t>
+            </a:r>
+            <a:r>
+              <a:rPr lang="en-US" dirty="0" smtClean="0"/>
+              <a:t>: Acoustic model, language model, and vocabulary are the same in both engines. Only the lexicon changes.</a:t>
+            </a:r>
+            <a:endParaRPr lang="en-US" dirty="0"/>
+          </a:p>
+          <a:p>
+            <a:endParaRPr lang="en-US" dirty="0"/>
+          </a:p>
+          <a:p>
+            <a:r>
+              <a:rPr lang="en-US" dirty="0" err="1" smtClean="0"/>
+              <a:t>SxS</a:t>
+            </a:r>
+            <a:r>
+              <a:rPr lang="en-US" dirty="0" smtClean="0"/>
+              <a:t> </a:t>
+            </a:r>
+            <a:r>
+              <a:rPr lang="en-US" dirty="0"/>
+              <a:t>experiments have the advantage of focusing </a:t>
+            </a:r>
+            <a:r>
+              <a:rPr lang="en-US" dirty="0" smtClean="0"/>
+              <a:t>on cases </a:t>
+            </a:r>
+            <a:r>
+              <a:rPr lang="en-US" dirty="0"/>
+              <a:t>where pronunciation changes do affect the recognition </a:t>
+            </a:r>
+            <a:r>
+              <a:rPr lang="en-US" dirty="0" smtClean="0"/>
+              <a:t>results. They </a:t>
+            </a:r>
+            <a:r>
+              <a:rPr lang="en-US" dirty="0"/>
+              <a:t>typically show more “movement” than </a:t>
+            </a:r>
+            <a:r>
+              <a:rPr lang="en-US" dirty="0" err="1"/>
+              <a:t>WER</a:t>
+            </a:r>
+            <a:r>
+              <a:rPr lang="en-US" dirty="0"/>
+              <a:t> </a:t>
+            </a:r>
+            <a:r>
+              <a:rPr lang="en-US" dirty="0" smtClean="0"/>
+              <a:t>measurements on </a:t>
+            </a:r>
+            <a:r>
+              <a:rPr lang="en-US" dirty="0"/>
+              <a:t>fixed test sets.</a:t>
+            </a:r>
+          </a:p>
+        </p:txBody>
+      </p:sp>
+      <p:sp>
+        <p:nvSpPr>
+          <p:cNvPr id="4" name="Slide Number Placeholder 3"/>
+          <p:cNvSpPr>
+            <a:spLocks noGrp="1"/>
+          </p:cNvSpPr>
+          <p:nvPr>
+            <p:ph type="sldNum" sz="quarter" idx="10"/>
+          </p:nvPr>
+        </p:nvSpPr>
+        <p:spPr/>
+        <p:txBody>
+          <a:bodyPr/>
+          <a:lstStyle/>
+          <a:p>
+            <a:fld id="{23F25543-CDE9-4CD3-908D-BDAD6E318A91}" type="slidenum">
+              <a:rPr lang="en-US" smtClean="0"/>
+              <a:t>7</a:t>
+            </a:fld>
+            <a:endParaRPr lang="en-US"/>
+          </a:p>
+        </p:txBody>
+      </p:sp>
+    </p:spTree>
+    <p:extLst>
+      <p:ext uri="{BB962C8B-B14F-4D97-AF65-F5344CB8AC3E}">
+        <p14:creationId xmlns:p14="http://schemas.microsoft.com/office/powerpoint/2010/main" val="2932354260"/>
+      </p:ext>
+    </p:extLst>
+  </p:cSld>
+  <p:clrMapOvr>
+    <a:masterClrMapping/>
+  </p:clrMapOvr>
+</p:notes>
+</file>
+
+<file path=ppt/notesSlides/notesSlide8.xml><?xml version="1.0" encoding="utf-8"?>
+<p:notes xmlns:a="http://schemas.openxmlformats.org/drawingml/2006/main" xmlns:r="http://schemas.openxmlformats.org/officeDocument/2006/relationships" xmlns:p="http://schemas.openxmlformats.org/presentationml/2006/main">
+  <p:cSld>
+    <p:spTree>
+      <p:nvGrpSpPr>
+        <p:cNvPr id="1" name=""/>
+        <p:cNvGrpSpPr/>
+        <p:nvPr/>
+      </p:nvGrpSpPr>
+      <p:grpSpPr>
+        <a:xfrm>
+          <a:off x="0" y="0"/>
+          <a:ext cx="0" cy="0"/>
+          <a:chOff x="0" y="0"/>
+          <a:chExt cx="0" cy="0"/>
+        </a:xfrm>
+      </p:grpSpPr>
+      <p:sp>
+        <p:nvSpPr>
+          <p:cNvPr id="2" name="Slide Image Placeholder 1"/>
+          <p:cNvSpPr>
+            <a:spLocks noGrp="1" noRot="1" noChangeAspect="1"/>
+          </p:cNvSpPr>
+          <p:nvPr>
+            <p:ph type="sldImg"/>
+          </p:nvPr>
+        </p:nvSpPr>
+        <p:spPr/>
+      </p:sp>
+      <p:sp>
+        <p:nvSpPr>
+          <p:cNvPr id="3" name="Notes Placeholder 2"/>
+          <p:cNvSpPr>
+            <a:spLocks noGrp="1"/>
+          </p:cNvSpPr>
+          <p:nvPr>
+            <p:ph type="body" idx="1"/>
+          </p:nvPr>
+        </p:nvSpPr>
+        <p:spPr/>
+        <p:txBody>
+          <a:bodyPr/>
+          <a:lstStyle/>
+          <a:p>
+            <a:r>
+              <a:rPr lang="en-US" dirty="0" smtClean="0"/>
+              <a:t>An experiment is considered positive if its </a:t>
+            </a:r>
+            <a:r>
+              <a:rPr lang="en-US" dirty="0" err="1" smtClean="0"/>
+              <a:t>SxS</a:t>
+            </a:r>
+            <a:r>
+              <a:rPr lang="en-US" dirty="0" smtClean="0"/>
+              <a:t> score is higher than that of the corresponding baseline. Generally this means it has fewer nonsense/unusable queries and more usable and exact queries.</a:t>
+            </a:r>
+          </a:p>
+          <a:p>
+            <a:endParaRPr lang="en-US" dirty="0" smtClean="0"/>
+          </a:p>
+          <a:p>
+            <a:r>
+              <a:rPr lang="en-US" dirty="0" smtClean="0"/>
+              <a:t>Keyboard Correction:</a:t>
+            </a:r>
+          </a:p>
+          <a:p>
+            <a:r>
+              <a:rPr lang="en-US" dirty="0" smtClean="0"/>
+              <a:t>We </a:t>
+            </a:r>
+            <a:r>
+              <a:rPr lang="en-US" dirty="0"/>
+              <a:t>see a small reduction in word error rate on each test </a:t>
+            </a:r>
+            <a:r>
+              <a:rPr lang="en-US" dirty="0" smtClean="0"/>
+              <a:t>set.</a:t>
+            </a:r>
+          </a:p>
+          <a:p>
+            <a:r>
+              <a:rPr lang="en-US" dirty="0" err="1" smtClean="0"/>
+              <a:t>SxS</a:t>
+            </a:r>
+            <a:r>
+              <a:rPr lang="en-US" dirty="0" smtClean="0"/>
+              <a:t> score improvements from adding new pronunciations to the baseline ASR engine</a:t>
+            </a:r>
+          </a:p>
+          <a:p>
+            <a:endParaRPr lang="en-US" dirty="0"/>
+          </a:p>
+          <a:p>
+            <a:r>
+              <a:rPr lang="en-US" dirty="0" smtClean="0"/>
+              <a:t>Alternate Selection:</a:t>
+            </a:r>
+          </a:p>
+          <a:p>
+            <a:r>
+              <a:rPr lang="en-US" dirty="0" smtClean="0"/>
+              <a:t>The </a:t>
+            </a:r>
+            <a:r>
+              <a:rPr lang="en-US" dirty="0"/>
+              <a:t>amount of data flowing through the Alternate Selection </a:t>
+            </a:r>
+            <a:r>
+              <a:rPr lang="en-US" dirty="0" smtClean="0"/>
+              <a:t>pipeline is </a:t>
+            </a:r>
+            <a:r>
+              <a:rPr lang="en-US" dirty="0"/>
+              <a:t>smaller than that from Keyboard Corrections. As a result, </a:t>
+            </a:r>
+            <a:r>
+              <a:rPr lang="en-US" dirty="0" smtClean="0"/>
+              <a:t>the system </a:t>
+            </a:r>
+            <a:r>
+              <a:rPr lang="en-US" dirty="0"/>
+              <a:t>learns fewer pronunciations, and our experiments showed </a:t>
+            </a:r>
+            <a:r>
+              <a:rPr lang="en-US" dirty="0" smtClean="0"/>
+              <a:t>no impact </a:t>
+            </a:r>
+            <a:r>
+              <a:rPr lang="en-US" dirty="0"/>
+              <a:t>on standard test set word error rates. However, </a:t>
+            </a:r>
+            <a:r>
+              <a:rPr lang="en-US" dirty="0" err="1"/>
+              <a:t>SxS</a:t>
+            </a:r>
+            <a:r>
+              <a:rPr lang="en-US" dirty="0"/>
+              <a:t> </a:t>
+            </a:r>
+            <a:r>
+              <a:rPr lang="en-US" dirty="0" smtClean="0"/>
+              <a:t>evaluations showed </a:t>
+            </a:r>
+            <a:r>
+              <a:rPr lang="en-US" dirty="0"/>
+              <a:t>significant improvements</a:t>
+            </a:r>
+            <a:r>
+              <a:rPr lang="en-US" dirty="0" smtClean="0"/>
+              <a:t>.</a:t>
+            </a:r>
+          </a:p>
+          <a:p>
+            <a:endParaRPr lang="en-US" dirty="0"/>
+          </a:p>
+          <a:p>
+            <a:r>
+              <a:rPr lang="en-US" dirty="0" smtClean="0"/>
+              <a:t>Side-by-side experiments demonstrate that the pronunciations learned via our methods significantly improve the quality of a production-quality speech recognition system.</a:t>
+            </a:r>
+          </a:p>
+          <a:p>
+            <a:endParaRPr lang="en-US" dirty="0" smtClean="0"/>
+          </a:p>
+          <a:p>
+            <a:endParaRPr lang="en-US" dirty="0"/>
+          </a:p>
+        </p:txBody>
+      </p:sp>
+      <p:sp>
+        <p:nvSpPr>
+          <p:cNvPr id="4" name="Slide Number Placeholder 3"/>
+          <p:cNvSpPr>
+            <a:spLocks noGrp="1"/>
+          </p:cNvSpPr>
+          <p:nvPr>
+            <p:ph type="sldNum" sz="quarter" idx="10"/>
+          </p:nvPr>
+        </p:nvSpPr>
+        <p:spPr/>
+        <p:txBody>
+          <a:bodyPr/>
+          <a:lstStyle/>
+          <a:p>
+            <a:fld id="{23F25543-CDE9-4CD3-908D-BDAD6E318A91}" type="slidenum">
+              <a:rPr lang="en-US" smtClean="0"/>
+              <a:t>8</a:t>
+            </a:fld>
+            <a:endParaRPr lang="en-US"/>
+          </a:p>
+        </p:txBody>
+      </p:sp>
+    </p:spTree>
+    <p:extLst>
+      <p:ext uri="{BB962C8B-B14F-4D97-AF65-F5344CB8AC3E}">
+        <p14:creationId xmlns:p14="http://schemas.microsoft.com/office/powerpoint/2010/main" val="2271397538"/>
+      </p:ext>
+    </p:extLst>
+  </p:cSld>
+  <p:clrMapOvr>
+    <a:masterClrMapping/>
+  </p:clrMapOvr>
+</p:notes>
+</file>
+
+<file path=ppt/notesSlides/notesSlide9.xml><?xml version="1.0" encoding="utf-8"?>
+<p:notes xmlns:a="http://schemas.openxmlformats.org/drawingml/2006/main" xmlns:r="http://schemas.openxmlformats.org/officeDocument/2006/relationships" xmlns:p="http://schemas.openxmlformats.org/presentationml/2006/main">
+  <p:cSld>
+    <p:spTree>
+      <p:nvGrpSpPr>
+        <p:cNvPr id="1" name=""/>
+        <p:cNvGrpSpPr/>
+        <p:nvPr/>
+      </p:nvGrpSpPr>
+      <p:grpSpPr>
+        <a:xfrm>
+          <a:off x="0" y="0"/>
+          <a:ext cx="0" cy="0"/>
+          <a:chOff x="0" y="0"/>
+          <a:chExt cx="0" cy="0"/>
+        </a:xfrm>
+      </p:grpSpPr>
+      <p:sp>
+        <p:nvSpPr>
+          <p:cNvPr id="2" name="Slide Image Placeholder 1"/>
+          <p:cNvSpPr>
+            <a:spLocks noGrp="1" noRot="1" noChangeAspect="1"/>
+          </p:cNvSpPr>
+          <p:nvPr>
+            <p:ph type="sldImg"/>
+          </p:nvPr>
+        </p:nvSpPr>
+        <p:spPr/>
+      </p:sp>
+      <p:sp>
+        <p:nvSpPr>
+          <p:cNvPr id="3" name="Notes Placeholder 2"/>
+          <p:cNvSpPr>
+            <a:spLocks noGrp="1"/>
+          </p:cNvSpPr>
+          <p:nvPr>
+            <p:ph type="body" idx="1"/>
+          </p:nvPr>
+        </p:nvSpPr>
+        <p:spPr/>
+        <p:txBody>
+          <a:bodyPr/>
+          <a:lstStyle/>
+          <a:p>
+            <a:endParaRPr lang="en-US"/>
+          </a:p>
+        </p:txBody>
+      </p:sp>
+      <p:sp>
+        <p:nvSpPr>
+          <p:cNvPr id="4" name="Slide Number Placeholder 3"/>
+          <p:cNvSpPr>
+            <a:spLocks noGrp="1"/>
+          </p:cNvSpPr>
+          <p:nvPr>
+            <p:ph type="sldNum" sz="quarter" idx="10"/>
+          </p:nvPr>
+        </p:nvSpPr>
+        <p:spPr/>
+        <p:txBody>
+          <a:bodyPr/>
+          <a:lstStyle/>
+          <a:p>
+            <a:fld id="{23F25543-CDE9-4CD3-908D-BDAD6E318A91}" type="slidenum">
+              <a:rPr lang="en-US" smtClean="0"/>
+              <a:t>9</a:t>
+            </a:fld>
+            <a:endParaRPr lang="en-US"/>
+          </a:p>
+        </p:txBody>
+      </p:sp>
+    </p:spTree>
+    <p:extLst>
+      <p:ext uri="{BB962C8B-B14F-4D97-AF65-F5344CB8AC3E}">
+        <p14:creationId xmlns:p14="http://schemas.microsoft.com/office/powerpoint/2010/main" val="2756502993"/>
+      </p:ext>
+    </p:extLst>
+  </p:cSld>
+  <p:clrMapOvr>
+    <a:masterClrMapping/>
+  </p:clrMapOvr>
+</p:notes>
 </file>
 
 <file path=ppt/slideLayouts/slideLayout1.xml><?xml version="1.0" encoding="utf-8"?>
@@ -244,7 +1757,7 @@
           <a:p>
             <a:fld id="{48A87A34-81AB-432B-8DAE-1953F412C126}" type="datetimeFigureOut">
               <a:rPr lang="en-US" dirty="0"/>
-              <a:t>22-Feb-16</a:t>
+              <a:t>24-Feb-16</a:t>
             </a:fld>
             <a:endParaRPr lang="en-US" dirty="0"/>
           </a:p>
@@ -526,7 +2039,7 @@
           <a:p>
             <a:fld id="{48A87A34-81AB-432B-8DAE-1953F412C126}" type="datetimeFigureOut">
               <a:rPr lang="en-US" dirty="0"/>
-              <a:t>22-Feb-16</a:t>
+              <a:t>24-Feb-16</a:t>
             </a:fld>
             <a:endParaRPr lang="en-US" dirty="0"/>
           </a:p>
@@ -713,7 +2226,7 @@
           <a:p>
             <a:fld id="{48A87A34-81AB-432B-8DAE-1953F412C126}" type="datetimeFigureOut">
               <a:rPr lang="en-US" dirty="0"/>
-              <a:t>22-Feb-16</a:t>
+              <a:t>24-Feb-16</a:t>
             </a:fld>
             <a:endParaRPr lang="en-US" dirty="0"/>
           </a:p>
@@ -969,7 +2482,7 @@
           <a:p>
             <a:fld id="{48A87A34-81AB-432B-8DAE-1953F412C126}" type="datetimeFigureOut">
               <a:rPr lang="en-US" dirty="0"/>
-              <a:t>22-Feb-16</a:t>
+              <a:t>24-Feb-16</a:t>
             </a:fld>
             <a:endParaRPr lang="en-US" dirty="0"/>
           </a:p>
@@ -1388,7 +2901,7 @@
           <a:p>
             <a:fld id="{48A87A34-81AB-432B-8DAE-1953F412C126}" type="datetimeFigureOut">
               <a:rPr lang="en-US" dirty="0"/>
-              <a:t>22-Feb-16</a:t>
+              <a:t>24-Feb-16</a:t>
             </a:fld>
             <a:endParaRPr lang="en-US" dirty="0"/>
           </a:p>
@@ -1929,7 +3442,7 @@
           <a:p>
             <a:fld id="{48A87A34-81AB-432B-8DAE-1953F412C126}" type="datetimeFigureOut">
               <a:rPr lang="en-US" dirty="0"/>
-              <a:t>22-Feb-16</a:t>
+              <a:t>24-Feb-16</a:t>
             </a:fld>
             <a:endParaRPr lang="en-US" dirty="0"/>
           </a:p>
@@ -2764,7 +4277,7 @@
           <a:p>
             <a:fld id="{48A87A34-81AB-432B-8DAE-1953F412C126}" type="datetimeFigureOut">
               <a:rPr lang="en-US" dirty="0"/>
-              <a:t>22-Feb-16</a:t>
+              <a:t>24-Feb-16</a:t>
             </a:fld>
             <a:endParaRPr lang="en-US" dirty="0"/>
           </a:p>
@@ -2929,7 +4442,7 @@
           <a:p>
             <a:fld id="{48A87A34-81AB-432B-8DAE-1953F412C126}" type="datetimeFigureOut">
               <a:rPr lang="en-US" dirty="0"/>
-              <a:t>22-Feb-16</a:t>
+              <a:t>24-Feb-16</a:t>
             </a:fld>
             <a:endParaRPr lang="en-US" dirty="0"/>
           </a:p>
@@ -3108,7 +4621,7 @@
           <a:p>
             <a:fld id="{48A87A34-81AB-432B-8DAE-1953F412C126}" type="datetimeFigureOut">
               <a:rPr lang="en-US" dirty="0"/>
-              <a:t>22-Feb-16</a:t>
+              <a:t>24-Feb-16</a:t>
             </a:fld>
             <a:endParaRPr lang="en-US" dirty="0"/>
           </a:p>
@@ -3273,7 +4786,7 @@
           <a:p>
             <a:fld id="{48A87A34-81AB-432B-8DAE-1953F412C126}" type="datetimeFigureOut">
               <a:rPr lang="en-US" dirty="0"/>
-              <a:t>22-Feb-16</a:t>
+              <a:t>24-Feb-16</a:t>
             </a:fld>
             <a:endParaRPr lang="en-US" dirty="0"/>
           </a:p>
@@ -3516,7 +5029,7 @@
           <a:p>
             <a:fld id="{48A87A34-81AB-432B-8DAE-1953F412C126}" type="datetimeFigureOut">
               <a:rPr lang="en-US" dirty="0"/>
-              <a:t>22-Feb-16</a:t>
+              <a:t>24-Feb-16</a:t>
             </a:fld>
             <a:endParaRPr lang="en-US" dirty="0"/>
           </a:p>
@@ -3748,7 +5261,7 @@
           <a:p>
             <a:fld id="{48A87A34-81AB-432B-8DAE-1953F412C126}" type="datetimeFigureOut">
               <a:rPr lang="en-US" dirty="0"/>
-              <a:t>22-Feb-16</a:t>
+              <a:t>24-Feb-16</a:t>
             </a:fld>
             <a:endParaRPr lang="en-US" dirty="0"/>
           </a:p>
@@ -4116,7 +5629,7 @@
           <a:p>
             <a:fld id="{48A87A34-81AB-432B-8DAE-1953F412C126}" type="datetimeFigureOut">
               <a:rPr lang="en-US" dirty="0"/>
-              <a:t>22-Feb-16</a:t>
+              <a:t>24-Feb-16</a:t>
             </a:fld>
             <a:endParaRPr lang="en-US" dirty="0"/>
           </a:p>
@@ -4229,7 +5742,7 @@
           <a:p>
             <a:fld id="{48A87A34-81AB-432B-8DAE-1953F412C126}" type="datetimeFigureOut">
               <a:rPr lang="en-US" dirty="0"/>
-              <a:t>22-Feb-16</a:t>
+              <a:t>24-Feb-16</a:t>
             </a:fld>
             <a:endParaRPr lang="en-US" dirty="0"/>
           </a:p>
@@ -4319,7 +5832,7 @@
           <a:p>
             <a:fld id="{48A87A34-81AB-432B-8DAE-1953F412C126}" type="datetimeFigureOut">
               <a:rPr lang="en-US" dirty="0"/>
-              <a:t>22-Feb-16</a:t>
+              <a:t>24-Feb-16</a:t>
             </a:fld>
             <a:endParaRPr lang="en-US" dirty="0"/>
           </a:p>
@@ -4565,7 +6078,7 @@
           <a:p>
             <a:fld id="{48A87A34-81AB-432B-8DAE-1953F412C126}" type="datetimeFigureOut">
               <a:rPr lang="en-US" dirty="0"/>
-              <a:t>22-Feb-16</a:t>
+              <a:t>24-Feb-16</a:t>
             </a:fld>
             <a:endParaRPr lang="en-US" dirty="0"/>
           </a:p>
@@ -4847,7 +6360,7 @@
           <a:p>
             <a:fld id="{48A87A34-81AB-432B-8DAE-1953F412C126}" type="datetimeFigureOut">
               <a:rPr lang="en-US" dirty="0"/>
-              <a:t>22-Feb-16</a:t>
+              <a:t>24-Feb-16</a:t>
             </a:fld>
             <a:endParaRPr lang="en-US" dirty="0"/>
           </a:p>
@@ -5056,7 +6569,7 @@
             <a:fld id="{48A87A34-81AB-432B-8DAE-1953F412C126}" type="datetimeFigureOut">
               <a:rPr lang="en-US" dirty="0"/>
               <a:pPr/>
-              <a:t>22-Feb-16</a:t>
+              <a:t>24-Feb-16</a:t>
             </a:fld>
             <a:endParaRPr lang="en-US" dirty="0"/>
           </a:p>
@@ -5545,19 +7058,19 @@
         </p:nvSpPr>
         <p:spPr>
           <a:xfrm>
-            <a:off x="1595269" y="914400"/>
-            <a:ext cx="9001462" cy="3300984"/>
+            <a:off x="1371600" y="914400"/>
+            <a:ext cx="9235440" cy="3300984"/>
           </a:xfrm>
         </p:spPr>
         <p:txBody>
-          <a:bodyPr>
+          <a:bodyPr anchor="ctr" anchorCtr="0">
             <a:normAutofit fontScale="90000"/>
           </a:bodyPr>
           <a:lstStyle/>
           <a:p>
             <a:r>
               <a:rPr lang="en-US" dirty="0" smtClean="0"/>
-              <a:t>Fix it where it fails: pronunciation learning by mining error correction from speech logs</a:t>
+              <a:t>Fix it where it fails: pronunciation learning by mining error corrections from speech logs</a:t>
             </a:r>
             <a:endParaRPr lang="en-US" dirty="0"/>
           </a:p>
@@ -5600,12 +7113,8 @@
               <a:t> Peng, </a:t>
             </a:r>
             <a:r>
-              <a:rPr lang="en-US" dirty="0" err="1"/>
-              <a:t>Franc¸oise</a:t>
-            </a:r>
-            <a:r>
-              <a:rPr lang="en-US" dirty="0"/>
-              <a:t> </a:t>
+              <a:rPr lang="en-US" dirty="0" smtClean="0"/>
+              <a:t>Françoise </a:t>
             </a:r>
             <a:r>
               <a:rPr lang="en-US" dirty="0" err="1"/>
@@ -5670,12 +7179,21 @@
             <p:ph type="title"/>
           </p:nvPr>
         </p:nvSpPr>
-        <p:spPr/>
-        <p:txBody>
-          <a:bodyPr/>
-          <a:lstStyle/>
-          <a:p>
-            <a:endParaRPr lang="en-US"/>
+        <p:spPr>
+          <a:xfrm>
+            <a:off x="913795" y="457200"/>
+            <a:ext cx="10353761" cy="914400"/>
+          </a:xfrm>
+        </p:spPr>
+        <p:txBody>
+          <a:bodyPr/>
+          <a:lstStyle/>
+          <a:p>
+            <a:r>
+              <a:rPr lang="en-US" dirty="0" smtClean="0"/>
+              <a:t>Overview</a:t>
+            </a:r>
+            <a:endParaRPr lang="en-US" dirty="0"/>
           </a:p>
         </p:txBody>
       </p:sp>
@@ -5689,19 +7207,128 @@
             <p:ph idx="1"/>
           </p:nvPr>
         </p:nvSpPr>
-        <p:spPr/>
-        <p:txBody>
-          <a:bodyPr/>
-          <a:lstStyle/>
-          <a:p>
-            <a:endParaRPr lang="en-US"/>
+        <p:spPr>
+          <a:xfrm>
+            <a:off x="913795" y="1600200"/>
+            <a:ext cx="10353762" cy="4572000"/>
+          </a:xfrm>
+        </p:spPr>
+        <p:txBody>
+          <a:bodyPr/>
+          <a:lstStyle/>
+          <a:p>
+            <a:r>
+              <a:rPr lang="en-US" dirty="0" smtClean="0"/>
+              <a:t>Automatic speech recognition (ASR) systems include a pronunciation dictionary (or lexicon) and a grapheme </a:t>
+            </a:r>
+            <a:r>
+              <a:rPr lang="en-US" dirty="0"/>
+              <a:t>to phoneme </a:t>
+            </a:r>
+            <a:r>
+              <a:rPr lang="en-US" dirty="0" smtClean="0"/>
+              <a:t>(</a:t>
+            </a:r>
+            <a:r>
+              <a:rPr lang="en-US" dirty="0" err="1"/>
+              <a:t>G2P</a:t>
+            </a:r>
+            <a:r>
+              <a:rPr lang="en-US" dirty="0" smtClean="0"/>
+              <a:t>) engine</a:t>
+            </a:r>
+          </a:p>
+          <a:p>
+            <a:pPr lvl="1"/>
+            <a:r>
+              <a:rPr lang="en-US" dirty="0" smtClean="0"/>
+              <a:t>The lexicon consists of word-pronunciation pairs written by linguist</a:t>
+            </a:r>
+          </a:p>
+          <a:p>
+            <a:pPr lvl="2"/>
+            <a:r>
+              <a:rPr lang="en-US" dirty="0" smtClean="0"/>
+              <a:t>Hand-generated – cannot keep up with growing vocabulary</a:t>
+            </a:r>
+          </a:p>
+          <a:p>
+            <a:pPr lvl="1"/>
+            <a:r>
+              <a:rPr lang="en-US" dirty="0" err="1" smtClean="0"/>
+              <a:t>G2P</a:t>
+            </a:r>
+            <a:r>
+              <a:rPr lang="en-US" dirty="0" smtClean="0"/>
+              <a:t> has limited accuracy</a:t>
+            </a:r>
+          </a:p>
+          <a:p>
+            <a:pPr lvl="2"/>
+            <a:r>
+              <a:rPr lang="en-US" dirty="0" smtClean="0"/>
+              <a:t>Proper names – pronunciation can be influenced by historical or foreign-origin factors</a:t>
+            </a:r>
+          </a:p>
+          <a:p>
+            <a:r>
+              <a:rPr lang="en-US" dirty="0"/>
+              <a:t>Speech recognition task </a:t>
+            </a:r>
+            <a:r>
+              <a:rPr lang="en-US" dirty="0" smtClean="0"/>
+              <a:t>in general finds </a:t>
+            </a:r>
+            <a:r>
+              <a:rPr lang="en-US" dirty="0"/>
+              <a:t>the word sequence that has the </a:t>
+            </a:r>
+            <a:r>
+              <a:rPr lang="en-US" dirty="0" smtClean="0"/>
+              <a:t>maximum </a:t>
+            </a:r>
+            <a:r>
+              <a:rPr lang="en-US" dirty="0"/>
+              <a:t>posterior probability given the acoustic </a:t>
+            </a:r>
+            <a:r>
+              <a:rPr lang="en-US" dirty="0" smtClean="0"/>
+              <a:t>observations</a:t>
+            </a:r>
+          </a:p>
+          <a:p>
+            <a:pPr lvl="1"/>
+            <a:r>
+              <a:rPr lang="en-US" dirty="0" smtClean="0"/>
+              <a:t>Relies heavily on a lexicon</a:t>
+            </a:r>
+          </a:p>
+          <a:p>
+            <a:pPr lvl="1"/>
+            <a:r>
+              <a:rPr lang="en-US" dirty="0" smtClean="0"/>
+              <a:t>Uses a </a:t>
+            </a:r>
+            <a:r>
+              <a:rPr lang="en-US" dirty="0" err="1" smtClean="0"/>
+              <a:t>G2P</a:t>
+            </a:r>
+            <a:r>
+              <a:rPr lang="en-US" dirty="0" smtClean="0"/>
+              <a:t> for words not found in the lexicon</a:t>
+            </a:r>
+            <a:endParaRPr lang="en-US" dirty="0"/>
+          </a:p>
+          <a:p>
+            <a:pPr lvl="2"/>
+            <a:endParaRPr lang="en-US" dirty="0" smtClean="0"/>
           </a:p>
         </p:txBody>
       </p:sp>
     </p:spTree>
     <p:extLst>
       <p:ext uri="{BB962C8B-B14F-4D97-AF65-F5344CB8AC3E}">
-        <p14:creationId xmlns:p14="http://schemas.microsoft.com/office/powerpoint/2010/main" val="582041634"/>
+        <p14:creationId xmlns:p14="http://schemas.microsoft.com/office/powerpoint/2010/main" val="1643602549"/>
       </p:ext>
     </p:extLst>
   </p:cSld>
@@ -5728,70 +7355,176 @@
           <a:chExt cx="0" cy="0"/>
         </a:xfrm>
       </p:grpSpPr>
-      <p:pic>
-        <p:nvPicPr>
-          <p:cNvPr id="2" name="Picture 1"/>
-          <p:cNvPicPr>
-            <a:picLocks noChangeAspect="1"/>
-          </p:cNvPicPr>
-          <p:nvPr/>
-        </p:nvPicPr>
-        <p:blipFill>
-          <a:blip r:embed="rId2">
-            <a:extLst>
-              <a:ext uri="{28A0092B-C50C-407E-A947-70E740481C1C}">
-                <a14:useLocalDpi xmlns:a14="http://schemas.microsoft.com/office/drawing/2010/main" val="0"/>
-              </a:ext>
-            </a:extLst>
-          </a:blip>
-          <a:stretch>
-            <a:fillRect/>
-          </a:stretch>
-        </p:blipFill>
+      <p:sp>
+        <p:nvSpPr>
+          <p:cNvPr id="2" name="Title 1"/>
+          <p:cNvSpPr>
+            <a:spLocks noGrp="1"/>
+          </p:cNvSpPr>
+          <p:nvPr>
+            <p:ph type="title"/>
+          </p:nvPr>
+        </p:nvSpPr>
         <p:spPr>
           <a:xfrm>
-            <a:off x="1025621" y="1663303"/>
-            <a:ext cx="3295819" cy="1371670"/>
+            <a:off x="913795" y="457200"/>
+            <a:ext cx="10353761" cy="914400"/>
           </a:xfrm>
-          <a:prstGeom prst="rect">
-            <a:avLst/>
-          </a:prstGeom>
         </p:spPr>
-      </p:pic>
-      <p:pic>
-        <p:nvPicPr>
-          <p:cNvPr id="3" name="Picture 2"/>
-          <p:cNvPicPr>
-            <a:picLocks noChangeAspect="1"/>
-          </p:cNvPicPr>
-          <p:nvPr/>
-        </p:nvPicPr>
-        <p:blipFill>
-          <a:blip r:embed="rId3">
-            <a:extLst>
-              <a:ext uri="{28A0092B-C50C-407E-A947-70E740481C1C}">
-                <a14:useLocalDpi xmlns:a14="http://schemas.microsoft.com/office/drawing/2010/main" val="0"/>
-              </a:ext>
-            </a:extLst>
-          </a:blip>
-          <a:stretch>
-            <a:fillRect/>
-          </a:stretch>
-        </p:blipFill>
+        <p:txBody>
+          <a:bodyPr/>
+          <a:lstStyle/>
+          <a:p>
+            <a:r>
+              <a:rPr lang="en-US" dirty="0" smtClean="0"/>
+              <a:t>Existing/related work</a:t>
+            </a:r>
+            <a:endParaRPr lang="en-US" dirty="0"/>
+          </a:p>
+        </p:txBody>
+      </p:sp>
+      <p:sp>
+        <p:nvSpPr>
+          <p:cNvPr id="3" name="Content Placeholder 2"/>
+          <p:cNvSpPr>
+            <a:spLocks noGrp="1"/>
+          </p:cNvSpPr>
+          <p:nvPr>
+            <p:ph idx="1"/>
+          </p:nvPr>
+        </p:nvSpPr>
         <p:spPr>
           <a:xfrm>
-            <a:off x="6180187" y="1624150"/>
-            <a:ext cx="3384724" cy="2787793"/>
+            <a:off x="913795" y="1600200"/>
+            <a:ext cx="10353762" cy="4572000"/>
           </a:xfrm>
-          <a:prstGeom prst="rect">
-            <a:avLst/>
-          </a:prstGeom>
         </p:spPr>
-      </p:pic>
+        <p:txBody>
+          <a:bodyPr>
+            <a:normAutofit fontScale="92500" lnSpcReduction="10000"/>
+          </a:bodyPr>
+          <a:lstStyle/>
+          <a:p>
+            <a:r>
+              <a:rPr lang="en-US" dirty="0" smtClean="0"/>
+              <a:t>Research on machine learning for </a:t>
+            </a:r>
+            <a:r>
+              <a:rPr lang="en-US" dirty="0" err="1" smtClean="0"/>
+              <a:t>G2P</a:t>
+            </a:r>
+            <a:r>
+              <a:rPr lang="en-US" dirty="0" smtClean="0"/>
+              <a:t> conversion:</a:t>
+            </a:r>
+          </a:p>
+          <a:p>
+            <a:pPr lvl="1"/>
+            <a:r>
+              <a:rPr lang="en-US" dirty="0" smtClean="0"/>
+              <a:t>Decision tree classifier to learn pronunciation rules</a:t>
+            </a:r>
+          </a:p>
+          <a:p>
+            <a:pPr lvl="1"/>
+            <a:r>
+              <a:rPr lang="en-US" dirty="0" smtClean="0"/>
+              <a:t>Joint </a:t>
+            </a:r>
+            <a:r>
+              <a:rPr lang="en-US" dirty="0" err="1" smtClean="0"/>
+              <a:t>ngram</a:t>
+            </a:r>
+            <a:r>
+              <a:rPr lang="en-US" dirty="0" smtClean="0"/>
+              <a:t> model</a:t>
+            </a:r>
+          </a:p>
+          <a:p>
+            <a:pPr lvl="1"/>
+            <a:r>
+              <a:rPr lang="en-US" dirty="0" smtClean="0"/>
+              <a:t>Maximum </a:t>
+            </a:r>
+            <a:r>
+              <a:rPr lang="en-US" dirty="0" err="1" smtClean="0"/>
+              <a:t>entroy</a:t>
+            </a:r>
+            <a:r>
+              <a:rPr lang="en-US" dirty="0" smtClean="0"/>
+              <a:t> model</a:t>
+            </a:r>
+          </a:p>
+          <a:p>
+            <a:pPr lvl="1"/>
+            <a:r>
+              <a:rPr lang="en-US" dirty="0" smtClean="0"/>
+              <a:t>Active learning</a:t>
+            </a:r>
+          </a:p>
+          <a:p>
+            <a:pPr lvl="1"/>
+            <a:r>
+              <a:rPr lang="en-US" dirty="0" smtClean="0"/>
+              <a:t>Recurrent neural network</a:t>
+            </a:r>
+          </a:p>
+          <a:p>
+            <a:r>
+              <a:rPr lang="en-US" dirty="0" smtClean="0"/>
+              <a:t>Studies on detection speech recognition errors:</a:t>
+            </a:r>
+          </a:p>
+          <a:p>
+            <a:pPr lvl="1"/>
+            <a:r>
+              <a:rPr lang="en-US" dirty="0" smtClean="0"/>
+              <a:t>Using acoustic and prosodic features to identify corrections</a:t>
+            </a:r>
+          </a:p>
+          <a:p>
+            <a:pPr lvl="1"/>
+            <a:r>
+              <a:rPr lang="en-US" dirty="0" smtClean="0"/>
+              <a:t>Prosodic features to detect recognition errors</a:t>
+            </a:r>
+          </a:p>
+          <a:p>
+            <a:pPr lvl="1"/>
+            <a:r>
+              <a:rPr lang="en-US" dirty="0" smtClean="0"/>
+              <a:t>Examining features related to the user’s speaking style to detect speech errors</a:t>
+            </a:r>
+          </a:p>
+          <a:p>
+            <a:pPr lvl="1"/>
+            <a:r>
+              <a:rPr lang="en-US" dirty="0" smtClean="0"/>
+              <a:t>Decision-tree based method to detect voice query retires</a:t>
+            </a:r>
+          </a:p>
+          <a:p>
+            <a:pPr lvl="1"/>
+            <a:r>
+              <a:rPr lang="en-US" dirty="0" smtClean="0"/>
+              <a:t>Co-</a:t>
+            </a:r>
+            <a:r>
+              <a:rPr lang="en-US" dirty="0" err="1" smtClean="0"/>
+              <a:t>occurence</a:t>
+            </a:r>
+            <a:r>
+              <a:rPr lang="en-US" dirty="0" smtClean="0"/>
+              <a:t> method for detecting and correcting misrecognition</a:t>
+            </a:r>
+            <a:endParaRPr lang="en-US" dirty="0"/>
+          </a:p>
+        </p:txBody>
+      </p:sp>
     </p:spTree>
     <p:extLst>
       <p:ext uri="{BB962C8B-B14F-4D97-AF65-F5344CB8AC3E}">
-        <p14:creationId xmlns:p14="http://schemas.microsoft.com/office/powerpoint/2010/main" val="561919222"/>
+        <p14:creationId xmlns:p14="http://schemas.microsoft.com/office/powerpoint/2010/main" val="3723262291"/>
       </p:ext>
     </p:extLst>
   </p:cSld>
@@ -5818,130 +7551,105 @@
           <a:chExt cx="0" cy="0"/>
         </a:xfrm>
       </p:grpSpPr>
-      <p:pic>
-        <p:nvPicPr>
-          <p:cNvPr id="2" name="Picture 1"/>
-          <p:cNvPicPr>
-            <a:picLocks noChangeAspect="1"/>
-          </p:cNvPicPr>
-          <p:nvPr/>
-        </p:nvPicPr>
-        <p:blipFill>
-          <a:blip r:embed="rId2">
-            <a:extLst>
-              <a:ext uri="{28A0092B-C50C-407E-A947-70E740481C1C}">
-                <a14:useLocalDpi xmlns:a14="http://schemas.microsoft.com/office/drawing/2010/main" val="0"/>
-              </a:ext>
-            </a:extLst>
-          </a:blip>
-          <a:stretch>
-            <a:fillRect/>
-          </a:stretch>
-        </p:blipFill>
+      <p:sp>
+        <p:nvSpPr>
+          <p:cNvPr id="2" name="Title 1"/>
+          <p:cNvSpPr>
+            <a:spLocks noGrp="1"/>
+          </p:cNvSpPr>
+          <p:nvPr>
+            <p:ph type="title"/>
+          </p:nvPr>
+        </p:nvSpPr>
         <p:spPr>
           <a:xfrm>
-            <a:off x="1161968" y="703094"/>
-            <a:ext cx="3162463" cy="1289116"/>
+            <a:off x="913795" y="457200"/>
+            <a:ext cx="10353761" cy="914400"/>
           </a:xfrm>
-          <a:prstGeom prst="rect">
-            <a:avLst/>
-          </a:prstGeom>
         </p:spPr>
-      </p:pic>
-      <p:pic>
-        <p:nvPicPr>
-          <p:cNvPr id="3" name="Picture 2"/>
-          <p:cNvPicPr>
-            <a:picLocks noChangeAspect="1"/>
-          </p:cNvPicPr>
-          <p:nvPr/>
-        </p:nvPicPr>
-        <p:blipFill>
-          <a:blip r:embed="rId3">
-            <a:extLst>
-              <a:ext uri="{28A0092B-C50C-407E-A947-70E740481C1C}">
-                <a14:useLocalDpi xmlns:a14="http://schemas.microsoft.com/office/drawing/2010/main" val="0"/>
-              </a:ext>
-            </a:extLst>
-          </a:blip>
-          <a:stretch>
-            <a:fillRect/>
-          </a:stretch>
-        </p:blipFill>
+        <p:txBody>
+          <a:bodyPr/>
+          <a:lstStyle/>
+          <a:p>
+            <a:r>
+              <a:rPr lang="en-US" dirty="0" smtClean="0"/>
+              <a:t>New Approach</a:t>
+            </a:r>
+            <a:endParaRPr lang="en-US" dirty="0"/>
+          </a:p>
+        </p:txBody>
+      </p:sp>
+      <p:sp>
+        <p:nvSpPr>
+          <p:cNvPr id="3" name="Content Placeholder 2"/>
+          <p:cNvSpPr>
+            <a:spLocks noGrp="1"/>
+          </p:cNvSpPr>
+          <p:nvPr>
+            <p:ph idx="1"/>
+          </p:nvPr>
+        </p:nvSpPr>
         <p:spPr>
           <a:xfrm>
-            <a:off x="6320526" y="805145"/>
-            <a:ext cx="3225966" cy="1346269"/>
+            <a:off x="913795" y="1600200"/>
+            <a:ext cx="10353762" cy="4572000"/>
           </a:xfrm>
-          <a:prstGeom prst="rect">
-            <a:avLst/>
-          </a:prstGeom>
         </p:spPr>
-      </p:pic>
-      <p:pic>
-        <p:nvPicPr>
-          <p:cNvPr id="4" name="Picture 3"/>
-          <p:cNvPicPr>
-            <a:picLocks noChangeAspect="1"/>
-          </p:cNvPicPr>
-          <p:nvPr/>
-        </p:nvPicPr>
-        <p:blipFill>
-          <a:blip r:embed="rId4">
-            <a:extLst>
-              <a:ext uri="{28A0092B-C50C-407E-A947-70E740481C1C}">
-                <a14:useLocalDpi xmlns:a14="http://schemas.microsoft.com/office/drawing/2010/main" val="0"/>
-              </a:ext>
-            </a:extLst>
-          </a:blip>
-          <a:stretch>
-            <a:fillRect/>
-          </a:stretch>
-        </p:blipFill>
-        <p:spPr>
-          <a:xfrm>
-            <a:off x="1269461" y="3826572"/>
-            <a:ext cx="3295819" cy="1085906"/>
-          </a:xfrm>
-          <a:prstGeom prst="rect">
-            <a:avLst/>
-          </a:prstGeom>
-        </p:spPr>
-      </p:pic>
-      <p:pic>
-        <p:nvPicPr>
-          <p:cNvPr id="5" name="Picture 4"/>
-          <p:cNvPicPr>
-            <a:picLocks noChangeAspect="1"/>
-          </p:cNvPicPr>
-          <p:nvPr/>
-        </p:nvPicPr>
-        <p:blipFill>
-          <a:blip r:embed="rId5">
-            <a:extLst>
-              <a:ext uri="{28A0092B-C50C-407E-A947-70E740481C1C}">
-                <a14:useLocalDpi xmlns:a14="http://schemas.microsoft.com/office/drawing/2010/main" val="0"/>
-              </a:ext>
-            </a:extLst>
-          </a:blip>
-          <a:stretch>
-            <a:fillRect/>
-          </a:stretch>
-        </p:blipFill>
-        <p:spPr>
-          <a:xfrm>
-            <a:off x="6797231" y="3680254"/>
-            <a:ext cx="3143412" cy="977950"/>
-          </a:xfrm>
-          <a:prstGeom prst="rect">
-            <a:avLst/>
-          </a:prstGeom>
-        </p:spPr>
-      </p:pic>
+        <p:txBody>
+          <a:bodyPr/>
+          <a:lstStyle/>
+          <a:p>
+            <a:r>
+              <a:rPr lang="en-US" dirty="0" smtClean="0"/>
+              <a:t>Correction data focuses specifically on the areas of weaknesses of the system</a:t>
+            </a:r>
+          </a:p>
+          <a:p>
+            <a:pPr lvl="1"/>
+            <a:r>
+              <a:rPr lang="en-US" dirty="0" smtClean="0"/>
+              <a:t>Do not need to identify bad pronunciations ahead of time</a:t>
+            </a:r>
+          </a:p>
+          <a:p>
+            <a:r>
+              <a:rPr lang="en-US" dirty="0"/>
+              <a:t>Language-independent</a:t>
+            </a:r>
+          </a:p>
+          <a:p>
+            <a:r>
+              <a:rPr lang="en-US" dirty="0" smtClean="0"/>
+              <a:t>Corrections are provided by the users who spoke them, who know how they want to pronounce the words</a:t>
+            </a:r>
+          </a:p>
+          <a:p>
+            <a:r>
+              <a:rPr lang="en-US" dirty="0" smtClean="0"/>
+              <a:t>Using two different types of correction data:</a:t>
+            </a:r>
+          </a:p>
+          <a:p>
+            <a:pPr lvl="1"/>
+            <a:r>
+              <a:rPr lang="en-US" dirty="0" smtClean="0"/>
+              <a:t>Keyboard Correction</a:t>
+            </a:r>
+          </a:p>
+          <a:p>
+            <a:pPr lvl="1"/>
+            <a:r>
+              <a:rPr lang="en-US" dirty="0" smtClean="0"/>
+              <a:t>Selected Alternate</a:t>
+            </a:r>
+            <a:endParaRPr lang="en-US" dirty="0"/>
+          </a:p>
+        </p:txBody>
+      </p:sp>
     </p:spTree>
     <p:extLst>
       <p:ext uri="{BB962C8B-B14F-4D97-AF65-F5344CB8AC3E}">
-        <p14:creationId xmlns:p14="http://schemas.microsoft.com/office/powerpoint/2010/main" val="504783391"/>
+        <p14:creationId xmlns:p14="http://schemas.microsoft.com/office/powerpoint/2010/main" val="582041634"/>
       </p:ext>
     </p:extLst>
   </p:cSld>
@@ -5978,16 +7686,20 @@
             <p:ph type="title"/>
           </p:nvPr>
         </p:nvSpPr>
-        <p:spPr/>
-        <p:txBody>
-          <a:bodyPr/>
-          <a:lstStyle/>
-          <a:p>
-            <a:r>
-              <a:rPr lang="en-US" smtClean="0"/>
-              <a:t>Thoughtful Questions</a:t>
-            </a:r>
-            <a:endParaRPr lang="en-US"/>
+        <p:spPr>
+          <a:xfrm>
+            <a:off x="913795" y="457200"/>
+            <a:ext cx="10353761" cy="914400"/>
+          </a:xfrm>
+        </p:spPr>
+        <p:txBody>
+          <a:bodyPr/>
+          <a:lstStyle/>
+          <a:p>
+            <a:r>
+              <a:rPr lang="en-US" dirty="0"/>
+              <a:t>Keyboard correction data</a:t>
+            </a:r>
           </a:p>
         </p:txBody>
       </p:sp>
@@ -5998,15 +7710,1153 @@
             <a:spLocks noGrp="1"/>
           </p:cNvSpPr>
           <p:nvPr>
+            <p:ph sz="half" idx="1"/>
+          </p:nvPr>
+        </p:nvSpPr>
+        <p:spPr>
+          <a:xfrm>
+            <a:off x="913795" y="1600200"/>
+            <a:ext cx="6858000" cy="4800600"/>
+          </a:xfrm>
+        </p:spPr>
+        <p:txBody>
+          <a:bodyPr>
+            <a:normAutofit fontScale="85000" lnSpcReduction="20000"/>
+          </a:bodyPr>
+          <a:lstStyle/>
+          <a:p>
+            <a:r>
+              <a:rPr lang="en-US" dirty="0" smtClean="0"/>
+              <a:t>User makes a voice query, then issues a typed query shortly after</a:t>
+            </a:r>
+          </a:p>
+          <a:p>
+            <a:pPr lvl="1"/>
+            <a:r>
+              <a:rPr lang="en-US" dirty="0" smtClean="0"/>
+              <a:t>Within 30 seconds</a:t>
+            </a:r>
+          </a:p>
+          <a:p>
+            <a:r>
+              <a:rPr lang="en-US" dirty="0" smtClean="0"/>
+              <a:t>Analysis showed only 30-40% of these pairs are true corrections</a:t>
+            </a:r>
+          </a:p>
+          <a:p>
+            <a:r>
+              <a:rPr lang="en-US" dirty="0"/>
+              <a:t>Correction data classifier features</a:t>
+            </a:r>
+          </a:p>
+          <a:p>
+            <a:pPr lvl="1"/>
+            <a:r>
+              <a:rPr lang="en-US" dirty="0"/>
+              <a:t>Word-based:</a:t>
+            </a:r>
+          </a:p>
+          <a:p>
+            <a:pPr lvl="2"/>
+            <a:r>
+              <a:rPr lang="en-US" dirty="0"/>
+              <a:t>Unigram </a:t>
+            </a:r>
+            <a:r>
+              <a:rPr lang="en-US" dirty="0" smtClean="0"/>
+              <a:t>counts, number </a:t>
+            </a:r>
+            <a:r>
+              <a:rPr lang="en-US" dirty="0"/>
+              <a:t>of word </a:t>
+            </a:r>
+            <a:r>
+              <a:rPr lang="en-US" dirty="0" smtClean="0"/>
+              <a:t>overlaps, and language </a:t>
+            </a:r>
+            <a:r>
+              <a:rPr lang="en-US" dirty="0"/>
+              <a:t>model costs</a:t>
+            </a:r>
+          </a:p>
+          <a:p>
+            <a:pPr lvl="1"/>
+            <a:r>
+              <a:rPr lang="en-US" dirty="0"/>
+              <a:t>Character-based:</a:t>
+            </a:r>
+          </a:p>
+          <a:p>
+            <a:pPr lvl="2"/>
+            <a:r>
+              <a:rPr lang="en-US" dirty="0"/>
+              <a:t>Character </a:t>
+            </a:r>
+            <a:r>
+              <a:rPr lang="en-US" dirty="0" smtClean="0"/>
+              <a:t>counts, and edit </a:t>
+            </a:r>
+            <a:r>
+              <a:rPr lang="en-US" dirty="0"/>
+              <a:t>distance between the recognized and typed queries</a:t>
+            </a:r>
+          </a:p>
+          <a:p>
+            <a:pPr lvl="1"/>
+            <a:r>
+              <a:rPr lang="en-US" dirty="0"/>
+              <a:t>Phoneme:</a:t>
+            </a:r>
+          </a:p>
+          <a:p>
+            <a:pPr lvl="2"/>
+            <a:r>
+              <a:rPr lang="en-US" dirty="0" smtClean="0"/>
+              <a:t>Counts and edit distance between the phoneme sequences corresponding to the recognition results and typed query</a:t>
+            </a:r>
+          </a:p>
+          <a:p>
+            <a:pPr lvl="1"/>
+            <a:r>
+              <a:rPr lang="en-US" dirty="0" smtClean="0"/>
+              <a:t>Acoustic</a:t>
+            </a:r>
+            <a:r>
+              <a:rPr lang="en-US" dirty="0"/>
+              <a:t>:</a:t>
+            </a:r>
+          </a:p>
+          <a:p>
+            <a:pPr lvl="2"/>
+            <a:r>
+              <a:rPr lang="en-US" dirty="0"/>
+              <a:t>Forced phone alignment costs</a:t>
+            </a:r>
+          </a:p>
+          <a:p>
+            <a:pPr lvl="2"/>
+            <a:r>
+              <a:rPr lang="en-US" dirty="0"/>
+              <a:t>Waveform-to-transcript length </a:t>
+            </a:r>
+            <a:r>
+              <a:rPr lang="en-US" dirty="0" smtClean="0"/>
+              <a:t>ratio</a:t>
+            </a:r>
+            <a:endParaRPr lang="en-US" dirty="0"/>
+          </a:p>
+        </p:txBody>
+      </p:sp>
+      <p:pic>
+        <p:nvPicPr>
+          <p:cNvPr id="9" name="Content Placeholder 4"/>
+          <p:cNvPicPr>
+            <a:picLocks noGrp="1" noChangeAspect="1"/>
+          </p:cNvPicPr>
+          <p:nvPr>
+            <p:ph sz="half" idx="2"/>
+          </p:nvPr>
+        </p:nvPicPr>
+        <p:blipFill rotWithShape="1">
+          <a:blip r:embed="rId3">
+            <a:extLst>
+              <a:ext uri="{28A0092B-C50C-407E-A947-70E740481C1C}">
+                <a14:useLocalDpi xmlns:a14="http://schemas.microsoft.com/office/drawing/2010/main" val="0"/>
+              </a:ext>
+            </a:extLst>
+          </a:blip>
+          <a:srcRect b="25545"/>
+          <a:stretch/>
+        </p:blipFill>
+        <p:spPr>
+          <a:xfrm>
+            <a:off x="8149501" y="2152551"/>
+            <a:ext cx="3295819" cy="1021277"/>
+          </a:xfrm>
+          <a:prstGeom prst="rect">
+            <a:avLst/>
+          </a:prstGeom>
+        </p:spPr>
+      </p:pic>
+      <p:pic>
+        <p:nvPicPr>
+          <p:cNvPr id="10" name="Picture 9"/>
+          <p:cNvPicPr>
+            <a:picLocks noChangeAspect="1"/>
+          </p:cNvPicPr>
+          <p:nvPr/>
+        </p:nvPicPr>
+        <p:blipFill rotWithShape="1">
+          <a:blip r:embed="rId4">
+            <a:extLst>
+              <a:ext uri="{28A0092B-C50C-407E-A947-70E740481C1C}">
+                <a14:useLocalDpi xmlns:a14="http://schemas.microsoft.com/office/drawing/2010/main" val="0"/>
+              </a:ext>
+            </a:extLst>
+          </a:blip>
+          <a:srcRect t="7525"/>
+          <a:stretch/>
+        </p:blipFill>
+        <p:spPr>
+          <a:xfrm>
+            <a:off x="8282856" y="4114800"/>
+            <a:ext cx="3162463" cy="1192110"/>
+          </a:xfrm>
+          <a:prstGeom prst="rect">
+            <a:avLst/>
+          </a:prstGeom>
+        </p:spPr>
+      </p:pic>
+    </p:spTree>
+    <p:extLst>
+      <p:ext uri="{BB962C8B-B14F-4D97-AF65-F5344CB8AC3E}">
+        <p14:creationId xmlns:p14="http://schemas.microsoft.com/office/powerpoint/2010/main" val="2949745998"/>
+      </p:ext>
+    </p:extLst>
+  </p:cSld>
+  <p:clrMapOvr>
+    <a:masterClrMapping/>
+  </p:clrMapOvr>
+</p:sld>
+</file>
+
+<file path=ppt/slides/slide6.xml><?xml version="1.0" encoding="utf-8"?>
+<p:sld xmlns:a="http://schemas.openxmlformats.org/drawingml/2006/main" xmlns:r="http://schemas.openxmlformats.org/officeDocument/2006/relationships" xmlns:p="http://schemas.openxmlformats.org/presentationml/2006/main">
+  <p:cSld>
+    <p:spTree>
+      <p:nvGrpSpPr>
+        <p:cNvPr id="1" name=""/>
+        <p:cNvGrpSpPr/>
+        <p:nvPr/>
+      </p:nvGrpSpPr>
+      <p:grpSpPr>
+        <a:xfrm>
+          <a:off x="0" y="0"/>
+          <a:ext cx="0" cy="0"/>
+          <a:chOff x="0" y="0"/>
+          <a:chExt cx="0" cy="0"/>
+        </a:xfrm>
+      </p:grpSpPr>
+      <p:sp>
+        <p:nvSpPr>
+          <p:cNvPr id="2" name="Title 1"/>
+          <p:cNvSpPr>
+            <a:spLocks noGrp="1"/>
+          </p:cNvSpPr>
+          <p:nvPr>
+            <p:ph type="title"/>
+          </p:nvPr>
+        </p:nvSpPr>
+        <p:spPr>
+          <a:xfrm>
+            <a:off x="913795" y="457200"/>
+            <a:ext cx="10353761" cy="914400"/>
+          </a:xfrm>
+        </p:spPr>
+        <p:txBody>
+          <a:bodyPr/>
+          <a:lstStyle/>
+          <a:p>
+            <a:r>
+              <a:rPr lang="en-US" dirty="0"/>
+              <a:t>Selected alternate data</a:t>
+            </a:r>
+          </a:p>
+        </p:txBody>
+      </p:sp>
+      <p:sp>
+        <p:nvSpPr>
+          <p:cNvPr id="3" name="Content Placeholder 2"/>
+          <p:cNvSpPr>
+            <a:spLocks noGrp="1"/>
+          </p:cNvSpPr>
+          <p:nvPr>
+            <p:ph sz="half" idx="1"/>
+          </p:nvPr>
+        </p:nvSpPr>
+        <p:spPr>
+          <a:xfrm>
+            <a:off x="913795" y="1600200"/>
+            <a:ext cx="10287000" cy="1885950"/>
+          </a:xfrm>
+        </p:spPr>
+        <p:txBody>
+          <a:bodyPr/>
+          <a:lstStyle/>
+          <a:p>
+            <a:r>
+              <a:rPr lang="en-US" dirty="0" smtClean="0"/>
+              <a:t>Google voice search user interface allows users to manually select from a list of alternative recognition results</a:t>
+            </a:r>
+          </a:p>
+          <a:p>
+            <a:r>
+              <a:rPr lang="en-US" dirty="0" smtClean="0"/>
+              <a:t>User selection provides a high quality correction, so no extra classifier needed</a:t>
+            </a:r>
+          </a:p>
+          <a:p>
+            <a:endParaRPr lang="en-US" dirty="0"/>
+          </a:p>
+        </p:txBody>
+      </p:sp>
+      <p:pic>
+        <p:nvPicPr>
+          <p:cNvPr id="6" name="Content Placeholder 5"/>
+          <p:cNvPicPr>
+            <a:picLocks noGrp="1" noChangeAspect="1"/>
+          </p:cNvPicPr>
+          <p:nvPr>
+            <p:ph sz="half" idx="2"/>
+          </p:nvPr>
+        </p:nvPicPr>
+        <p:blipFill rotWithShape="1">
+          <a:blip r:embed="rId3">
+            <a:extLst>
+              <a:ext uri="{28A0092B-C50C-407E-A947-70E740481C1C}">
+                <a14:useLocalDpi xmlns:a14="http://schemas.microsoft.com/office/drawing/2010/main" val="0"/>
+              </a:ext>
+            </a:extLst>
+          </a:blip>
+          <a:srcRect t="3607" b="11068"/>
+          <a:stretch/>
+        </p:blipFill>
+        <p:spPr>
+          <a:xfrm>
+            <a:off x="1839349" y="3441793"/>
+            <a:ext cx="3384724" cy="2378651"/>
+          </a:xfrm>
+          <a:prstGeom prst="rect">
+            <a:avLst/>
+          </a:prstGeom>
+        </p:spPr>
+      </p:pic>
+      <p:pic>
+        <p:nvPicPr>
+          <p:cNvPr id="7" name="Picture 6"/>
+          <p:cNvPicPr>
+            <a:picLocks noChangeAspect="1"/>
+          </p:cNvPicPr>
+          <p:nvPr/>
+        </p:nvPicPr>
+        <p:blipFill rotWithShape="1">
+          <a:blip r:embed="rId4">
+            <a:extLst>
+              <a:ext uri="{28A0092B-C50C-407E-A947-70E740481C1C}">
+                <a14:useLocalDpi xmlns:a14="http://schemas.microsoft.com/office/drawing/2010/main" val="0"/>
+              </a:ext>
+            </a:extLst>
+          </a:blip>
+          <a:srcRect t="6417"/>
+          <a:stretch/>
+        </p:blipFill>
+        <p:spPr>
+          <a:xfrm>
+            <a:off x="6537696" y="3863340"/>
+            <a:ext cx="3225966" cy="1259874"/>
+          </a:xfrm>
+          <a:prstGeom prst="rect">
+            <a:avLst/>
+          </a:prstGeom>
+        </p:spPr>
+      </p:pic>
+    </p:spTree>
+    <p:extLst>
+      <p:ext uri="{BB962C8B-B14F-4D97-AF65-F5344CB8AC3E}">
+        <p14:creationId xmlns:p14="http://schemas.microsoft.com/office/powerpoint/2010/main" val="261239048"/>
+      </p:ext>
+    </p:extLst>
+  </p:cSld>
+  <p:clrMapOvr>
+    <a:masterClrMapping/>
+  </p:clrMapOvr>
+</p:sld>
+</file>
+
+<file path=ppt/slides/slide7.xml><?xml version="1.0" encoding="utf-8"?>
+<p:sld xmlns:a="http://schemas.openxmlformats.org/drawingml/2006/main" xmlns:r="http://schemas.openxmlformats.org/officeDocument/2006/relationships" xmlns:p="http://schemas.openxmlformats.org/presentationml/2006/main">
+  <p:cSld>
+    <p:spTree>
+      <p:nvGrpSpPr>
+        <p:cNvPr id="1" name=""/>
+        <p:cNvGrpSpPr/>
+        <p:nvPr/>
+      </p:nvGrpSpPr>
+      <p:grpSpPr>
+        <a:xfrm>
+          <a:off x="0" y="0"/>
+          <a:ext cx="0" cy="0"/>
+          <a:chOff x="0" y="0"/>
+          <a:chExt cx="0" cy="0"/>
+        </a:xfrm>
+      </p:grpSpPr>
+      <p:sp>
+        <p:nvSpPr>
+          <p:cNvPr id="2" name="Title 1"/>
+          <p:cNvSpPr>
+            <a:spLocks noGrp="1"/>
+          </p:cNvSpPr>
+          <p:nvPr>
+            <p:ph type="title"/>
+          </p:nvPr>
+        </p:nvSpPr>
+        <p:spPr>
+          <a:xfrm>
+            <a:off x="913795" y="457200"/>
+            <a:ext cx="10353761" cy="914400"/>
+          </a:xfrm>
+        </p:spPr>
+        <p:txBody>
+          <a:bodyPr/>
+          <a:lstStyle/>
+          <a:p>
+            <a:r>
+              <a:rPr lang="en-US" dirty="0" smtClean="0"/>
+              <a:t>Testing</a:t>
+            </a:r>
+            <a:endParaRPr lang="en-US" dirty="0"/>
+          </a:p>
+        </p:txBody>
+      </p:sp>
+      <p:sp>
+        <p:nvSpPr>
+          <p:cNvPr id="3" name="Content Placeholder 2"/>
+          <p:cNvSpPr>
+            <a:spLocks noGrp="1"/>
+          </p:cNvSpPr>
+          <p:nvPr>
             <p:ph idx="1"/>
           </p:nvPr>
         </p:nvSpPr>
-        <p:spPr/>
-        <p:txBody>
-          <a:bodyPr/>
-          <a:lstStyle/>
-          <a:p>
-            <a:endParaRPr lang="en-US"/>
+        <p:spPr>
+          <a:xfrm>
+            <a:off x="913795" y="1600200"/>
+            <a:ext cx="10353762" cy="4572000"/>
+          </a:xfrm>
+        </p:spPr>
+        <p:txBody>
+          <a:bodyPr>
+            <a:normAutofit fontScale="92500" lnSpcReduction="10000"/>
+          </a:bodyPr>
+          <a:lstStyle/>
+          <a:p>
+            <a:r>
+              <a:rPr lang="en-US" dirty="0" smtClean="0"/>
+              <a:t>Word error rate (</a:t>
+            </a:r>
+            <a:r>
+              <a:rPr lang="en-US" dirty="0" err="1" smtClean="0"/>
+              <a:t>WER</a:t>
+            </a:r>
+            <a:r>
+              <a:rPr lang="en-US" dirty="0" smtClean="0"/>
+              <a:t>) evaluation:</a:t>
+            </a:r>
+          </a:p>
+          <a:p>
+            <a:pPr lvl="1"/>
+            <a:r>
+              <a:rPr lang="en-US" dirty="0" smtClean="0"/>
+              <a:t>Anonymized speech queries randomly selected from traffic logs and human-transcribed</a:t>
+            </a:r>
+          </a:p>
+          <a:p>
+            <a:pPr lvl="1"/>
+            <a:r>
+              <a:rPr lang="en-US" dirty="0" smtClean="0"/>
+              <a:t>The most frequently used words already have a good pronunciation, but are still useful to ensure no learned “rogue” pronunciations</a:t>
+            </a:r>
+          </a:p>
+          <a:p>
+            <a:r>
+              <a:rPr lang="en-US" dirty="0" smtClean="0"/>
+              <a:t>Side-by-side (</a:t>
+            </a:r>
+            <a:r>
+              <a:rPr lang="en-US" dirty="0" err="1" smtClean="0"/>
+              <a:t>SxS</a:t>
+            </a:r>
+            <a:r>
+              <a:rPr lang="en-US" dirty="0" smtClean="0"/>
+              <a:t>) tests:</a:t>
+            </a:r>
+          </a:p>
+          <a:p>
+            <a:pPr lvl="1"/>
+            <a:r>
+              <a:rPr lang="en-US" dirty="0" smtClean="0"/>
+              <a:t>Two ASR engines: one with the learned pronunciations and one without</a:t>
+            </a:r>
+          </a:p>
+          <a:p>
+            <a:pPr lvl="1"/>
+            <a:r>
+              <a:rPr lang="en-US" dirty="0" smtClean="0"/>
+              <a:t>Both engines are fed the exact same queries from anonymized voice search logs</a:t>
+            </a:r>
+          </a:p>
+          <a:p>
+            <a:pPr lvl="1"/>
+            <a:r>
+              <a:rPr lang="en-US" dirty="0" smtClean="0"/>
+              <a:t>Queries with differing recognition transcripts are evaluated by human raters and marked as one of four categories:</a:t>
+            </a:r>
+          </a:p>
+          <a:p>
+            <a:pPr lvl="2"/>
+            <a:r>
+              <a:rPr lang="en-US" dirty="0" smtClean="0"/>
+              <a:t>Nonsense: the transcript is nonsense</a:t>
+            </a:r>
+          </a:p>
+          <a:p>
+            <a:pPr lvl="2"/>
+            <a:r>
+              <a:rPr lang="en-US" dirty="0" smtClean="0"/>
+              <a:t>Unusable: the transcript does not correspond to the audio</a:t>
+            </a:r>
+          </a:p>
+          <a:p>
+            <a:pPr lvl="2"/>
+            <a:r>
+              <a:rPr lang="en-US" dirty="0" smtClean="0"/>
+              <a:t>Usable: the transcript contains only small errors</a:t>
+            </a:r>
+          </a:p>
+          <a:p>
+            <a:pPr lvl="2"/>
+            <a:r>
+              <a:rPr lang="en-US" dirty="0" smtClean="0"/>
+              <a:t>Exact: the transcript matches the spoken audio exactly</a:t>
+            </a:r>
+            <a:endParaRPr lang="en-US" dirty="0"/>
+          </a:p>
+        </p:txBody>
+      </p:sp>
+    </p:spTree>
+    <p:extLst>
+      <p:ext uri="{BB962C8B-B14F-4D97-AF65-F5344CB8AC3E}">
+        <p14:creationId xmlns:p14="http://schemas.microsoft.com/office/powerpoint/2010/main" val="3294197162"/>
+      </p:ext>
+    </p:extLst>
+  </p:cSld>
+  <p:clrMapOvr>
+    <a:masterClrMapping/>
+  </p:clrMapOvr>
+</p:sld>
+</file>
+
+<file path=ppt/slides/slide8.xml><?xml version="1.0" encoding="utf-8"?>
+<p:sld xmlns:a="http://schemas.openxmlformats.org/drawingml/2006/main" xmlns:r="http://schemas.openxmlformats.org/officeDocument/2006/relationships" xmlns:p="http://schemas.openxmlformats.org/presentationml/2006/main">
+  <p:cSld>
+    <p:spTree>
+      <p:nvGrpSpPr>
+        <p:cNvPr id="1" name=""/>
+        <p:cNvGrpSpPr/>
+        <p:nvPr/>
+      </p:nvGrpSpPr>
+      <p:grpSpPr>
+        <a:xfrm>
+          <a:off x="0" y="0"/>
+          <a:ext cx="0" cy="0"/>
+          <a:chOff x="0" y="0"/>
+          <a:chExt cx="0" cy="0"/>
+        </a:xfrm>
+      </p:grpSpPr>
+      <p:sp>
+        <p:nvSpPr>
+          <p:cNvPr id="2" name="Title 1"/>
+          <p:cNvSpPr>
+            <a:spLocks noGrp="1"/>
+          </p:cNvSpPr>
+          <p:nvPr>
+            <p:ph type="title"/>
+          </p:nvPr>
+        </p:nvSpPr>
+        <p:spPr>
+          <a:xfrm>
+            <a:off x="913795" y="457200"/>
+            <a:ext cx="10353761" cy="914400"/>
+          </a:xfrm>
+        </p:spPr>
+        <p:txBody>
+          <a:bodyPr/>
+          <a:lstStyle/>
+          <a:p>
+            <a:r>
+              <a:rPr lang="en-US" dirty="0" smtClean="0"/>
+              <a:t>Results</a:t>
+            </a:r>
+            <a:endParaRPr lang="en-US" dirty="0"/>
+          </a:p>
+        </p:txBody>
+      </p:sp>
+      <p:sp>
+        <p:nvSpPr>
+          <p:cNvPr id="3" name="Text Placeholder 2"/>
+          <p:cNvSpPr>
+            <a:spLocks noGrp="1"/>
+          </p:cNvSpPr>
+          <p:nvPr>
+            <p:ph type="body" idx="1"/>
+          </p:nvPr>
+        </p:nvSpPr>
+        <p:spPr>
+          <a:xfrm>
+            <a:off x="1143000" y="1371600"/>
+            <a:ext cx="3657600" cy="823912"/>
+          </a:xfrm>
+        </p:spPr>
+        <p:txBody>
+          <a:bodyPr anchor="ctr"/>
+          <a:lstStyle/>
+          <a:p>
+            <a:pPr algn="ctr"/>
+            <a:r>
+              <a:rPr lang="en-US" dirty="0" smtClean="0"/>
+              <a:t>Keyboard Correction</a:t>
+            </a:r>
+          </a:p>
+        </p:txBody>
+      </p:sp>
+      <p:sp>
+        <p:nvSpPr>
+          <p:cNvPr id="5" name="Text Placeholder 4"/>
+          <p:cNvSpPr>
+            <a:spLocks noGrp="1"/>
+          </p:cNvSpPr>
+          <p:nvPr>
+            <p:ph type="body" sz="quarter" idx="3"/>
+          </p:nvPr>
+        </p:nvSpPr>
+        <p:spPr>
+          <a:xfrm>
+            <a:off x="7543800" y="1371600"/>
+            <a:ext cx="3200400" cy="823912"/>
+          </a:xfrm>
+        </p:spPr>
+        <p:txBody>
+          <a:bodyPr anchor="ctr"/>
+          <a:lstStyle/>
+          <a:p>
+            <a:pPr algn="ctr"/>
+            <a:r>
+              <a:rPr lang="en-US" dirty="0" smtClean="0"/>
+              <a:t>Alternate Selection</a:t>
+            </a:r>
+            <a:endParaRPr lang="en-US" dirty="0"/>
+          </a:p>
+        </p:txBody>
+      </p:sp>
+      <p:pic>
+        <p:nvPicPr>
+          <p:cNvPr id="7" name="Content Placeholder 6"/>
+          <p:cNvPicPr>
+            <a:picLocks noGrp="1" noChangeAspect="1"/>
+          </p:cNvPicPr>
+          <p:nvPr>
+            <p:ph sz="half" idx="2"/>
+          </p:nvPr>
+        </p:nvPicPr>
+        <p:blipFill rotWithShape="1">
+          <a:blip r:embed="rId3">
+            <a:extLst>
+              <a:ext uri="{28A0092B-C50C-407E-A947-70E740481C1C}">
+                <a14:useLocalDpi xmlns:a14="http://schemas.microsoft.com/office/drawing/2010/main" val="0"/>
+              </a:ext>
+            </a:extLst>
+          </a:blip>
+          <a:srcRect l="573" t="5061"/>
+          <a:stretch/>
+        </p:blipFill>
+        <p:spPr>
+          <a:xfrm>
+            <a:off x="1339487" y="2240280"/>
+            <a:ext cx="3276953" cy="1030950"/>
+          </a:xfrm>
+          <a:prstGeom prst="rect">
+            <a:avLst/>
+          </a:prstGeom>
+        </p:spPr>
+      </p:pic>
+      <p:pic>
+        <p:nvPicPr>
+          <p:cNvPr id="8" name="Picture 7"/>
+          <p:cNvPicPr>
+            <a:picLocks noChangeAspect="1"/>
+          </p:cNvPicPr>
+          <p:nvPr/>
+        </p:nvPicPr>
+        <p:blipFill rotWithShape="1">
+          <a:blip r:embed="rId4">
+            <a:extLst>
+              <a:ext uri="{28A0092B-C50C-407E-A947-70E740481C1C}">
+                <a14:useLocalDpi xmlns:a14="http://schemas.microsoft.com/office/drawing/2010/main" val="0"/>
+              </a:ext>
+            </a:extLst>
+          </a:blip>
+          <a:srcRect t="8203"/>
+          <a:stretch/>
+        </p:blipFill>
+        <p:spPr>
+          <a:xfrm>
+            <a:off x="1393018" y="3603547"/>
+            <a:ext cx="3143412" cy="897734"/>
+          </a:xfrm>
+          <a:prstGeom prst="rect">
+            <a:avLst/>
+          </a:prstGeom>
+        </p:spPr>
+      </p:pic>
+      <p:pic>
+        <p:nvPicPr>
+          <p:cNvPr id="10" name="Picture 3" descr="U:\git\COSC757\Assignments\ArticleSummary\Figure 5.PNG"/>
+          <p:cNvPicPr>
+            <a:picLocks noGrp="1" noChangeAspect="1" noChangeArrowheads="1"/>
+          </p:cNvPicPr>
+          <p:nvPr>
+            <p:ph sz="quarter" idx="4"/>
+          </p:nvPr>
+        </p:nvPicPr>
+        <p:blipFill rotWithShape="1">
+          <a:blip r:embed="rId5">
+            <a:extLst>
+              <a:ext uri="{28A0092B-C50C-407E-A947-70E740481C1C}">
+                <a14:useLocalDpi xmlns:a14="http://schemas.microsoft.com/office/drawing/2010/main" val="0"/>
+              </a:ext>
+            </a:extLst>
+          </a:blip>
+          <a:srcRect t="10391" b="3311"/>
+          <a:stretch/>
+        </p:blipFill>
+        <p:spPr bwMode="auto">
+          <a:xfrm>
+            <a:off x="7409239" y="2112127"/>
+            <a:ext cx="3696216" cy="2482733"/>
+          </a:xfrm>
+          <a:prstGeom prst="rect">
+            <a:avLst/>
+          </a:prstGeom>
+          <a:noFill/>
+          <a:extLst>
+            <a:ext uri="{909E8E84-426E-40DD-AFC4-6F175D3DCCD1}">
+              <a14:hiddenFill xmlns:a14="http://schemas.microsoft.com/office/drawing/2010/main">
+                <a:solidFill>
+                  <a:srgbClr val="FFFFFF"/>
+                </a:solidFill>
+              </a14:hiddenFill>
+            </a:ext>
+          </a:extLst>
+        </p:spPr>
+      </p:pic>
+      <p:sp>
+        <p:nvSpPr>
+          <p:cNvPr id="11" name="Text Placeholder 4"/>
+          <p:cNvSpPr txBox="1">
+            <a:spLocks/>
+          </p:cNvSpPr>
+          <p:nvPr/>
+        </p:nvSpPr>
+        <p:spPr>
+          <a:xfrm>
+            <a:off x="5257800" y="4114800"/>
+            <a:ext cx="1828800" cy="823912"/>
+          </a:xfrm>
+          <a:prstGeom prst="rect">
+            <a:avLst/>
+          </a:prstGeom>
+        </p:spPr>
+        <p:txBody>
+          <a:bodyPr vert="horz" lIns="91440" tIns="45720" rIns="91440" bIns="45720" rtlCol="0" anchor="ctr">
+            <a:normAutofit/>
+          </a:bodyPr>
+          <a:lstStyle>
+            <a:lvl1pPr marL="0" indent="0" algn="l" defTabSz="914400" rtl="0" eaLnBrk="1" latinLnBrk="0" hangingPunct="1">
+              <a:lnSpc>
+                <a:spcPct val="100000"/>
+              </a:lnSpc>
+              <a:spcBef>
+                <a:spcPts val="1000"/>
+              </a:spcBef>
+              <a:buFont typeface="Arial" panose="020B0604020202020204" pitchFamily="34" charset="0"/>
+              <a:buNone/>
+              <a:defRPr sz="2400" b="1" kern="1200">
+                <a:solidFill>
+                  <a:schemeClr val="tx1"/>
+                </a:solidFill>
+                <a:effectLst>
+                  <a:outerShdw blurRad="50800" dist="38100" dir="2700000" algn="tl" rotWithShape="0">
+                    <a:srgbClr val="000000">
+                      <a:alpha val="48000"/>
+                    </a:srgbClr>
+                  </a:outerShdw>
+                </a:effectLst>
+                <a:latin typeface="+mn-lt"/>
+                <a:ea typeface="+mn-ea"/>
+                <a:cs typeface="+mn-cs"/>
+              </a:defRPr>
+            </a:lvl1pPr>
+            <a:lvl2pPr marL="457200" indent="0" algn="l" defTabSz="914400" rtl="0" eaLnBrk="1" latinLnBrk="0" hangingPunct="1">
+              <a:lnSpc>
+                <a:spcPct val="120000"/>
+              </a:lnSpc>
+              <a:spcBef>
+                <a:spcPts val="500"/>
+              </a:spcBef>
+              <a:buFont typeface="Arial" panose="020B0604020202020204" pitchFamily="34" charset="0"/>
+              <a:buNone/>
+              <a:defRPr sz="2000" b="1" kern="1200">
+                <a:solidFill>
+                  <a:schemeClr val="tx1"/>
+                </a:solidFill>
+                <a:effectLst>
+                  <a:outerShdw blurRad="50800" dist="38100" dir="2700000" algn="tl" rotWithShape="0">
+                    <a:srgbClr val="000000">
+                      <a:alpha val="48000"/>
+                    </a:srgbClr>
+                  </a:outerShdw>
+                </a:effectLst>
+                <a:latin typeface="+mn-lt"/>
+                <a:ea typeface="+mn-ea"/>
+                <a:cs typeface="+mn-cs"/>
+              </a:defRPr>
+            </a:lvl2pPr>
+            <a:lvl3pPr marL="914400" indent="0" algn="l" defTabSz="914400" rtl="0" eaLnBrk="1" latinLnBrk="0" hangingPunct="1">
+              <a:lnSpc>
+                <a:spcPct val="120000"/>
+              </a:lnSpc>
+              <a:spcBef>
+                <a:spcPts val="500"/>
+              </a:spcBef>
+              <a:buFont typeface="Arial" panose="020B0604020202020204" pitchFamily="34" charset="0"/>
+              <a:buNone/>
+              <a:defRPr sz="1800" b="1" kern="1200">
+                <a:solidFill>
+                  <a:schemeClr val="tx1"/>
+                </a:solidFill>
+                <a:effectLst>
+                  <a:outerShdw blurRad="50800" dist="38100" dir="2700000" algn="tl" rotWithShape="0">
+                    <a:srgbClr val="000000">
+                      <a:alpha val="48000"/>
+                    </a:srgbClr>
+                  </a:outerShdw>
+                </a:effectLst>
+                <a:latin typeface="+mn-lt"/>
+                <a:ea typeface="+mn-ea"/>
+                <a:cs typeface="+mn-cs"/>
+              </a:defRPr>
+            </a:lvl3pPr>
+            <a:lvl4pPr marL="1371600" indent="0" algn="l" defTabSz="914400" rtl="0" eaLnBrk="1" latinLnBrk="0" hangingPunct="1">
+              <a:lnSpc>
+                <a:spcPct val="120000"/>
+              </a:lnSpc>
+              <a:spcBef>
+                <a:spcPts val="500"/>
+              </a:spcBef>
+              <a:buFont typeface="Arial" panose="020B0604020202020204" pitchFamily="34" charset="0"/>
+              <a:buNone/>
+              <a:defRPr sz="1600" b="1" kern="1200">
+                <a:solidFill>
+                  <a:schemeClr val="tx1"/>
+                </a:solidFill>
+                <a:effectLst>
+                  <a:outerShdw blurRad="50800" dist="38100" dir="2700000" algn="tl" rotWithShape="0">
+                    <a:srgbClr val="000000">
+                      <a:alpha val="48000"/>
+                    </a:srgbClr>
+                  </a:outerShdw>
+                </a:effectLst>
+                <a:latin typeface="+mn-lt"/>
+                <a:ea typeface="+mn-ea"/>
+                <a:cs typeface="+mn-cs"/>
+              </a:defRPr>
+            </a:lvl4pPr>
+            <a:lvl5pPr marL="1828800" indent="0" algn="l" defTabSz="914400" rtl="0" eaLnBrk="1" latinLnBrk="0" hangingPunct="1">
+              <a:lnSpc>
+                <a:spcPct val="120000"/>
+              </a:lnSpc>
+              <a:spcBef>
+                <a:spcPts val="500"/>
+              </a:spcBef>
+              <a:buFont typeface="Arial" panose="020B0604020202020204" pitchFamily="34" charset="0"/>
+              <a:buNone/>
+              <a:defRPr sz="1600" b="1" kern="1200">
+                <a:solidFill>
+                  <a:schemeClr val="tx1"/>
+                </a:solidFill>
+                <a:effectLst>
+                  <a:outerShdw blurRad="50800" dist="38100" dir="2700000" algn="tl" rotWithShape="0">
+                    <a:srgbClr val="000000">
+                      <a:alpha val="48000"/>
+                    </a:srgbClr>
+                  </a:outerShdw>
+                </a:effectLst>
+                <a:latin typeface="+mn-lt"/>
+                <a:ea typeface="+mn-ea"/>
+                <a:cs typeface="+mn-cs"/>
+              </a:defRPr>
+            </a:lvl5pPr>
+            <a:lvl6pPr marL="2286000" indent="0" algn="l" defTabSz="914400" rtl="0" eaLnBrk="1" latinLnBrk="0" hangingPunct="1">
+              <a:lnSpc>
+                <a:spcPct val="120000"/>
+              </a:lnSpc>
+              <a:spcBef>
+                <a:spcPts val="500"/>
+              </a:spcBef>
+              <a:buFont typeface="Arial" panose="020B0604020202020204" pitchFamily="34" charset="0"/>
+              <a:buNone/>
+              <a:defRPr sz="1600" b="1" kern="1200">
+                <a:solidFill>
+                  <a:schemeClr val="tx1"/>
+                </a:solidFill>
+                <a:effectLst>
+                  <a:outerShdw blurRad="50800" dist="38100" dir="2700000" algn="tl" rotWithShape="0">
+                    <a:srgbClr val="000000">
+                      <a:alpha val="48000"/>
+                    </a:srgbClr>
+                  </a:outerShdw>
+                </a:effectLst>
+                <a:latin typeface="+mn-lt"/>
+                <a:ea typeface="+mn-ea"/>
+                <a:cs typeface="+mn-cs"/>
+              </a:defRPr>
+            </a:lvl6pPr>
+            <a:lvl7pPr marL="2743200" indent="0" algn="l" defTabSz="914400" rtl="0" eaLnBrk="1" latinLnBrk="0" hangingPunct="1">
+              <a:lnSpc>
+                <a:spcPct val="120000"/>
+              </a:lnSpc>
+              <a:spcBef>
+                <a:spcPts val="500"/>
+              </a:spcBef>
+              <a:buFont typeface="Arial" panose="020B0604020202020204" pitchFamily="34" charset="0"/>
+              <a:buNone/>
+              <a:defRPr sz="1600" b="1" kern="1200">
+                <a:solidFill>
+                  <a:schemeClr val="tx1"/>
+                </a:solidFill>
+                <a:effectLst>
+                  <a:outerShdw blurRad="50800" dist="38100" dir="2700000" algn="tl" rotWithShape="0">
+                    <a:srgbClr val="000000">
+                      <a:alpha val="48000"/>
+                    </a:srgbClr>
+                  </a:outerShdw>
+                </a:effectLst>
+                <a:latin typeface="+mn-lt"/>
+                <a:ea typeface="+mn-ea"/>
+                <a:cs typeface="+mn-cs"/>
+              </a:defRPr>
+            </a:lvl7pPr>
+            <a:lvl8pPr marL="3200400" indent="0" algn="l" defTabSz="914400" rtl="0" eaLnBrk="1" latinLnBrk="0" hangingPunct="1">
+              <a:lnSpc>
+                <a:spcPct val="120000"/>
+              </a:lnSpc>
+              <a:spcBef>
+                <a:spcPts val="500"/>
+              </a:spcBef>
+              <a:buFont typeface="Arial" panose="020B0604020202020204" pitchFamily="34" charset="0"/>
+              <a:buNone/>
+              <a:defRPr sz="1600" b="1" kern="1200">
+                <a:solidFill>
+                  <a:schemeClr val="tx1"/>
+                </a:solidFill>
+                <a:effectLst>
+                  <a:outerShdw blurRad="50800" dist="38100" dir="2700000" algn="tl" rotWithShape="0">
+                    <a:srgbClr val="000000">
+                      <a:alpha val="48000"/>
+                    </a:srgbClr>
+                  </a:outerShdw>
+                </a:effectLst>
+                <a:latin typeface="+mn-lt"/>
+                <a:ea typeface="+mn-ea"/>
+                <a:cs typeface="+mn-cs"/>
+              </a:defRPr>
+            </a:lvl8pPr>
+            <a:lvl9pPr marL="3657600" indent="0" algn="l" defTabSz="914400" rtl="0" eaLnBrk="1" latinLnBrk="0" hangingPunct="1">
+              <a:lnSpc>
+                <a:spcPct val="120000"/>
+              </a:lnSpc>
+              <a:spcBef>
+                <a:spcPts val="500"/>
+              </a:spcBef>
+              <a:buFont typeface="Arial" panose="020B0604020202020204" pitchFamily="34" charset="0"/>
+              <a:buNone/>
+              <a:defRPr sz="1600" b="1" kern="1200">
+                <a:solidFill>
+                  <a:schemeClr val="tx1"/>
+                </a:solidFill>
+                <a:effectLst>
+                  <a:outerShdw blurRad="50800" dist="38100" dir="2700000" algn="tl" rotWithShape="0">
+                    <a:srgbClr val="000000">
+                      <a:alpha val="48000"/>
+                    </a:srgbClr>
+                  </a:outerShdw>
+                </a:effectLst>
+                <a:latin typeface="+mn-lt"/>
+                <a:ea typeface="+mn-ea"/>
+                <a:cs typeface="+mn-cs"/>
+              </a:defRPr>
+            </a:lvl9pPr>
+          </a:lstStyle>
+          <a:p>
+            <a:pPr algn="ctr"/>
+            <a:r>
+              <a:rPr lang="en-US" dirty="0" smtClean="0"/>
+              <a:t>Together</a:t>
+            </a:r>
+          </a:p>
+        </p:txBody>
+      </p:sp>
+      <p:pic>
+        <p:nvPicPr>
+          <p:cNvPr id="12" name="Picture 2" descr="U:\git\COSC757\Assignments\ArticleSummary\Table 5.PNG"/>
+          <p:cNvPicPr>
+            <a:picLocks noChangeAspect="1" noChangeArrowheads="1"/>
+          </p:cNvPicPr>
+          <p:nvPr/>
+        </p:nvPicPr>
+        <p:blipFill>
+          <a:blip r:embed="rId6">
+            <a:extLst>
+              <a:ext uri="{28A0092B-C50C-407E-A947-70E740481C1C}">
+                <a14:useLocalDpi xmlns:a14="http://schemas.microsoft.com/office/drawing/2010/main" val="0"/>
+              </a:ext>
+            </a:extLst>
+          </a:blip>
+          <a:srcRect/>
+          <a:stretch>
+            <a:fillRect/>
+          </a:stretch>
+        </p:blipFill>
+        <p:spPr bwMode="auto">
+          <a:xfrm>
+            <a:off x="4536430" y="4996371"/>
+            <a:ext cx="3245017" cy="1339919"/>
+          </a:xfrm>
+          <a:prstGeom prst="rect">
+            <a:avLst/>
+          </a:prstGeom>
+          <a:noFill/>
+          <a:extLst>
+            <a:ext uri="{909E8E84-426E-40DD-AFC4-6F175D3DCCD1}">
+              <a14:hiddenFill xmlns:a14="http://schemas.microsoft.com/office/drawing/2010/main">
+                <a:solidFill>
+                  <a:srgbClr val="FFFFFF"/>
+                </a:solidFill>
+              </a14:hiddenFill>
+            </a:ext>
+          </a:extLst>
+        </p:spPr>
+      </p:pic>
+    </p:spTree>
+    <p:extLst>
+      <p:ext uri="{BB962C8B-B14F-4D97-AF65-F5344CB8AC3E}">
+        <p14:creationId xmlns:p14="http://schemas.microsoft.com/office/powerpoint/2010/main" val="1548367371"/>
+      </p:ext>
+    </p:extLst>
+  </p:cSld>
+  <p:clrMapOvr>
+    <a:masterClrMapping/>
+  </p:clrMapOvr>
+</p:sld>
+</file>
+
+<file path=ppt/slides/slide9.xml><?xml version="1.0" encoding="utf-8"?>
+<p:sld xmlns:a="http://schemas.openxmlformats.org/drawingml/2006/main" xmlns:r="http://schemas.openxmlformats.org/officeDocument/2006/relationships" xmlns:p="http://schemas.openxmlformats.org/presentationml/2006/main">
+  <p:cSld>
+    <p:spTree>
+      <p:nvGrpSpPr>
+        <p:cNvPr id="1" name=""/>
+        <p:cNvGrpSpPr/>
+        <p:nvPr/>
+      </p:nvGrpSpPr>
+      <p:grpSpPr>
+        <a:xfrm>
+          <a:off x="0" y="0"/>
+          <a:ext cx="0" cy="0"/>
+          <a:chOff x="0" y="0"/>
+          <a:chExt cx="0" cy="0"/>
+        </a:xfrm>
+      </p:grpSpPr>
+      <p:sp>
+        <p:nvSpPr>
+          <p:cNvPr id="2" name="Title 1"/>
+          <p:cNvSpPr>
+            <a:spLocks noGrp="1"/>
+          </p:cNvSpPr>
+          <p:nvPr>
+            <p:ph type="title"/>
+          </p:nvPr>
+        </p:nvSpPr>
+        <p:spPr>
+          <a:xfrm>
+            <a:off x="913795" y="457200"/>
+            <a:ext cx="10353761" cy="914400"/>
+          </a:xfrm>
+        </p:spPr>
+        <p:txBody>
+          <a:bodyPr/>
+          <a:lstStyle/>
+          <a:p>
+            <a:r>
+              <a:rPr lang="en-US" dirty="0" smtClean="0"/>
+              <a:t>Thoughts/Questions</a:t>
+            </a:r>
+            <a:endParaRPr lang="en-US" dirty="0"/>
+          </a:p>
+        </p:txBody>
+      </p:sp>
+      <p:sp>
+        <p:nvSpPr>
+          <p:cNvPr id="3" name="Content Placeholder 2"/>
+          <p:cNvSpPr>
+            <a:spLocks noGrp="1"/>
+          </p:cNvSpPr>
+          <p:nvPr>
+            <p:ph idx="1"/>
+          </p:nvPr>
+        </p:nvSpPr>
+        <p:spPr>
+          <a:xfrm>
+            <a:off x="913795" y="1600200"/>
+            <a:ext cx="10353762" cy="4572000"/>
+          </a:xfrm>
+        </p:spPr>
+        <p:txBody>
+          <a:bodyPr/>
+          <a:lstStyle/>
+          <a:p>
+            <a:r>
+              <a:rPr lang="en-US" dirty="0" smtClean="0"/>
+              <a:t>Crowdsourcing – the authors originally looked at this technique</a:t>
+            </a:r>
+          </a:p>
+          <a:p>
+            <a:pPr lvl="1"/>
+            <a:r>
+              <a:rPr lang="en-US" dirty="0" smtClean="0"/>
+              <a:t>Ways to overcome shortcomings that may be used in conjunction with Keyboard Correction and Selected Alternate data</a:t>
+            </a:r>
+            <a:endParaRPr lang="en-US" dirty="0" smtClean="0"/>
+          </a:p>
+          <a:p>
+            <a:r>
+              <a:rPr lang="en-US" dirty="0" smtClean="0"/>
+              <a:t>Can/is the data obtained from these tests used to also create better Selected Alternate data choices?</a:t>
+            </a:r>
+          </a:p>
+          <a:p>
+            <a:r>
+              <a:rPr lang="en-US" dirty="0" smtClean="0"/>
+              <a:t>Homophones (same pronunciation, different spelling and/or meaning) and how they affect misrecognitions</a:t>
+            </a:r>
+          </a:p>
+          <a:p>
+            <a:pPr lvl="1"/>
+            <a:r>
+              <a:rPr lang="en-US" dirty="0" smtClean="0"/>
+              <a:t>Their, there, they’re</a:t>
+            </a:r>
+            <a:endParaRPr lang="en-US" dirty="0" smtClean="0"/>
           </a:p>
         </p:txBody>
       </p:sp>
@@ -6277,4 +9127,289 @@
     </a:ext>
   </a:extLst>
 </a:theme>
+</file>
+
+<file path=ppt/theme/theme2.xml><?xml version="1.0" encoding="utf-8"?>
+<a:theme xmlns:a="http://schemas.openxmlformats.org/drawingml/2006/main" name="Office Theme">
+  <a:themeElements>
+    <a:clrScheme name="Office">
+      <a:dk1>
+        <a:sysClr val="windowText" lastClr="000000"/>
+      </a:dk1>
+      <a:lt1>
+        <a:sysClr val="window" lastClr="FFFFFF"/>
+      </a:lt1>
+      <a:dk2>
+        <a:srgbClr val="1F497D"/>
+      </a:dk2>
+      <a:lt2>
+        <a:srgbClr val="EEECE1"/>
+      </a:lt2>
+      <a:accent1>
+        <a:srgbClr val="4F81BD"/>
+      </a:accent1>
+      <a:accent2>
+        <a:srgbClr val="C0504D"/>
+      </a:accent2>
+      <a:accent3>
+        <a:srgbClr val="9BBB59"/>
+      </a:accent3>
+      <a:accent4>
+        <a:srgbClr val="8064A2"/>
+      </a:accent4>
+      <a:accent5>
+        <a:srgbClr val="4BACC6"/>
+      </a:accent5>
+      <a:accent6>
+        <a:srgbClr val="F79646"/>
+      </a:accent6>
+      <a:hlink>
+        <a:srgbClr val="0000FF"/>
+      </a:hlink>
+      <a:folHlink>
+        <a:srgbClr val="800080"/>
+      </a:folHlink>
+    </a:clrScheme>
+    <a:fontScheme name="Office">
+      <a:majorFont>
+        <a:latin typeface="Calibri"/>
+        <a:ea typeface=""/>
+        <a:cs typeface=""/>
+        <a:font script="Jpan" typeface="ＭＳ Ｐゴシック"/>
+        <a:font script="Hang" typeface="맑은 고딕"/>
+        <a:font script="Hans" typeface="宋体"/>
+        <a:font script="Hant" typeface="新細明體"/>
+        <a:font script="Arab" typeface="Times New Roman"/>
+        <a:font script="Hebr" typeface="Times New Roman"/>
+        <a:font script="Thai" typeface="Angsana New"/>
+        <a:font script="Ethi" typeface="Nyala"/>
+        <a:font script="Beng" typeface="Vrinda"/>
+        <a:font script="Gujr" typeface="Shruti"/>
+        <a:font script="Khmr" typeface="MoolBoran"/>
+        <a:font script="Knda" typeface="Tunga"/>
+        <a:font script="Guru" typeface="Raavi"/>
+        <a:font script="Cans" typeface="Euphemia"/>
+        <a:font script="Cher" typeface="Plantagenet Cherokee"/>
+        <a:font script="Yiii" typeface="Microsoft Yi Baiti"/>
+        <a:font script="Tibt" typeface="Microsoft Himalaya"/>
+        <a:font script="Thaa" typeface="MV Boli"/>
+        <a:font script="Deva" typeface="Mangal"/>
+        <a:font script="Telu" typeface="Gautami"/>
+        <a:font script="Taml" typeface="Latha"/>
+        <a:font script="Syrc" typeface="Estrangelo Edessa"/>
+        <a:font script="Orya" typeface="Kalinga"/>
+        <a:font script="Mlym" typeface="Kartika"/>
+        <a:font script="Laoo" typeface="DokChampa"/>
+        <a:font script="Sinh" typeface="Iskoola Pota"/>
+        <a:font script="Mong" typeface="Mongolian Baiti"/>
+        <a:font script="Viet" typeface="Times New Roman"/>
+        <a:font script="Uigh" typeface="Microsoft Uighur"/>
+        <a:font script="Geor" typeface="Sylfaen"/>
+      </a:majorFont>
+      <a:minorFont>
+        <a:latin typeface="Calibri"/>
+        <a:ea typeface=""/>
+        <a:cs typeface=""/>
+        <a:font script="Jpan" typeface="ＭＳ Ｐゴシック"/>
+        <a:font script="Hang" typeface="맑은 고딕"/>
+        <a:font script="Hans" typeface="宋体"/>
+        <a:font script="Hant" typeface="新細明體"/>
+        <a:font script="Arab" typeface="Arial"/>
+        <a:font script="Hebr" typeface="Arial"/>
+        <a:font script="Thai" typeface="Cordia New"/>
+        <a:font script="Ethi" typeface="Nyala"/>
+        <a:font script="Beng" typeface="Vrinda"/>
+        <a:font script="Gujr" typeface="Shruti"/>
+        <a:font script="Khmr" typeface="DaunPenh"/>
+        <a:font script="Knda" typeface="Tunga"/>
+        <a:font script="Guru" typeface="Raavi"/>
+        <a:font script="Cans" typeface="Euphemia"/>
+        <a:font script="Cher" typeface="Plantagenet Cherokee"/>
+        <a:font script="Yiii" typeface="Microsoft Yi Baiti"/>
+        <a:font script="Tibt" typeface="Microsoft Himalaya"/>
+        <a:font script="Thaa" typeface="MV Boli"/>
+        <a:font script="Deva" typeface="Mangal"/>
+        <a:font script="Telu" typeface="Gautami"/>
+        <a:font script="Taml" typeface="Latha"/>
+        <a:font script="Syrc" typeface="Estrangelo Edessa"/>
+        <a:font script="Orya" typeface="Kalinga"/>
+        <a:font script="Mlym" typeface="Kartika"/>
+        <a:font script="Laoo" typeface="DokChampa"/>
+        <a:font script="Sinh" typeface="Iskoola Pota"/>
+        <a:font script="Mong" typeface="Mongolian Baiti"/>
+        <a:font script="Viet" typeface="Arial"/>
+        <a:font script="Uigh" typeface="Microsoft Uighur"/>
+        <a:font script="Geor" typeface="Sylfaen"/>
+      </a:minorFont>
+    </a:fontScheme>
+    <a:fmtScheme name="Office">
+      <a:fillStyleLst>
+        <a:solidFill>
+          <a:schemeClr val="phClr"/>
+        </a:solidFill>
+        <a:gradFill rotWithShape="1">
+          <a:gsLst>
+            <a:gs pos="0">
+              <a:schemeClr val="phClr">
+                <a:tint val="50000"/>
+                <a:satMod val="300000"/>
+              </a:schemeClr>
+            </a:gs>
+            <a:gs pos="35000">
+              <a:schemeClr val="phClr">
+                <a:tint val="37000"/>
+                <a:satMod val="300000"/>
+              </a:schemeClr>
+            </a:gs>
+            <a:gs pos="100000">
+              <a:schemeClr val="phClr">
+                <a:tint val="15000"/>
+                <a:satMod val="350000"/>
+              </a:schemeClr>
+            </a:gs>
+          </a:gsLst>
+          <a:lin ang="16200000" scaled="1"/>
+        </a:gradFill>
+        <a:gradFill rotWithShape="1">
+          <a:gsLst>
+            <a:gs pos="0">
+              <a:schemeClr val="phClr">
+                <a:shade val="51000"/>
+                <a:satMod val="130000"/>
+              </a:schemeClr>
+            </a:gs>
+            <a:gs pos="80000">
+              <a:schemeClr val="phClr">
+                <a:shade val="93000"/>
+                <a:satMod val="130000"/>
+              </a:schemeClr>
+            </a:gs>
+            <a:gs pos="100000">
+              <a:schemeClr val="phClr">
+                <a:shade val="94000"/>
+                <a:satMod val="135000"/>
+              </a:schemeClr>
+            </a:gs>
+          </a:gsLst>
+          <a:lin ang="16200000" scaled="0"/>
+        </a:gradFill>
+      </a:fillStyleLst>
+      <a:lnStyleLst>
+        <a:ln w="9525" cap="flat" cmpd="sng" algn="ctr">
+          <a:solidFill>
+            <a:schemeClr val="phClr">
+              <a:shade val="95000"/>
+              <a:satMod val="105000"/>
+            </a:schemeClr>
+          </a:solidFill>
+          <a:prstDash val="solid"/>
+        </a:ln>
+        <a:ln w="25400" cap="flat" cmpd="sng" algn="ctr">
+          <a:solidFill>
+            <a:schemeClr val="phClr"/>
+          </a:solidFill>
+          <a:prstDash val="solid"/>
+        </a:ln>
+        <a:ln w="38100" cap="flat" cmpd="sng" algn="ctr">
+          <a:solidFill>
+            <a:schemeClr val="phClr"/>
+          </a:solidFill>
+          <a:prstDash val="solid"/>
+        </a:ln>
+      </a:lnStyleLst>
+      <a:effectStyleLst>
+        <a:effectStyle>
+          <a:effectLst>
+            <a:outerShdw blurRad="40000" dist="20000" dir="5400000" rotWithShape="0">
+              <a:srgbClr val="000000">
+                <a:alpha val="38000"/>
+              </a:srgbClr>
+            </a:outerShdw>
+          </a:effectLst>
+        </a:effectStyle>
+        <a:effectStyle>
+          <a:effectLst>
+            <a:outerShdw blurRad="40000" dist="23000" dir="5400000" rotWithShape="0">
+              <a:srgbClr val="000000">
+                <a:alpha val="35000"/>
+              </a:srgbClr>
+            </a:outerShdw>
+          </a:effectLst>
+        </a:effectStyle>
+        <a:effectStyle>
+          <a:effectLst>
+            <a:outerShdw blurRad="40000" dist="23000" dir="5400000" rotWithShape="0">
+              <a:srgbClr val="000000">
+                <a:alpha val="35000"/>
+              </a:srgbClr>
+            </a:outerShdw>
+          </a:effectLst>
+          <a:scene3d>
+            <a:camera prst="orthographicFront">
+              <a:rot lat="0" lon="0" rev="0"/>
+            </a:camera>
+            <a:lightRig rig="threePt" dir="t">
+              <a:rot lat="0" lon="0" rev="1200000"/>
+            </a:lightRig>
+          </a:scene3d>
+          <a:sp3d>
+            <a:bevelT w="63500" h="25400"/>
+          </a:sp3d>
+        </a:effectStyle>
+      </a:effectStyleLst>
+      <a:bgFillStyleLst>
+        <a:solidFill>
+          <a:schemeClr val="phClr"/>
+        </a:solidFill>
+        <a:gradFill rotWithShape="1">
+          <a:gsLst>
+            <a:gs pos="0">
+              <a:schemeClr val="phClr">
+                <a:tint val="40000"/>
+                <a:satMod val="350000"/>
+              </a:schemeClr>
+            </a:gs>
+            <a:gs pos="40000">
+              <a:schemeClr val="phClr">
+                <a:tint val="45000"/>
+                <a:shade val="99000"/>
+                <a:satMod val="350000"/>
+              </a:schemeClr>
+            </a:gs>
+            <a:gs pos="100000">
+              <a:schemeClr val="phClr">
+                <a:shade val="20000"/>
+                <a:satMod val="255000"/>
+              </a:schemeClr>
+            </a:gs>
+          </a:gsLst>
+          <a:path path="circle">
+            <a:fillToRect l="50000" t="-80000" r="50000" b="180000"/>
+          </a:path>
+        </a:gradFill>
+        <a:gradFill rotWithShape="1">
+          <a:gsLst>
+            <a:gs pos="0">
+              <a:schemeClr val="phClr">
+                <a:tint val="80000"/>
+                <a:satMod val="300000"/>
+              </a:schemeClr>
+            </a:gs>
+            <a:gs pos="100000">
+              <a:schemeClr val="phClr">
+                <a:shade val="30000"/>
+                <a:satMod val="200000"/>
+              </a:schemeClr>
+            </a:gs>
+          </a:gsLst>
+          <a:path path="circle">
+            <a:fillToRect l="50000" t="50000" r="50000" b="50000"/>
+          </a:path>
+        </a:gradFill>
+      </a:bgFillStyleLst>
+    </a:fmtScheme>
+  </a:themeElements>
+  <a:objectDefaults/>
+  <a:extraClrSchemeLst/>
+</a:theme>
 </file>
</xml_diff>